<commit_message>
updated layout draft in accordance with the latest changes (previous commit)
</commit_message>
<xml_diff>
--- a/layout.pptx
+++ b/layout.pptx
@@ -104,6 +104,11 @@
       </a:defRPr>
     </a:lvl9pPr>
   </p:defaultTextStyle>
+  <p:extLst>
+    <p:ext uri="{EFAFB233-063F-42B5-8137-9DF3F51BA10A}">
+      <p15:sldGuideLst xmlns:p15="http://schemas.microsoft.com/office/powerpoint/2012/main"/>
+    </p:ext>
+  </p:extLst>
 </p:presentation>
 </file>
 
@@ -238,7 +243,7 @@
           <a:p>
             <a:fld id="{C782FC65-C45D-46EC-96CC-48548B21CF81}" type="datetimeFigureOut">
               <a:rPr lang="en-US" smtClean="0"/>
-              <a:t>3/10/2020</a:t>
+              <a:t>3/11/20</a:t>
             </a:fld>
             <a:endParaRPr lang="en-US"/>
           </a:p>
@@ -408,7 +413,7 @@
           <a:p>
             <a:fld id="{C782FC65-C45D-46EC-96CC-48548B21CF81}" type="datetimeFigureOut">
               <a:rPr lang="en-US" smtClean="0"/>
-              <a:t>3/10/2020</a:t>
+              <a:t>3/11/20</a:t>
             </a:fld>
             <a:endParaRPr lang="en-US"/>
           </a:p>
@@ -588,7 +593,7 @@
           <a:p>
             <a:fld id="{C782FC65-C45D-46EC-96CC-48548B21CF81}" type="datetimeFigureOut">
               <a:rPr lang="en-US" smtClean="0"/>
-              <a:t>3/10/2020</a:t>
+              <a:t>3/11/20</a:t>
             </a:fld>
             <a:endParaRPr lang="en-US"/>
           </a:p>
@@ -758,7 +763,7 @@
           <a:p>
             <a:fld id="{C782FC65-C45D-46EC-96CC-48548B21CF81}" type="datetimeFigureOut">
               <a:rPr lang="en-US" smtClean="0"/>
-              <a:t>3/10/2020</a:t>
+              <a:t>3/11/20</a:t>
             </a:fld>
             <a:endParaRPr lang="en-US"/>
           </a:p>
@@ -1002,7 +1007,7 @@
           <a:p>
             <a:fld id="{C782FC65-C45D-46EC-96CC-48548B21CF81}" type="datetimeFigureOut">
               <a:rPr lang="en-US" smtClean="0"/>
-              <a:t>3/10/2020</a:t>
+              <a:t>3/11/20</a:t>
             </a:fld>
             <a:endParaRPr lang="en-US"/>
           </a:p>
@@ -1234,7 +1239,7 @@
           <a:p>
             <a:fld id="{C782FC65-C45D-46EC-96CC-48548B21CF81}" type="datetimeFigureOut">
               <a:rPr lang="en-US" smtClean="0"/>
-              <a:t>3/10/2020</a:t>
+              <a:t>3/11/20</a:t>
             </a:fld>
             <a:endParaRPr lang="en-US"/>
           </a:p>
@@ -1601,7 +1606,7 @@
           <a:p>
             <a:fld id="{C782FC65-C45D-46EC-96CC-48548B21CF81}" type="datetimeFigureOut">
               <a:rPr lang="en-US" smtClean="0"/>
-              <a:t>3/10/2020</a:t>
+              <a:t>3/11/20</a:t>
             </a:fld>
             <a:endParaRPr lang="en-US"/>
           </a:p>
@@ -1719,7 +1724,7 @@
           <a:p>
             <a:fld id="{C782FC65-C45D-46EC-96CC-48548B21CF81}" type="datetimeFigureOut">
               <a:rPr lang="en-US" smtClean="0"/>
-              <a:t>3/10/2020</a:t>
+              <a:t>3/11/20</a:t>
             </a:fld>
             <a:endParaRPr lang="en-US"/>
           </a:p>
@@ -1814,7 +1819,7 @@
           <a:p>
             <a:fld id="{C782FC65-C45D-46EC-96CC-48548B21CF81}" type="datetimeFigureOut">
               <a:rPr lang="en-US" smtClean="0"/>
-              <a:t>3/10/2020</a:t>
+              <a:t>3/11/20</a:t>
             </a:fld>
             <a:endParaRPr lang="en-US"/>
           </a:p>
@@ -2091,7 +2096,7 @@
           <a:p>
             <a:fld id="{C782FC65-C45D-46EC-96CC-48548B21CF81}" type="datetimeFigureOut">
               <a:rPr lang="en-US" smtClean="0"/>
-              <a:t>3/10/2020</a:t>
+              <a:t>3/11/20</a:t>
             </a:fld>
             <a:endParaRPr lang="en-US"/>
           </a:p>
@@ -2348,7 +2353,7 @@
           <a:p>
             <a:fld id="{C782FC65-C45D-46EC-96CC-48548B21CF81}" type="datetimeFigureOut">
               <a:rPr lang="en-US" smtClean="0"/>
-              <a:t>3/10/2020</a:t>
+              <a:t>3/11/20</a:t>
             </a:fld>
             <a:endParaRPr lang="en-US"/>
           </a:p>
@@ -2561,7 +2566,7 @@
           <a:p>
             <a:fld id="{C782FC65-C45D-46EC-96CC-48548B21CF81}" type="datetimeFigureOut">
               <a:rPr lang="en-US" smtClean="0"/>
-              <a:t>3/10/2020</a:t>
+              <a:t>3/11/20</a:t>
             </a:fld>
             <a:endParaRPr lang="en-US"/>
           </a:p>
@@ -3306,10 +3311,10 @@
         </p:nvGrpSpPr>
         <p:grpSpPr>
           <a:xfrm>
-            <a:off x="787400" y="650240"/>
-            <a:ext cx="5283200" cy="1219200"/>
-            <a:chOff x="787400" y="650240"/>
-            <a:chExt cx="5283200" cy="1219200"/>
+            <a:off x="787399" y="650240"/>
+            <a:ext cx="5283201" cy="1219200"/>
+            <a:chOff x="787399" y="650240"/>
+            <a:chExt cx="5283201" cy="1219200"/>
           </a:xfrm>
         </p:grpSpPr>
         <p:sp>
@@ -3382,8 +3387,8 @@
           </p:nvSpPr>
           <p:spPr>
             <a:xfrm>
-              <a:off x="787400" y="680720"/>
-              <a:ext cx="2321560" cy="121920"/>
+              <a:off x="787399" y="680720"/>
+              <a:ext cx="4834925" cy="163830"/>
             </a:xfrm>
             <a:prstGeom prst="rect">
               <a:avLst/>
@@ -3419,7 +3424,23 @@
                     <a:schemeClr val="accent5"/>
                   </a:solidFill>
                 </a:rPr>
-                <a:t>&lt;div&gt; .content-horizontal-center</a:t>
+                <a:t>&lt;div&gt; .content-horizontal-center .</a:t>
+              </a:r>
+              <a:r>
+                <a:rPr lang="en-US" sz="1200" dirty="0" err="1">
+                  <a:solidFill>
+                    <a:schemeClr val="accent5"/>
+                  </a:solidFill>
+                </a:rPr>
+                <a:t>head_content</a:t>
+              </a:r>
+              <a:r>
+                <a:rPr lang="en-US" sz="1200" dirty="0">
+                  <a:solidFill>
+                    <a:schemeClr val="accent5"/>
+                  </a:solidFill>
+                </a:rPr>
+                <a:t>-vertical-center</a:t>
               </a:r>
             </a:p>
           </p:txBody>
@@ -3495,7 +3516,7 @@
         </p:nvSpPr>
         <p:spPr>
           <a:xfrm>
-            <a:off x="716280" y="1008380"/>
+            <a:off x="2433869" y="997122"/>
             <a:ext cx="2321560" cy="121920"/>
           </a:xfrm>
           <a:prstGeom prst="rect">
@@ -3532,8 +3553,21 @@
                   <a:schemeClr val="accent2"/>
                 </a:solidFill>
               </a:rPr>
-              <a:t>&lt;div&gt; .head-vertical-center</a:t>
-            </a:r>
+              <a:t>&lt;div&gt; .</a:t>
+            </a:r>
+            <a:r>
+              <a:rPr lang="en-US" sz="1200" dirty="0" err="1">
+                <a:solidFill>
+                  <a:schemeClr val="accent2"/>
+                </a:solidFill>
+              </a:rPr>
+              <a:t>head__content</a:t>
+            </a:r>
+            <a:endParaRPr lang="en-US" sz="1200" dirty="0">
+              <a:solidFill>
+                <a:schemeClr val="accent2"/>
+              </a:solidFill>
+            </a:endParaRPr>
           </a:p>
         </p:txBody>
       </p:sp>
@@ -3612,7 +3646,7 @@
         </p:nvSpPr>
         <p:spPr>
           <a:xfrm>
-            <a:off x="1071880" y="1214120"/>
+            <a:off x="1071880" y="1152165"/>
             <a:ext cx="1275080" cy="121920"/>
           </a:xfrm>
           <a:prstGeom prst="rect">
@@ -3653,8 +3687,27 @@
                   </a:schemeClr>
                 </a:solidFill>
               </a:rPr>
-              <a:t>&lt;img&gt; .logo</a:t>
-            </a:r>
+              <a:t>&lt;img&gt; .</a:t>
+            </a:r>
+            <a:r>
+              <a:rPr lang="en-US" sz="1200" dirty="0" err="1">
+                <a:solidFill>
+                  <a:schemeClr val="tx1">
+                    <a:lumMod val="50000"/>
+                    <a:lumOff val="50000"/>
+                  </a:schemeClr>
+                </a:solidFill>
+              </a:rPr>
+              <a:t>head__logo</a:t>
+            </a:r>
+            <a:endParaRPr lang="en-US" sz="1200" dirty="0">
+              <a:solidFill>
+                <a:schemeClr val="tx1">
+                  <a:lumMod val="50000"/>
+                  <a:lumOff val="50000"/>
+                </a:schemeClr>
+              </a:solidFill>
+            </a:endParaRPr>
           </a:p>
         </p:txBody>
       </p:sp>

</xml_diff>

<commit_message>
added a checklist for sprites
</commit_message>
<xml_diff>
--- a/layout.pptx
+++ b/layout.pptx
@@ -2,12 +2,13 @@
 <file path=ppt/presentation.xml><?xml version="1.0" encoding="utf-8"?>
 <p:presentation xmlns:a="http://schemas.openxmlformats.org/drawingml/2006/main" xmlns:r="http://schemas.openxmlformats.org/officeDocument/2006/relationships" xmlns:p="http://schemas.openxmlformats.org/presentationml/2006/main" saveSubsetFonts="1">
   <p:sldMasterIdLst>
-    <p:sldMasterId id="2147483660" r:id="rId1"/>
+    <p:sldMasterId id="2147483672" r:id="rId1"/>
   </p:sldMasterIdLst>
   <p:sldIdLst>
     <p:sldId id="257" r:id="rId2"/>
+    <p:sldId id="258" r:id="rId3"/>
   </p:sldIdLst>
-  <p:sldSz cx="6858000" cy="12192000"/>
+  <p:sldSz cx="16256000" cy="12192000"/>
   <p:notesSz cx="6858000" cy="9144000"/>
   <p:defaultTextStyle>
     <a:defPPr>
@@ -141,15 +142,15 @@
         </p:nvSpPr>
         <p:spPr>
           <a:xfrm>
-            <a:off x="514350" y="1995312"/>
-            <a:ext cx="5829300" cy="4244622"/>
+            <a:off x="1219200" y="1995312"/>
+            <a:ext cx="13817600" cy="4244622"/>
           </a:xfrm>
         </p:spPr>
         <p:txBody>
           <a:bodyPr anchor="b"/>
           <a:lstStyle>
             <a:lvl1pPr algn="ctr">
-              <a:defRPr sz="4500"/>
+              <a:defRPr sz="10667"/>
             </a:lvl1pPr>
           </a:lstStyle>
           <a:p>
@@ -173,8 +174,8 @@
         </p:nvSpPr>
         <p:spPr>
           <a:xfrm>
-            <a:off x="857250" y="6403623"/>
-            <a:ext cx="5143500" cy="2943577"/>
+            <a:off x="2032000" y="6403623"/>
+            <a:ext cx="12192000" cy="2943577"/>
           </a:xfrm>
         </p:spPr>
         <p:txBody>
@@ -182,39 +183,39 @@
           <a:lstStyle>
             <a:lvl1pPr marL="0" indent="0" algn="ctr">
               <a:buNone/>
-              <a:defRPr sz="1800"/>
+              <a:defRPr sz="4267"/>
             </a:lvl1pPr>
-            <a:lvl2pPr marL="342900" indent="0" algn="ctr">
-              <a:buNone/>
-              <a:defRPr sz="1500"/>
+            <a:lvl2pPr marL="812810" indent="0" algn="ctr">
+              <a:buNone/>
+              <a:defRPr sz="3556"/>
             </a:lvl2pPr>
-            <a:lvl3pPr marL="685800" indent="0" algn="ctr">
-              <a:buNone/>
-              <a:defRPr sz="1350"/>
+            <a:lvl3pPr marL="1625620" indent="0" algn="ctr">
+              <a:buNone/>
+              <a:defRPr sz="3200"/>
             </a:lvl3pPr>
-            <a:lvl4pPr marL="1028700" indent="0" algn="ctr">
-              <a:buNone/>
-              <a:defRPr sz="1200"/>
+            <a:lvl4pPr marL="2438430" indent="0" algn="ctr">
+              <a:buNone/>
+              <a:defRPr sz="2844"/>
             </a:lvl4pPr>
-            <a:lvl5pPr marL="1371600" indent="0" algn="ctr">
-              <a:buNone/>
-              <a:defRPr sz="1200"/>
+            <a:lvl5pPr marL="3251241" indent="0" algn="ctr">
+              <a:buNone/>
+              <a:defRPr sz="2844"/>
             </a:lvl5pPr>
-            <a:lvl6pPr marL="1714500" indent="0" algn="ctr">
-              <a:buNone/>
-              <a:defRPr sz="1200"/>
+            <a:lvl6pPr marL="4064051" indent="0" algn="ctr">
+              <a:buNone/>
+              <a:defRPr sz="2844"/>
             </a:lvl6pPr>
-            <a:lvl7pPr marL="2057400" indent="0" algn="ctr">
-              <a:buNone/>
-              <a:defRPr sz="1200"/>
+            <a:lvl7pPr marL="4876861" indent="0" algn="ctr">
+              <a:buNone/>
+              <a:defRPr sz="2844"/>
             </a:lvl7pPr>
-            <a:lvl8pPr marL="2400300" indent="0" algn="ctr">
-              <a:buNone/>
-              <a:defRPr sz="1200"/>
+            <a:lvl8pPr marL="5689671" indent="0" algn="ctr">
+              <a:buNone/>
+              <a:defRPr sz="2844"/>
             </a:lvl8pPr>
-            <a:lvl9pPr marL="2743200" indent="0" algn="ctr">
-              <a:buNone/>
-              <a:defRPr sz="1200"/>
+            <a:lvl9pPr marL="6502481" indent="0" algn="ctr">
+              <a:buNone/>
+              <a:defRPr sz="2844"/>
             </a:lvl9pPr>
           </a:lstStyle>
           <a:p>
@@ -294,7 +295,7 @@
     </p:spTree>
     <p:extLst>
       <p:ext uri="{BB962C8B-B14F-4D97-AF65-F5344CB8AC3E}">
-        <p14:creationId xmlns:p14="http://schemas.microsoft.com/office/powerpoint/2010/main" val="3167062625"/>
+        <p14:creationId xmlns:p14="http://schemas.microsoft.com/office/powerpoint/2010/main" val="1251905288"/>
       </p:ext>
     </p:extLst>
   </p:cSld>
@@ -464,7 +465,7 @@
     </p:spTree>
     <p:extLst>
       <p:ext uri="{BB962C8B-B14F-4D97-AF65-F5344CB8AC3E}">
-        <p14:creationId xmlns:p14="http://schemas.microsoft.com/office/powerpoint/2010/main" val="4087893072"/>
+        <p14:creationId xmlns:p14="http://schemas.microsoft.com/office/powerpoint/2010/main" val="563610572"/>
       </p:ext>
     </p:extLst>
   </p:cSld>
@@ -503,8 +504,8 @@
         </p:nvSpPr>
         <p:spPr>
           <a:xfrm>
-            <a:off x="4907757" y="649111"/>
-            <a:ext cx="1478756" cy="10332156"/>
+            <a:off x="11633201" y="649111"/>
+            <a:ext cx="3505200" cy="10332156"/>
           </a:xfrm>
         </p:spPr>
         <p:txBody>
@@ -531,8 +532,8 @@
         </p:nvSpPr>
         <p:spPr>
           <a:xfrm>
-            <a:off x="471488" y="649111"/>
-            <a:ext cx="4350544" cy="10332156"/>
+            <a:off x="1117601" y="649111"/>
+            <a:ext cx="10312400" cy="10332156"/>
           </a:xfrm>
         </p:spPr>
         <p:txBody>
@@ -644,7 +645,7 @@
     </p:spTree>
     <p:extLst>
       <p:ext uri="{BB962C8B-B14F-4D97-AF65-F5344CB8AC3E}">
-        <p14:creationId xmlns:p14="http://schemas.microsoft.com/office/powerpoint/2010/main" val="3466010757"/>
+        <p14:creationId xmlns:p14="http://schemas.microsoft.com/office/powerpoint/2010/main" val="1759449280"/>
       </p:ext>
     </p:extLst>
   </p:cSld>
@@ -814,7 +815,7 @@
     </p:spTree>
     <p:extLst>
       <p:ext uri="{BB962C8B-B14F-4D97-AF65-F5344CB8AC3E}">
-        <p14:creationId xmlns:p14="http://schemas.microsoft.com/office/powerpoint/2010/main" val="4161801683"/>
+        <p14:creationId xmlns:p14="http://schemas.microsoft.com/office/powerpoint/2010/main" val="1246066706"/>
       </p:ext>
     </p:extLst>
   </p:cSld>
@@ -853,15 +854,15 @@
         </p:nvSpPr>
         <p:spPr>
           <a:xfrm>
-            <a:off x="467916" y="3039537"/>
-            <a:ext cx="5915025" cy="5071532"/>
+            <a:off x="1109134" y="3039537"/>
+            <a:ext cx="14020800" cy="5071532"/>
           </a:xfrm>
         </p:spPr>
         <p:txBody>
           <a:bodyPr anchor="b"/>
           <a:lstStyle>
             <a:lvl1pPr>
-              <a:defRPr sz="4500"/>
+              <a:defRPr sz="10667"/>
             </a:lvl1pPr>
           </a:lstStyle>
           <a:p>
@@ -885,8 +886,8 @@
         </p:nvSpPr>
         <p:spPr>
           <a:xfrm>
-            <a:off x="467916" y="8159048"/>
-            <a:ext cx="5915025" cy="2666999"/>
+            <a:off x="1109134" y="8159048"/>
+            <a:ext cx="14020800" cy="2666999"/>
           </a:xfrm>
         </p:spPr>
         <p:txBody>
@@ -894,15 +895,15 @@
           <a:lstStyle>
             <a:lvl1pPr marL="0" indent="0">
               <a:buNone/>
-              <a:defRPr sz="1800">
+              <a:defRPr sz="4267">
                 <a:solidFill>
                   <a:schemeClr val="tx1"/>
                 </a:solidFill>
               </a:defRPr>
             </a:lvl1pPr>
-            <a:lvl2pPr marL="342900" indent="0">
-              <a:buNone/>
-              <a:defRPr sz="1500">
+            <a:lvl2pPr marL="812810" indent="0">
+              <a:buNone/>
+              <a:defRPr sz="3556">
                 <a:solidFill>
                   <a:schemeClr val="tx1">
                     <a:tint val="75000"/>
@@ -910,9 +911,9 @@
                 </a:solidFill>
               </a:defRPr>
             </a:lvl2pPr>
-            <a:lvl3pPr marL="685800" indent="0">
-              <a:buNone/>
-              <a:defRPr sz="1350">
+            <a:lvl3pPr marL="1625620" indent="0">
+              <a:buNone/>
+              <a:defRPr sz="3200">
                 <a:solidFill>
                   <a:schemeClr val="tx1">
                     <a:tint val="75000"/>
@@ -920,9 +921,9 @@
                 </a:solidFill>
               </a:defRPr>
             </a:lvl3pPr>
-            <a:lvl4pPr marL="1028700" indent="0">
-              <a:buNone/>
-              <a:defRPr sz="1200">
+            <a:lvl4pPr marL="2438430" indent="0">
+              <a:buNone/>
+              <a:defRPr sz="2844">
                 <a:solidFill>
                   <a:schemeClr val="tx1">
                     <a:tint val="75000"/>
@@ -930,9 +931,9 @@
                 </a:solidFill>
               </a:defRPr>
             </a:lvl4pPr>
-            <a:lvl5pPr marL="1371600" indent="0">
-              <a:buNone/>
-              <a:defRPr sz="1200">
+            <a:lvl5pPr marL="3251241" indent="0">
+              <a:buNone/>
+              <a:defRPr sz="2844">
                 <a:solidFill>
                   <a:schemeClr val="tx1">
                     <a:tint val="75000"/>
@@ -940,9 +941,9 @@
                 </a:solidFill>
               </a:defRPr>
             </a:lvl5pPr>
-            <a:lvl6pPr marL="1714500" indent="0">
-              <a:buNone/>
-              <a:defRPr sz="1200">
+            <a:lvl6pPr marL="4064051" indent="0">
+              <a:buNone/>
+              <a:defRPr sz="2844">
                 <a:solidFill>
                   <a:schemeClr val="tx1">
                     <a:tint val="75000"/>
@@ -950,9 +951,9 @@
                 </a:solidFill>
               </a:defRPr>
             </a:lvl6pPr>
-            <a:lvl7pPr marL="2057400" indent="0">
-              <a:buNone/>
-              <a:defRPr sz="1200">
+            <a:lvl7pPr marL="4876861" indent="0">
+              <a:buNone/>
+              <a:defRPr sz="2844">
                 <a:solidFill>
                   <a:schemeClr val="tx1">
                     <a:tint val="75000"/>
@@ -960,9 +961,9 @@
                 </a:solidFill>
               </a:defRPr>
             </a:lvl7pPr>
-            <a:lvl8pPr marL="2400300" indent="0">
-              <a:buNone/>
-              <a:defRPr sz="1200">
+            <a:lvl8pPr marL="5689671" indent="0">
+              <a:buNone/>
+              <a:defRPr sz="2844">
                 <a:solidFill>
                   <a:schemeClr val="tx1">
                     <a:tint val="75000"/>
@@ -970,9 +971,9 @@
                 </a:solidFill>
               </a:defRPr>
             </a:lvl8pPr>
-            <a:lvl9pPr marL="2743200" indent="0">
-              <a:buNone/>
-              <a:defRPr sz="1200">
+            <a:lvl9pPr marL="6502481" indent="0">
+              <a:buNone/>
+              <a:defRPr sz="2844">
                 <a:solidFill>
                   <a:schemeClr val="tx1">
                     <a:tint val="75000"/>
@@ -1058,7 +1059,7 @@
     </p:spTree>
     <p:extLst>
       <p:ext uri="{BB962C8B-B14F-4D97-AF65-F5344CB8AC3E}">
-        <p14:creationId xmlns:p14="http://schemas.microsoft.com/office/powerpoint/2010/main" val="2730140989"/>
+        <p14:creationId xmlns:p14="http://schemas.microsoft.com/office/powerpoint/2010/main" val="1300467224"/>
       </p:ext>
     </p:extLst>
   </p:cSld>
@@ -1120,8 +1121,8 @@
         </p:nvSpPr>
         <p:spPr>
           <a:xfrm>
-            <a:off x="471488" y="3245556"/>
-            <a:ext cx="2914650" cy="7735712"/>
+            <a:off x="1117600" y="3245556"/>
+            <a:ext cx="6908800" cy="7735712"/>
           </a:xfrm>
         </p:spPr>
         <p:txBody>
@@ -1177,8 +1178,8 @@
         </p:nvSpPr>
         <p:spPr>
           <a:xfrm>
-            <a:off x="3471863" y="3245556"/>
-            <a:ext cx="2914650" cy="7735712"/>
+            <a:off x="8229600" y="3245556"/>
+            <a:ext cx="6908800" cy="7735712"/>
           </a:xfrm>
         </p:spPr>
         <p:txBody>
@@ -1290,7 +1291,7 @@
     </p:spTree>
     <p:extLst>
       <p:ext uri="{BB962C8B-B14F-4D97-AF65-F5344CB8AC3E}">
-        <p14:creationId xmlns:p14="http://schemas.microsoft.com/office/powerpoint/2010/main" val="915308745"/>
+        <p14:creationId xmlns:p14="http://schemas.microsoft.com/office/powerpoint/2010/main" val="1977262412"/>
       </p:ext>
     </p:extLst>
   </p:cSld>
@@ -1329,8 +1330,8 @@
         </p:nvSpPr>
         <p:spPr>
           <a:xfrm>
-            <a:off x="472381" y="649114"/>
-            <a:ext cx="5915025" cy="2356556"/>
+            <a:off x="1119717" y="649114"/>
+            <a:ext cx="14020800" cy="2356556"/>
           </a:xfrm>
         </p:spPr>
         <p:txBody>
@@ -1357,8 +1358,8 @@
         </p:nvSpPr>
         <p:spPr>
           <a:xfrm>
-            <a:off x="472381" y="2988734"/>
-            <a:ext cx="2901255" cy="1464732"/>
+            <a:off x="1119719" y="2988734"/>
+            <a:ext cx="6877049" cy="1464732"/>
           </a:xfrm>
         </p:spPr>
         <p:txBody>
@@ -1366,39 +1367,39 @@
           <a:lstStyle>
             <a:lvl1pPr marL="0" indent="0">
               <a:buNone/>
-              <a:defRPr sz="1800" b="1"/>
+              <a:defRPr sz="4267" b="1"/>
             </a:lvl1pPr>
-            <a:lvl2pPr marL="342900" indent="0">
-              <a:buNone/>
-              <a:defRPr sz="1500" b="1"/>
+            <a:lvl2pPr marL="812810" indent="0">
+              <a:buNone/>
+              <a:defRPr sz="3556" b="1"/>
             </a:lvl2pPr>
-            <a:lvl3pPr marL="685800" indent="0">
-              <a:buNone/>
-              <a:defRPr sz="1350" b="1"/>
+            <a:lvl3pPr marL="1625620" indent="0">
+              <a:buNone/>
+              <a:defRPr sz="3200" b="1"/>
             </a:lvl3pPr>
-            <a:lvl4pPr marL="1028700" indent="0">
-              <a:buNone/>
-              <a:defRPr sz="1200" b="1"/>
+            <a:lvl4pPr marL="2438430" indent="0">
+              <a:buNone/>
+              <a:defRPr sz="2844" b="1"/>
             </a:lvl4pPr>
-            <a:lvl5pPr marL="1371600" indent="0">
-              <a:buNone/>
-              <a:defRPr sz="1200" b="1"/>
+            <a:lvl5pPr marL="3251241" indent="0">
+              <a:buNone/>
+              <a:defRPr sz="2844" b="1"/>
             </a:lvl5pPr>
-            <a:lvl6pPr marL="1714500" indent="0">
-              <a:buNone/>
-              <a:defRPr sz="1200" b="1"/>
+            <a:lvl6pPr marL="4064051" indent="0">
+              <a:buNone/>
+              <a:defRPr sz="2844" b="1"/>
             </a:lvl6pPr>
-            <a:lvl7pPr marL="2057400" indent="0">
-              <a:buNone/>
-              <a:defRPr sz="1200" b="1"/>
+            <a:lvl7pPr marL="4876861" indent="0">
+              <a:buNone/>
+              <a:defRPr sz="2844" b="1"/>
             </a:lvl7pPr>
-            <a:lvl8pPr marL="2400300" indent="0">
-              <a:buNone/>
-              <a:defRPr sz="1200" b="1"/>
+            <a:lvl8pPr marL="5689671" indent="0">
+              <a:buNone/>
+              <a:defRPr sz="2844" b="1"/>
             </a:lvl8pPr>
-            <a:lvl9pPr marL="2743200" indent="0">
-              <a:buNone/>
-              <a:defRPr sz="1200" b="1"/>
+            <a:lvl9pPr marL="6502481" indent="0">
+              <a:buNone/>
+              <a:defRPr sz="2844" b="1"/>
             </a:lvl9pPr>
           </a:lstStyle>
           <a:p>
@@ -1422,8 +1423,8 @@
         </p:nvSpPr>
         <p:spPr>
           <a:xfrm>
-            <a:off x="472381" y="4453467"/>
-            <a:ext cx="2901255" cy="6550379"/>
+            <a:off x="1119719" y="4453467"/>
+            <a:ext cx="6877049" cy="6550379"/>
           </a:xfrm>
         </p:spPr>
         <p:txBody>
@@ -1479,8 +1480,8 @@
         </p:nvSpPr>
         <p:spPr>
           <a:xfrm>
-            <a:off x="3471863" y="2988734"/>
-            <a:ext cx="2915543" cy="1464732"/>
+            <a:off x="8229601" y="2988734"/>
+            <a:ext cx="6910917" cy="1464732"/>
           </a:xfrm>
         </p:spPr>
         <p:txBody>
@@ -1488,39 +1489,39 @@
           <a:lstStyle>
             <a:lvl1pPr marL="0" indent="0">
               <a:buNone/>
-              <a:defRPr sz="1800" b="1"/>
+              <a:defRPr sz="4267" b="1"/>
             </a:lvl1pPr>
-            <a:lvl2pPr marL="342900" indent="0">
-              <a:buNone/>
-              <a:defRPr sz="1500" b="1"/>
+            <a:lvl2pPr marL="812810" indent="0">
+              <a:buNone/>
+              <a:defRPr sz="3556" b="1"/>
             </a:lvl2pPr>
-            <a:lvl3pPr marL="685800" indent="0">
-              <a:buNone/>
-              <a:defRPr sz="1350" b="1"/>
+            <a:lvl3pPr marL="1625620" indent="0">
+              <a:buNone/>
+              <a:defRPr sz="3200" b="1"/>
             </a:lvl3pPr>
-            <a:lvl4pPr marL="1028700" indent="0">
-              <a:buNone/>
-              <a:defRPr sz="1200" b="1"/>
+            <a:lvl4pPr marL="2438430" indent="0">
+              <a:buNone/>
+              <a:defRPr sz="2844" b="1"/>
             </a:lvl4pPr>
-            <a:lvl5pPr marL="1371600" indent="0">
-              <a:buNone/>
-              <a:defRPr sz="1200" b="1"/>
+            <a:lvl5pPr marL="3251241" indent="0">
+              <a:buNone/>
+              <a:defRPr sz="2844" b="1"/>
             </a:lvl5pPr>
-            <a:lvl6pPr marL="1714500" indent="0">
-              <a:buNone/>
-              <a:defRPr sz="1200" b="1"/>
+            <a:lvl6pPr marL="4064051" indent="0">
+              <a:buNone/>
+              <a:defRPr sz="2844" b="1"/>
             </a:lvl6pPr>
-            <a:lvl7pPr marL="2057400" indent="0">
-              <a:buNone/>
-              <a:defRPr sz="1200" b="1"/>
+            <a:lvl7pPr marL="4876861" indent="0">
+              <a:buNone/>
+              <a:defRPr sz="2844" b="1"/>
             </a:lvl7pPr>
-            <a:lvl8pPr marL="2400300" indent="0">
-              <a:buNone/>
-              <a:defRPr sz="1200" b="1"/>
+            <a:lvl8pPr marL="5689671" indent="0">
+              <a:buNone/>
+              <a:defRPr sz="2844" b="1"/>
             </a:lvl8pPr>
-            <a:lvl9pPr marL="2743200" indent="0">
-              <a:buNone/>
-              <a:defRPr sz="1200" b="1"/>
+            <a:lvl9pPr marL="6502481" indent="0">
+              <a:buNone/>
+              <a:defRPr sz="2844" b="1"/>
             </a:lvl9pPr>
           </a:lstStyle>
           <a:p>
@@ -1544,8 +1545,8 @@
         </p:nvSpPr>
         <p:spPr>
           <a:xfrm>
-            <a:off x="3471863" y="4453467"/>
-            <a:ext cx="2915543" cy="6550379"/>
+            <a:off x="8229601" y="4453467"/>
+            <a:ext cx="6910917" cy="6550379"/>
           </a:xfrm>
         </p:spPr>
         <p:txBody>
@@ -1657,7 +1658,7 @@
     </p:spTree>
     <p:extLst>
       <p:ext uri="{BB962C8B-B14F-4D97-AF65-F5344CB8AC3E}">
-        <p14:creationId xmlns:p14="http://schemas.microsoft.com/office/powerpoint/2010/main" val="2831854487"/>
+        <p14:creationId xmlns:p14="http://schemas.microsoft.com/office/powerpoint/2010/main" val="1406314670"/>
       </p:ext>
     </p:extLst>
   </p:cSld>
@@ -1775,7 +1776,7 @@
     </p:spTree>
     <p:extLst>
       <p:ext uri="{BB962C8B-B14F-4D97-AF65-F5344CB8AC3E}">
-        <p14:creationId xmlns:p14="http://schemas.microsoft.com/office/powerpoint/2010/main" val="1343618498"/>
+        <p14:creationId xmlns:p14="http://schemas.microsoft.com/office/powerpoint/2010/main" val="496195001"/>
       </p:ext>
     </p:extLst>
   </p:cSld>
@@ -1870,7 +1871,7 @@
     </p:spTree>
     <p:extLst>
       <p:ext uri="{BB962C8B-B14F-4D97-AF65-F5344CB8AC3E}">
-        <p14:creationId xmlns:p14="http://schemas.microsoft.com/office/powerpoint/2010/main" val="235293718"/>
+        <p14:creationId xmlns:p14="http://schemas.microsoft.com/office/powerpoint/2010/main" val="789499461"/>
       </p:ext>
     </p:extLst>
   </p:cSld>
@@ -1909,15 +1910,15 @@
         </p:nvSpPr>
         <p:spPr>
           <a:xfrm>
-            <a:off x="472381" y="812800"/>
-            <a:ext cx="2211884" cy="2844800"/>
+            <a:off x="1119717" y="812800"/>
+            <a:ext cx="5242983" cy="2844800"/>
           </a:xfrm>
         </p:spPr>
         <p:txBody>
           <a:bodyPr anchor="b"/>
           <a:lstStyle>
             <a:lvl1pPr>
-              <a:defRPr sz="2400"/>
+              <a:defRPr sz="5689"/>
             </a:lvl1pPr>
           </a:lstStyle>
           <a:p>
@@ -1941,39 +1942,39 @@
         </p:nvSpPr>
         <p:spPr>
           <a:xfrm>
-            <a:off x="2915543" y="1755425"/>
-            <a:ext cx="3471863" cy="8664222"/>
+            <a:off x="6910917" y="1755425"/>
+            <a:ext cx="8229600" cy="8664222"/>
           </a:xfrm>
         </p:spPr>
         <p:txBody>
           <a:bodyPr/>
           <a:lstStyle>
             <a:lvl1pPr>
-              <a:defRPr sz="2400"/>
+              <a:defRPr sz="5689"/>
             </a:lvl1pPr>
             <a:lvl2pPr>
-              <a:defRPr sz="2100"/>
+              <a:defRPr sz="4978"/>
             </a:lvl2pPr>
             <a:lvl3pPr>
-              <a:defRPr sz="1800"/>
+              <a:defRPr sz="4267"/>
             </a:lvl3pPr>
             <a:lvl4pPr>
-              <a:defRPr sz="1500"/>
+              <a:defRPr sz="3556"/>
             </a:lvl4pPr>
             <a:lvl5pPr>
-              <a:defRPr sz="1500"/>
+              <a:defRPr sz="3556"/>
             </a:lvl5pPr>
             <a:lvl6pPr>
-              <a:defRPr sz="1500"/>
+              <a:defRPr sz="3556"/>
             </a:lvl6pPr>
             <a:lvl7pPr>
-              <a:defRPr sz="1500"/>
+              <a:defRPr sz="3556"/>
             </a:lvl7pPr>
             <a:lvl8pPr>
-              <a:defRPr sz="1500"/>
+              <a:defRPr sz="3556"/>
             </a:lvl8pPr>
             <a:lvl9pPr>
-              <a:defRPr sz="1500"/>
+              <a:defRPr sz="3556"/>
             </a:lvl9pPr>
           </a:lstStyle>
           <a:p>
@@ -2026,8 +2027,8 @@
         </p:nvSpPr>
         <p:spPr>
           <a:xfrm>
-            <a:off x="472381" y="3657600"/>
-            <a:ext cx="2211884" cy="6776156"/>
+            <a:off x="1119717" y="3657600"/>
+            <a:ext cx="5242983" cy="6776156"/>
           </a:xfrm>
         </p:spPr>
         <p:txBody>
@@ -2035,39 +2036,39 @@
           <a:lstStyle>
             <a:lvl1pPr marL="0" indent="0">
               <a:buNone/>
-              <a:defRPr sz="1200"/>
+              <a:defRPr sz="2844"/>
             </a:lvl1pPr>
-            <a:lvl2pPr marL="342900" indent="0">
-              <a:buNone/>
-              <a:defRPr sz="1050"/>
+            <a:lvl2pPr marL="812810" indent="0">
+              <a:buNone/>
+              <a:defRPr sz="2489"/>
             </a:lvl2pPr>
-            <a:lvl3pPr marL="685800" indent="0">
-              <a:buNone/>
-              <a:defRPr sz="900"/>
+            <a:lvl3pPr marL="1625620" indent="0">
+              <a:buNone/>
+              <a:defRPr sz="2133"/>
             </a:lvl3pPr>
-            <a:lvl4pPr marL="1028700" indent="0">
-              <a:buNone/>
-              <a:defRPr sz="750"/>
+            <a:lvl4pPr marL="2438430" indent="0">
+              <a:buNone/>
+              <a:defRPr sz="1778"/>
             </a:lvl4pPr>
-            <a:lvl5pPr marL="1371600" indent="0">
-              <a:buNone/>
-              <a:defRPr sz="750"/>
+            <a:lvl5pPr marL="3251241" indent="0">
+              <a:buNone/>
+              <a:defRPr sz="1778"/>
             </a:lvl5pPr>
-            <a:lvl6pPr marL="1714500" indent="0">
-              <a:buNone/>
-              <a:defRPr sz="750"/>
+            <a:lvl6pPr marL="4064051" indent="0">
+              <a:buNone/>
+              <a:defRPr sz="1778"/>
             </a:lvl6pPr>
-            <a:lvl7pPr marL="2057400" indent="0">
-              <a:buNone/>
-              <a:defRPr sz="750"/>
+            <a:lvl7pPr marL="4876861" indent="0">
+              <a:buNone/>
+              <a:defRPr sz="1778"/>
             </a:lvl7pPr>
-            <a:lvl8pPr marL="2400300" indent="0">
-              <a:buNone/>
-              <a:defRPr sz="750"/>
+            <a:lvl8pPr marL="5689671" indent="0">
+              <a:buNone/>
+              <a:defRPr sz="1778"/>
             </a:lvl8pPr>
-            <a:lvl9pPr marL="2743200" indent="0">
-              <a:buNone/>
-              <a:defRPr sz="750"/>
+            <a:lvl9pPr marL="6502481" indent="0">
+              <a:buNone/>
+              <a:defRPr sz="1778"/>
             </a:lvl9pPr>
           </a:lstStyle>
           <a:p>
@@ -2147,7 +2148,7 @@
     </p:spTree>
     <p:extLst>
       <p:ext uri="{BB962C8B-B14F-4D97-AF65-F5344CB8AC3E}">
-        <p14:creationId xmlns:p14="http://schemas.microsoft.com/office/powerpoint/2010/main" val="4225483449"/>
+        <p14:creationId xmlns:p14="http://schemas.microsoft.com/office/powerpoint/2010/main" val="2133500169"/>
       </p:ext>
     </p:extLst>
   </p:cSld>
@@ -2186,15 +2187,15 @@
         </p:nvSpPr>
         <p:spPr>
           <a:xfrm>
-            <a:off x="472381" y="812800"/>
-            <a:ext cx="2211884" cy="2844800"/>
+            <a:off x="1119717" y="812800"/>
+            <a:ext cx="5242983" cy="2844800"/>
           </a:xfrm>
         </p:spPr>
         <p:txBody>
           <a:bodyPr anchor="b"/>
           <a:lstStyle>
             <a:lvl1pPr>
-              <a:defRPr sz="2400"/>
+              <a:defRPr sz="5689"/>
             </a:lvl1pPr>
           </a:lstStyle>
           <a:p>
@@ -2218,8 +2219,8 @@
         </p:nvSpPr>
         <p:spPr>
           <a:xfrm>
-            <a:off x="2915543" y="1755425"/>
-            <a:ext cx="3471863" cy="8664222"/>
+            <a:off x="6910917" y="1755425"/>
+            <a:ext cx="8229600" cy="8664222"/>
           </a:xfrm>
         </p:spPr>
         <p:txBody>
@@ -2227,39 +2228,39 @@
           <a:lstStyle>
             <a:lvl1pPr marL="0" indent="0">
               <a:buNone/>
-              <a:defRPr sz="2400"/>
+              <a:defRPr sz="5689"/>
             </a:lvl1pPr>
-            <a:lvl2pPr marL="342900" indent="0">
-              <a:buNone/>
-              <a:defRPr sz="2100"/>
+            <a:lvl2pPr marL="812810" indent="0">
+              <a:buNone/>
+              <a:defRPr sz="4978"/>
             </a:lvl2pPr>
-            <a:lvl3pPr marL="685800" indent="0">
-              <a:buNone/>
-              <a:defRPr sz="1800"/>
+            <a:lvl3pPr marL="1625620" indent="0">
+              <a:buNone/>
+              <a:defRPr sz="4267"/>
             </a:lvl3pPr>
-            <a:lvl4pPr marL="1028700" indent="0">
-              <a:buNone/>
-              <a:defRPr sz="1500"/>
+            <a:lvl4pPr marL="2438430" indent="0">
+              <a:buNone/>
+              <a:defRPr sz="3556"/>
             </a:lvl4pPr>
-            <a:lvl5pPr marL="1371600" indent="0">
-              <a:buNone/>
-              <a:defRPr sz="1500"/>
+            <a:lvl5pPr marL="3251241" indent="0">
+              <a:buNone/>
+              <a:defRPr sz="3556"/>
             </a:lvl5pPr>
-            <a:lvl6pPr marL="1714500" indent="0">
-              <a:buNone/>
-              <a:defRPr sz="1500"/>
+            <a:lvl6pPr marL="4064051" indent="0">
+              <a:buNone/>
+              <a:defRPr sz="3556"/>
             </a:lvl6pPr>
-            <a:lvl7pPr marL="2057400" indent="0">
-              <a:buNone/>
-              <a:defRPr sz="1500"/>
+            <a:lvl7pPr marL="4876861" indent="0">
+              <a:buNone/>
+              <a:defRPr sz="3556"/>
             </a:lvl7pPr>
-            <a:lvl8pPr marL="2400300" indent="0">
-              <a:buNone/>
-              <a:defRPr sz="1500"/>
+            <a:lvl8pPr marL="5689671" indent="0">
+              <a:buNone/>
+              <a:defRPr sz="3556"/>
             </a:lvl8pPr>
-            <a:lvl9pPr marL="2743200" indent="0">
-              <a:buNone/>
-              <a:defRPr sz="1500"/>
+            <a:lvl9pPr marL="6502481" indent="0">
+              <a:buNone/>
+              <a:defRPr sz="3556"/>
             </a:lvl9pPr>
           </a:lstStyle>
           <a:p>
@@ -2283,8 +2284,8 @@
         </p:nvSpPr>
         <p:spPr>
           <a:xfrm>
-            <a:off x="472381" y="3657600"/>
-            <a:ext cx="2211884" cy="6776156"/>
+            <a:off x="1119717" y="3657600"/>
+            <a:ext cx="5242983" cy="6776156"/>
           </a:xfrm>
         </p:spPr>
         <p:txBody>
@@ -2292,39 +2293,39 @@
           <a:lstStyle>
             <a:lvl1pPr marL="0" indent="0">
               <a:buNone/>
-              <a:defRPr sz="1200"/>
+              <a:defRPr sz="2844"/>
             </a:lvl1pPr>
-            <a:lvl2pPr marL="342900" indent="0">
-              <a:buNone/>
-              <a:defRPr sz="1050"/>
+            <a:lvl2pPr marL="812810" indent="0">
+              <a:buNone/>
+              <a:defRPr sz="2489"/>
             </a:lvl2pPr>
-            <a:lvl3pPr marL="685800" indent="0">
-              <a:buNone/>
-              <a:defRPr sz="900"/>
+            <a:lvl3pPr marL="1625620" indent="0">
+              <a:buNone/>
+              <a:defRPr sz="2133"/>
             </a:lvl3pPr>
-            <a:lvl4pPr marL="1028700" indent="0">
-              <a:buNone/>
-              <a:defRPr sz="750"/>
+            <a:lvl4pPr marL="2438430" indent="0">
+              <a:buNone/>
+              <a:defRPr sz="1778"/>
             </a:lvl4pPr>
-            <a:lvl5pPr marL="1371600" indent="0">
-              <a:buNone/>
-              <a:defRPr sz="750"/>
+            <a:lvl5pPr marL="3251241" indent="0">
+              <a:buNone/>
+              <a:defRPr sz="1778"/>
             </a:lvl5pPr>
-            <a:lvl6pPr marL="1714500" indent="0">
-              <a:buNone/>
-              <a:defRPr sz="750"/>
+            <a:lvl6pPr marL="4064051" indent="0">
+              <a:buNone/>
+              <a:defRPr sz="1778"/>
             </a:lvl6pPr>
-            <a:lvl7pPr marL="2057400" indent="0">
-              <a:buNone/>
-              <a:defRPr sz="750"/>
+            <a:lvl7pPr marL="4876861" indent="0">
+              <a:buNone/>
+              <a:defRPr sz="1778"/>
             </a:lvl7pPr>
-            <a:lvl8pPr marL="2400300" indent="0">
-              <a:buNone/>
-              <a:defRPr sz="750"/>
+            <a:lvl8pPr marL="5689671" indent="0">
+              <a:buNone/>
+              <a:defRPr sz="1778"/>
             </a:lvl8pPr>
-            <a:lvl9pPr marL="2743200" indent="0">
-              <a:buNone/>
-              <a:defRPr sz="750"/>
+            <a:lvl9pPr marL="6502481" indent="0">
+              <a:buNone/>
+              <a:defRPr sz="1778"/>
             </a:lvl9pPr>
           </a:lstStyle>
           <a:p>
@@ -2404,7 +2405,7 @@
     </p:spTree>
     <p:extLst>
       <p:ext uri="{BB962C8B-B14F-4D97-AF65-F5344CB8AC3E}">
-        <p14:creationId xmlns:p14="http://schemas.microsoft.com/office/powerpoint/2010/main" val="508449879"/>
+        <p14:creationId xmlns:p14="http://schemas.microsoft.com/office/powerpoint/2010/main" val="3498112792"/>
       </p:ext>
     </p:extLst>
   </p:cSld>
@@ -2448,8 +2449,8 @@
         </p:nvSpPr>
         <p:spPr>
           <a:xfrm>
-            <a:off x="471488" y="649114"/>
-            <a:ext cx="5915025" cy="2356556"/>
+            <a:off x="1117600" y="649114"/>
+            <a:ext cx="14020800" cy="2356556"/>
           </a:xfrm>
           <a:prstGeom prst="rect">
             <a:avLst/>
@@ -2481,8 +2482,8 @@
         </p:nvSpPr>
         <p:spPr>
           <a:xfrm>
-            <a:off x="471488" y="3245556"/>
-            <a:ext cx="5915025" cy="7735712"/>
+            <a:off x="1117600" y="3245556"/>
+            <a:ext cx="14020800" cy="7735712"/>
           </a:xfrm>
           <a:prstGeom prst="rect">
             <a:avLst/>
@@ -2543,8 +2544,8 @@
         </p:nvSpPr>
         <p:spPr>
           <a:xfrm>
-            <a:off x="471488" y="11300181"/>
-            <a:ext cx="1543050" cy="649111"/>
+            <a:off x="1117600" y="11300181"/>
+            <a:ext cx="3657600" cy="649111"/>
           </a:xfrm>
           <a:prstGeom prst="rect">
             <a:avLst/>
@@ -2554,7 +2555,7 @@
           <a:bodyPr vert="horz" lIns="91440" tIns="45720" rIns="91440" bIns="45720" rtlCol="0" anchor="ctr"/>
           <a:lstStyle>
             <a:lvl1pPr algn="l">
-              <a:defRPr sz="900">
+              <a:defRPr sz="2133">
                 <a:solidFill>
                   <a:schemeClr val="tx1">
                     <a:tint val="75000"/>
@@ -2584,8 +2585,8 @@
         </p:nvSpPr>
         <p:spPr>
           <a:xfrm>
-            <a:off x="2271713" y="11300181"/>
-            <a:ext cx="2314575" cy="649111"/>
+            <a:off x="5384800" y="11300181"/>
+            <a:ext cx="5486400" cy="649111"/>
           </a:xfrm>
           <a:prstGeom prst="rect">
             <a:avLst/>
@@ -2595,7 +2596,7 @@
           <a:bodyPr vert="horz" lIns="91440" tIns="45720" rIns="91440" bIns="45720" rtlCol="0" anchor="ctr"/>
           <a:lstStyle>
             <a:lvl1pPr algn="ctr">
-              <a:defRPr sz="900">
+              <a:defRPr sz="2133">
                 <a:solidFill>
                   <a:schemeClr val="tx1">
                     <a:tint val="75000"/>
@@ -2621,8 +2622,8 @@
         </p:nvSpPr>
         <p:spPr>
           <a:xfrm>
-            <a:off x="4843463" y="11300181"/>
-            <a:ext cx="1543050" cy="649111"/>
+            <a:off x="11480800" y="11300181"/>
+            <a:ext cx="3657600" cy="649111"/>
           </a:xfrm>
           <a:prstGeom prst="rect">
             <a:avLst/>
@@ -2632,7 +2633,7 @@
           <a:bodyPr vert="horz" lIns="91440" tIns="45720" rIns="91440" bIns="45720" rtlCol="0" anchor="ctr"/>
           <a:lstStyle>
             <a:lvl1pPr algn="r">
-              <a:defRPr sz="900">
+              <a:defRPr sz="2133">
                 <a:solidFill>
                   <a:schemeClr val="tx1">
                     <a:tint val="75000"/>
@@ -2653,27 +2654,27 @@
     </p:spTree>
     <p:extLst>
       <p:ext uri="{BB962C8B-B14F-4D97-AF65-F5344CB8AC3E}">
-        <p14:creationId xmlns:p14="http://schemas.microsoft.com/office/powerpoint/2010/main" val="3962707330"/>
+        <p14:creationId xmlns:p14="http://schemas.microsoft.com/office/powerpoint/2010/main" val="1785176558"/>
       </p:ext>
     </p:extLst>
   </p:cSld>
   <p:clrMap bg1="lt1" tx1="dk1" bg2="lt2" tx2="dk2" accent1="accent1" accent2="accent2" accent3="accent3" accent4="accent4" accent5="accent5" accent6="accent6" hlink="hlink" folHlink="folHlink"/>
   <p:sldLayoutIdLst>
-    <p:sldLayoutId id="2147483661" r:id="rId1"/>
-    <p:sldLayoutId id="2147483662" r:id="rId2"/>
-    <p:sldLayoutId id="2147483663" r:id="rId3"/>
-    <p:sldLayoutId id="2147483664" r:id="rId4"/>
-    <p:sldLayoutId id="2147483665" r:id="rId5"/>
-    <p:sldLayoutId id="2147483666" r:id="rId6"/>
-    <p:sldLayoutId id="2147483667" r:id="rId7"/>
-    <p:sldLayoutId id="2147483668" r:id="rId8"/>
-    <p:sldLayoutId id="2147483669" r:id="rId9"/>
-    <p:sldLayoutId id="2147483670" r:id="rId10"/>
-    <p:sldLayoutId id="2147483671" r:id="rId11"/>
+    <p:sldLayoutId id="2147483673" r:id="rId1"/>
+    <p:sldLayoutId id="2147483674" r:id="rId2"/>
+    <p:sldLayoutId id="2147483675" r:id="rId3"/>
+    <p:sldLayoutId id="2147483676" r:id="rId4"/>
+    <p:sldLayoutId id="2147483677" r:id="rId5"/>
+    <p:sldLayoutId id="2147483678" r:id="rId6"/>
+    <p:sldLayoutId id="2147483679" r:id="rId7"/>
+    <p:sldLayoutId id="2147483680" r:id="rId8"/>
+    <p:sldLayoutId id="2147483681" r:id="rId9"/>
+    <p:sldLayoutId id="2147483682" r:id="rId10"/>
+    <p:sldLayoutId id="2147483683" r:id="rId11"/>
   </p:sldLayoutIdLst>
   <p:txStyles>
     <p:titleStyle>
-      <a:lvl1pPr algn="l" defTabSz="685800" rtl="0" eaLnBrk="1" latinLnBrk="0" hangingPunct="1">
+      <a:lvl1pPr algn="l" defTabSz="1625620" rtl="0" eaLnBrk="1" latinLnBrk="0" hangingPunct="1">
         <a:lnSpc>
           <a:spcPct val="90000"/>
         </a:lnSpc>
@@ -2681,7 +2682,7 @@
           <a:spcPct val="0"/>
         </a:spcBef>
         <a:buNone/>
-        <a:defRPr sz="3300" kern="1200">
+        <a:defRPr sz="7822" kern="1200">
           <a:solidFill>
             <a:schemeClr val="tx1"/>
           </a:solidFill>
@@ -2692,16 +2693,16 @@
       </a:lvl1pPr>
     </p:titleStyle>
     <p:bodyStyle>
-      <a:lvl1pPr marL="171450" indent="-171450" algn="l" defTabSz="685800" rtl="0" eaLnBrk="1" latinLnBrk="0" hangingPunct="1">
+      <a:lvl1pPr marL="406405" indent="-406405" algn="l" defTabSz="1625620" rtl="0" eaLnBrk="1" latinLnBrk="0" hangingPunct="1">
         <a:lnSpc>
           <a:spcPct val="90000"/>
         </a:lnSpc>
         <a:spcBef>
-          <a:spcPts val="750"/>
+          <a:spcPts val="1778"/>
         </a:spcBef>
         <a:buFont typeface="Arial" panose="020B0604020202020204" pitchFamily="34" charset="0"/>
         <a:buChar char="•"/>
-        <a:defRPr sz="2100" kern="1200">
+        <a:defRPr sz="4978" kern="1200">
           <a:solidFill>
             <a:schemeClr val="tx1"/>
           </a:solidFill>
@@ -2710,16 +2711,16 @@
           <a:cs typeface="+mn-cs"/>
         </a:defRPr>
       </a:lvl1pPr>
-      <a:lvl2pPr marL="514350" indent="-171450" algn="l" defTabSz="685800" rtl="0" eaLnBrk="1" latinLnBrk="0" hangingPunct="1">
+      <a:lvl2pPr marL="1219215" indent="-406405" algn="l" defTabSz="1625620" rtl="0" eaLnBrk="1" latinLnBrk="0" hangingPunct="1">
         <a:lnSpc>
           <a:spcPct val="90000"/>
         </a:lnSpc>
         <a:spcBef>
-          <a:spcPts val="375"/>
+          <a:spcPts val="889"/>
         </a:spcBef>
         <a:buFont typeface="Arial" panose="020B0604020202020204" pitchFamily="34" charset="0"/>
         <a:buChar char="•"/>
-        <a:defRPr sz="1800" kern="1200">
+        <a:defRPr sz="4267" kern="1200">
           <a:solidFill>
             <a:schemeClr val="tx1"/>
           </a:solidFill>
@@ -2728,16 +2729,16 @@
           <a:cs typeface="+mn-cs"/>
         </a:defRPr>
       </a:lvl2pPr>
-      <a:lvl3pPr marL="857250" indent="-171450" algn="l" defTabSz="685800" rtl="0" eaLnBrk="1" latinLnBrk="0" hangingPunct="1">
+      <a:lvl3pPr marL="2032025" indent="-406405" algn="l" defTabSz="1625620" rtl="0" eaLnBrk="1" latinLnBrk="0" hangingPunct="1">
         <a:lnSpc>
           <a:spcPct val="90000"/>
         </a:lnSpc>
         <a:spcBef>
-          <a:spcPts val="375"/>
+          <a:spcPts val="889"/>
         </a:spcBef>
         <a:buFont typeface="Arial" panose="020B0604020202020204" pitchFamily="34" charset="0"/>
         <a:buChar char="•"/>
-        <a:defRPr sz="1500" kern="1200">
+        <a:defRPr sz="3556" kern="1200">
           <a:solidFill>
             <a:schemeClr val="tx1"/>
           </a:solidFill>
@@ -2746,16 +2747,16 @@
           <a:cs typeface="+mn-cs"/>
         </a:defRPr>
       </a:lvl3pPr>
-      <a:lvl4pPr marL="1200150" indent="-171450" algn="l" defTabSz="685800" rtl="0" eaLnBrk="1" latinLnBrk="0" hangingPunct="1">
+      <a:lvl4pPr marL="2844836" indent="-406405" algn="l" defTabSz="1625620" rtl="0" eaLnBrk="1" latinLnBrk="0" hangingPunct="1">
         <a:lnSpc>
           <a:spcPct val="90000"/>
         </a:lnSpc>
         <a:spcBef>
-          <a:spcPts val="375"/>
+          <a:spcPts val="889"/>
         </a:spcBef>
         <a:buFont typeface="Arial" panose="020B0604020202020204" pitchFamily="34" charset="0"/>
         <a:buChar char="•"/>
-        <a:defRPr sz="1350" kern="1200">
+        <a:defRPr sz="3200" kern="1200">
           <a:solidFill>
             <a:schemeClr val="tx1"/>
           </a:solidFill>
@@ -2764,16 +2765,16 @@
           <a:cs typeface="+mn-cs"/>
         </a:defRPr>
       </a:lvl4pPr>
-      <a:lvl5pPr marL="1543050" indent="-171450" algn="l" defTabSz="685800" rtl="0" eaLnBrk="1" latinLnBrk="0" hangingPunct="1">
+      <a:lvl5pPr marL="3657646" indent="-406405" algn="l" defTabSz="1625620" rtl="0" eaLnBrk="1" latinLnBrk="0" hangingPunct="1">
         <a:lnSpc>
           <a:spcPct val="90000"/>
         </a:lnSpc>
         <a:spcBef>
-          <a:spcPts val="375"/>
+          <a:spcPts val="889"/>
         </a:spcBef>
         <a:buFont typeface="Arial" panose="020B0604020202020204" pitchFamily="34" charset="0"/>
         <a:buChar char="•"/>
-        <a:defRPr sz="1350" kern="1200">
+        <a:defRPr sz="3200" kern="1200">
           <a:solidFill>
             <a:schemeClr val="tx1"/>
           </a:solidFill>
@@ -2782,16 +2783,16 @@
           <a:cs typeface="+mn-cs"/>
         </a:defRPr>
       </a:lvl5pPr>
-      <a:lvl6pPr marL="1885950" indent="-171450" algn="l" defTabSz="685800" rtl="0" eaLnBrk="1" latinLnBrk="0" hangingPunct="1">
+      <a:lvl6pPr marL="4470456" indent="-406405" algn="l" defTabSz="1625620" rtl="0" eaLnBrk="1" latinLnBrk="0" hangingPunct="1">
         <a:lnSpc>
           <a:spcPct val="90000"/>
         </a:lnSpc>
         <a:spcBef>
-          <a:spcPts val="375"/>
+          <a:spcPts val="889"/>
         </a:spcBef>
         <a:buFont typeface="Arial" panose="020B0604020202020204" pitchFamily="34" charset="0"/>
         <a:buChar char="•"/>
-        <a:defRPr sz="1350" kern="1200">
+        <a:defRPr sz="3200" kern="1200">
           <a:solidFill>
             <a:schemeClr val="tx1"/>
           </a:solidFill>
@@ -2800,16 +2801,16 @@
           <a:cs typeface="+mn-cs"/>
         </a:defRPr>
       </a:lvl6pPr>
-      <a:lvl7pPr marL="2228850" indent="-171450" algn="l" defTabSz="685800" rtl="0" eaLnBrk="1" latinLnBrk="0" hangingPunct="1">
+      <a:lvl7pPr marL="5283266" indent="-406405" algn="l" defTabSz="1625620" rtl="0" eaLnBrk="1" latinLnBrk="0" hangingPunct="1">
         <a:lnSpc>
           <a:spcPct val="90000"/>
         </a:lnSpc>
         <a:spcBef>
-          <a:spcPts val="375"/>
+          <a:spcPts val="889"/>
         </a:spcBef>
         <a:buFont typeface="Arial" panose="020B0604020202020204" pitchFamily="34" charset="0"/>
         <a:buChar char="•"/>
-        <a:defRPr sz="1350" kern="1200">
+        <a:defRPr sz="3200" kern="1200">
           <a:solidFill>
             <a:schemeClr val="tx1"/>
           </a:solidFill>
@@ -2818,16 +2819,16 @@
           <a:cs typeface="+mn-cs"/>
         </a:defRPr>
       </a:lvl7pPr>
-      <a:lvl8pPr marL="2571750" indent="-171450" algn="l" defTabSz="685800" rtl="0" eaLnBrk="1" latinLnBrk="0" hangingPunct="1">
+      <a:lvl8pPr marL="6096076" indent="-406405" algn="l" defTabSz="1625620" rtl="0" eaLnBrk="1" latinLnBrk="0" hangingPunct="1">
         <a:lnSpc>
           <a:spcPct val="90000"/>
         </a:lnSpc>
         <a:spcBef>
-          <a:spcPts val="375"/>
+          <a:spcPts val="889"/>
         </a:spcBef>
         <a:buFont typeface="Arial" panose="020B0604020202020204" pitchFamily="34" charset="0"/>
         <a:buChar char="•"/>
-        <a:defRPr sz="1350" kern="1200">
+        <a:defRPr sz="3200" kern="1200">
           <a:solidFill>
             <a:schemeClr val="tx1"/>
           </a:solidFill>
@@ -2836,16 +2837,16 @@
           <a:cs typeface="+mn-cs"/>
         </a:defRPr>
       </a:lvl8pPr>
-      <a:lvl9pPr marL="2914650" indent="-171450" algn="l" defTabSz="685800" rtl="0" eaLnBrk="1" latinLnBrk="0" hangingPunct="1">
+      <a:lvl9pPr marL="6908886" indent="-406405" algn="l" defTabSz="1625620" rtl="0" eaLnBrk="1" latinLnBrk="0" hangingPunct="1">
         <a:lnSpc>
           <a:spcPct val="90000"/>
         </a:lnSpc>
         <a:spcBef>
-          <a:spcPts val="375"/>
+          <a:spcPts val="889"/>
         </a:spcBef>
         <a:buFont typeface="Arial" panose="020B0604020202020204" pitchFamily="34" charset="0"/>
         <a:buChar char="•"/>
-        <a:defRPr sz="1350" kern="1200">
+        <a:defRPr sz="3200" kern="1200">
           <a:solidFill>
             <a:schemeClr val="tx1"/>
           </a:solidFill>
@@ -2859,8 +2860,8 @@
       <a:defPPr>
         <a:defRPr lang="en-US"/>
       </a:defPPr>
-      <a:lvl1pPr marL="0" algn="l" defTabSz="685800" rtl="0" eaLnBrk="1" latinLnBrk="0" hangingPunct="1">
-        <a:defRPr sz="1350" kern="1200">
+      <a:lvl1pPr marL="0" algn="l" defTabSz="1625620" rtl="0" eaLnBrk="1" latinLnBrk="0" hangingPunct="1">
+        <a:defRPr sz="3200" kern="1200">
           <a:solidFill>
             <a:schemeClr val="tx1"/>
           </a:solidFill>
@@ -2869,8 +2870,8 @@
           <a:cs typeface="+mn-cs"/>
         </a:defRPr>
       </a:lvl1pPr>
-      <a:lvl2pPr marL="342900" algn="l" defTabSz="685800" rtl="0" eaLnBrk="1" latinLnBrk="0" hangingPunct="1">
-        <a:defRPr sz="1350" kern="1200">
+      <a:lvl2pPr marL="812810" algn="l" defTabSz="1625620" rtl="0" eaLnBrk="1" latinLnBrk="0" hangingPunct="1">
+        <a:defRPr sz="3200" kern="1200">
           <a:solidFill>
             <a:schemeClr val="tx1"/>
           </a:solidFill>
@@ -2879,8 +2880,8 @@
           <a:cs typeface="+mn-cs"/>
         </a:defRPr>
       </a:lvl2pPr>
-      <a:lvl3pPr marL="685800" algn="l" defTabSz="685800" rtl="0" eaLnBrk="1" latinLnBrk="0" hangingPunct="1">
-        <a:defRPr sz="1350" kern="1200">
+      <a:lvl3pPr marL="1625620" algn="l" defTabSz="1625620" rtl="0" eaLnBrk="1" latinLnBrk="0" hangingPunct="1">
+        <a:defRPr sz="3200" kern="1200">
           <a:solidFill>
             <a:schemeClr val="tx1"/>
           </a:solidFill>
@@ -2889,8 +2890,8 @@
           <a:cs typeface="+mn-cs"/>
         </a:defRPr>
       </a:lvl3pPr>
-      <a:lvl4pPr marL="1028700" algn="l" defTabSz="685800" rtl="0" eaLnBrk="1" latinLnBrk="0" hangingPunct="1">
-        <a:defRPr sz="1350" kern="1200">
+      <a:lvl4pPr marL="2438430" algn="l" defTabSz="1625620" rtl="0" eaLnBrk="1" latinLnBrk="0" hangingPunct="1">
+        <a:defRPr sz="3200" kern="1200">
           <a:solidFill>
             <a:schemeClr val="tx1"/>
           </a:solidFill>
@@ -2899,8 +2900,8 @@
           <a:cs typeface="+mn-cs"/>
         </a:defRPr>
       </a:lvl4pPr>
-      <a:lvl5pPr marL="1371600" algn="l" defTabSz="685800" rtl="0" eaLnBrk="1" latinLnBrk="0" hangingPunct="1">
-        <a:defRPr sz="1350" kern="1200">
+      <a:lvl5pPr marL="3251241" algn="l" defTabSz="1625620" rtl="0" eaLnBrk="1" latinLnBrk="0" hangingPunct="1">
+        <a:defRPr sz="3200" kern="1200">
           <a:solidFill>
             <a:schemeClr val="tx1"/>
           </a:solidFill>
@@ -2909,8 +2910,8 @@
           <a:cs typeface="+mn-cs"/>
         </a:defRPr>
       </a:lvl5pPr>
-      <a:lvl6pPr marL="1714500" algn="l" defTabSz="685800" rtl="0" eaLnBrk="1" latinLnBrk="0" hangingPunct="1">
-        <a:defRPr sz="1350" kern="1200">
+      <a:lvl6pPr marL="4064051" algn="l" defTabSz="1625620" rtl="0" eaLnBrk="1" latinLnBrk="0" hangingPunct="1">
+        <a:defRPr sz="3200" kern="1200">
           <a:solidFill>
             <a:schemeClr val="tx1"/>
           </a:solidFill>
@@ -2919,8 +2920,8 @@
           <a:cs typeface="+mn-cs"/>
         </a:defRPr>
       </a:lvl6pPr>
-      <a:lvl7pPr marL="2057400" algn="l" defTabSz="685800" rtl="0" eaLnBrk="1" latinLnBrk="0" hangingPunct="1">
-        <a:defRPr sz="1350" kern="1200">
+      <a:lvl7pPr marL="4876861" algn="l" defTabSz="1625620" rtl="0" eaLnBrk="1" latinLnBrk="0" hangingPunct="1">
+        <a:defRPr sz="3200" kern="1200">
           <a:solidFill>
             <a:schemeClr val="tx1"/>
           </a:solidFill>
@@ -2929,8 +2930,8 @@
           <a:cs typeface="+mn-cs"/>
         </a:defRPr>
       </a:lvl7pPr>
-      <a:lvl8pPr marL="2400300" algn="l" defTabSz="685800" rtl="0" eaLnBrk="1" latinLnBrk="0" hangingPunct="1">
-        <a:defRPr sz="1350" kern="1200">
+      <a:lvl8pPr marL="5689671" algn="l" defTabSz="1625620" rtl="0" eaLnBrk="1" latinLnBrk="0" hangingPunct="1">
+        <a:defRPr sz="3200" kern="1200">
           <a:solidFill>
             <a:schemeClr val="tx1"/>
           </a:solidFill>
@@ -2939,8 +2940,8 @@
           <a:cs typeface="+mn-cs"/>
         </a:defRPr>
       </a:lvl8pPr>
-      <a:lvl9pPr marL="2743200" algn="l" defTabSz="685800" rtl="0" eaLnBrk="1" latinLnBrk="0" hangingPunct="1">
-        <a:defRPr sz="1350" kern="1200">
+      <a:lvl9pPr marL="6502481" algn="l" defTabSz="1625620" rtl="0" eaLnBrk="1" latinLnBrk="0" hangingPunct="1">
+        <a:defRPr sz="3200" kern="1200">
           <a:solidFill>
             <a:schemeClr val="tx1"/>
           </a:solidFill>
@@ -2985,7 +2986,7 @@
         </p:nvSpPr>
         <p:spPr>
           <a:xfrm>
-            <a:off x="71120" y="650240"/>
+            <a:off x="4785360" y="1005840"/>
             <a:ext cx="6685280" cy="1219200"/>
           </a:xfrm>
           <a:prstGeom prst="rect">
@@ -3036,7 +3037,7 @@
         </p:nvSpPr>
         <p:spPr>
           <a:xfrm>
-            <a:off x="71120" y="1869440"/>
+            <a:off x="4785360" y="2225040"/>
             <a:ext cx="6685280" cy="2011680"/>
           </a:xfrm>
           <a:prstGeom prst="rect">
@@ -3087,7 +3088,7 @@
         </p:nvSpPr>
         <p:spPr>
           <a:xfrm>
-            <a:off x="71120" y="3881120"/>
+            <a:off x="4785360" y="4236720"/>
             <a:ext cx="6685280" cy="1859280"/>
           </a:xfrm>
           <a:prstGeom prst="rect">
@@ -3138,7 +3139,7 @@
         </p:nvSpPr>
         <p:spPr>
           <a:xfrm>
-            <a:off x="71120" y="5740400"/>
+            <a:off x="4785360" y="6096000"/>
             <a:ext cx="6685280" cy="2153920"/>
           </a:xfrm>
           <a:prstGeom prst="rect">
@@ -3189,7 +3190,7 @@
         </p:nvSpPr>
         <p:spPr>
           <a:xfrm>
-            <a:off x="71120" y="7894320"/>
+            <a:off x="4785360" y="8249920"/>
             <a:ext cx="6685280" cy="1859280"/>
           </a:xfrm>
           <a:prstGeom prst="rect">
@@ -3240,7 +3241,7 @@
         </p:nvSpPr>
         <p:spPr>
           <a:xfrm>
-            <a:off x="101600" y="669290"/>
+            <a:off x="4815840" y="1024890"/>
             <a:ext cx="975360" cy="297180"/>
           </a:xfrm>
           <a:prstGeom prst="rect">
@@ -3311,7 +3312,7 @@
         </p:nvGrpSpPr>
         <p:grpSpPr>
           <a:xfrm>
-            <a:off x="787399" y="650240"/>
+            <a:off x="5501640" y="1005840"/>
             <a:ext cx="5283201" cy="1219200"/>
             <a:chOff x="787399" y="650240"/>
             <a:chExt cx="5283201" cy="1219200"/>
@@ -3460,7 +3461,7 @@
         </p:nvSpPr>
         <p:spPr>
           <a:xfrm>
-            <a:off x="787400" y="977900"/>
+            <a:off x="5501640" y="1333500"/>
             <a:ext cx="5283200" cy="563880"/>
           </a:xfrm>
           <a:prstGeom prst="rect">
@@ -3516,7 +3517,7 @@
         </p:nvSpPr>
         <p:spPr>
           <a:xfrm>
-            <a:off x="2433869" y="997122"/>
+            <a:off x="7148109" y="1352722"/>
             <a:ext cx="2321560" cy="121920"/>
           </a:xfrm>
           <a:prstGeom prst="rect">
@@ -3585,7 +3586,7 @@
         </p:nvSpPr>
         <p:spPr>
           <a:xfrm>
-            <a:off x="1071880" y="977900"/>
+            <a:off x="5786120" y="1333500"/>
             <a:ext cx="1275080" cy="563880"/>
           </a:xfrm>
           <a:prstGeom prst="rect">
@@ -3646,7 +3647,7 @@
         </p:nvSpPr>
         <p:spPr>
           <a:xfrm>
-            <a:off x="1071880" y="1152165"/>
+            <a:off x="5786120" y="1507765"/>
             <a:ext cx="1275080" cy="121920"/>
           </a:xfrm>
           <a:prstGeom prst="rect">
@@ -3725,7 +3726,7 @@
         </p:nvSpPr>
         <p:spPr>
           <a:xfrm>
-            <a:off x="3108960" y="1192530"/>
+            <a:off x="7823200" y="1548130"/>
             <a:ext cx="2961640" cy="165100"/>
           </a:xfrm>
           <a:prstGeom prst="rect">
@@ -3786,7 +3787,7 @@
         </p:nvGrpSpPr>
         <p:grpSpPr>
           <a:xfrm>
-            <a:off x="787400" y="1880870"/>
+            <a:off x="5501640" y="2236470"/>
             <a:ext cx="5283200" cy="2000250"/>
             <a:chOff x="787400" y="650240"/>
             <a:chExt cx="5283200" cy="2000250"/>
@@ -3919,7 +3920,7 @@
         </p:nvGrpSpPr>
         <p:grpSpPr>
           <a:xfrm>
-            <a:off x="787400" y="1880870"/>
+            <a:off x="5501640" y="2236470"/>
             <a:ext cx="5283200" cy="1814830"/>
             <a:chOff x="787400" y="650240"/>
             <a:chExt cx="5283200" cy="1814830"/>
@@ -4052,7 +4053,7 @@
         </p:nvSpPr>
         <p:spPr>
           <a:xfrm>
-            <a:off x="55880" y="1899920"/>
+            <a:off x="4770120" y="2255520"/>
             <a:ext cx="975360" cy="297180"/>
           </a:xfrm>
           <a:prstGeom prst="rect">
@@ -4113,6 +4114,613 @@
     <p:extLst>
       <p:ext uri="{BB962C8B-B14F-4D97-AF65-F5344CB8AC3E}">
         <p14:creationId xmlns:p14="http://schemas.microsoft.com/office/powerpoint/2010/main" val="3176767531"/>
+      </p:ext>
+    </p:extLst>
+  </p:cSld>
+  <p:clrMapOvr>
+    <a:masterClrMapping/>
+  </p:clrMapOvr>
+</p:sld>
+</file>
+
+<file path=ppt/slides/slide2.xml><?xml version="1.0" encoding="utf-8"?>
+<p:sld xmlns:a="http://schemas.openxmlformats.org/drawingml/2006/main" xmlns:r="http://schemas.openxmlformats.org/officeDocument/2006/relationships" xmlns:p="http://schemas.openxmlformats.org/presentationml/2006/main">
+  <p:cSld>
+    <p:spTree>
+      <p:nvGrpSpPr>
+        <p:cNvPr id="1" name=""/>
+        <p:cNvGrpSpPr/>
+        <p:nvPr/>
+      </p:nvGrpSpPr>
+      <p:grpSpPr>
+        <a:xfrm>
+          <a:off x="0" y="0"/>
+          <a:ext cx="0" cy="0"/>
+          <a:chOff x="0" y="0"/>
+          <a:chExt cx="0" cy="0"/>
+        </a:xfrm>
+      </p:grpSpPr>
+      <p:sp>
+        <p:nvSpPr>
+          <p:cNvPr id="4" name="TextBox 3">
+            <a:extLst>
+              <a:ext uri="{FF2B5EF4-FFF2-40B4-BE49-F238E27FC236}">
+                <a16:creationId xmlns:a16="http://schemas.microsoft.com/office/drawing/2014/main" id="{4E45CDFE-59FB-F74F-A73B-6933C90EBAEE}"/>
+              </a:ext>
+            </a:extLst>
+          </p:cNvPr>
+          <p:cNvSpPr txBox="1"/>
+          <p:nvPr/>
+        </p:nvSpPr>
+        <p:spPr>
+          <a:xfrm>
+            <a:off x="443346" y="360218"/>
+            <a:ext cx="4620689" cy="707886"/>
+          </a:xfrm>
+          <a:prstGeom prst="rect">
+            <a:avLst/>
+          </a:prstGeom>
+          <a:noFill/>
+        </p:spPr>
+        <p:txBody>
+          <a:bodyPr wrap="none" rtlCol="0">
+            <a:spAutoFit/>
+          </a:bodyPr>
+          <a:lstStyle/>
+          <a:p>
+            <a:r>
+              <a:rPr lang="en-BY" sz="4000" dirty="0"/>
+              <a:t>Sprite Icons Checklist</a:t>
+            </a:r>
+            <a:r>
+              <a:rPr lang="en-BY" dirty="0"/>
+              <a:t> </a:t>
+            </a:r>
+          </a:p>
+        </p:txBody>
+      </p:sp>
+      <p:sp>
+        <p:nvSpPr>
+          <p:cNvPr id="5" name="TextBox 4">
+            <a:extLst>
+              <a:ext uri="{FF2B5EF4-FFF2-40B4-BE49-F238E27FC236}">
+                <a16:creationId xmlns:a16="http://schemas.microsoft.com/office/drawing/2014/main" id="{DEF74D58-ECCF-7249-A7FB-9063FA7C6C45}"/>
+              </a:ext>
+            </a:extLst>
+          </p:cNvPr>
+          <p:cNvSpPr txBox="1"/>
+          <p:nvPr/>
+        </p:nvSpPr>
+        <p:spPr>
+          <a:xfrm>
+            <a:off x="1273509" y="2729345"/>
+            <a:ext cx="1907895" cy="1323439"/>
+          </a:xfrm>
+          <a:prstGeom prst="rect">
+            <a:avLst/>
+          </a:prstGeom>
+          <a:noFill/>
+        </p:spPr>
+        <p:txBody>
+          <a:bodyPr wrap="none" rtlCol="0">
+            <a:spAutoFit/>
+          </a:bodyPr>
+          <a:lstStyle/>
+          <a:p>
+            <a:r>
+              <a:rPr lang="en-BY" sz="4000" dirty="0">
+                <a:solidFill>
+                  <a:schemeClr val="accent6"/>
+                </a:solidFill>
+              </a:rPr>
+              <a:t>2. clean </a:t>
+            </a:r>
+          </a:p>
+          <a:p>
+            <a:r>
+              <a:rPr lang="en-BY" sz="4000" dirty="0">
+                <a:solidFill>
+                  <a:schemeClr val="accent6"/>
+                </a:solidFill>
+              </a:rPr>
+              <a:t>-theme</a:t>
+            </a:r>
+            <a:endParaRPr lang="en-BY" dirty="0">
+              <a:solidFill>
+                <a:schemeClr val="accent6"/>
+              </a:solidFill>
+            </a:endParaRPr>
+          </a:p>
+        </p:txBody>
+      </p:sp>
+      <p:sp>
+        <p:nvSpPr>
+          <p:cNvPr id="6" name="TextBox 5">
+            <a:extLst>
+              <a:ext uri="{FF2B5EF4-FFF2-40B4-BE49-F238E27FC236}">
+                <a16:creationId xmlns:a16="http://schemas.microsoft.com/office/drawing/2014/main" id="{93A8F4D1-712A-404F-9221-83AD6C9DECBD}"/>
+              </a:ext>
+            </a:extLst>
+          </p:cNvPr>
+          <p:cNvSpPr txBox="1"/>
+          <p:nvPr/>
+        </p:nvSpPr>
+        <p:spPr>
+          <a:xfrm>
+            <a:off x="3644606" y="2729345"/>
+            <a:ext cx="3139386" cy="984885"/>
+          </a:xfrm>
+          <a:prstGeom prst="rect">
+            <a:avLst/>
+          </a:prstGeom>
+          <a:noFill/>
+        </p:spPr>
+        <p:txBody>
+          <a:bodyPr wrap="none" rtlCol="0">
+            <a:spAutoFit/>
+          </a:bodyPr>
+          <a:lstStyle/>
+          <a:p>
+            <a:r>
+              <a:rPr lang="en-BY" sz="4000" dirty="0">
+                <a:solidFill>
+                  <a:schemeClr val="accent6"/>
+                </a:solidFill>
+              </a:rPr>
+              <a:t>3. Responsive </a:t>
+            </a:r>
+          </a:p>
+          <a:p>
+            <a:r>
+              <a:rPr lang="en-BY" dirty="0">
+                <a:solidFill>
+                  <a:schemeClr val="accent6"/>
+                </a:solidFill>
+              </a:rPr>
+              <a:t> </a:t>
+            </a:r>
+          </a:p>
+        </p:txBody>
+      </p:sp>
+      <p:sp>
+        <p:nvSpPr>
+          <p:cNvPr id="7" name="TextBox 6">
+            <a:extLst>
+              <a:ext uri="{FF2B5EF4-FFF2-40B4-BE49-F238E27FC236}">
+                <a16:creationId xmlns:a16="http://schemas.microsoft.com/office/drawing/2014/main" id="{2903AAF0-E2B5-AD4A-A2D3-FAAC4350B309}"/>
+              </a:ext>
+            </a:extLst>
+          </p:cNvPr>
+          <p:cNvSpPr txBox="1"/>
+          <p:nvPr/>
+        </p:nvSpPr>
+        <p:spPr>
+          <a:xfrm>
+            <a:off x="7074151" y="2729345"/>
+            <a:ext cx="1872564" cy="1323439"/>
+          </a:xfrm>
+          <a:prstGeom prst="rect">
+            <a:avLst/>
+          </a:prstGeom>
+          <a:noFill/>
+        </p:spPr>
+        <p:txBody>
+          <a:bodyPr wrap="none" rtlCol="0">
+            <a:spAutoFit/>
+          </a:bodyPr>
+          <a:lstStyle/>
+          <a:p>
+            <a:r>
+              <a:rPr lang="en-BY" sz="4000" dirty="0">
+                <a:solidFill>
+                  <a:schemeClr val="accent6"/>
+                </a:solidFill>
+              </a:rPr>
+              <a:t>4. Fully </a:t>
+            </a:r>
+          </a:p>
+          <a:p>
+            <a:r>
+              <a:rPr lang="en-BY" sz="4000" dirty="0">
+                <a:solidFill>
+                  <a:schemeClr val="accent6"/>
+                </a:solidFill>
+              </a:rPr>
+              <a:t>-layered</a:t>
+            </a:r>
+            <a:endParaRPr lang="en-BY" dirty="0">
+              <a:solidFill>
+                <a:schemeClr val="accent6"/>
+              </a:solidFill>
+            </a:endParaRPr>
+          </a:p>
+        </p:txBody>
+      </p:sp>
+      <p:sp>
+        <p:nvSpPr>
+          <p:cNvPr id="8" name="TextBox 7">
+            <a:extLst>
+              <a:ext uri="{FF2B5EF4-FFF2-40B4-BE49-F238E27FC236}">
+                <a16:creationId xmlns:a16="http://schemas.microsoft.com/office/drawing/2014/main" id="{10755231-65AF-E04A-A572-9C33E3BF55BE}"/>
+              </a:ext>
+            </a:extLst>
+          </p:cNvPr>
+          <p:cNvSpPr txBox="1"/>
+          <p:nvPr/>
+        </p:nvSpPr>
+        <p:spPr>
+          <a:xfrm>
+            <a:off x="10249319" y="2729345"/>
+            <a:ext cx="2076787" cy="707886"/>
+          </a:xfrm>
+          <a:prstGeom prst="rect">
+            <a:avLst/>
+          </a:prstGeom>
+          <a:noFill/>
+        </p:spPr>
+        <p:txBody>
+          <a:bodyPr wrap="none" rtlCol="0">
+            <a:spAutoFit/>
+          </a:bodyPr>
+          <a:lstStyle/>
+          <a:p>
+            <a:r>
+              <a:rPr lang="en-BY" sz="4000" dirty="0">
+                <a:solidFill>
+                  <a:schemeClr val="accent6"/>
+                </a:solidFill>
+              </a:rPr>
+              <a:t>5. Ready </a:t>
+            </a:r>
+          </a:p>
+        </p:txBody>
+      </p:sp>
+      <p:sp>
+        <p:nvSpPr>
+          <p:cNvPr id="9" name="TextBox 8">
+            <a:extLst>
+              <a:ext uri="{FF2B5EF4-FFF2-40B4-BE49-F238E27FC236}">
+                <a16:creationId xmlns:a16="http://schemas.microsoft.com/office/drawing/2014/main" id="{1F5A0999-22D3-9F46-9EB3-2A10A3BE6782}"/>
+              </a:ext>
+            </a:extLst>
+          </p:cNvPr>
+          <p:cNvSpPr txBox="1"/>
+          <p:nvPr/>
+        </p:nvSpPr>
+        <p:spPr>
+          <a:xfrm>
+            <a:off x="1273509" y="1454727"/>
+            <a:ext cx="2891497" cy="707886"/>
+          </a:xfrm>
+          <a:prstGeom prst="rect">
+            <a:avLst/>
+          </a:prstGeom>
+          <a:noFill/>
+        </p:spPr>
+        <p:txBody>
+          <a:bodyPr wrap="none" rtlCol="0">
+            <a:spAutoFit/>
+          </a:bodyPr>
+          <a:lstStyle/>
+          <a:p>
+            <a:r>
+              <a:rPr lang="en-BY" sz="4000" dirty="0">
+                <a:solidFill>
+                  <a:schemeClr val="accent6"/>
+                </a:solidFill>
+              </a:rPr>
+              <a:t>1. Dropdown</a:t>
+            </a:r>
+            <a:endParaRPr lang="en-BY" dirty="0">
+              <a:solidFill>
+                <a:schemeClr val="accent6"/>
+              </a:solidFill>
+            </a:endParaRPr>
+          </a:p>
+        </p:txBody>
+      </p:sp>
+      <p:sp>
+        <p:nvSpPr>
+          <p:cNvPr id="10" name="TextBox 9">
+            <a:extLst>
+              <a:ext uri="{FF2B5EF4-FFF2-40B4-BE49-F238E27FC236}">
+                <a16:creationId xmlns:a16="http://schemas.microsoft.com/office/drawing/2014/main" id="{0592BD73-6BF4-8B4B-B803-22AB5DA0ECE7}"/>
+              </a:ext>
+            </a:extLst>
+          </p:cNvPr>
+          <p:cNvSpPr txBox="1"/>
+          <p:nvPr/>
+        </p:nvSpPr>
+        <p:spPr>
+          <a:xfrm>
+            <a:off x="1303131" y="4516902"/>
+            <a:ext cx="5510483" cy="707886"/>
+          </a:xfrm>
+          <a:prstGeom prst="rect">
+            <a:avLst/>
+          </a:prstGeom>
+          <a:noFill/>
+        </p:spPr>
+        <p:txBody>
+          <a:bodyPr wrap="none" rtlCol="0">
+            <a:spAutoFit/>
+          </a:bodyPr>
+          <a:lstStyle/>
+          <a:p>
+            <a:r>
+              <a:rPr lang="en-BY" sz="4000" dirty="0">
+                <a:solidFill>
+                  <a:schemeClr val="accent6"/>
+                </a:solidFill>
+              </a:rPr>
+              <a:t>Dropdown right-oriented</a:t>
+            </a:r>
+            <a:endParaRPr lang="en-BY" dirty="0">
+              <a:solidFill>
+                <a:schemeClr val="accent6"/>
+              </a:solidFill>
+            </a:endParaRPr>
+          </a:p>
+        </p:txBody>
+      </p:sp>
+      <p:sp>
+        <p:nvSpPr>
+          <p:cNvPr id="11" name="TextBox 10">
+            <a:extLst>
+              <a:ext uri="{FF2B5EF4-FFF2-40B4-BE49-F238E27FC236}">
+                <a16:creationId xmlns:a16="http://schemas.microsoft.com/office/drawing/2014/main" id="{F8D35A24-439B-6646-A966-18AEDA3AB038}"/>
+              </a:ext>
+            </a:extLst>
+          </p:cNvPr>
+          <p:cNvSpPr txBox="1"/>
+          <p:nvPr/>
+        </p:nvSpPr>
+        <p:spPr>
+          <a:xfrm>
+            <a:off x="1273508" y="5611411"/>
+            <a:ext cx="3190425" cy="707886"/>
+          </a:xfrm>
+          <a:prstGeom prst="rect">
+            <a:avLst/>
+          </a:prstGeom>
+          <a:noFill/>
+        </p:spPr>
+        <p:txBody>
+          <a:bodyPr wrap="none" rtlCol="0">
+            <a:spAutoFit/>
+          </a:bodyPr>
+          <a:lstStyle/>
+          <a:p>
+            <a:r>
+              <a:rPr lang="en-BY" sz="4000" dirty="0">
+                <a:solidFill>
+                  <a:schemeClr val="accent6"/>
+                </a:solidFill>
+              </a:rPr>
+              <a:t>6. latest-works</a:t>
+            </a:r>
+            <a:endParaRPr lang="en-BY" dirty="0">
+              <a:solidFill>
+                <a:schemeClr val="accent6"/>
+              </a:solidFill>
+            </a:endParaRPr>
+          </a:p>
+        </p:txBody>
+      </p:sp>
+      <p:sp>
+        <p:nvSpPr>
+          <p:cNvPr id="12" name="TextBox 11">
+            <a:extLst>
+              <a:ext uri="{FF2B5EF4-FFF2-40B4-BE49-F238E27FC236}">
+                <a16:creationId xmlns:a16="http://schemas.microsoft.com/office/drawing/2014/main" id="{C51E008A-8B9C-344B-9A24-AA7657ABF6A2}"/>
+              </a:ext>
+            </a:extLst>
+          </p:cNvPr>
+          <p:cNvSpPr txBox="1"/>
+          <p:nvPr/>
+        </p:nvSpPr>
+        <p:spPr>
+          <a:xfrm>
+            <a:off x="11231767" y="5611411"/>
+            <a:ext cx="2802627" cy="707886"/>
+          </a:xfrm>
+          <a:prstGeom prst="rect">
+            <a:avLst/>
+          </a:prstGeom>
+          <a:noFill/>
+        </p:spPr>
+        <p:txBody>
+          <a:bodyPr wrap="none" rtlCol="0">
+            <a:spAutoFit/>
+          </a:bodyPr>
+          <a:lstStyle/>
+          <a:p>
+            <a:r>
+              <a:rPr lang="en-BY" sz="4000" dirty="0">
+                <a:solidFill>
+                  <a:schemeClr val="accent6"/>
+                </a:solidFill>
+              </a:rPr>
+              <a:t>Arrows 7.-8. </a:t>
+            </a:r>
+            <a:endParaRPr lang="en-BY" dirty="0">
+              <a:solidFill>
+                <a:schemeClr val="accent6"/>
+              </a:solidFill>
+            </a:endParaRPr>
+          </a:p>
+        </p:txBody>
+      </p:sp>
+      <p:sp>
+        <p:nvSpPr>
+          <p:cNvPr id="13" name="TextBox 12">
+            <a:extLst>
+              <a:ext uri="{FF2B5EF4-FFF2-40B4-BE49-F238E27FC236}">
+                <a16:creationId xmlns:a16="http://schemas.microsoft.com/office/drawing/2014/main" id="{54104E2F-1146-0B45-9ACC-5A578D4A4BA4}"/>
+              </a:ext>
+            </a:extLst>
+          </p:cNvPr>
+          <p:cNvSpPr txBox="1"/>
+          <p:nvPr/>
+        </p:nvSpPr>
+        <p:spPr>
+          <a:xfrm>
+            <a:off x="1273508" y="6707544"/>
+            <a:ext cx="3106876" cy="707886"/>
+          </a:xfrm>
+          <a:prstGeom prst="rect">
+            <a:avLst/>
+          </a:prstGeom>
+          <a:noFill/>
+        </p:spPr>
+        <p:txBody>
+          <a:bodyPr wrap="none" rtlCol="0">
+            <a:spAutoFit/>
+          </a:bodyPr>
+          <a:lstStyle/>
+          <a:p>
+            <a:r>
+              <a:rPr lang="en-BY" sz="4000" dirty="0">
+                <a:solidFill>
+                  <a:schemeClr val="accent6"/>
+                </a:solidFill>
+              </a:rPr>
+              <a:t>9. </a:t>
+            </a:r>
+            <a:r>
+              <a:rPr lang="en-BY" sz="4000">
+                <a:solidFill>
+                  <a:schemeClr val="accent6"/>
+                </a:solidFill>
+              </a:rPr>
+              <a:t>testimonals</a:t>
+            </a:r>
+            <a:endParaRPr lang="en-BY" dirty="0">
+              <a:solidFill>
+                <a:schemeClr val="accent6"/>
+              </a:solidFill>
+            </a:endParaRPr>
+          </a:p>
+        </p:txBody>
+      </p:sp>
+      <p:sp>
+        <p:nvSpPr>
+          <p:cNvPr id="14" name="TextBox 13">
+            <a:extLst>
+              <a:ext uri="{FF2B5EF4-FFF2-40B4-BE49-F238E27FC236}">
+                <a16:creationId xmlns:a16="http://schemas.microsoft.com/office/drawing/2014/main" id="{25BC831D-D03C-F940-8E99-5217CE2F7DF0}"/>
+              </a:ext>
+            </a:extLst>
+          </p:cNvPr>
+          <p:cNvSpPr txBox="1"/>
+          <p:nvPr/>
+        </p:nvSpPr>
+        <p:spPr>
+          <a:xfrm>
+            <a:off x="7351241" y="6707544"/>
+            <a:ext cx="3368294" cy="707886"/>
+          </a:xfrm>
+          <a:prstGeom prst="rect">
+            <a:avLst/>
+          </a:prstGeom>
+          <a:noFill/>
+        </p:spPr>
+        <p:txBody>
+          <a:bodyPr wrap="none" rtlCol="0">
+            <a:spAutoFit/>
+          </a:bodyPr>
+          <a:lstStyle/>
+          <a:p>
+            <a:r>
+              <a:rPr lang="en-BY" sz="4000" dirty="0">
+                <a:solidFill>
+                  <a:schemeClr val="accent6"/>
+                </a:solidFill>
+              </a:rPr>
+              <a:t>10. Our Clients </a:t>
+            </a:r>
+            <a:endParaRPr lang="en-BY" dirty="0">
+              <a:solidFill>
+                <a:schemeClr val="accent6"/>
+              </a:solidFill>
+            </a:endParaRPr>
+          </a:p>
+        </p:txBody>
+      </p:sp>
+      <p:sp>
+        <p:nvSpPr>
+          <p:cNvPr id="15" name="TextBox 14">
+            <a:extLst>
+              <a:ext uri="{FF2B5EF4-FFF2-40B4-BE49-F238E27FC236}">
+                <a16:creationId xmlns:a16="http://schemas.microsoft.com/office/drawing/2014/main" id="{C7C15D5E-03C1-2443-94B4-FAEF792F0DAD}"/>
+              </a:ext>
+            </a:extLst>
+          </p:cNvPr>
+          <p:cNvSpPr txBox="1"/>
+          <p:nvPr/>
+        </p:nvSpPr>
+        <p:spPr>
+          <a:xfrm>
+            <a:off x="11231767" y="9025585"/>
+            <a:ext cx="2108462" cy="1323439"/>
+          </a:xfrm>
+          <a:prstGeom prst="rect">
+            <a:avLst/>
+          </a:prstGeom>
+          <a:noFill/>
+        </p:spPr>
+        <p:txBody>
+          <a:bodyPr wrap="none" rtlCol="0">
+            <a:spAutoFit/>
+          </a:bodyPr>
+          <a:lstStyle/>
+          <a:p>
+            <a:r>
+              <a:rPr lang="en-BY" sz="4000" dirty="0">
+                <a:solidFill>
+                  <a:schemeClr val="accent6"/>
+                </a:solidFill>
+              </a:rPr>
+              <a:t>Contacts </a:t>
+            </a:r>
+          </a:p>
+          <a:p>
+            <a:r>
+              <a:rPr lang="en-BY" sz="4000" dirty="0">
+                <a:solidFill>
+                  <a:schemeClr val="accent6"/>
+                </a:solidFill>
+              </a:rPr>
+              <a:t>+=6-&gt;</a:t>
+            </a:r>
+            <a:r>
+              <a:rPr lang="en-BY" sz="4000" b="1" dirty="0">
+                <a:solidFill>
+                  <a:schemeClr val="accent6"/>
+                </a:solidFill>
+              </a:rPr>
+              <a:t>16</a:t>
+            </a:r>
+            <a:r>
+              <a:rPr lang="en-BY" sz="4000" dirty="0">
+                <a:solidFill>
+                  <a:schemeClr val="accent6"/>
+                </a:solidFill>
+              </a:rPr>
+              <a:t> </a:t>
+            </a:r>
+            <a:endParaRPr lang="en-BY" dirty="0">
+              <a:solidFill>
+                <a:schemeClr val="accent6"/>
+              </a:solidFill>
+            </a:endParaRPr>
+          </a:p>
+        </p:txBody>
+      </p:sp>
+    </p:spTree>
+    <p:extLst>
+      <p:ext uri="{BB962C8B-B14F-4D97-AF65-F5344CB8AC3E}">
+        <p14:creationId xmlns:p14="http://schemas.microsoft.com/office/powerpoint/2010/main" val="737876356"/>
       </p:ext>
     </p:extLst>
   </p:cSld>

</xml_diff>

<commit_message>
added layout for the slideshow section
</commit_message>
<xml_diff>
--- a/layout.pptx
+++ b/layout.pptx
@@ -7,6 +7,7 @@
   <p:sldIdLst>
     <p:sldId id="257" r:id="rId2"/>
     <p:sldId id="258" r:id="rId3"/>
+    <p:sldId id="260" r:id="rId4"/>
   </p:sldIdLst>
   <p:sldSz cx="16256000" cy="12192000"/>
   <p:notesSz cx="6858000" cy="9144000"/>
@@ -4105,7 +4106,7 @@
                   <a:schemeClr val="tx1"/>
                 </a:solidFill>
               </a:rPr>
-              <a:t>.gallery</a:t>
+              <a:t>.slideshow</a:t>
             </a:r>
           </a:p>
         </p:txBody>
@@ -4193,7 +4194,7 @@
         </p:nvSpPr>
         <p:spPr>
           <a:xfrm>
-            <a:off x="1273509" y="2729345"/>
+            <a:off x="1273509" y="4259972"/>
             <a:ext cx="1907895" cy="1323439"/>
           </a:xfrm>
           <a:prstGeom prst="rect">
@@ -4247,7 +4248,7 @@
         </p:nvSpPr>
         <p:spPr>
           <a:xfrm>
-            <a:off x="3644606" y="2729345"/>
+            <a:off x="3644606" y="4259972"/>
             <a:ext cx="3139386" cy="984885"/>
           </a:xfrm>
           <a:prstGeom prst="rect">
@@ -4296,7 +4297,7 @@
         </p:nvSpPr>
         <p:spPr>
           <a:xfrm>
-            <a:off x="7074151" y="2729345"/>
+            <a:off x="7074151" y="4259972"/>
             <a:ext cx="1872564" cy="1323439"/>
           </a:xfrm>
           <a:prstGeom prst="rect">
@@ -4350,7 +4351,7 @@
         </p:nvSpPr>
         <p:spPr>
           <a:xfrm>
-            <a:off x="10249319" y="2729345"/>
+            <a:off x="10249319" y="4259972"/>
             <a:ext cx="2076787" cy="707886"/>
           </a:xfrm>
           <a:prstGeom prst="rect">
@@ -4433,8 +4434,8 @@
         </p:nvSpPr>
         <p:spPr>
           <a:xfrm>
-            <a:off x="1303131" y="4516902"/>
-            <a:ext cx="5510483" cy="707886"/>
+            <a:off x="1303131" y="6047529"/>
+            <a:ext cx="2340064" cy="707886"/>
           </a:xfrm>
           <a:prstGeom prst="rect">
             <a:avLst/>
@@ -4453,7 +4454,7 @@
                   <a:schemeClr val="accent6"/>
                 </a:solidFill>
               </a:rPr>
-              <a:t>Dropdown right-oriented</a:t>
+              <a:t>dropdown</a:t>
             </a:r>
             <a:endParaRPr lang="en-BY" dirty="0">
               <a:solidFill>
@@ -4477,7 +4478,7 @@
         </p:nvSpPr>
         <p:spPr>
           <a:xfrm>
-            <a:off x="1273508" y="5611411"/>
+            <a:off x="1273508" y="7142038"/>
             <a:ext cx="3190425" cy="707886"/>
           </a:xfrm>
           <a:prstGeom prst="rect">
@@ -4521,8 +4522,8 @@
         </p:nvSpPr>
         <p:spPr>
           <a:xfrm>
-            <a:off x="11231767" y="5611411"/>
-            <a:ext cx="2802627" cy="707886"/>
+            <a:off x="11231767" y="7142038"/>
+            <a:ext cx="3478773" cy="707886"/>
           </a:xfrm>
           <a:prstGeom prst="rect">
             <a:avLst/>
@@ -4541,7 +4542,7 @@
                   <a:schemeClr val="accent6"/>
                 </a:solidFill>
               </a:rPr>
-              <a:t>Arrows 7.-8. </a:t>
+              <a:t>dropdown 7.-8. </a:t>
             </a:r>
             <a:endParaRPr lang="en-BY" dirty="0">
               <a:solidFill>
@@ -4565,7 +4566,7 @@
         </p:nvSpPr>
         <p:spPr>
           <a:xfrm>
-            <a:off x="1273508" y="6707544"/>
+            <a:off x="1273508" y="8238171"/>
             <a:ext cx="3106876" cy="707886"/>
           </a:xfrm>
           <a:prstGeom prst="rect">
@@ -4585,15 +4586,7 @@
                   <a:schemeClr val="accent6"/>
                 </a:solidFill>
               </a:rPr>
-              <a:t>9. </a:t>
-            </a:r>
-            <a:r>
-              <a:rPr lang="en-BY" sz="4000">
-                <a:solidFill>
-                  <a:schemeClr val="accent6"/>
-                </a:solidFill>
-              </a:rPr>
-              <a:t>testimonals</a:t>
+              <a:t>9. testimonals</a:t>
             </a:r>
             <a:endParaRPr lang="en-BY" dirty="0">
               <a:solidFill>
@@ -4617,8 +4610,8 @@
         </p:nvSpPr>
         <p:spPr>
           <a:xfrm>
-            <a:off x="7351241" y="6707544"/>
-            <a:ext cx="3368294" cy="707886"/>
+            <a:off x="7351241" y="8238171"/>
+            <a:ext cx="3268331" cy="707886"/>
           </a:xfrm>
           <a:prstGeom prst="rect">
             <a:avLst/>
@@ -4637,7 +4630,7 @@
                   <a:schemeClr val="accent6"/>
                 </a:solidFill>
               </a:rPr>
-              <a:t>10. Our Clients </a:t>
+              <a:t>10. our-clients </a:t>
             </a:r>
             <a:endParaRPr lang="en-BY" dirty="0">
               <a:solidFill>
@@ -4661,7 +4654,7 @@
         </p:nvSpPr>
         <p:spPr>
           <a:xfrm>
-            <a:off x="11231767" y="9025585"/>
+            <a:off x="11231767" y="10556212"/>
             <a:ext cx="2108462" cy="1323439"/>
           </a:xfrm>
           <a:prstGeom prst="rect">
@@ -4717,10 +4710,1145 @@
           </a:p>
         </p:txBody>
       </p:sp>
+      <p:sp>
+        <p:nvSpPr>
+          <p:cNvPr id="17" name="TextBox 16">
+            <a:extLst>
+              <a:ext uri="{FF2B5EF4-FFF2-40B4-BE49-F238E27FC236}">
+                <a16:creationId xmlns:a16="http://schemas.microsoft.com/office/drawing/2014/main" id="{D4090F45-8723-3F49-93B2-7C8DA2E1B954}"/>
+              </a:ext>
+            </a:extLst>
+          </p:cNvPr>
+          <p:cNvSpPr txBox="1"/>
+          <p:nvPr/>
+        </p:nvSpPr>
+        <p:spPr>
+          <a:xfrm>
+            <a:off x="4704362" y="3103357"/>
+            <a:ext cx="5293757" cy="707886"/>
+          </a:xfrm>
+          <a:prstGeom prst="rect">
+            <a:avLst/>
+          </a:prstGeom>
+          <a:noFill/>
+        </p:spPr>
+        <p:txBody>
+          <a:bodyPr wrap="none" rtlCol="0">
+            <a:spAutoFit/>
+          </a:bodyPr>
+          <a:lstStyle/>
+          <a:p>
+            <a:r>
+              <a:rPr lang="en-BY" sz="4000" dirty="0">
+                <a:solidFill>
+                  <a:schemeClr val="accent6"/>
+                </a:solidFill>
+              </a:rPr>
+              <a:t>1.1 slideshow-nav-round</a:t>
+            </a:r>
+            <a:endParaRPr lang="en-BY" dirty="0">
+              <a:solidFill>
+                <a:schemeClr val="accent6"/>
+              </a:solidFill>
+            </a:endParaRPr>
+          </a:p>
+        </p:txBody>
+      </p:sp>
     </p:spTree>
     <p:extLst>
       <p:ext uri="{BB962C8B-B14F-4D97-AF65-F5344CB8AC3E}">
         <p14:creationId xmlns:p14="http://schemas.microsoft.com/office/powerpoint/2010/main" val="737876356"/>
+      </p:ext>
+    </p:extLst>
+  </p:cSld>
+  <p:clrMapOvr>
+    <a:masterClrMapping/>
+  </p:clrMapOvr>
+</p:sld>
+</file>
+
+<file path=ppt/slides/slide3.xml><?xml version="1.0" encoding="utf-8"?>
+<p:sld xmlns:a="http://schemas.openxmlformats.org/drawingml/2006/main" xmlns:r="http://schemas.openxmlformats.org/officeDocument/2006/relationships" xmlns:p="http://schemas.openxmlformats.org/presentationml/2006/main">
+  <p:cSld>
+    <p:spTree>
+      <p:nvGrpSpPr>
+        <p:cNvPr id="1" name=""/>
+        <p:cNvGrpSpPr/>
+        <p:nvPr/>
+      </p:nvGrpSpPr>
+      <p:grpSpPr>
+        <a:xfrm>
+          <a:off x="0" y="0"/>
+          <a:ext cx="0" cy="0"/>
+          <a:chOff x="0" y="0"/>
+          <a:chExt cx="0" cy="0"/>
+        </a:xfrm>
+      </p:grpSpPr>
+      <p:sp>
+        <p:nvSpPr>
+          <p:cNvPr id="4" name="TextBox 3">
+            <a:extLst>
+              <a:ext uri="{FF2B5EF4-FFF2-40B4-BE49-F238E27FC236}">
+                <a16:creationId xmlns:a16="http://schemas.microsoft.com/office/drawing/2014/main" id="{4E45CDFE-59FB-F74F-A73B-6933C90EBAEE}"/>
+              </a:ext>
+            </a:extLst>
+          </p:cNvPr>
+          <p:cNvSpPr txBox="1"/>
+          <p:nvPr/>
+        </p:nvSpPr>
+        <p:spPr>
+          <a:xfrm>
+            <a:off x="443346" y="360218"/>
+            <a:ext cx="3900042" cy="707886"/>
+          </a:xfrm>
+          <a:prstGeom prst="rect">
+            <a:avLst/>
+          </a:prstGeom>
+          <a:noFill/>
+        </p:spPr>
+        <p:txBody>
+          <a:bodyPr wrap="none" rtlCol="0">
+            <a:spAutoFit/>
+          </a:bodyPr>
+          <a:lstStyle/>
+          <a:p>
+            <a:r>
+              <a:rPr lang="en-BY" sz="4000" dirty="0"/>
+              <a:t>Slideshow section</a:t>
+            </a:r>
+            <a:endParaRPr lang="en-BY" dirty="0"/>
+          </a:p>
+        </p:txBody>
+      </p:sp>
+      <p:sp>
+        <p:nvSpPr>
+          <p:cNvPr id="16" name="Rectangle 15">
+            <a:extLst>
+              <a:ext uri="{FF2B5EF4-FFF2-40B4-BE49-F238E27FC236}">
+                <a16:creationId xmlns:a16="http://schemas.microsoft.com/office/drawing/2014/main" id="{3178C7DD-2D9B-D344-9FB1-89BF70EB1B23}"/>
+              </a:ext>
+            </a:extLst>
+          </p:cNvPr>
+          <p:cNvSpPr/>
+          <p:nvPr/>
+        </p:nvSpPr>
+        <p:spPr>
+          <a:xfrm>
+            <a:off x="1111430" y="1669869"/>
+            <a:ext cx="12413183" cy="5390150"/>
+          </a:xfrm>
+          <a:prstGeom prst="rect">
+            <a:avLst/>
+          </a:prstGeom>
+          <a:solidFill>
+            <a:schemeClr val="bg1">
+              <a:lumMod val="95000"/>
+            </a:schemeClr>
+          </a:solidFill>
+        </p:spPr>
+        <p:style>
+          <a:lnRef idx="2">
+            <a:schemeClr val="accent1">
+              <a:shade val="50000"/>
+            </a:schemeClr>
+          </a:lnRef>
+          <a:fillRef idx="1">
+            <a:schemeClr val="accent1"/>
+          </a:fillRef>
+          <a:effectRef idx="0">
+            <a:schemeClr val="accent1"/>
+          </a:effectRef>
+          <a:fontRef idx="minor">
+            <a:schemeClr val="lt1"/>
+          </a:fontRef>
+        </p:style>
+        <p:txBody>
+          <a:bodyPr rtlCol="0" anchor="ctr"/>
+          <a:lstStyle/>
+          <a:p>
+            <a:pPr algn="ctr"/>
+            <a:endParaRPr lang="en-US"/>
+          </a:p>
+        </p:txBody>
+      </p:sp>
+      <p:grpSp>
+        <p:nvGrpSpPr>
+          <p:cNvPr id="17" name="Group 16">
+            <a:extLst>
+              <a:ext uri="{FF2B5EF4-FFF2-40B4-BE49-F238E27FC236}">
+                <a16:creationId xmlns:a16="http://schemas.microsoft.com/office/drawing/2014/main" id="{C9880EC7-75D0-2E45-B27E-9CEE6201A1FF}"/>
+              </a:ext>
+            </a:extLst>
+          </p:cNvPr>
+          <p:cNvGrpSpPr/>
+          <p:nvPr/>
+        </p:nvGrpSpPr>
+        <p:grpSpPr>
+          <a:xfrm>
+            <a:off x="2413116" y="1700495"/>
+            <a:ext cx="9809810" cy="5359524"/>
+            <a:chOff x="787400" y="650240"/>
+            <a:chExt cx="5283200" cy="2000250"/>
+          </a:xfrm>
+        </p:grpSpPr>
+        <p:sp>
+          <p:nvSpPr>
+            <p:cNvPr id="18" name="Rectangle 17">
+              <a:extLst>
+                <a:ext uri="{FF2B5EF4-FFF2-40B4-BE49-F238E27FC236}">
+                  <a16:creationId xmlns:a16="http://schemas.microsoft.com/office/drawing/2014/main" id="{8AFBF417-F05E-8E4F-8390-52398C96C588}"/>
+                </a:ext>
+              </a:extLst>
+            </p:cNvPr>
+            <p:cNvSpPr/>
+            <p:nvPr/>
+          </p:nvSpPr>
+          <p:spPr>
+            <a:xfrm>
+              <a:off x="787400" y="650240"/>
+              <a:ext cx="5283200" cy="2000250"/>
+            </a:xfrm>
+            <a:prstGeom prst="rect">
+              <a:avLst/>
+            </a:prstGeom>
+            <a:solidFill>
+              <a:srgbClr val="5B9BD5">
+                <a:alpha val="10196"/>
+              </a:srgbClr>
+            </a:solidFill>
+            <a:ln>
+              <a:solidFill>
+                <a:schemeClr val="accent5"/>
+              </a:solidFill>
+            </a:ln>
+          </p:spPr>
+          <p:style>
+            <a:lnRef idx="2">
+              <a:schemeClr val="accent1">
+                <a:shade val="50000"/>
+              </a:schemeClr>
+            </a:lnRef>
+            <a:fillRef idx="1">
+              <a:schemeClr val="accent1"/>
+            </a:fillRef>
+            <a:effectRef idx="0">
+              <a:schemeClr val="accent1"/>
+            </a:effectRef>
+            <a:fontRef idx="minor">
+              <a:schemeClr val="lt1"/>
+            </a:fontRef>
+          </p:style>
+          <p:txBody>
+            <a:bodyPr rtlCol="0" anchor="ctr"/>
+            <a:lstStyle/>
+            <a:p>
+              <a:pPr algn="ctr"/>
+              <a:endParaRPr lang="en-US" dirty="0"/>
+            </a:p>
+          </p:txBody>
+        </p:sp>
+        <p:sp>
+          <p:nvSpPr>
+            <p:cNvPr id="19" name="Rectangle 18">
+              <a:extLst>
+                <a:ext uri="{FF2B5EF4-FFF2-40B4-BE49-F238E27FC236}">
+                  <a16:creationId xmlns:a16="http://schemas.microsoft.com/office/drawing/2014/main" id="{91869B45-4A01-164E-98E2-ADB9CC3952C9}"/>
+                </a:ext>
+              </a:extLst>
+            </p:cNvPr>
+            <p:cNvSpPr/>
+            <p:nvPr/>
+          </p:nvSpPr>
+          <p:spPr>
+            <a:xfrm>
+              <a:off x="787400" y="680720"/>
+              <a:ext cx="2321560" cy="121920"/>
+            </a:xfrm>
+            <a:prstGeom prst="rect">
+              <a:avLst/>
+            </a:prstGeom>
+            <a:noFill/>
+            <a:ln>
+              <a:noFill/>
+            </a:ln>
+          </p:spPr>
+          <p:style>
+            <a:lnRef idx="2">
+              <a:schemeClr val="accent1">
+                <a:shade val="50000"/>
+              </a:schemeClr>
+            </a:lnRef>
+            <a:fillRef idx="1">
+              <a:schemeClr val="accent1"/>
+            </a:fillRef>
+            <a:effectRef idx="0">
+              <a:schemeClr val="accent1"/>
+            </a:effectRef>
+            <a:fontRef idx="minor">
+              <a:schemeClr val="lt1"/>
+            </a:fontRef>
+          </p:style>
+          <p:txBody>
+            <a:bodyPr rtlCol="0" anchor="ctr"/>
+            <a:lstStyle/>
+            <a:p>
+              <a:r>
+                <a:rPr lang="en-US" sz="1600" dirty="0">
+                  <a:solidFill>
+                    <a:schemeClr val="accent5"/>
+                  </a:solidFill>
+                </a:rPr>
+                <a:t>&lt;div&gt; .content-horizontal-center</a:t>
+              </a:r>
+            </a:p>
+          </p:txBody>
+        </p:sp>
+      </p:grpSp>
+      <p:sp>
+        <p:nvSpPr>
+          <p:cNvPr id="23" name="Rectangle 22">
+            <a:extLst>
+              <a:ext uri="{FF2B5EF4-FFF2-40B4-BE49-F238E27FC236}">
+                <a16:creationId xmlns:a16="http://schemas.microsoft.com/office/drawing/2014/main" id="{C697B5D6-684E-F341-84B3-480269E5B8A5}"/>
+              </a:ext>
+            </a:extLst>
+          </p:cNvPr>
+          <p:cNvSpPr/>
+          <p:nvPr/>
+        </p:nvSpPr>
+        <p:spPr>
+          <a:xfrm>
+            <a:off x="1096191" y="1700349"/>
+            <a:ext cx="1811042" cy="796272"/>
+          </a:xfrm>
+          <a:prstGeom prst="rect">
+            <a:avLst/>
+          </a:prstGeom>
+          <a:noFill/>
+          <a:ln>
+            <a:noFill/>
+          </a:ln>
+        </p:spPr>
+        <p:style>
+          <a:lnRef idx="2">
+            <a:schemeClr val="accent1">
+              <a:shade val="50000"/>
+            </a:schemeClr>
+          </a:lnRef>
+          <a:fillRef idx="1">
+            <a:schemeClr val="accent1"/>
+          </a:fillRef>
+          <a:effectRef idx="0">
+            <a:schemeClr val="accent1"/>
+          </a:effectRef>
+          <a:fontRef idx="minor">
+            <a:schemeClr val="lt1"/>
+          </a:fontRef>
+        </p:style>
+        <p:txBody>
+          <a:bodyPr rtlCol="0" anchor="ctr"/>
+          <a:lstStyle/>
+          <a:p>
+            <a:r>
+              <a:rPr lang="en-US" sz="1600" dirty="0">
+                <a:solidFill>
+                  <a:schemeClr val="tx1"/>
+                </a:solidFill>
+              </a:rPr>
+              <a:t>&lt;div&gt; </a:t>
+            </a:r>
+            <a:br>
+              <a:rPr lang="en-US" sz="1600" dirty="0">
+                <a:solidFill>
+                  <a:schemeClr val="tx1"/>
+                </a:solidFill>
+              </a:rPr>
+            </a:br>
+            <a:r>
+              <a:rPr lang="en-US" sz="1600" dirty="0">
+                <a:solidFill>
+                  <a:schemeClr val="tx1"/>
+                </a:solidFill>
+              </a:rPr>
+              <a:t>.slideshow</a:t>
+            </a:r>
+          </a:p>
+        </p:txBody>
+      </p:sp>
+      <p:grpSp>
+        <p:nvGrpSpPr>
+          <p:cNvPr id="24" name="Group 23">
+            <a:extLst>
+              <a:ext uri="{FF2B5EF4-FFF2-40B4-BE49-F238E27FC236}">
+                <a16:creationId xmlns:a16="http://schemas.microsoft.com/office/drawing/2014/main" id="{538C9DEF-B4A9-2340-A774-A0EE6CDDB056}"/>
+              </a:ext>
+            </a:extLst>
+          </p:cNvPr>
+          <p:cNvGrpSpPr/>
+          <p:nvPr/>
+        </p:nvGrpSpPr>
+        <p:grpSpPr>
+          <a:xfrm>
+            <a:off x="2458994" y="2108839"/>
+            <a:ext cx="9714505" cy="3802860"/>
+            <a:chOff x="838728" y="802694"/>
+            <a:chExt cx="5231872" cy="1419281"/>
+          </a:xfrm>
+        </p:grpSpPr>
+        <p:sp>
+          <p:nvSpPr>
+            <p:cNvPr id="25" name="Rectangle 24">
+              <a:extLst>
+                <a:ext uri="{FF2B5EF4-FFF2-40B4-BE49-F238E27FC236}">
+                  <a16:creationId xmlns:a16="http://schemas.microsoft.com/office/drawing/2014/main" id="{2FCB1430-0AAB-214B-A592-0F1B4C30544A}"/>
+                </a:ext>
+              </a:extLst>
+            </p:cNvPr>
+            <p:cNvSpPr/>
+            <p:nvPr/>
+          </p:nvSpPr>
+          <p:spPr>
+            <a:xfrm>
+              <a:off x="838728" y="802694"/>
+              <a:ext cx="5231872" cy="1419281"/>
+            </a:xfrm>
+            <a:prstGeom prst="rect">
+              <a:avLst/>
+            </a:prstGeom>
+            <a:solidFill>
+              <a:schemeClr val="accent4">
+                <a:alpha val="10196"/>
+              </a:schemeClr>
+            </a:solidFill>
+            <a:ln>
+              <a:solidFill>
+                <a:schemeClr val="accent4"/>
+              </a:solidFill>
+            </a:ln>
+          </p:spPr>
+          <p:style>
+            <a:lnRef idx="2">
+              <a:schemeClr val="accent1">
+                <a:shade val="50000"/>
+              </a:schemeClr>
+            </a:lnRef>
+            <a:fillRef idx="1">
+              <a:schemeClr val="accent1"/>
+            </a:fillRef>
+            <a:effectRef idx="0">
+              <a:schemeClr val="accent1"/>
+            </a:effectRef>
+            <a:fontRef idx="minor">
+              <a:schemeClr val="lt1"/>
+            </a:fontRef>
+          </p:style>
+          <p:txBody>
+            <a:bodyPr rtlCol="0" anchor="ctr"/>
+            <a:lstStyle/>
+            <a:p>
+              <a:pPr algn="ctr"/>
+              <a:endParaRPr lang="en-US" dirty="0"/>
+            </a:p>
+          </p:txBody>
+        </p:sp>
+        <p:sp>
+          <p:nvSpPr>
+            <p:cNvPr id="26" name="Rectangle 25">
+              <a:extLst>
+                <a:ext uri="{FF2B5EF4-FFF2-40B4-BE49-F238E27FC236}">
+                  <a16:creationId xmlns:a16="http://schemas.microsoft.com/office/drawing/2014/main" id="{96B646B2-80B9-8D43-8CD6-868C7793E705}"/>
+                </a:ext>
+              </a:extLst>
+            </p:cNvPr>
+            <p:cNvSpPr/>
+            <p:nvPr/>
+          </p:nvSpPr>
+          <p:spPr>
+            <a:xfrm>
+              <a:off x="2601570" y="1389491"/>
+              <a:ext cx="2321560" cy="121920"/>
+            </a:xfrm>
+            <a:prstGeom prst="rect">
+              <a:avLst/>
+            </a:prstGeom>
+            <a:noFill/>
+            <a:ln>
+              <a:noFill/>
+            </a:ln>
+          </p:spPr>
+          <p:style>
+            <a:lnRef idx="2">
+              <a:schemeClr val="accent1">
+                <a:shade val="50000"/>
+              </a:schemeClr>
+            </a:lnRef>
+            <a:fillRef idx="1">
+              <a:schemeClr val="accent1"/>
+            </a:fillRef>
+            <a:effectRef idx="0">
+              <a:schemeClr val="accent1"/>
+            </a:effectRef>
+            <a:fontRef idx="minor">
+              <a:schemeClr val="lt1"/>
+            </a:fontRef>
+          </p:style>
+          <p:txBody>
+            <a:bodyPr rtlCol="0" anchor="ctr"/>
+            <a:lstStyle/>
+            <a:p>
+              <a:r>
+                <a:rPr lang="en-US" sz="1600" dirty="0">
+                  <a:solidFill>
+                    <a:schemeClr val="accent2">
+                      <a:lumMod val="50000"/>
+                    </a:schemeClr>
+                  </a:solidFill>
+                </a:rPr>
+                <a:t>&lt;div&gt; .slideshow__display-container</a:t>
+              </a:r>
+            </a:p>
+          </p:txBody>
+        </p:sp>
+      </p:grpSp>
+      <p:grpSp>
+        <p:nvGrpSpPr>
+          <p:cNvPr id="27" name="Group 26">
+            <a:extLst>
+              <a:ext uri="{FF2B5EF4-FFF2-40B4-BE49-F238E27FC236}">
+                <a16:creationId xmlns:a16="http://schemas.microsoft.com/office/drawing/2014/main" id="{0AE8C89F-CC4E-3B4F-B785-84E09DED3960}"/>
+              </a:ext>
+            </a:extLst>
+          </p:cNvPr>
+          <p:cNvGrpSpPr/>
+          <p:nvPr/>
+        </p:nvGrpSpPr>
+        <p:grpSpPr>
+          <a:xfrm>
+            <a:off x="2458994" y="5965057"/>
+            <a:ext cx="9714505" cy="1041605"/>
+            <a:chOff x="838728" y="1799338"/>
+            <a:chExt cx="5231872" cy="422638"/>
+          </a:xfrm>
+        </p:grpSpPr>
+        <p:sp>
+          <p:nvSpPr>
+            <p:cNvPr id="28" name="Rectangle 27">
+              <a:extLst>
+                <a:ext uri="{FF2B5EF4-FFF2-40B4-BE49-F238E27FC236}">
+                  <a16:creationId xmlns:a16="http://schemas.microsoft.com/office/drawing/2014/main" id="{4841E32A-857D-7445-AC2B-28C1E0D4D8A0}"/>
+                </a:ext>
+              </a:extLst>
+            </p:cNvPr>
+            <p:cNvSpPr/>
+            <p:nvPr/>
+          </p:nvSpPr>
+          <p:spPr>
+            <a:xfrm>
+              <a:off x="838728" y="1799338"/>
+              <a:ext cx="5231872" cy="422638"/>
+            </a:xfrm>
+            <a:prstGeom prst="rect">
+              <a:avLst/>
+            </a:prstGeom>
+            <a:solidFill>
+              <a:srgbClr val="FF0000">
+                <a:alpha val="10196"/>
+              </a:srgbClr>
+            </a:solidFill>
+            <a:ln>
+              <a:solidFill>
+                <a:srgbClr val="C00000"/>
+              </a:solidFill>
+            </a:ln>
+          </p:spPr>
+          <p:style>
+            <a:lnRef idx="2">
+              <a:schemeClr val="accent1">
+                <a:shade val="50000"/>
+              </a:schemeClr>
+            </a:lnRef>
+            <a:fillRef idx="1">
+              <a:schemeClr val="accent1"/>
+            </a:fillRef>
+            <a:effectRef idx="0">
+              <a:schemeClr val="accent1"/>
+            </a:effectRef>
+            <a:fontRef idx="minor">
+              <a:schemeClr val="lt1"/>
+            </a:fontRef>
+          </p:style>
+          <p:txBody>
+            <a:bodyPr rtlCol="0" anchor="ctr"/>
+            <a:lstStyle/>
+            <a:p>
+              <a:pPr algn="ctr"/>
+              <a:endParaRPr lang="en-US" dirty="0"/>
+            </a:p>
+          </p:txBody>
+        </p:sp>
+        <p:sp>
+          <p:nvSpPr>
+            <p:cNvPr id="29" name="Rectangle 28">
+              <a:extLst>
+                <a:ext uri="{FF2B5EF4-FFF2-40B4-BE49-F238E27FC236}">
+                  <a16:creationId xmlns:a16="http://schemas.microsoft.com/office/drawing/2014/main" id="{55C6D190-53FA-E94F-9347-AF1EEB35A0C4}"/>
+                </a:ext>
+              </a:extLst>
+            </p:cNvPr>
+            <p:cNvSpPr/>
+            <p:nvPr/>
+          </p:nvSpPr>
+          <p:spPr>
+            <a:xfrm>
+              <a:off x="838728" y="1823565"/>
+              <a:ext cx="2321560" cy="198293"/>
+            </a:xfrm>
+            <a:prstGeom prst="rect">
+              <a:avLst/>
+            </a:prstGeom>
+            <a:noFill/>
+            <a:ln>
+              <a:noFill/>
+            </a:ln>
+          </p:spPr>
+          <p:style>
+            <a:lnRef idx="2">
+              <a:schemeClr val="accent1">
+                <a:shade val="50000"/>
+              </a:schemeClr>
+            </a:lnRef>
+            <a:fillRef idx="1">
+              <a:schemeClr val="accent1"/>
+            </a:fillRef>
+            <a:effectRef idx="0">
+              <a:schemeClr val="accent1"/>
+            </a:effectRef>
+            <a:fontRef idx="minor">
+              <a:schemeClr val="lt1"/>
+            </a:fontRef>
+          </p:style>
+          <p:txBody>
+            <a:bodyPr rtlCol="0" anchor="ctr"/>
+            <a:lstStyle/>
+            <a:p>
+              <a:r>
+                <a:rPr lang="en-US" sz="1600" dirty="0">
+                  <a:solidFill>
+                    <a:srgbClr val="C00000"/>
+                  </a:solidFill>
+                </a:rPr>
+                <a:t>&lt;div&gt; .slideshow</a:t>
+              </a:r>
+              <a:br>
+                <a:rPr lang="en-US" sz="1600" dirty="0">
+                  <a:solidFill>
+                    <a:srgbClr val="C00000"/>
+                  </a:solidFill>
+                </a:rPr>
+              </a:br>
+              <a:r>
+                <a:rPr lang="en-US" sz="1600" dirty="0">
+                  <a:solidFill>
+                    <a:srgbClr val="C00000"/>
+                  </a:solidFill>
+                </a:rPr>
+                <a:t>__nav-bar</a:t>
+              </a:r>
+            </a:p>
+          </p:txBody>
+        </p:sp>
+      </p:grpSp>
+      <p:sp>
+        <p:nvSpPr>
+          <p:cNvPr id="30" name="Rectangle 29">
+            <a:extLst>
+              <a:ext uri="{FF2B5EF4-FFF2-40B4-BE49-F238E27FC236}">
+                <a16:creationId xmlns:a16="http://schemas.microsoft.com/office/drawing/2014/main" id="{3EE42572-E42F-BA42-8711-90728F121084}"/>
+              </a:ext>
+            </a:extLst>
+          </p:cNvPr>
+          <p:cNvSpPr/>
+          <p:nvPr/>
+        </p:nvSpPr>
+        <p:spPr>
+          <a:xfrm>
+            <a:off x="4532376" y="6028802"/>
+            <a:ext cx="1019377" cy="902241"/>
+          </a:xfrm>
+          <a:prstGeom prst="rect">
+            <a:avLst/>
+          </a:prstGeom>
+          <a:solidFill>
+            <a:schemeClr val="tx1">
+              <a:lumMod val="50000"/>
+              <a:lumOff val="50000"/>
+              <a:alpha val="10196"/>
+            </a:schemeClr>
+          </a:solidFill>
+          <a:ln>
+            <a:solidFill>
+              <a:schemeClr val="tx1">
+                <a:lumMod val="50000"/>
+                <a:lumOff val="50000"/>
+              </a:schemeClr>
+            </a:solidFill>
+          </a:ln>
+        </p:spPr>
+        <p:style>
+          <a:lnRef idx="2">
+            <a:schemeClr val="accent1">
+              <a:shade val="50000"/>
+            </a:schemeClr>
+          </a:lnRef>
+          <a:fillRef idx="1">
+            <a:schemeClr val="accent1"/>
+          </a:fillRef>
+          <a:effectRef idx="0">
+            <a:schemeClr val="accent1"/>
+          </a:effectRef>
+          <a:fontRef idx="minor">
+            <a:schemeClr val="lt1"/>
+          </a:fontRef>
+        </p:style>
+        <p:txBody>
+          <a:bodyPr rtlCol="0" anchor="ctr"/>
+          <a:lstStyle/>
+          <a:p>
+            <a:pPr algn="ctr"/>
+            <a:endParaRPr lang="en-US" dirty="0"/>
+          </a:p>
+        </p:txBody>
+      </p:sp>
+      <p:sp>
+        <p:nvSpPr>
+          <p:cNvPr id="31" name="Rectangle 30">
+            <a:extLst>
+              <a:ext uri="{FF2B5EF4-FFF2-40B4-BE49-F238E27FC236}">
+                <a16:creationId xmlns:a16="http://schemas.microsoft.com/office/drawing/2014/main" id="{27BA95AA-AAB4-424B-ABA9-2691B476793D}"/>
+              </a:ext>
+            </a:extLst>
+          </p:cNvPr>
+          <p:cNvSpPr/>
+          <p:nvPr/>
+        </p:nvSpPr>
+        <p:spPr>
+          <a:xfrm>
+            <a:off x="5655159" y="6028801"/>
+            <a:ext cx="1019377" cy="902241"/>
+          </a:xfrm>
+          <a:prstGeom prst="rect">
+            <a:avLst/>
+          </a:prstGeom>
+          <a:solidFill>
+            <a:schemeClr val="tx1">
+              <a:lumMod val="50000"/>
+              <a:lumOff val="50000"/>
+              <a:alpha val="10196"/>
+            </a:schemeClr>
+          </a:solidFill>
+          <a:ln>
+            <a:solidFill>
+              <a:schemeClr val="tx1">
+                <a:lumMod val="50000"/>
+                <a:lumOff val="50000"/>
+              </a:schemeClr>
+            </a:solidFill>
+          </a:ln>
+        </p:spPr>
+        <p:style>
+          <a:lnRef idx="2">
+            <a:schemeClr val="accent1">
+              <a:shade val="50000"/>
+            </a:schemeClr>
+          </a:lnRef>
+          <a:fillRef idx="1">
+            <a:schemeClr val="accent1"/>
+          </a:fillRef>
+          <a:effectRef idx="0">
+            <a:schemeClr val="accent1"/>
+          </a:effectRef>
+          <a:fontRef idx="minor">
+            <a:schemeClr val="lt1"/>
+          </a:fontRef>
+        </p:style>
+        <p:txBody>
+          <a:bodyPr rtlCol="0" anchor="ctr"/>
+          <a:lstStyle/>
+          <a:p>
+            <a:pPr algn="ctr"/>
+            <a:endParaRPr lang="en-US" dirty="0"/>
+          </a:p>
+        </p:txBody>
+      </p:sp>
+      <p:sp>
+        <p:nvSpPr>
+          <p:cNvPr id="32" name="Rectangle 31">
+            <a:extLst>
+              <a:ext uri="{FF2B5EF4-FFF2-40B4-BE49-F238E27FC236}">
+                <a16:creationId xmlns:a16="http://schemas.microsoft.com/office/drawing/2014/main" id="{59579229-6CBE-0C4A-BB7A-228DEFB19314}"/>
+              </a:ext>
+            </a:extLst>
+          </p:cNvPr>
+          <p:cNvSpPr/>
+          <p:nvPr/>
+        </p:nvSpPr>
+        <p:spPr>
+          <a:xfrm>
+            <a:off x="6760071" y="6028800"/>
+            <a:ext cx="1019377" cy="902241"/>
+          </a:xfrm>
+          <a:prstGeom prst="rect">
+            <a:avLst/>
+          </a:prstGeom>
+          <a:solidFill>
+            <a:schemeClr val="tx1">
+              <a:lumMod val="50000"/>
+              <a:lumOff val="50000"/>
+              <a:alpha val="10196"/>
+            </a:schemeClr>
+          </a:solidFill>
+          <a:ln>
+            <a:solidFill>
+              <a:schemeClr val="tx1">
+                <a:lumMod val="50000"/>
+                <a:lumOff val="50000"/>
+              </a:schemeClr>
+            </a:solidFill>
+          </a:ln>
+        </p:spPr>
+        <p:style>
+          <a:lnRef idx="2">
+            <a:schemeClr val="accent1">
+              <a:shade val="50000"/>
+            </a:schemeClr>
+          </a:lnRef>
+          <a:fillRef idx="1">
+            <a:schemeClr val="accent1"/>
+          </a:fillRef>
+          <a:effectRef idx="0">
+            <a:schemeClr val="accent1"/>
+          </a:effectRef>
+          <a:fontRef idx="minor">
+            <a:schemeClr val="lt1"/>
+          </a:fontRef>
+        </p:style>
+        <p:txBody>
+          <a:bodyPr rtlCol="0" anchor="ctr"/>
+          <a:lstStyle/>
+          <a:p>
+            <a:pPr algn="ctr"/>
+            <a:endParaRPr lang="en-US" dirty="0"/>
+          </a:p>
+        </p:txBody>
+      </p:sp>
+      <p:sp>
+        <p:nvSpPr>
+          <p:cNvPr id="33" name="Rectangle 32">
+            <a:extLst>
+              <a:ext uri="{FF2B5EF4-FFF2-40B4-BE49-F238E27FC236}">
+                <a16:creationId xmlns:a16="http://schemas.microsoft.com/office/drawing/2014/main" id="{C109E867-F7F2-6F4E-B422-4EAD3B90E3EF}"/>
+              </a:ext>
+            </a:extLst>
+          </p:cNvPr>
+          <p:cNvSpPr/>
+          <p:nvPr/>
+        </p:nvSpPr>
+        <p:spPr>
+          <a:xfrm>
+            <a:off x="7882854" y="6026226"/>
+            <a:ext cx="1019377" cy="902241"/>
+          </a:xfrm>
+          <a:prstGeom prst="rect">
+            <a:avLst/>
+          </a:prstGeom>
+          <a:solidFill>
+            <a:schemeClr val="tx1">
+              <a:lumMod val="50000"/>
+              <a:lumOff val="50000"/>
+              <a:alpha val="10196"/>
+            </a:schemeClr>
+          </a:solidFill>
+          <a:ln>
+            <a:solidFill>
+              <a:schemeClr val="tx1">
+                <a:lumMod val="50000"/>
+                <a:lumOff val="50000"/>
+              </a:schemeClr>
+            </a:solidFill>
+          </a:ln>
+        </p:spPr>
+        <p:style>
+          <a:lnRef idx="2">
+            <a:schemeClr val="accent1">
+              <a:shade val="50000"/>
+            </a:schemeClr>
+          </a:lnRef>
+          <a:fillRef idx="1">
+            <a:schemeClr val="accent1"/>
+          </a:fillRef>
+          <a:effectRef idx="0">
+            <a:schemeClr val="accent1"/>
+          </a:effectRef>
+          <a:fontRef idx="minor">
+            <a:schemeClr val="lt1"/>
+          </a:fontRef>
+        </p:style>
+        <p:txBody>
+          <a:bodyPr rtlCol="0" anchor="ctr"/>
+          <a:lstStyle/>
+          <a:p>
+            <a:pPr algn="ctr"/>
+            <a:endParaRPr lang="en-US" dirty="0"/>
+          </a:p>
+        </p:txBody>
+      </p:sp>
+      <p:sp>
+        <p:nvSpPr>
+          <p:cNvPr id="34" name="Rectangle 33">
+            <a:extLst>
+              <a:ext uri="{FF2B5EF4-FFF2-40B4-BE49-F238E27FC236}">
+                <a16:creationId xmlns:a16="http://schemas.microsoft.com/office/drawing/2014/main" id="{F28E363B-F837-624A-96EF-F6679F17EAC1}"/>
+              </a:ext>
+            </a:extLst>
+          </p:cNvPr>
+          <p:cNvSpPr/>
+          <p:nvPr/>
+        </p:nvSpPr>
+        <p:spPr>
+          <a:xfrm>
+            <a:off x="9023507" y="6023723"/>
+            <a:ext cx="1019377" cy="902241"/>
+          </a:xfrm>
+          <a:prstGeom prst="rect">
+            <a:avLst/>
+          </a:prstGeom>
+          <a:solidFill>
+            <a:schemeClr val="tx1">
+              <a:lumMod val="50000"/>
+              <a:lumOff val="50000"/>
+              <a:alpha val="10196"/>
+            </a:schemeClr>
+          </a:solidFill>
+          <a:ln>
+            <a:solidFill>
+              <a:schemeClr val="tx1">
+                <a:lumMod val="50000"/>
+                <a:lumOff val="50000"/>
+              </a:schemeClr>
+            </a:solidFill>
+          </a:ln>
+        </p:spPr>
+        <p:style>
+          <a:lnRef idx="2">
+            <a:schemeClr val="accent1">
+              <a:shade val="50000"/>
+            </a:schemeClr>
+          </a:lnRef>
+          <a:fillRef idx="1">
+            <a:schemeClr val="accent1"/>
+          </a:fillRef>
+          <a:effectRef idx="0">
+            <a:schemeClr val="accent1"/>
+          </a:effectRef>
+          <a:fontRef idx="minor">
+            <a:schemeClr val="lt1"/>
+          </a:fontRef>
+        </p:style>
+        <p:txBody>
+          <a:bodyPr rtlCol="0" anchor="ctr"/>
+          <a:lstStyle/>
+          <a:p>
+            <a:pPr algn="ctr"/>
+            <a:endParaRPr lang="en-US" dirty="0"/>
+          </a:p>
+        </p:txBody>
+      </p:sp>
+      <p:sp>
+        <p:nvSpPr>
+          <p:cNvPr id="35" name="Rectangle 34">
+            <a:extLst>
+              <a:ext uri="{FF2B5EF4-FFF2-40B4-BE49-F238E27FC236}">
+                <a16:creationId xmlns:a16="http://schemas.microsoft.com/office/drawing/2014/main" id="{942B949A-89D1-A24F-9D71-E71F26F60DBF}"/>
+              </a:ext>
+            </a:extLst>
+          </p:cNvPr>
+          <p:cNvSpPr/>
+          <p:nvPr/>
+        </p:nvSpPr>
+        <p:spPr>
+          <a:xfrm>
+            <a:off x="4519207" y="6233227"/>
+            <a:ext cx="4310657" cy="488700"/>
+          </a:xfrm>
+          <a:prstGeom prst="rect">
+            <a:avLst/>
+          </a:prstGeom>
+          <a:noFill/>
+          <a:ln>
+            <a:noFill/>
+          </a:ln>
+        </p:spPr>
+        <p:style>
+          <a:lnRef idx="2">
+            <a:schemeClr val="accent1">
+              <a:shade val="50000"/>
+            </a:schemeClr>
+          </a:lnRef>
+          <a:fillRef idx="1">
+            <a:schemeClr val="accent1"/>
+          </a:fillRef>
+          <a:effectRef idx="0">
+            <a:schemeClr val="accent1"/>
+          </a:effectRef>
+          <a:fontRef idx="minor">
+            <a:schemeClr val="lt1"/>
+          </a:fontRef>
+        </p:style>
+        <p:txBody>
+          <a:bodyPr rtlCol="0" anchor="ctr"/>
+          <a:lstStyle/>
+          <a:p>
+            <a:r>
+              <a:rPr lang="en-US" sz="1600" dirty="0">
+                <a:solidFill>
+                  <a:schemeClr val="tx1">
+                    <a:lumMod val="75000"/>
+                    <a:lumOff val="25000"/>
+                  </a:schemeClr>
+                </a:solidFill>
+              </a:rPr>
+              <a:t>&lt;span&gt; </a:t>
+            </a:r>
+            <a:br>
+              <a:rPr lang="en-US" sz="1600" dirty="0">
+                <a:solidFill>
+                  <a:schemeClr val="tx1">
+                    <a:lumMod val="75000"/>
+                    <a:lumOff val="25000"/>
+                  </a:schemeClr>
+                </a:solidFill>
+              </a:rPr>
+            </a:br>
+            <a:r>
+              <a:rPr lang="en-US" sz="1600" dirty="0">
+                <a:solidFill>
+                  <a:schemeClr val="tx1">
+                    <a:lumMod val="75000"/>
+                    <a:lumOff val="25000"/>
+                  </a:schemeClr>
+                </a:solidFill>
+              </a:rPr>
+              <a:t>.slideshow</a:t>
+            </a:r>
+            <a:br>
+              <a:rPr lang="en-US" sz="1600" dirty="0">
+                <a:solidFill>
+                  <a:schemeClr val="tx1">
+                    <a:lumMod val="75000"/>
+                    <a:lumOff val="25000"/>
+                  </a:schemeClr>
+                </a:solidFill>
+              </a:rPr>
+            </a:br>
+            <a:r>
+              <a:rPr lang="en-US" sz="1600" dirty="0">
+                <a:solidFill>
+                  <a:schemeClr val="tx1">
+                    <a:lumMod val="75000"/>
+                    <a:lumOff val="25000"/>
+                  </a:schemeClr>
+                </a:solidFill>
+              </a:rPr>
+              <a:t>__</a:t>
+            </a:r>
+            <a:r>
+              <a:rPr lang="en-US" sz="1600" dirty="0" err="1">
+                <a:solidFill>
+                  <a:schemeClr val="tx1">
+                    <a:lumMod val="75000"/>
+                    <a:lumOff val="25000"/>
+                  </a:schemeClr>
+                </a:solidFill>
+              </a:rPr>
+              <a:t>navi</a:t>
+            </a:r>
+            <a:r>
+              <a:rPr lang="en-US" sz="1600" dirty="0">
+                <a:solidFill>
+                  <a:schemeClr val="tx1">
+                    <a:lumMod val="75000"/>
+                    <a:lumOff val="25000"/>
+                  </a:schemeClr>
+                </a:solidFill>
+              </a:rPr>
+              <a:t>-icon</a:t>
+            </a:r>
+          </a:p>
+        </p:txBody>
+      </p:sp>
+      <p:sp>
+        <p:nvSpPr>
+          <p:cNvPr id="36" name="Rectangle 35">
+            <a:extLst>
+              <a:ext uri="{FF2B5EF4-FFF2-40B4-BE49-F238E27FC236}">
+                <a16:creationId xmlns:a16="http://schemas.microsoft.com/office/drawing/2014/main" id="{FBA7CD59-97DB-9247-939B-3C6CCD8C224E}"/>
+              </a:ext>
+            </a:extLst>
+          </p:cNvPr>
+          <p:cNvSpPr/>
+          <p:nvPr/>
+        </p:nvSpPr>
+        <p:spPr>
+          <a:xfrm>
+            <a:off x="4366949" y="7119727"/>
+            <a:ext cx="5675935" cy="488700"/>
+          </a:xfrm>
+          <a:prstGeom prst="rect">
+            <a:avLst/>
+          </a:prstGeom>
+          <a:noFill/>
+          <a:ln>
+            <a:noFill/>
+          </a:ln>
+        </p:spPr>
+        <p:style>
+          <a:lnRef idx="2">
+            <a:schemeClr val="accent1">
+              <a:shade val="50000"/>
+            </a:schemeClr>
+          </a:lnRef>
+          <a:fillRef idx="1">
+            <a:schemeClr val="accent1"/>
+          </a:fillRef>
+          <a:effectRef idx="0">
+            <a:schemeClr val="accent1"/>
+          </a:effectRef>
+          <a:fontRef idx="minor">
+            <a:schemeClr val="lt1"/>
+          </a:fontRef>
+        </p:style>
+        <p:txBody>
+          <a:bodyPr rtlCol="0" anchor="ctr"/>
+          <a:lstStyle/>
+          <a:p>
+            <a:r>
+              <a:rPr lang="en-US" sz="1600" dirty="0">
+                <a:solidFill>
+                  <a:schemeClr val="tx1">
+                    <a:lumMod val="75000"/>
+                    <a:lumOff val="25000"/>
+                  </a:schemeClr>
+                </a:solidFill>
+              </a:rPr>
+              <a:t>Navigation icons are empty. Filled directly by  adjusting svg def</a:t>
+            </a:r>
+          </a:p>
+        </p:txBody>
+      </p:sp>
+    </p:spTree>
+    <p:extLst>
+      <p:ext uri="{BB962C8B-B14F-4D97-AF65-F5344CB8AC3E}">
+        <p14:creationId xmlns:p14="http://schemas.microsoft.com/office/powerpoint/2010/main" val="3965133238"/>
       </p:ext>
     </p:extLst>
   </p:cSld>

</xml_diff>

<commit_message>
added smooth transition for all animated highlighting of the elements
</commit_message>
<xml_diff>
--- a/layout.pptx
+++ b/layout.pptx
@@ -5089,10 +5089,10 @@
         </p:nvGrpSpPr>
         <p:grpSpPr>
           <a:xfrm>
-            <a:off x="4033076" y="2108839"/>
-            <a:ext cx="6502405" cy="3802860"/>
-            <a:chOff x="1686470" y="802694"/>
-            <a:chExt cx="3501954" cy="1419281"/>
+            <a:off x="4033076" y="1700349"/>
+            <a:ext cx="6502405" cy="4211349"/>
+            <a:chOff x="1686470" y="650240"/>
+            <a:chExt cx="3501954" cy="1571735"/>
           </a:xfrm>
         </p:grpSpPr>
         <p:sp>
@@ -5109,8 +5109,8 @@
           </p:nvSpPr>
           <p:spPr>
             <a:xfrm>
-              <a:off x="1686470" y="802694"/>
-              <a:ext cx="3501954" cy="1419281"/>
+              <a:off x="1686470" y="650240"/>
+              <a:ext cx="3501954" cy="1571735"/>
             </a:xfrm>
             <a:prstGeom prst="rect">
               <a:avLst/>
@@ -5165,7 +5165,7 @@
           </p:nvSpPr>
           <p:spPr>
             <a:xfrm>
-              <a:off x="2601570" y="1389491"/>
+              <a:off x="2366356" y="681018"/>
               <a:ext cx="2321560" cy="121920"/>
             </a:xfrm>
             <a:prstGeom prst="rect">
@@ -5347,18 +5347,13 @@
                 </a:rPr>
               </a:br>
               <a:r>
-                <a:rPr lang="en-US" sz="1600">
+                <a:rPr lang="en-US" sz="1600" dirty="0">
                   <a:solidFill>
                     <a:srgbClr val="C00000"/>
                   </a:solidFill>
                 </a:rPr>
                 <a:t>__nav</a:t>
               </a:r>
-              <a:endParaRPr lang="en-US" sz="1600" dirty="0">
-                <a:solidFill>
-                  <a:srgbClr val="C00000"/>
-                </a:solidFill>
-              </a:endParaRPr>
             </a:p>
           </p:txBody>
         </p:sp>
@@ -5850,6 +5845,178 @@
           </a:p>
         </p:txBody>
       </p:sp>
+      <p:grpSp>
+        <p:nvGrpSpPr>
+          <p:cNvPr id="37" name="Group 36">
+            <a:extLst>
+              <a:ext uri="{FF2B5EF4-FFF2-40B4-BE49-F238E27FC236}">
+                <a16:creationId xmlns:a16="http://schemas.microsoft.com/office/drawing/2014/main" id="{594D2D94-BA1E-2E40-AFC6-CBA10051C9C4}"/>
+              </a:ext>
+            </a:extLst>
+          </p:cNvPr>
+          <p:cNvGrpSpPr/>
+          <p:nvPr/>
+        </p:nvGrpSpPr>
+        <p:grpSpPr>
+          <a:xfrm>
+            <a:off x="4033076" y="2261245"/>
+            <a:ext cx="6502405" cy="3316035"/>
+            <a:chOff x="1604393" y="802696"/>
+            <a:chExt cx="3501954" cy="1237591"/>
+          </a:xfrm>
+        </p:grpSpPr>
+        <p:sp>
+          <p:nvSpPr>
+            <p:cNvPr id="38" name="Rectangle 37">
+              <a:extLst>
+                <a:ext uri="{FF2B5EF4-FFF2-40B4-BE49-F238E27FC236}">
+                  <a16:creationId xmlns:a16="http://schemas.microsoft.com/office/drawing/2014/main" id="{FD89888D-97AE-684D-9423-37FBC236A64D}"/>
+                </a:ext>
+              </a:extLst>
+            </p:cNvPr>
+            <p:cNvSpPr/>
+            <p:nvPr/>
+          </p:nvSpPr>
+          <p:spPr>
+            <a:xfrm>
+              <a:off x="1604393" y="802696"/>
+              <a:ext cx="3501954" cy="1237591"/>
+            </a:xfrm>
+            <a:prstGeom prst="rect">
+              <a:avLst/>
+            </a:prstGeom>
+            <a:solidFill>
+              <a:schemeClr val="accent4">
+                <a:alpha val="10196"/>
+              </a:schemeClr>
+            </a:solidFill>
+            <a:ln>
+              <a:solidFill>
+                <a:schemeClr val="accent4"/>
+              </a:solidFill>
+            </a:ln>
+          </p:spPr>
+          <p:style>
+            <a:lnRef idx="2">
+              <a:schemeClr val="accent1">
+                <a:shade val="50000"/>
+              </a:schemeClr>
+            </a:lnRef>
+            <a:fillRef idx="1">
+              <a:schemeClr val="accent1"/>
+            </a:fillRef>
+            <a:effectRef idx="0">
+              <a:schemeClr val="accent1"/>
+            </a:effectRef>
+            <a:fontRef idx="minor">
+              <a:schemeClr val="lt1"/>
+            </a:fontRef>
+          </p:style>
+          <p:txBody>
+            <a:bodyPr rtlCol="0" anchor="ctr"/>
+            <a:lstStyle/>
+            <a:p>
+              <a:pPr algn="ctr"/>
+              <a:endParaRPr lang="en-US" dirty="0"/>
+            </a:p>
+          </p:txBody>
+        </p:sp>
+        <p:sp>
+          <p:nvSpPr>
+            <p:cNvPr id="39" name="Rectangle 38">
+              <a:extLst>
+                <a:ext uri="{FF2B5EF4-FFF2-40B4-BE49-F238E27FC236}">
+                  <a16:creationId xmlns:a16="http://schemas.microsoft.com/office/drawing/2014/main" id="{0940CF0E-262E-5B4B-A28C-D77F95A45531}"/>
+                </a:ext>
+              </a:extLst>
+            </p:cNvPr>
+            <p:cNvSpPr/>
+            <p:nvPr/>
+          </p:nvSpPr>
+          <p:spPr>
+            <a:xfrm>
+              <a:off x="2284279" y="845901"/>
+              <a:ext cx="2321560" cy="121920"/>
+            </a:xfrm>
+            <a:prstGeom prst="rect">
+              <a:avLst/>
+            </a:prstGeom>
+            <a:noFill/>
+            <a:ln>
+              <a:noFill/>
+            </a:ln>
+          </p:spPr>
+          <p:style>
+            <a:lnRef idx="2">
+              <a:schemeClr val="accent1">
+                <a:shade val="50000"/>
+              </a:schemeClr>
+            </a:lnRef>
+            <a:fillRef idx="1">
+              <a:schemeClr val="accent1"/>
+            </a:fillRef>
+            <a:effectRef idx="0">
+              <a:schemeClr val="accent1"/>
+            </a:effectRef>
+            <a:fontRef idx="minor">
+              <a:schemeClr val="lt1"/>
+            </a:fontRef>
+          </p:style>
+          <p:txBody>
+            <a:bodyPr rtlCol="0" anchor="ctr"/>
+            <a:lstStyle/>
+            <a:p>
+              <a:r>
+                <a:rPr lang="en-US" sz="1600" dirty="0">
+                  <a:solidFill>
+                    <a:schemeClr val="accent2">
+                      <a:lumMod val="50000"/>
+                    </a:schemeClr>
+                  </a:solidFill>
+                </a:rPr>
+                <a:t>&lt;</a:t>
+              </a:r>
+              <a:r>
+                <a:rPr lang="en-US" sz="1600" dirty="0" err="1">
+                  <a:solidFill>
+                    <a:schemeClr val="accent2">
+                      <a:lumMod val="50000"/>
+                    </a:schemeClr>
+                  </a:solidFill>
+                </a:rPr>
+                <a:t>img</a:t>
+              </a:r>
+              <a:r>
+                <a:rPr lang="en-US" sz="1600" dirty="0">
+                  <a:solidFill>
+                    <a:schemeClr val="accent2">
+                      <a:lumMod val="50000"/>
+                    </a:schemeClr>
+                  </a:solidFill>
+                </a:rPr>
+                <a:t>&gt; .slideshow</a:t>
+              </a:r>
+              <a:r>
+                <a:rPr lang="en-US" sz="1600">
+                  <a:solidFill>
+                    <a:schemeClr val="accent2">
+                      <a:lumMod val="50000"/>
+                    </a:schemeClr>
+                  </a:solidFill>
+                </a:rPr>
+                <a:t>__display-image</a:t>
+              </a:r>
+              <a:endParaRPr lang="en-US" sz="1600" dirty="0">
+                <a:solidFill>
+                  <a:schemeClr val="accent2">
+                    <a:lumMod val="50000"/>
+                  </a:schemeClr>
+                </a:solidFill>
+              </a:endParaRPr>
+            </a:p>
+          </p:txBody>
+        </p:sp>
+      </p:grpSp>
     </p:spTree>
     <p:extLst>
       <p:ext uri="{BB962C8B-B14F-4D97-AF65-F5344CB8AC3E}">

</xml_diff>

<commit_message>
added a preliminary layout for the keypoints section and the keypoints cards
</commit_message>
<xml_diff>
--- a/layout.pptx
+++ b/layout.pptx
@@ -8,6 +8,7 @@
     <p:sldId id="257" r:id="rId2"/>
     <p:sldId id="258" r:id="rId3"/>
     <p:sldId id="260" r:id="rId4"/>
+    <p:sldId id="261" r:id="rId5"/>
   </p:sldIdLst>
   <p:sldSz cx="16256000" cy="12192000"/>
   <p:notesSz cx="6858000" cy="9144000"/>
@@ -5974,18 +5975,464 @@
                     </a:schemeClr>
                   </a:solidFill>
                 </a:rPr>
-                <a:t>&lt;</a:t>
+                <a:t>&lt;img&gt; .slideshow__display-image</a:t>
               </a:r>
+            </a:p>
+          </p:txBody>
+        </p:sp>
+      </p:grpSp>
+    </p:spTree>
+    <p:extLst>
+      <p:ext uri="{BB962C8B-B14F-4D97-AF65-F5344CB8AC3E}">
+        <p14:creationId xmlns:p14="http://schemas.microsoft.com/office/powerpoint/2010/main" val="3965133238"/>
+      </p:ext>
+    </p:extLst>
+  </p:cSld>
+  <p:clrMapOvr>
+    <a:masterClrMapping/>
+  </p:clrMapOvr>
+</p:sld>
+</file>
+
+<file path=ppt/slides/slide4.xml><?xml version="1.0" encoding="utf-8"?>
+<p:sld xmlns:a="http://schemas.openxmlformats.org/drawingml/2006/main" xmlns:r="http://schemas.openxmlformats.org/officeDocument/2006/relationships" xmlns:p="http://schemas.openxmlformats.org/presentationml/2006/main">
+  <p:cSld>
+    <p:spTree>
+      <p:nvGrpSpPr>
+        <p:cNvPr id="1" name=""/>
+        <p:cNvGrpSpPr/>
+        <p:nvPr/>
+      </p:nvGrpSpPr>
+      <p:grpSpPr>
+        <a:xfrm>
+          <a:off x="0" y="0"/>
+          <a:ext cx="0" cy="0"/>
+          <a:chOff x="0" y="0"/>
+          <a:chExt cx="0" cy="0"/>
+        </a:xfrm>
+      </p:grpSpPr>
+      <p:sp>
+        <p:nvSpPr>
+          <p:cNvPr id="4" name="TextBox 3">
+            <a:extLst>
+              <a:ext uri="{FF2B5EF4-FFF2-40B4-BE49-F238E27FC236}">
+                <a16:creationId xmlns:a16="http://schemas.microsoft.com/office/drawing/2014/main" id="{4E45CDFE-59FB-F74F-A73B-6933C90EBAEE}"/>
+              </a:ext>
+            </a:extLst>
+          </p:cNvPr>
+          <p:cNvSpPr txBox="1"/>
+          <p:nvPr/>
+        </p:nvSpPr>
+        <p:spPr>
+          <a:xfrm>
+            <a:off x="443346" y="360218"/>
+            <a:ext cx="3835024" cy="707886"/>
+          </a:xfrm>
+          <a:prstGeom prst="rect">
+            <a:avLst/>
+          </a:prstGeom>
+          <a:noFill/>
+        </p:spPr>
+        <p:txBody>
+          <a:bodyPr wrap="none" rtlCol="0">
+            <a:spAutoFit/>
+          </a:bodyPr>
+          <a:lstStyle/>
+          <a:p>
+            <a:r>
+              <a:rPr lang="en-BY" sz="4000" dirty="0"/>
+              <a:t>Keypoints section</a:t>
+            </a:r>
+            <a:endParaRPr lang="en-BY" dirty="0"/>
+          </a:p>
+        </p:txBody>
+      </p:sp>
+      <p:sp>
+        <p:nvSpPr>
+          <p:cNvPr id="16" name="Rectangle 15">
+            <a:extLst>
+              <a:ext uri="{FF2B5EF4-FFF2-40B4-BE49-F238E27FC236}">
+                <a16:creationId xmlns:a16="http://schemas.microsoft.com/office/drawing/2014/main" id="{3178C7DD-2D9B-D344-9FB1-89BF70EB1B23}"/>
+              </a:ext>
+            </a:extLst>
+          </p:cNvPr>
+          <p:cNvSpPr/>
+          <p:nvPr/>
+        </p:nvSpPr>
+        <p:spPr>
+          <a:xfrm>
+            <a:off x="1111430" y="1669869"/>
+            <a:ext cx="12413183" cy="3856288"/>
+          </a:xfrm>
+          <a:prstGeom prst="rect">
+            <a:avLst/>
+          </a:prstGeom>
+          <a:solidFill>
+            <a:schemeClr val="bg1">
+              <a:lumMod val="95000"/>
+            </a:schemeClr>
+          </a:solidFill>
+        </p:spPr>
+        <p:style>
+          <a:lnRef idx="2">
+            <a:schemeClr val="accent1">
+              <a:shade val="50000"/>
+            </a:schemeClr>
+          </a:lnRef>
+          <a:fillRef idx="1">
+            <a:schemeClr val="accent1"/>
+          </a:fillRef>
+          <a:effectRef idx="0">
+            <a:schemeClr val="accent1"/>
+          </a:effectRef>
+          <a:fontRef idx="minor">
+            <a:schemeClr val="lt1"/>
+          </a:fontRef>
+        </p:style>
+        <p:txBody>
+          <a:bodyPr rtlCol="0" anchor="ctr"/>
+          <a:lstStyle/>
+          <a:p>
+            <a:pPr algn="ctr"/>
+            <a:endParaRPr lang="en-US"/>
+          </a:p>
+        </p:txBody>
+      </p:sp>
+      <p:grpSp>
+        <p:nvGrpSpPr>
+          <p:cNvPr id="17" name="Group 16">
+            <a:extLst>
+              <a:ext uri="{FF2B5EF4-FFF2-40B4-BE49-F238E27FC236}">
+                <a16:creationId xmlns:a16="http://schemas.microsoft.com/office/drawing/2014/main" id="{C9880EC7-75D0-2E45-B27E-9CEE6201A1FF}"/>
+              </a:ext>
+            </a:extLst>
+          </p:cNvPr>
+          <p:cNvGrpSpPr/>
+          <p:nvPr/>
+        </p:nvGrpSpPr>
+        <p:grpSpPr>
+          <a:xfrm>
+            <a:off x="2413116" y="1700495"/>
+            <a:ext cx="9809810" cy="3825662"/>
+            <a:chOff x="787400" y="650240"/>
+            <a:chExt cx="5283200" cy="1427791"/>
+          </a:xfrm>
+        </p:grpSpPr>
+        <p:sp>
+          <p:nvSpPr>
+            <p:cNvPr id="18" name="Rectangle 17">
+              <a:extLst>
+                <a:ext uri="{FF2B5EF4-FFF2-40B4-BE49-F238E27FC236}">
+                  <a16:creationId xmlns:a16="http://schemas.microsoft.com/office/drawing/2014/main" id="{8AFBF417-F05E-8E4F-8390-52398C96C588}"/>
+                </a:ext>
+              </a:extLst>
+            </p:cNvPr>
+            <p:cNvSpPr/>
+            <p:nvPr/>
+          </p:nvSpPr>
+          <p:spPr>
+            <a:xfrm>
+              <a:off x="787400" y="650240"/>
+              <a:ext cx="5283200" cy="1427791"/>
+            </a:xfrm>
+            <a:prstGeom prst="rect">
+              <a:avLst/>
+            </a:prstGeom>
+            <a:solidFill>
+              <a:srgbClr val="5B9BD5">
+                <a:alpha val="10196"/>
+              </a:srgbClr>
+            </a:solidFill>
+            <a:ln>
+              <a:solidFill>
+                <a:schemeClr val="accent5"/>
+              </a:solidFill>
+            </a:ln>
+          </p:spPr>
+          <p:style>
+            <a:lnRef idx="2">
+              <a:schemeClr val="accent1">
+                <a:shade val="50000"/>
+              </a:schemeClr>
+            </a:lnRef>
+            <a:fillRef idx="1">
+              <a:schemeClr val="accent1"/>
+            </a:fillRef>
+            <a:effectRef idx="0">
+              <a:schemeClr val="accent1"/>
+            </a:effectRef>
+            <a:fontRef idx="minor">
+              <a:schemeClr val="lt1"/>
+            </a:fontRef>
+          </p:style>
+          <p:txBody>
+            <a:bodyPr rtlCol="0" anchor="ctr"/>
+            <a:lstStyle/>
+            <a:p>
+              <a:pPr algn="ctr"/>
+              <a:endParaRPr lang="en-US" dirty="0"/>
+            </a:p>
+          </p:txBody>
+        </p:sp>
+        <p:sp>
+          <p:nvSpPr>
+            <p:cNvPr id="19" name="Rectangle 18">
+              <a:extLst>
+                <a:ext uri="{FF2B5EF4-FFF2-40B4-BE49-F238E27FC236}">
+                  <a16:creationId xmlns:a16="http://schemas.microsoft.com/office/drawing/2014/main" id="{91869B45-4A01-164E-98E2-ADB9CC3952C9}"/>
+                </a:ext>
+              </a:extLst>
+            </p:cNvPr>
+            <p:cNvSpPr/>
+            <p:nvPr/>
+          </p:nvSpPr>
+          <p:spPr>
+            <a:xfrm>
+              <a:off x="787400" y="680720"/>
+              <a:ext cx="2321560" cy="121920"/>
+            </a:xfrm>
+            <a:prstGeom prst="rect">
+              <a:avLst/>
+            </a:prstGeom>
+            <a:noFill/>
+            <a:ln>
+              <a:noFill/>
+            </a:ln>
+          </p:spPr>
+          <p:style>
+            <a:lnRef idx="2">
+              <a:schemeClr val="accent1">
+                <a:shade val="50000"/>
+              </a:schemeClr>
+            </a:lnRef>
+            <a:fillRef idx="1">
+              <a:schemeClr val="accent1"/>
+            </a:fillRef>
+            <a:effectRef idx="0">
+              <a:schemeClr val="accent1"/>
+            </a:effectRef>
+            <a:fontRef idx="minor">
+              <a:schemeClr val="lt1"/>
+            </a:fontRef>
+          </p:style>
+          <p:txBody>
+            <a:bodyPr rtlCol="0" anchor="ctr"/>
+            <a:lstStyle/>
+            <a:p>
               <a:r>
-                <a:rPr lang="en-US" sz="1600" dirty="0" err="1">
+                <a:rPr lang="en-US" sz="1600" dirty="0">
                   <a:solidFill>
-                    <a:schemeClr val="accent2">
-                      <a:lumMod val="50000"/>
-                    </a:schemeClr>
+                    <a:schemeClr val="accent5"/>
                   </a:solidFill>
                 </a:rPr>
-                <a:t>img</a:t>
+                <a:t>&lt;div&gt; .content-horizontal-center</a:t>
               </a:r>
+            </a:p>
+          </p:txBody>
+        </p:sp>
+      </p:grpSp>
+      <p:sp>
+        <p:nvSpPr>
+          <p:cNvPr id="23" name="Rectangle 22">
+            <a:extLst>
+              <a:ext uri="{FF2B5EF4-FFF2-40B4-BE49-F238E27FC236}">
+                <a16:creationId xmlns:a16="http://schemas.microsoft.com/office/drawing/2014/main" id="{C697B5D6-684E-F341-84B3-480269E5B8A5}"/>
+              </a:ext>
+            </a:extLst>
+          </p:cNvPr>
+          <p:cNvSpPr/>
+          <p:nvPr/>
+        </p:nvSpPr>
+        <p:spPr>
+          <a:xfrm>
+            <a:off x="1096191" y="1700349"/>
+            <a:ext cx="1811042" cy="796272"/>
+          </a:xfrm>
+          <a:prstGeom prst="rect">
+            <a:avLst/>
+          </a:prstGeom>
+          <a:noFill/>
+          <a:ln>
+            <a:noFill/>
+          </a:ln>
+        </p:spPr>
+        <p:style>
+          <a:lnRef idx="2">
+            <a:schemeClr val="accent1">
+              <a:shade val="50000"/>
+            </a:schemeClr>
+          </a:lnRef>
+          <a:fillRef idx="1">
+            <a:schemeClr val="accent1"/>
+          </a:fillRef>
+          <a:effectRef idx="0">
+            <a:schemeClr val="accent1"/>
+          </a:effectRef>
+          <a:fontRef idx="minor">
+            <a:schemeClr val="lt1"/>
+          </a:fontRef>
+        </p:style>
+        <p:txBody>
+          <a:bodyPr rtlCol="0" anchor="ctr"/>
+          <a:lstStyle/>
+          <a:p>
+            <a:r>
+              <a:rPr lang="en-US" sz="1600" dirty="0">
+                <a:solidFill>
+                  <a:schemeClr val="tx1"/>
+                </a:solidFill>
+              </a:rPr>
+              <a:t>&lt;div&gt; </a:t>
+            </a:r>
+            <a:br>
+              <a:rPr lang="en-US" sz="1600" dirty="0">
+                <a:solidFill>
+                  <a:schemeClr val="tx1"/>
+                </a:solidFill>
+              </a:rPr>
+            </a:br>
+            <a:r>
+              <a:rPr lang="en-US" sz="1600" dirty="0">
+                <a:solidFill>
+                  <a:schemeClr val="tx1"/>
+                </a:solidFill>
+              </a:rPr>
+              <a:t>.keypoints</a:t>
+            </a:r>
+          </a:p>
+          <a:p>
+            <a:r>
+              <a:rPr lang="en-US" sz="1600" dirty="0">
+                <a:solidFill>
+                  <a:schemeClr val="tx1"/>
+                </a:solidFill>
+              </a:rPr>
+              <a:t>.section</a:t>
+            </a:r>
+          </a:p>
+        </p:txBody>
+      </p:sp>
+      <p:grpSp>
+        <p:nvGrpSpPr>
+          <p:cNvPr id="24" name="Group 23">
+            <a:extLst>
+              <a:ext uri="{FF2B5EF4-FFF2-40B4-BE49-F238E27FC236}">
+                <a16:creationId xmlns:a16="http://schemas.microsoft.com/office/drawing/2014/main" id="{538C9DEF-B4A9-2340-A774-A0EE6CDDB056}"/>
+              </a:ext>
+            </a:extLst>
+          </p:cNvPr>
+          <p:cNvGrpSpPr/>
+          <p:nvPr/>
+        </p:nvGrpSpPr>
+        <p:grpSpPr>
+          <a:xfrm>
+            <a:off x="2672289" y="2308786"/>
+            <a:ext cx="3651039" cy="2746693"/>
+            <a:chOff x="1686470" y="650240"/>
+            <a:chExt cx="3501954" cy="1571735"/>
+          </a:xfrm>
+        </p:grpSpPr>
+        <p:sp>
+          <p:nvSpPr>
+            <p:cNvPr id="25" name="Rectangle 24">
+              <a:extLst>
+                <a:ext uri="{FF2B5EF4-FFF2-40B4-BE49-F238E27FC236}">
+                  <a16:creationId xmlns:a16="http://schemas.microsoft.com/office/drawing/2014/main" id="{2FCB1430-0AAB-214B-A592-0F1B4C30544A}"/>
+                </a:ext>
+              </a:extLst>
+            </p:cNvPr>
+            <p:cNvSpPr/>
+            <p:nvPr/>
+          </p:nvSpPr>
+          <p:spPr>
+            <a:xfrm>
+              <a:off x="1686470" y="650240"/>
+              <a:ext cx="3501954" cy="1571735"/>
+            </a:xfrm>
+            <a:prstGeom prst="rect">
+              <a:avLst/>
+            </a:prstGeom>
+            <a:solidFill>
+              <a:schemeClr val="accent4">
+                <a:alpha val="10196"/>
+              </a:schemeClr>
+            </a:solidFill>
+            <a:ln>
+              <a:solidFill>
+                <a:schemeClr val="accent4"/>
+              </a:solidFill>
+            </a:ln>
+          </p:spPr>
+          <p:style>
+            <a:lnRef idx="2">
+              <a:schemeClr val="accent1">
+                <a:shade val="50000"/>
+              </a:schemeClr>
+            </a:lnRef>
+            <a:fillRef idx="1">
+              <a:schemeClr val="accent1"/>
+            </a:fillRef>
+            <a:effectRef idx="0">
+              <a:schemeClr val="accent1"/>
+            </a:effectRef>
+            <a:fontRef idx="minor">
+              <a:schemeClr val="lt1"/>
+            </a:fontRef>
+          </p:style>
+          <p:txBody>
+            <a:bodyPr rtlCol="0" anchor="ctr"/>
+            <a:lstStyle/>
+            <a:p>
+              <a:pPr algn="ctr"/>
+              <a:endParaRPr lang="en-US" dirty="0"/>
+            </a:p>
+          </p:txBody>
+        </p:sp>
+        <p:sp>
+          <p:nvSpPr>
+            <p:cNvPr id="26" name="Rectangle 25">
+              <a:extLst>
+                <a:ext uri="{FF2B5EF4-FFF2-40B4-BE49-F238E27FC236}">
+                  <a16:creationId xmlns:a16="http://schemas.microsoft.com/office/drawing/2014/main" id="{96B646B2-80B9-8D43-8CD6-868C7793E705}"/>
+                </a:ext>
+              </a:extLst>
+            </p:cNvPr>
+            <p:cNvSpPr/>
+            <p:nvPr/>
+          </p:nvSpPr>
+          <p:spPr>
+            <a:xfrm>
+              <a:off x="1830909" y="696764"/>
+              <a:ext cx="2321560" cy="121920"/>
+            </a:xfrm>
+            <a:prstGeom prst="rect">
+              <a:avLst/>
+            </a:prstGeom>
+            <a:noFill/>
+            <a:ln>
+              <a:noFill/>
+            </a:ln>
+          </p:spPr>
+          <p:style>
+            <a:lnRef idx="2">
+              <a:schemeClr val="accent1">
+                <a:shade val="50000"/>
+              </a:schemeClr>
+            </a:lnRef>
+            <a:fillRef idx="1">
+              <a:schemeClr val="accent1"/>
+            </a:fillRef>
+            <a:effectRef idx="0">
+              <a:schemeClr val="accent1"/>
+            </a:effectRef>
+            <a:fontRef idx="minor">
+              <a:schemeClr val="lt1"/>
+            </a:fontRef>
+          </p:style>
+          <p:txBody>
+            <a:bodyPr rtlCol="0" anchor="ctr"/>
+            <a:lstStyle/>
+            <a:p>
               <a:r>
                 <a:rPr lang="en-US" sz="1600" dirty="0">
                   <a:solidFill>
@@ -5994,21 +6441,578 @@
                     </a:schemeClr>
                   </a:solidFill>
                 </a:rPr>
-                <a:t>&gt; .slideshow</a:t>
+                <a:t>&lt;div&gt; .card</a:t>
               </a:r>
+            </a:p>
+          </p:txBody>
+        </p:sp>
+      </p:grpSp>
+      <p:grpSp>
+        <p:nvGrpSpPr>
+          <p:cNvPr id="40" name="Group 39">
+            <a:extLst>
+              <a:ext uri="{FF2B5EF4-FFF2-40B4-BE49-F238E27FC236}">
+                <a16:creationId xmlns:a16="http://schemas.microsoft.com/office/drawing/2014/main" id="{5A0B0EC7-7791-5A47-B215-9ADAB5AD4493}"/>
+              </a:ext>
+            </a:extLst>
+          </p:cNvPr>
+          <p:cNvGrpSpPr/>
+          <p:nvPr/>
+        </p:nvGrpSpPr>
+        <p:grpSpPr>
+          <a:xfrm>
+            <a:off x="1096191" y="5871802"/>
+            <a:ext cx="3914424" cy="3329347"/>
+            <a:chOff x="1530306" y="451661"/>
+            <a:chExt cx="3754584" cy="1905146"/>
+          </a:xfrm>
+        </p:grpSpPr>
+        <p:sp>
+          <p:nvSpPr>
+            <p:cNvPr id="41" name="Rectangle 40">
+              <a:extLst>
+                <a:ext uri="{FF2B5EF4-FFF2-40B4-BE49-F238E27FC236}">
+                  <a16:creationId xmlns:a16="http://schemas.microsoft.com/office/drawing/2014/main" id="{2D0159EB-8DA0-8548-8A63-014B6A5A0808}"/>
+                </a:ext>
+              </a:extLst>
+            </p:cNvPr>
+            <p:cNvSpPr/>
+            <p:nvPr/>
+          </p:nvSpPr>
+          <p:spPr>
+            <a:xfrm>
+              <a:off x="1598378" y="615662"/>
+              <a:ext cx="3686512" cy="1741145"/>
+            </a:xfrm>
+            <a:prstGeom prst="rect">
+              <a:avLst/>
+            </a:prstGeom>
+            <a:solidFill>
+              <a:schemeClr val="accent4">
+                <a:alpha val="10196"/>
+              </a:schemeClr>
+            </a:solidFill>
+            <a:ln>
+              <a:solidFill>
+                <a:schemeClr val="accent4"/>
+              </a:solidFill>
+            </a:ln>
+          </p:spPr>
+          <p:style>
+            <a:lnRef idx="2">
+              <a:schemeClr val="accent1">
+                <a:shade val="50000"/>
+              </a:schemeClr>
+            </a:lnRef>
+            <a:fillRef idx="1">
+              <a:schemeClr val="accent1"/>
+            </a:fillRef>
+            <a:effectRef idx="0">
+              <a:schemeClr val="accent1"/>
+            </a:effectRef>
+            <a:fontRef idx="minor">
+              <a:schemeClr val="lt1"/>
+            </a:fontRef>
+          </p:style>
+          <p:txBody>
+            <a:bodyPr rtlCol="0" anchor="ctr"/>
+            <a:lstStyle/>
+            <a:p>
+              <a:pPr algn="ctr"/>
+              <a:endParaRPr lang="en-US" dirty="0"/>
+            </a:p>
+          </p:txBody>
+        </p:sp>
+        <p:sp>
+          <p:nvSpPr>
+            <p:cNvPr id="42" name="Rectangle 41">
+              <a:extLst>
+                <a:ext uri="{FF2B5EF4-FFF2-40B4-BE49-F238E27FC236}">
+                  <a16:creationId xmlns:a16="http://schemas.microsoft.com/office/drawing/2014/main" id="{FFB46B81-7AC1-6D41-8CFD-A3C9947B7998}"/>
+                </a:ext>
+              </a:extLst>
+            </p:cNvPr>
+            <p:cNvSpPr/>
+            <p:nvPr/>
+          </p:nvSpPr>
+          <p:spPr>
+            <a:xfrm>
+              <a:off x="1530306" y="451661"/>
+              <a:ext cx="2321560" cy="121920"/>
+            </a:xfrm>
+            <a:prstGeom prst="rect">
+              <a:avLst/>
+            </a:prstGeom>
+            <a:noFill/>
+            <a:ln>
+              <a:noFill/>
+            </a:ln>
+          </p:spPr>
+          <p:style>
+            <a:lnRef idx="2">
+              <a:schemeClr val="accent1">
+                <a:shade val="50000"/>
+              </a:schemeClr>
+            </a:lnRef>
+            <a:fillRef idx="1">
+              <a:schemeClr val="accent1"/>
+            </a:fillRef>
+            <a:effectRef idx="0">
+              <a:schemeClr val="accent1"/>
+            </a:effectRef>
+            <a:fontRef idx="minor">
+              <a:schemeClr val="lt1"/>
+            </a:fontRef>
+          </p:style>
+          <p:txBody>
+            <a:bodyPr rtlCol="0" anchor="ctr"/>
+            <a:lstStyle/>
+            <a:p>
               <a:r>
-                <a:rPr lang="en-US" sz="1600">
+                <a:rPr lang="en-US" sz="2000" dirty="0">
                   <a:solidFill>
                     <a:schemeClr val="accent2">
                       <a:lumMod val="50000"/>
                     </a:schemeClr>
                   </a:solidFill>
                 </a:rPr>
-                <a:t>__display-image</a:t>
+                <a:t>&lt;div&gt; .card</a:t>
+              </a:r>
+            </a:p>
+          </p:txBody>
+        </p:sp>
+      </p:grpSp>
+      <p:sp>
+        <p:nvSpPr>
+          <p:cNvPr id="43" name="Rectangle 42">
+            <a:extLst>
+              <a:ext uri="{FF2B5EF4-FFF2-40B4-BE49-F238E27FC236}">
+                <a16:creationId xmlns:a16="http://schemas.microsoft.com/office/drawing/2014/main" id="{ED7FA569-BAE8-C547-AE68-577FC8D12E4C}"/>
+              </a:ext>
+            </a:extLst>
+          </p:cNvPr>
+          <p:cNvSpPr/>
+          <p:nvPr/>
+        </p:nvSpPr>
+        <p:spPr>
+          <a:xfrm>
+            <a:off x="1254009" y="6240138"/>
+            <a:ext cx="3651039" cy="569844"/>
+          </a:xfrm>
+          <a:prstGeom prst="rect">
+            <a:avLst/>
+          </a:prstGeom>
+          <a:solidFill>
+            <a:schemeClr val="tx1">
+              <a:lumMod val="50000"/>
+              <a:lumOff val="50000"/>
+              <a:alpha val="10196"/>
+            </a:schemeClr>
+          </a:solidFill>
+          <a:ln>
+            <a:solidFill>
+              <a:schemeClr val="tx1">
+                <a:lumMod val="50000"/>
+                <a:lumOff val="50000"/>
+              </a:schemeClr>
+            </a:solidFill>
+          </a:ln>
+        </p:spPr>
+        <p:style>
+          <a:lnRef idx="2">
+            <a:schemeClr val="accent1">
+              <a:shade val="50000"/>
+            </a:schemeClr>
+          </a:lnRef>
+          <a:fillRef idx="1">
+            <a:schemeClr val="accent1"/>
+          </a:fillRef>
+          <a:effectRef idx="0">
+            <a:schemeClr val="accent1"/>
+          </a:effectRef>
+          <a:fontRef idx="minor">
+            <a:schemeClr val="lt1"/>
+          </a:fontRef>
+        </p:style>
+        <p:txBody>
+          <a:bodyPr rtlCol="0" anchor="ctr"/>
+          <a:lstStyle/>
+          <a:p>
+            <a:pPr algn="ctr"/>
+            <a:endParaRPr lang="en-US" dirty="0"/>
+          </a:p>
+        </p:txBody>
+      </p:sp>
+      <p:sp>
+        <p:nvSpPr>
+          <p:cNvPr id="44" name="Rectangle 43">
+            <a:extLst>
+              <a:ext uri="{FF2B5EF4-FFF2-40B4-BE49-F238E27FC236}">
+                <a16:creationId xmlns:a16="http://schemas.microsoft.com/office/drawing/2014/main" id="{A28910A9-6B4A-6449-91BC-D05BB6824E19}"/>
+              </a:ext>
+            </a:extLst>
+          </p:cNvPr>
+          <p:cNvSpPr/>
+          <p:nvPr/>
+        </p:nvSpPr>
+        <p:spPr>
+          <a:xfrm>
+            <a:off x="2207021" y="6420374"/>
+            <a:ext cx="2420393" cy="213062"/>
+          </a:xfrm>
+          <a:prstGeom prst="rect">
+            <a:avLst/>
+          </a:prstGeom>
+          <a:noFill/>
+          <a:ln>
+            <a:noFill/>
+          </a:ln>
+        </p:spPr>
+        <p:style>
+          <a:lnRef idx="2">
+            <a:schemeClr val="accent1">
+              <a:shade val="50000"/>
+            </a:schemeClr>
+          </a:lnRef>
+          <a:fillRef idx="1">
+            <a:schemeClr val="accent1"/>
+          </a:fillRef>
+          <a:effectRef idx="0">
+            <a:schemeClr val="accent1"/>
+          </a:effectRef>
+          <a:fontRef idx="minor">
+            <a:schemeClr val="lt1"/>
+          </a:fontRef>
+        </p:style>
+        <p:txBody>
+          <a:bodyPr rtlCol="0" anchor="ctr"/>
+          <a:lstStyle/>
+          <a:p>
+            <a:r>
+              <a:rPr lang="en-US" sz="1600" dirty="0">
+                <a:solidFill>
+                  <a:schemeClr val="tx1">
+                    <a:lumMod val="75000"/>
+                    <a:lumOff val="25000"/>
+                  </a:schemeClr>
+                </a:solidFill>
+              </a:rPr>
+              <a:t>&lt;div&gt; .</a:t>
+            </a:r>
+            <a:r>
+              <a:rPr lang="en-US" sz="1600" dirty="0" err="1">
+                <a:solidFill>
+                  <a:schemeClr val="tx1">
+                    <a:lumMod val="75000"/>
+                    <a:lumOff val="25000"/>
+                  </a:schemeClr>
+                </a:solidFill>
+              </a:rPr>
+              <a:t>card__head</a:t>
+            </a:r>
+            <a:endParaRPr lang="en-US" sz="1600" dirty="0">
+              <a:solidFill>
+                <a:schemeClr val="tx1">
+                  <a:lumMod val="75000"/>
+                  <a:lumOff val="25000"/>
+                </a:schemeClr>
+              </a:solidFill>
+            </a:endParaRPr>
+          </a:p>
+        </p:txBody>
+      </p:sp>
+      <p:grpSp>
+        <p:nvGrpSpPr>
+          <p:cNvPr id="46" name="Group 45">
+            <a:extLst>
+              <a:ext uri="{FF2B5EF4-FFF2-40B4-BE49-F238E27FC236}">
+                <a16:creationId xmlns:a16="http://schemas.microsoft.com/office/drawing/2014/main" id="{109A9BDA-539B-4741-B752-BB1A808DB43D}"/>
+              </a:ext>
+            </a:extLst>
+          </p:cNvPr>
+          <p:cNvGrpSpPr/>
+          <p:nvPr/>
+        </p:nvGrpSpPr>
+        <p:grpSpPr>
+          <a:xfrm>
+            <a:off x="1259003" y="6921220"/>
+            <a:ext cx="3646044" cy="1473617"/>
+            <a:chOff x="838728" y="1834120"/>
+            <a:chExt cx="1963624" cy="597929"/>
+          </a:xfrm>
+        </p:grpSpPr>
+        <p:sp>
+          <p:nvSpPr>
+            <p:cNvPr id="47" name="Rectangle 46">
+              <a:extLst>
+                <a:ext uri="{FF2B5EF4-FFF2-40B4-BE49-F238E27FC236}">
+                  <a16:creationId xmlns:a16="http://schemas.microsoft.com/office/drawing/2014/main" id="{35B446C4-ECB2-FC4F-9466-E46249454EFF}"/>
+                </a:ext>
+              </a:extLst>
+            </p:cNvPr>
+            <p:cNvSpPr/>
+            <p:nvPr/>
+          </p:nvSpPr>
+          <p:spPr>
+            <a:xfrm>
+              <a:off x="838728" y="1834120"/>
+              <a:ext cx="1963624" cy="597929"/>
+            </a:xfrm>
+            <a:prstGeom prst="rect">
+              <a:avLst/>
+            </a:prstGeom>
+            <a:solidFill>
+              <a:srgbClr val="FF0000">
+                <a:alpha val="10196"/>
+              </a:srgbClr>
+            </a:solidFill>
+            <a:ln>
+              <a:solidFill>
+                <a:srgbClr val="C00000"/>
+              </a:solidFill>
+            </a:ln>
+          </p:spPr>
+          <p:style>
+            <a:lnRef idx="2">
+              <a:schemeClr val="accent1">
+                <a:shade val="50000"/>
+              </a:schemeClr>
+            </a:lnRef>
+            <a:fillRef idx="1">
+              <a:schemeClr val="accent1"/>
+            </a:fillRef>
+            <a:effectRef idx="0">
+              <a:schemeClr val="accent1"/>
+            </a:effectRef>
+            <a:fontRef idx="minor">
+              <a:schemeClr val="lt1"/>
+            </a:fontRef>
+          </p:style>
+          <p:txBody>
+            <a:bodyPr rtlCol="0" anchor="ctr"/>
+            <a:lstStyle/>
+            <a:p>
+              <a:pPr algn="ctr"/>
+              <a:endParaRPr lang="en-US" dirty="0"/>
+            </a:p>
+          </p:txBody>
+        </p:sp>
+        <p:sp>
+          <p:nvSpPr>
+            <p:cNvPr id="48" name="Rectangle 47">
+              <a:extLst>
+                <a:ext uri="{FF2B5EF4-FFF2-40B4-BE49-F238E27FC236}">
+                  <a16:creationId xmlns:a16="http://schemas.microsoft.com/office/drawing/2014/main" id="{44424FC0-1CE3-D04D-BB17-BB6A6C4F070E}"/>
+                </a:ext>
+              </a:extLst>
+            </p:cNvPr>
+            <p:cNvSpPr/>
+            <p:nvPr/>
+          </p:nvSpPr>
+          <p:spPr>
+            <a:xfrm>
+              <a:off x="1310792" y="1992863"/>
+              <a:ext cx="1077682" cy="198293"/>
+            </a:xfrm>
+            <a:prstGeom prst="rect">
+              <a:avLst/>
+            </a:prstGeom>
+            <a:noFill/>
+            <a:ln>
+              <a:noFill/>
+            </a:ln>
+          </p:spPr>
+          <p:style>
+            <a:lnRef idx="2">
+              <a:schemeClr val="accent1">
+                <a:shade val="50000"/>
+              </a:schemeClr>
+            </a:lnRef>
+            <a:fillRef idx="1">
+              <a:schemeClr val="accent1"/>
+            </a:fillRef>
+            <a:effectRef idx="0">
+              <a:schemeClr val="accent1"/>
+            </a:effectRef>
+            <a:fontRef idx="minor">
+              <a:schemeClr val="lt1"/>
+            </a:fontRef>
+          </p:style>
+          <p:txBody>
+            <a:bodyPr rtlCol="0" anchor="ctr"/>
+            <a:lstStyle/>
+            <a:p>
+              <a:r>
+                <a:rPr lang="en-US" sz="1600" dirty="0">
+                  <a:solidFill>
+                    <a:srgbClr val="C00000"/>
+                  </a:solidFill>
+                </a:rPr>
+                <a:t>&lt;div&gt; .</a:t>
+              </a:r>
+              <a:r>
+                <a:rPr lang="en-US" sz="1600" dirty="0" err="1">
+                  <a:solidFill>
+                    <a:srgbClr val="C00000"/>
+                  </a:solidFill>
+                </a:rPr>
+                <a:t>card__content</a:t>
               </a:r>
               <a:endParaRPr lang="en-US" sz="1600" dirty="0">
                 <a:solidFill>
-                  <a:schemeClr val="accent2">
+                  <a:srgbClr val="C00000"/>
+                </a:solidFill>
+              </a:endParaRPr>
+            </a:p>
+          </p:txBody>
+        </p:sp>
+      </p:grpSp>
+      <p:grpSp>
+        <p:nvGrpSpPr>
+          <p:cNvPr id="49" name="Group 48">
+            <a:extLst>
+              <a:ext uri="{FF2B5EF4-FFF2-40B4-BE49-F238E27FC236}">
+                <a16:creationId xmlns:a16="http://schemas.microsoft.com/office/drawing/2014/main" id="{A5C17E2F-0594-2C48-8BD8-AAE2B7B95998}"/>
+              </a:ext>
+            </a:extLst>
+          </p:cNvPr>
+          <p:cNvGrpSpPr/>
+          <p:nvPr/>
+        </p:nvGrpSpPr>
+        <p:grpSpPr>
+          <a:xfrm>
+            <a:off x="1254010" y="8496362"/>
+            <a:ext cx="3651039" cy="640603"/>
+            <a:chOff x="842732" y="1868905"/>
+            <a:chExt cx="1966314" cy="259929"/>
+          </a:xfrm>
+        </p:grpSpPr>
+        <p:sp>
+          <p:nvSpPr>
+            <p:cNvPr id="50" name="Rectangle 49">
+              <a:extLst>
+                <a:ext uri="{FF2B5EF4-FFF2-40B4-BE49-F238E27FC236}">
+                  <a16:creationId xmlns:a16="http://schemas.microsoft.com/office/drawing/2014/main" id="{C3529E1C-8826-8C49-9837-47C63212DBFA}"/>
+                </a:ext>
+              </a:extLst>
+            </p:cNvPr>
+            <p:cNvSpPr/>
+            <p:nvPr/>
+          </p:nvSpPr>
+          <p:spPr>
+            <a:xfrm>
+              <a:off x="842732" y="1868905"/>
+              <a:ext cx="1966314" cy="259929"/>
+            </a:xfrm>
+            <a:prstGeom prst="rect">
+              <a:avLst/>
+            </a:prstGeom>
+            <a:solidFill>
+              <a:schemeClr val="accent6">
+                <a:alpha val="10196"/>
+              </a:schemeClr>
+            </a:solidFill>
+            <a:ln>
+              <a:solidFill>
+                <a:schemeClr val="accent6">
+                  <a:lumMod val="50000"/>
+                </a:schemeClr>
+              </a:solidFill>
+            </a:ln>
+          </p:spPr>
+          <p:style>
+            <a:lnRef idx="2">
+              <a:schemeClr val="accent1">
+                <a:shade val="50000"/>
+              </a:schemeClr>
+            </a:lnRef>
+            <a:fillRef idx="1">
+              <a:schemeClr val="accent1"/>
+            </a:fillRef>
+            <a:effectRef idx="0">
+              <a:schemeClr val="accent1"/>
+            </a:effectRef>
+            <a:fontRef idx="minor">
+              <a:schemeClr val="lt1"/>
+            </a:fontRef>
+          </p:style>
+          <p:txBody>
+            <a:bodyPr rtlCol="0" anchor="ctr"/>
+            <a:lstStyle/>
+            <a:p>
+              <a:pPr algn="ctr"/>
+              <a:endParaRPr lang="en-US" dirty="0"/>
+            </a:p>
+          </p:txBody>
+        </p:sp>
+        <p:sp>
+          <p:nvSpPr>
+            <p:cNvPr id="51" name="Rectangle 50">
+              <a:extLst>
+                <a:ext uri="{FF2B5EF4-FFF2-40B4-BE49-F238E27FC236}">
+                  <a16:creationId xmlns:a16="http://schemas.microsoft.com/office/drawing/2014/main" id="{9D8F22D4-8AA0-264C-AFA3-62CAF1E15E1C}"/>
+                </a:ext>
+              </a:extLst>
+            </p:cNvPr>
+            <p:cNvSpPr/>
+            <p:nvPr/>
+          </p:nvSpPr>
+          <p:spPr>
+            <a:xfrm>
+              <a:off x="1347102" y="1898881"/>
+              <a:ext cx="1077682" cy="198293"/>
+            </a:xfrm>
+            <a:prstGeom prst="rect">
+              <a:avLst/>
+            </a:prstGeom>
+            <a:noFill/>
+            <a:ln>
+              <a:noFill/>
+            </a:ln>
+          </p:spPr>
+          <p:style>
+            <a:lnRef idx="2">
+              <a:schemeClr val="accent1">
+                <a:shade val="50000"/>
+              </a:schemeClr>
+            </a:lnRef>
+            <a:fillRef idx="1">
+              <a:schemeClr val="accent1"/>
+            </a:fillRef>
+            <a:effectRef idx="0">
+              <a:schemeClr val="accent1"/>
+            </a:effectRef>
+            <a:fontRef idx="minor">
+              <a:schemeClr val="lt1"/>
+            </a:fontRef>
+          </p:style>
+          <p:txBody>
+            <a:bodyPr rtlCol="0" anchor="ctr"/>
+            <a:lstStyle/>
+            <a:p>
+              <a:r>
+                <a:rPr lang="en-US" sz="1600" dirty="0">
+                  <a:solidFill>
+                    <a:schemeClr val="accent6">
+                      <a:lumMod val="50000"/>
+                    </a:schemeClr>
+                  </a:solidFill>
+                </a:rPr>
+                <a:t>&lt;div&gt; .</a:t>
+              </a:r>
+              <a:r>
+                <a:rPr lang="en-US" sz="1600" dirty="0" err="1">
+                  <a:solidFill>
+                    <a:schemeClr val="accent6">
+                      <a:lumMod val="50000"/>
+                    </a:schemeClr>
+                  </a:solidFill>
+                </a:rPr>
+                <a:t>card__footer</a:t>
+              </a:r>
+              <a:endParaRPr lang="en-US" sz="1600" dirty="0">
+                <a:solidFill>
+                  <a:schemeClr val="accent6">
                     <a:lumMod val="50000"/>
                   </a:schemeClr>
                 </a:solidFill>
@@ -6017,10 +7021,832 @@
           </p:txBody>
         </p:sp>
       </p:grpSp>
+      <p:sp>
+        <p:nvSpPr>
+          <p:cNvPr id="52" name="Rectangle 51">
+            <a:extLst>
+              <a:ext uri="{FF2B5EF4-FFF2-40B4-BE49-F238E27FC236}">
+                <a16:creationId xmlns:a16="http://schemas.microsoft.com/office/drawing/2014/main" id="{07F6ECB5-4753-B940-B80F-4E4ACE586CAC}"/>
+              </a:ext>
+            </a:extLst>
+          </p:cNvPr>
+          <p:cNvSpPr/>
+          <p:nvPr/>
+        </p:nvSpPr>
+        <p:spPr>
+          <a:xfrm>
+            <a:off x="5858059" y="6158403"/>
+            <a:ext cx="5057189" cy="789312"/>
+          </a:xfrm>
+          <a:prstGeom prst="rect">
+            <a:avLst/>
+          </a:prstGeom>
+          <a:solidFill>
+            <a:schemeClr val="tx1">
+              <a:lumMod val="50000"/>
+              <a:lumOff val="50000"/>
+              <a:alpha val="10196"/>
+            </a:schemeClr>
+          </a:solidFill>
+          <a:ln>
+            <a:solidFill>
+              <a:schemeClr val="tx1">
+                <a:lumMod val="50000"/>
+                <a:lumOff val="50000"/>
+              </a:schemeClr>
+            </a:solidFill>
+          </a:ln>
+        </p:spPr>
+        <p:style>
+          <a:lnRef idx="2">
+            <a:schemeClr val="accent1">
+              <a:shade val="50000"/>
+            </a:schemeClr>
+          </a:lnRef>
+          <a:fillRef idx="1">
+            <a:schemeClr val="accent1"/>
+          </a:fillRef>
+          <a:effectRef idx="0">
+            <a:schemeClr val="accent1"/>
+          </a:effectRef>
+          <a:fontRef idx="minor">
+            <a:schemeClr val="lt1"/>
+          </a:fontRef>
+        </p:style>
+        <p:txBody>
+          <a:bodyPr rtlCol="0" anchor="ctr"/>
+          <a:lstStyle/>
+          <a:p>
+            <a:pPr algn="ctr"/>
+            <a:endParaRPr lang="en-US" dirty="0"/>
+          </a:p>
+        </p:txBody>
+      </p:sp>
+      <p:sp>
+        <p:nvSpPr>
+          <p:cNvPr id="53" name="Rectangle 52">
+            <a:extLst>
+              <a:ext uri="{FF2B5EF4-FFF2-40B4-BE49-F238E27FC236}">
+                <a16:creationId xmlns:a16="http://schemas.microsoft.com/office/drawing/2014/main" id="{775F8967-93E3-8340-A161-C45CE0E52C0E}"/>
+              </a:ext>
+            </a:extLst>
+          </p:cNvPr>
+          <p:cNvSpPr/>
+          <p:nvPr/>
+        </p:nvSpPr>
+        <p:spPr>
+          <a:xfrm>
+            <a:off x="5858059" y="5871802"/>
+            <a:ext cx="2420393" cy="213062"/>
+          </a:xfrm>
+          <a:prstGeom prst="rect">
+            <a:avLst/>
+          </a:prstGeom>
+          <a:noFill/>
+          <a:ln>
+            <a:noFill/>
+          </a:ln>
+        </p:spPr>
+        <p:style>
+          <a:lnRef idx="2">
+            <a:schemeClr val="accent1">
+              <a:shade val="50000"/>
+            </a:schemeClr>
+          </a:lnRef>
+          <a:fillRef idx="1">
+            <a:schemeClr val="accent1"/>
+          </a:fillRef>
+          <a:effectRef idx="0">
+            <a:schemeClr val="accent1"/>
+          </a:effectRef>
+          <a:fontRef idx="minor">
+            <a:schemeClr val="lt1"/>
+          </a:fontRef>
+        </p:style>
+        <p:txBody>
+          <a:bodyPr rtlCol="0" anchor="ctr"/>
+          <a:lstStyle/>
+          <a:p>
+            <a:r>
+              <a:rPr lang="en-US" sz="2000" dirty="0">
+                <a:solidFill>
+                  <a:schemeClr val="tx1">
+                    <a:lumMod val="75000"/>
+                    <a:lumOff val="25000"/>
+                  </a:schemeClr>
+                </a:solidFill>
+              </a:rPr>
+              <a:t>&lt;div&gt; .</a:t>
+            </a:r>
+            <a:r>
+              <a:rPr lang="en-US" sz="2000" dirty="0" err="1">
+                <a:solidFill>
+                  <a:schemeClr val="tx1">
+                    <a:lumMod val="75000"/>
+                    <a:lumOff val="25000"/>
+                  </a:schemeClr>
+                </a:solidFill>
+              </a:rPr>
+              <a:t>card__head</a:t>
+            </a:r>
+            <a:endParaRPr lang="en-US" sz="2000" dirty="0">
+              <a:solidFill>
+                <a:schemeClr val="tx1">
+                  <a:lumMod val="75000"/>
+                  <a:lumOff val="25000"/>
+                </a:schemeClr>
+              </a:solidFill>
+            </a:endParaRPr>
+          </a:p>
+        </p:txBody>
+      </p:sp>
+      <p:sp>
+        <p:nvSpPr>
+          <p:cNvPr id="54" name="Rectangle 53">
+            <a:extLst>
+              <a:ext uri="{FF2B5EF4-FFF2-40B4-BE49-F238E27FC236}">
+                <a16:creationId xmlns:a16="http://schemas.microsoft.com/office/drawing/2014/main" id="{58DC78B5-7018-AB48-9B4D-1F48FEC55097}"/>
+              </a:ext>
+            </a:extLst>
+          </p:cNvPr>
+          <p:cNvSpPr/>
+          <p:nvPr/>
+        </p:nvSpPr>
+        <p:spPr>
+          <a:xfrm>
+            <a:off x="5963627" y="6240138"/>
+            <a:ext cx="1251561" cy="569844"/>
+          </a:xfrm>
+          <a:prstGeom prst="rect">
+            <a:avLst/>
+          </a:prstGeom>
+          <a:solidFill>
+            <a:schemeClr val="accent5">
+              <a:alpha val="10196"/>
+            </a:schemeClr>
+          </a:solidFill>
+          <a:ln>
+            <a:solidFill>
+              <a:schemeClr val="accent5">
+                <a:lumMod val="50000"/>
+              </a:schemeClr>
+            </a:solidFill>
+          </a:ln>
+        </p:spPr>
+        <p:style>
+          <a:lnRef idx="2">
+            <a:schemeClr val="accent1">
+              <a:shade val="50000"/>
+            </a:schemeClr>
+          </a:lnRef>
+          <a:fillRef idx="1">
+            <a:schemeClr val="accent1"/>
+          </a:fillRef>
+          <a:effectRef idx="0">
+            <a:schemeClr val="accent1"/>
+          </a:effectRef>
+          <a:fontRef idx="minor">
+            <a:schemeClr val="lt1"/>
+          </a:fontRef>
+        </p:style>
+        <p:txBody>
+          <a:bodyPr rtlCol="0" anchor="ctr"/>
+          <a:lstStyle/>
+          <a:p>
+            <a:pPr algn="ctr"/>
+            <a:endParaRPr lang="en-US" dirty="0"/>
+          </a:p>
+        </p:txBody>
+      </p:sp>
+      <p:sp>
+        <p:nvSpPr>
+          <p:cNvPr id="55" name="Rectangle 54">
+            <a:extLst>
+              <a:ext uri="{FF2B5EF4-FFF2-40B4-BE49-F238E27FC236}">
+                <a16:creationId xmlns:a16="http://schemas.microsoft.com/office/drawing/2014/main" id="{B57057F1-5442-004D-B63B-E2D95231F24C}"/>
+              </a:ext>
+            </a:extLst>
+          </p:cNvPr>
+          <p:cNvSpPr/>
+          <p:nvPr/>
+        </p:nvSpPr>
+        <p:spPr>
+          <a:xfrm>
+            <a:off x="5963627" y="6372458"/>
+            <a:ext cx="1184245" cy="260978"/>
+          </a:xfrm>
+          <a:prstGeom prst="rect">
+            <a:avLst/>
+          </a:prstGeom>
+          <a:noFill/>
+          <a:ln>
+            <a:noFill/>
+          </a:ln>
+        </p:spPr>
+        <p:style>
+          <a:lnRef idx="2">
+            <a:schemeClr val="accent1">
+              <a:shade val="50000"/>
+            </a:schemeClr>
+          </a:lnRef>
+          <a:fillRef idx="1">
+            <a:schemeClr val="accent1"/>
+          </a:fillRef>
+          <a:effectRef idx="0">
+            <a:schemeClr val="accent1"/>
+          </a:effectRef>
+          <a:fontRef idx="minor">
+            <a:schemeClr val="lt1"/>
+          </a:fontRef>
+        </p:style>
+        <p:txBody>
+          <a:bodyPr rtlCol="0" anchor="ctr"/>
+          <a:lstStyle/>
+          <a:p>
+            <a:r>
+              <a:rPr lang="en-US" sz="1600" dirty="0">
+                <a:solidFill>
+                  <a:schemeClr val="accent5">
+                    <a:lumMod val="50000"/>
+                  </a:schemeClr>
+                </a:solidFill>
+              </a:rPr>
+              <a:t>&lt;svg&gt; .</a:t>
+            </a:r>
+            <a:r>
+              <a:rPr lang="en-US" sz="1600" dirty="0" err="1">
+                <a:solidFill>
+                  <a:schemeClr val="accent5">
+                    <a:lumMod val="50000"/>
+                  </a:schemeClr>
+                </a:solidFill>
+              </a:rPr>
+              <a:t>card__icon</a:t>
+            </a:r>
+            <a:endParaRPr lang="en-US" sz="1600" dirty="0">
+              <a:solidFill>
+                <a:schemeClr val="accent5">
+                  <a:lumMod val="50000"/>
+                </a:schemeClr>
+              </a:solidFill>
+            </a:endParaRPr>
+          </a:p>
+        </p:txBody>
+      </p:sp>
+      <p:grpSp>
+        <p:nvGrpSpPr>
+          <p:cNvPr id="56" name="Group 55">
+            <a:extLst>
+              <a:ext uri="{FF2B5EF4-FFF2-40B4-BE49-F238E27FC236}">
+                <a16:creationId xmlns:a16="http://schemas.microsoft.com/office/drawing/2014/main" id="{132D157B-3A1E-A540-9E58-03FEC26BFC0D}"/>
+              </a:ext>
+            </a:extLst>
+          </p:cNvPr>
+          <p:cNvGrpSpPr/>
+          <p:nvPr/>
+        </p:nvGrpSpPr>
+        <p:grpSpPr>
+          <a:xfrm>
+            <a:off x="7288244" y="6240139"/>
+            <a:ext cx="3505138" cy="591032"/>
+            <a:chOff x="1215096" y="1834122"/>
+            <a:chExt cx="1887737" cy="239815"/>
+          </a:xfrm>
+        </p:grpSpPr>
+        <p:sp>
+          <p:nvSpPr>
+            <p:cNvPr id="57" name="Rectangle 56">
+              <a:extLst>
+                <a:ext uri="{FF2B5EF4-FFF2-40B4-BE49-F238E27FC236}">
+                  <a16:creationId xmlns:a16="http://schemas.microsoft.com/office/drawing/2014/main" id="{B3D90073-EA58-D64F-A08B-2A1A5B30970F}"/>
+                </a:ext>
+              </a:extLst>
+            </p:cNvPr>
+            <p:cNvSpPr/>
+            <p:nvPr/>
+          </p:nvSpPr>
+          <p:spPr>
+            <a:xfrm>
+              <a:off x="1215096" y="1834122"/>
+              <a:ext cx="1887737" cy="239815"/>
+            </a:xfrm>
+            <a:prstGeom prst="rect">
+              <a:avLst/>
+            </a:prstGeom>
+            <a:solidFill>
+              <a:srgbClr val="FF0000">
+                <a:alpha val="10196"/>
+              </a:srgbClr>
+            </a:solidFill>
+            <a:ln>
+              <a:solidFill>
+                <a:srgbClr val="C00000"/>
+              </a:solidFill>
+            </a:ln>
+          </p:spPr>
+          <p:style>
+            <a:lnRef idx="2">
+              <a:schemeClr val="accent1">
+                <a:shade val="50000"/>
+              </a:schemeClr>
+            </a:lnRef>
+            <a:fillRef idx="1">
+              <a:schemeClr val="accent1"/>
+            </a:fillRef>
+            <a:effectRef idx="0">
+              <a:schemeClr val="accent1"/>
+            </a:effectRef>
+            <a:fontRef idx="minor">
+              <a:schemeClr val="lt1"/>
+            </a:fontRef>
+          </p:style>
+          <p:txBody>
+            <a:bodyPr rtlCol="0" anchor="ctr"/>
+            <a:lstStyle/>
+            <a:p>
+              <a:pPr algn="ctr"/>
+              <a:endParaRPr lang="en-US" dirty="0"/>
+            </a:p>
+          </p:txBody>
+        </p:sp>
+        <p:sp>
+          <p:nvSpPr>
+            <p:cNvPr id="58" name="Rectangle 57">
+              <a:extLst>
+                <a:ext uri="{FF2B5EF4-FFF2-40B4-BE49-F238E27FC236}">
+                  <a16:creationId xmlns:a16="http://schemas.microsoft.com/office/drawing/2014/main" id="{1626D3B4-CB1B-E84A-B84D-59FEC6807DBC}"/>
+                </a:ext>
+              </a:extLst>
+            </p:cNvPr>
+            <p:cNvSpPr/>
+            <p:nvPr/>
+          </p:nvSpPr>
+          <p:spPr>
+            <a:xfrm>
+              <a:off x="1582613" y="1846284"/>
+              <a:ext cx="1077682" cy="198293"/>
+            </a:xfrm>
+            <a:prstGeom prst="rect">
+              <a:avLst/>
+            </a:prstGeom>
+            <a:noFill/>
+            <a:ln>
+              <a:noFill/>
+            </a:ln>
+          </p:spPr>
+          <p:style>
+            <a:lnRef idx="2">
+              <a:schemeClr val="accent1">
+                <a:shade val="50000"/>
+              </a:schemeClr>
+            </a:lnRef>
+            <a:fillRef idx="1">
+              <a:schemeClr val="accent1"/>
+            </a:fillRef>
+            <a:effectRef idx="0">
+              <a:schemeClr val="accent1"/>
+            </a:effectRef>
+            <a:fontRef idx="minor">
+              <a:schemeClr val="lt1"/>
+            </a:fontRef>
+          </p:style>
+          <p:txBody>
+            <a:bodyPr rtlCol="0" anchor="ctr"/>
+            <a:lstStyle/>
+            <a:p>
+              <a:r>
+                <a:rPr lang="en-US" sz="1600" dirty="0">
+                  <a:solidFill>
+                    <a:srgbClr val="C00000"/>
+                  </a:solidFill>
+                </a:rPr>
+                <a:t>&lt;h4&gt; .</a:t>
+              </a:r>
+              <a:r>
+                <a:rPr lang="en-US" sz="1600" dirty="0" err="1">
+                  <a:solidFill>
+                    <a:srgbClr val="C00000"/>
+                  </a:solidFill>
+                </a:rPr>
+                <a:t>card__header</a:t>
+              </a:r>
+              <a:endParaRPr lang="en-US" sz="1600" dirty="0">
+                <a:solidFill>
+                  <a:srgbClr val="C00000"/>
+                </a:solidFill>
+              </a:endParaRPr>
+            </a:p>
+          </p:txBody>
+        </p:sp>
+      </p:grpSp>
+      <p:sp>
+        <p:nvSpPr>
+          <p:cNvPr id="59" name="Rectangle 58">
+            <a:extLst>
+              <a:ext uri="{FF2B5EF4-FFF2-40B4-BE49-F238E27FC236}">
+                <a16:creationId xmlns:a16="http://schemas.microsoft.com/office/drawing/2014/main" id="{BF8637D9-4AED-C149-8B46-5D93A784D01C}"/>
+              </a:ext>
+            </a:extLst>
+          </p:cNvPr>
+          <p:cNvSpPr/>
+          <p:nvPr/>
+        </p:nvSpPr>
+        <p:spPr>
+          <a:xfrm>
+            <a:off x="5841558" y="8411837"/>
+            <a:ext cx="5057189" cy="789312"/>
+          </a:xfrm>
+          <a:prstGeom prst="rect">
+            <a:avLst/>
+          </a:prstGeom>
+          <a:solidFill>
+            <a:schemeClr val="tx1">
+              <a:lumMod val="50000"/>
+              <a:lumOff val="50000"/>
+              <a:alpha val="10196"/>
+            </a:schemeClr>
+          </a:solidFill>
+          <a:ln>
+            <a:solidFill>
+              <a:schemeClr val="tx1">
+                <a:lumMod val="50000"/>
+                <a:lumOff val="50000"/>
+              </a:schemeClr>
+            </a:solidFill>
+          </a:ln>
+        </p:spPr>
+        <p:style>
+          <a:lnRef idx="2">
+            <a:schemeClr val="accent1">
+              <a:shade val="50000"/>
+            </a:schemeClr>
+          </a:lnRef>
+          <a:fillRef idx="1">
+            <a:schemeClr val="accent1"/>
+          </a:fillRef>
+          <a:effectRef idx="0">
+            <a:schemeClr val="accent1"/>
+          </a:effectRef>
+          <a:fontRef idx="minor">
+            <a:schemeClr val="lt1"/>
+          </a:fontRef>
+        </p:style>
+        <p:txBody>
+          <a:bodyPr rtlCol="0" anchor="ctr"/>
+          <a:lstStyle/>
+          <a:p>
+            <a:pPr algn="ctr"/>
+            <a:endParaRPr lang="en-US" dirty="0"/>
+          </a:p>
+        </p:txBody>
+      </p:sp>
+      <p:sp>
+        <p:nvSpPr>
+          <p:cNvPr id="60" name="Rectangle 59">
+            <a:extLst>
+              <a:ext uri="{FF2B5EF4-FFF2-40B4-BE49-F238E27FC236}">
+                <a16:creationId xmlns:a16="http://schemas.microsoft.com/office/drawing/2014/main" id="{427EC953-2707-9144-8C6D-2D42BF8F20F0}"/>
+              </a:ext>
+            </a:extLst>
+          </p:cNvPr>
+          <p:cNvSpPr/>
+          <p:nvPr/>
+        </p:nvSpPr>
+        <p:spPr>
+          <a:xfrm>
+            <a:off x="5841558" y="8125236"/>
+            <a:ext cx="2420393" cy="213062"/>
+          </a:xfrm>
+          <a:prstGeom prst="rect">
+            <a:avLst/>
+          </a:prstGeom>
+          <a:noFill/>
+          <a:ln>
+            <a:noFill/>
+          </a:ln>
+        </p:spPr>
+        <p:style>
+          <a:lnRef idx="2">
+            <a:schemeClr val="accent1">
+              <a:shade val="50000"/>
+            </a:schemeClr>
+          </a:lnRef>
+          <a:fillRef idx="1">
+            <a:schemeClr val="accent1"/>
+          </a:fillRef>
+          <a:effectRef idx="0">
+            <a:schemeClr val="accent1"/>
+          </a:effectRef>
+          <a:fontRef idx="minor">
+            <a:schemeClr val="lt1"/>
+          </a:fontRef>
+        </p:style>
+        <p:txBody>
+          <a:bodyPr rtlCol="0" anchor="ctr"/>
+          <a:lstStyle/>
+          <a:p>
+            <a:r>
+              <a:rPr lang="en-US" sz="2000" dirty="0">
+                <a:solidFill>
+                  <a:schemeClr val="tx1">
+                    <a:lumMod val="75000"/>
+                    <a:lumOff val="25000"/>
+                  </a:schemeClr>
+                </a:solidFill>
+              </a:rPr>
+              <a:t>&lt;div&gt; .</a:t>
+            </a:r>
+            <a:r>
+              <a:rPr lang="en-US" sz="2000" dirty="0" err="1">
+                <a:solidFill>
+                  <a:schemeClr val="tx1">
+                    <a:lumMod val="75000"/>
+                    <a:lumOff val="25000"/>
+                  </a:schemeClr>
+                </a:solidFill>
+              </a:rPr>
+              <a:t>card__footer</a:t>
+            </a:r>
+            <a:endParaRPr lang="en-US" sz="2000" dirty="0">
+              <a:solidFill>
+                <a:schemeClr val="tx1">
+                  <a:lumMod val="75000"/>
+                  <a:lumOff val="25000"/>
+                </a:schemeClr>
+              </a:solidFill>
+            </a:endParaRPr>
+          </a:p>
+        </p:txBody>
+      </p:sp>
+      <p:sp>
+        <p:nvSpPr>
+          <p:cNvPr id="61" name="Rectangle 60">
+            <a:extLst>
+              <a:ext uri="{FF2B5EF4-FFF2-40B4-BE49-F238E27FC236}">
+                <a16:creationId xmlns:a16="http://schemas.microsoft.com/office/drawing/2014/main" id="{1B92AC21-EC8E-5042-B5FC-E8161D171184}"/>
+              </a:ext>
+            </a:extLst>
+          </p:cNvPr>
+          <p:cNvSpPr/>
+          <p:nvPr/>
+        </p:nvSpPr>
+        <p:spPr>
+          <a:xfrm>
+            <a:off x="5947126" y="8493572"/>
+            <a:ext cx="1251561" cy="569844"/>
+          </a:xfrm>
+          <a:prstGeom prst="rect">
+            <a:avLst/>
+          </a:prstGeom>
+          <a:solidFill>
+            <a:schemeClr val="accent5">
+              <a:alpha val="10196"/>
+            </a:schemeClr>
+          </a:solidFill>
+          <a:ln>
+            <a:solidFill>
+              <a:schemeClr val="accent5">
+                <a:lumMod val="50000"/>
+              </a:schemeClr>
+            </a:solidFill>
+          </a:ln>
+        </p:spPr>
+        <p:style>
+          <a:lnRef idx="2">
+            <a:schemeClr val="accent1">
+              <a:shade val="50000"/>
+            </a:schemeClr>
+          </a:lnRef>
+          <a:fillRef idx="1">
+            <a:schemeClr val="accent1"/>
+          </a:fillRef>
+          <a:effectRef idx="0">
+            <a:schemeClr val="accent1"/>
+          </a:effectRef>
+          <a:fontRef idx="minor">
+            <a:schemeClr val="lt1"/>
+          </a:fontRef>
+        </p:style>
+        <p:txBody>
+          <a:bodyPr rtlCol="0" anchor="ctr"/>
+          <a:lstStyle/>
+          <a:p>
+            <a:pPr algn="ctr"/>
+            <a:endParaRPr lang="en-US" dirty="0"/>
+          </a:p>
+        </p:txBody>
+      </p:sp>
+      <p:sp>
+        <p:nvSpPr>
+          <p:cNvPr id="62" name="Rectangle 61">
+            <a:extLst>
+              <a:ext uri="{FF2B5EF4-FFF2-40B4-BE49-F238E27FC236}">
+                <a16:creationId xmlns:a16="http://schemas.microsoft.com/office/drawing/2014/main" id="{F10B9118-2194-7544-9B56-3CBA48BFECD8}"/>
+              </a:ext>
+            </a:extLst>
+          </p:cNvPr>
+          <p:cNvSpPr/>
+          <p:nvPr/>
+        </p:nvSpPr>
+        <p:spPr>
+          <a:xfrm>
+            <a:off x="5947126" y="8625892"/>
+            <a:ext cx="1184245" cy="260978"/>
+          </a:xfrm>
+          <a:prstGeom prst="rect">
+            <a:avLst/>
+          </a:prstGeom>
+          <a:noFill/>
+          <a:ln>
+            <a:noFill/>
+          </a:ln>
+        </p:spPr>
+        <p:style>
+          <a:lnRef idx="2">
+            <a:schemeClr val="accent1">
+              <a:shade val="50000"/>
+            </a:schemeClr>
+          </a:lnRef>
+          <a:fillRef idx="1">
+            <a:schemeClr val="accent1"/>
+          </a:fillRef>
+          <a:effectRef idx="0">
+            <a:schemeClr val="accent1"/>
+          </a:effectRef>
+          <a:fontRef idx="minor">
+            <a:schemeClr val="lt1"/>
+          </a:fontRef>
+        </p:style>
+        <p:txBody>
+          <a:bodyPr rtlCol="0" anchor="ctr"/>
+          <a:lstStyle/>
+          <a:p>
+            <a:r>
+              <a:rPr lang="en-US" sz="1600" dirty="0">
+                <a:solidFill>
+                  <a:schemeClr val="accent5">
+                    <a:lumMod val="50000"/>
+                  </a:schemeClr>
+                </a:solidFill>
+              </a:rPr>
+              <a:t>&lt;span&gt; .right-arrow</a:t>
+            </a:r>
+          </a:p>
+        </p:txBody>
+      </p:sp>
+      <p:grpSp>
+        <p:nvGrpSpPr>
+          <p:cNvPr id="63" name="Group 62">
+            <a:extLst>
+              <a:ext uri="{FF2B5EF4-FFF2-40B4-BE49-F238E27FC236}">
+                <a16:creationId xmlns:a16="http://schemas.microsoft.com/office/drawing/2014/main" id="{20B8B725-4104-7B4A-BEF6-053660D3DAC7}"/>
+              </a:ext>
+            </a:extLst>
+          </p:cNvPr>
+          <p:cNvGrpSpPr/>
+          <p:nvPr/>
+        </p:nvGrpSpPr>
+        <p:grpSpPr>
+          <a:xfrm>
+            <a:off x="7271743" y="8493573"/>
+            <a:ext cx="3505138" cy="591032"/>
+            <a:chOff x="1215096" y="1834122"/>
+            <a:chExt cx="1887737" cy="239815"/>
+          </a:xfrm>
+        </p:grpSpPr>
+        <p:sp>
+          <p:nvSpPr>
+            <p:cNvPr id="64" name="Rectangle 63">
+              <a:extLst>
+                <a:ext uri="{FF2B5EF4-FFF2-40B4-BE49-F238E27FC236}">
+                  <a16:creationId xmlns:a16="http://schemas.microsoft.com/office/drawing/2014/main" id="{A596566C-0DD8-1B47-9B1B-62DF075C8F9C}"/>
+                </a:ext>
+              </a:extLst>
+            </p:cNvPr>
+            <p:cNvSpPr/>
+            <p:nvPr/>
+          </p:nvSpPr>
+          <p:spPr>
+            <a:xfrm>
+              <a:off x="1215096" y="1834122"/>
+              <a:ext cx="1887737" cy="239815"/>
+            </a:xfrm>
+            <a:prstGeom prst="rect">
+              <a:avLst/>
+            </a:prstGeom>
+            <a:solidFill>
+              <a:srgbClr val="FF0000">
+                <a:alpha val="10196"/>
+              </a:srgbClr>
+            </a:solidFill>
+            <a:ln>
+              <a:solidFill>
+                <a:srgbClr val="C00000"/>
+              </a:solidFill>
+            </a:ln>
+          </p:spPr>
+          <p:style>
+            <a:lnRef idx="2">
+              <a:schemeClr val="accent1">
+                <a:shade val="50000"/>
+              </a:schemeClr>
+            </a:lnRef>
+            <a:fillRef idx="1">
+              <a:schemeClr val="accent1"/>
+            </a:fillRef>
+            <a:effectRef idx="0">
+              <a:schemeClr val="accent1"/>
+            </a:effectRef>
+            <a:fontRef idx="minor">
+              <a:schemeClr val="lt1"/>
+            </a:fontRef>
+          </p:style>
+          <p:txBody>
+            <a:bodyPr rtlCol="0" anchor="ctr"/>
+            <a:lstStyle/>
+            <a:p>
+              <a:pPr algn="ctr"/>
+              <a:endParaRPr lang="en-US" dirty="0"/>
+            </a:p>
+          </p:txBody>
+        </p:sp>
+        <p:sp>
+          <p:nvSpPr>
+            <p:cNvPr id="65" name="Rectangle 64">
+              <a:extLst>
+                <a:ext uri="{FF2B5EF4-FFF2-40B4-BE49-F238E27FC236}">
+                  <a16:creationId xmlns:a16="http://schemas.microsoft.com/office/drawing/2014/main" id="{A21B5A9F-1789-F14A-BE12-41FDCBC74096}"/>
+                </a:ext>
+              </a:extLst>
+            </p:cNvPr>
+            <p:cNvSpPr/>
+            <p:nvPr/>
+          </p:nvSpPr>
+          <p:spPr>
+            <a:xfrm>
+              <a:off x="1582613" y="1850584"/>
+              <a:ext cx="1077682" cy="198293"/>
+            </a:xfrm>
+            <a:prstGeom prst="rect">
+              <a:avLst/>
+            </a:prstGeom>
+            <a:noFill/>
+            <a:ln>
+              <a:noFill/>
+            </a:ln>
+          </p:spPr>
+          <p:style>
+            <a:lnRef idx="2">
+              <a:schemeClr val="accent1">
+                <a:shade val="50000"/>
+              </a:schemeClr>
+            </a:lnRef>
+            <a:fillRef idx="1">
+              <a:schemeClr val="accent1"/>
+            </a:fillRef>
+            <a:effectRef idx="0">
+              <a:schemeClr val="accent1"/>
+            </a:effectRef>
+            <a:fontRef idx="minor">
+              <a:schemeClr val="lt1"/>
+            </a:fontRef>
+          </p:style>
+          <p:txBody>
+            <a:bodyPr rtlCol="0" anchor="ctr"/>
+            <a:lstStyle/>
+            <a:p>
+              <a:r>
+                <a:rPr lang="en-US" sz="1600" dirty="0">
+                  <a:solidFill>
+                    <a:srgbClr val="C00000"/>
+                  </a:solidFill>
+                </a:rPr>
+                <a:t>&lt;a&gt; .</a:t>
+              </a:r>
+              <a:r>
+                <a:rPr lang="en-US" sz="1600" dirty="0" err="1">
+                  <a:solidFill>
+                    <a:srgbClr val="C00000"/>
+                  </a:solidFill>
+                </a:rPr>
+                <a:t>card__read</a:t>
+              </a:r>
+              <a:r>
+                <a:rPr lang="en-US" sz="1600" dirty="0">
+                  <a:solidFill>
+                    <a:srgbClr val="C00000"/>
+                  </a:solidFill>
+                </a:rPr>
+                <a:t>-more-link</a:t>
+              </a:r>
+            </a:p>
+          </p:txBody>
+        </p:sp>
+      </p:grpSp>
     </p:spTree>
     <p:extLst>
       <p:ext uri="{BB962C8B-B14F-4D97-AF65-F5344CB8AC3E}">
-        <p14:creationId xmlns:p14="http://schemas.microsoft.com/office/powerpoint/2010/main" val="3965133238"/>
+        <p14:creationId xmlns:p14="http://schemas.microsoft.com/office/powerpoint/2010/main" val="903363909"/>
       </p:ext>
     </p:extLst>
   </p:cSld>

</xml_diff>

<commit_message>
minor adjustments to the keypoints section layout
</commit_message>
<xml_diff>
--- a/layout.pptx
+++ b/layout.pptx
@@ -6189,7 +6189,7 @@
           <p:spPr>
             <a:xfrm>
               <a:off x="787400" y="680720"/>
-              <a:ext cx="2321560" cy="121920"/>
+              <a:ext cx="2878104" cy="130653"/>
             </a:xfrm>
             <a:prstGeom prst="rect">
               <a:avLst/>
@@ -6225,7 +6225,23 @@
                     <a:schemeClr val="accent5"/>
                   </a:solidFill>
                 </a:rPr>
-                <a:t>&lt;div&gt; .content-horizontal-center</a:t>
+                <a:t>&lt;div&gt; .content-horizontal-center .</a:t>
+              </a:r>
+              <a:r>
+                <a:rPr lang="en-US" sz="1600" dirty="0" err="1">
+                  <a:solidFill>
+                    <a:schemeClr val="accent5"/>
+                  </a:solidFill>
+                </a:rPr>
+                <a:t>keypoints__flex</a:t>
+              </a:r>
+              <a:r>
+                <a:rPr lang="en-US" sz="1600" dirty="0">
+                  <a:solidFill>
+                    <a:schemeClr val="accent5"/>
+                  </a:solidFill>
+                </a:rPr>
+                <a:t>-container</a:t>
               </a:r>
             </a:p>
           </p:txBody>

</xml_diff>

<commit_message>
prepared a preliminary layout for the latest-works section
</commit_message>
<xml_diff>
--- a/layout.pptx
+++ b/layout.pptx
@@ -9,6 +9,7 @@
     <p:sldId id="258" r:id="rId3"/>
     <p:sldId id="260" r:id="rId4"/>
     <p:sldId id="261" r:id="rId5"/>
+    <p:sldId id="262" r:id="rId6"/>
   </p:sldIdLst>
   <p:sldSz cx="16256000" cy="12192000"/>
   <p:notesSz cx="6858000" cy="9144000"/>
@@ -7872,6 +7873,1464 @@
 </p:sld>
 </file>
 
+<file path=ppt/slides/slide5.xml><?xml version="1.0" encoding="utf-8"?>
+<p:sld xmlns:a="http://schemas.openxmlformats.org/drawingml/2006/main" xmlns:r="http://schemas.openxmlformats.org/officeDocument/2006/relationships" xmlns:p="http://schemas.openxmlformats.org/presentationml/2006/main">
+  <p:cSld>
+    <p:spTree>
+      <p:nvGrpSpPr>
+        <p:cNvPr id="1" name=""/>
+        <p:cNvGrpSpPr/>
+        <p:nvPr/>
+      </p:nvGrpSpPr>
+      <p:grpSpPr>
+        <a:xfrm>
+          <a:off x="0" y="0"/>
+          <a:ext cx="0" cy="0"/>
+          <a:chOff x="0" y="0"/>
+          <a:chExt cx="0" cy="0"/>
+        </a:xfrm>
+      </p:grpSpPr>
+      <p:sp>
+        <p:nvSpPr>
+          <p:cNvPr id="4" name="TextBox 3">
+            <a:extLst>
+              <a:ext uri="{FF2B5EF4-FFF2-40B4-BE49-F238E27FC236}">
+                <a16:creationId xmlns:a16="http://schemas.microsoft.com/office/drawing/2014/main" id="{4E45CDFE-59FB-F74F-A73B-6933C90EBAEE}"/>
+              </a:ext>
+            </a:extLst>
+          </p:cNvPr>
+          <p:cNvSpPr txBox="1"/>
+          <p:nvPr/>
+        </p:nvSpPr>
+        <p:spPr>
+          <a:xfrm>
+            <a:off x="443346" y="360218"/>
+            <a:ext cx="4508927" cy="707886"/>
+          </a:xfrm>
+          <a:prstGeom prst="rect">
+            <a:avLst/>
+          </a:prstGeom>
+          <a:noFill/>
+        </p:spPr>
+        <p:txBody>
+          <a:bodyPr wrap="none" rtlCol="0">
+            <a:spAutoFit/>
+          </a:bodyPr>
+          <a:lstStyle/>
+          <a:p>
+            <a:r>
+              <a:rPr lang="en-BY" sz="4000" dirty="0"/>
+              <a:t>Latest Works Section</a:t>
+            </a:r>
+            <a:endParaRPr lang="en-BY" dirty="0"/>
+          </a:p>
+        </p:txBody>
+      </p:sp>
+      <p:sp>
+        <p:nvSpPr>
+          <p:cNvPr id="16" name="Rectangle 15">
+            <a:extLst>
+              <a:ext uri="{FF2B5EF4-FFF2-40B4-BE49-F238E27FC236}">
+                <a16:creationId xmlns:a16="http://schemas.microsoft.com/office/drawing/2014/main" id="{3178C7DD-2D9B-D344-9FB1-89BF70EB1B23}"/>
+              </a:ext>
+            </a:extLst>
+          </p:cNvPr>
+          <p:cNvSpPr/>
+          <p:nvPr/>
+        </p:nvSpPr>
+        <p:spPr>
+          <a:xfrm>
+            <a:off x="1111430" y="1669869"/>
+            <a:ext cx="12413183" cy="3856288"/>
+          </a:xfrm>
+          <a:prstGeom prst="rect">
+            <a:avLst/>
+          </a:prstGeom>
+          <a:solidFill>
+            <a:schemeClr val="bg1">
+              <a:lumMod val="95000"/>
+            </a:schemeClr>
+          </a:solidFill>
+        </p:spPr>
+        <p:style>
+          <a:lnRef idx="2">
+            <a:schemeClr val="accent1">
+              <a:shade val="50000"/>
+            </a:schemeClr>
+          </a:lnRef>
+          <a:fillRef idx="1">
+            <a:schemeClr val="accent1"/>
+          </a:fillRef>
+          <a:effectRef idx="0">
+            <a:schemeClr val="accent1"/>
+          </a:effectRef>
+          <a:fontRef idx="minor">
+            <a:schemeClr val="lt1"/>
+          </a:fontRef>
+        </p:style>
+        <p:txBody>
+          <a:bodyPr rtlCol="0" anchor="ctr"/>
+          <a:lstStyle/>
+          <a:p>
+            <a:pPr algn="ctr"/>
+            <a:endParaRPr lang="en-US"/>
+          </a:p>
+        </p:txBody>
+      </p:sp>
+      <p:grpSp>
+        <p:nvGrpSpPr>
+          <p:cNvPr id="17" name="Group 16">
+            <a:extLst>
+              <a:ext uri="{FF2B5EF4-FFF2-40B4-BE49-F238E27FC236}">
+                <a16:creationId xmlns:a16="http://schemas.microsoft.com/office/drawing/2014/main" id="{C9880EC7-75D0-2E45-B27E-9CEE6201A1FF}"/>
+              </a:ext>
+            </a:extLst>
+          </p:cNvPr>
+          <p:cNvGrpSpPr/>
+          <p:nvPr/>
+        </p:nvGrpSpPr>
+        <p:grpSpPr>
+          <a:xfrm>
+            <a:off x="2413116" y="1690643"/>
+            <a:ext cx="9809810" cy="3835514"/>
+            <a:chOff x="787400" y="646563"/>
+            <a:chExt cx="5283200" cy="1431468"/>
+          </a:xfrm>
+        </p:grpSpPr>
+        <p:sp>
+          <p:nvSpPr>
+            <p:cNvPr id="18" name="Rectangle 17">
+              <a:extLst>
+                <a:ext uri="{FF2B5EF4-FFF2-40B4-BE49-F238E27FC236}">
+                  <a16:creationId xmlns:a16="http://schemas.microsoft.com/office/drawing/2014/main" id="{8AFBF417-F05E-8E4F-8390-52398C96C588}"/>
+                </a:ext>
+              </a:extLst>
+            </p:cNvPr>
+            <p:cNvSpPr/>
+            <p:nvPr/>
+          </p:nvSpPr>
+          <p:spPr>
+            <a:xfrm>
+              <a:off x="787400" y="650240"/>
+              <a:ext cx="5283200" cy="1427791"/>
+            </a:xfrm>
+            <a:prstGeom prst="rect">
+              <a:avLst/>
+            </a:prstGeom>
+            <a:solidFill>
+              <a:srgbClr val="5B9BD5">
+                <a:alpha val="10196"/>
+              </a:srgbClr>
+            </a:solidFill>
+            <a:ln>
+              <a:solidFill>
+                <a:schemeClr val="accent5"/>
+              </a:solidFill>
+            </a:ln>
+          </p:spPr>
+          <p:style>
+            <a:lnRef idx="2">
+              <a:schemeClr val="accent1">
+                <a:shade val="50000"/>
+              </a:schemeClr>
+            </a:lnRef>
+            <a:fillRef idx="1">
+              <a:schemeClr val="accent1"/>
+            </a:fillRef>
+            <a:effectRef idx="0">
+              <a:schemeClr val="accent1"/>
+            </a:effectRef>
+            <a:fontRef idx="minor">
+              <a:schemeClr val="lt1"/>
+            </a:fontRef>
+          </p:style>
+          <p:txBody>
+            <a:bodyPr rtlCol="0" anchor="ctr"/>
+            <a:lstStyle/>
+            <a:p>
+              <a:pPr algn="ctr"/>
+              <a:endParaRPr lang="en-US" dirty="0"/>
+            </a:p>
+          </p:txBody>
+        </p:sp>
+        <p:sp>
+          <p:nvSpPr>
+            <p:cNvPr id="19" name="Rectangle 18">
+              <a:extLst>
+                <a:ext uri="{FF2B5EF4-FFF2-40B4-BE49-F238E27FC236}">
+                  <a16:creationId xmlns:a16="http://schemas.microsoft.com/office/drawing/2014/main" id="{91869B45-4A01-164E-98E2-ADB9CC3952C9}"/>
+                </a:ext>
+              </a:extLst>
+            </p:cNvPr>
+            <p:cNvSpPr/>
+            <p:nvPr/>
+          </p:nvSpPr>
+          <p:spPr>
+            <a:xfrm>
+              <a:off x="787400" y="646563"/>
+              <a:ext cx="2878104" cy="130653"/>
+            </a:xfrm>
+            <a:prstGeom prst="rect">
+              <a:avLst/>
+            </a:prstGeom>
+            <a:noFill/>
+            <a:ln>
+              <a:noFill/>
+            </a:ln>
+          </p:spPr>
+          <p:style>
+            <a:lnRef idx="2">
+              <a:schemeClr val="accent1">
+                <a:shade val="50000"/>
+              </a:schemeClr>
+            </a:lnRef>
+            <a:fillRef idx="1">
+              <a:schemeClr val="accent1"/>
+            </a:fillRef>
+            <a:effectRef idx="0">
+              <a:schemeClr val="accent1"/>
+            </a:effectRef>
+            <a:fontRef idx="minor">
+              <a:schemeClr val="lt1"/>
+            </a:fontRef>
+          </p:style>
+          <p:txBody>
+            <a:bodyPr rtlCol="0" anchor="ctr"/>
+            <a:lstStyle/>
+            <a:p>
+              <a:r>
+                <a:rPr lang="en-US" sz="1600" dirty="0">
+                  <a:solidFill>
+                    <a:schemeClr val="accent5"/>
+                  </a:solidFill>
+                </a:rPr>
+                <a:t>&lt;div&gt; .content-horizontal-center .</a:t>
+              </a:r>
+              <a:r>
+                <a:rPr lang="en-US" sz="1600" dirty="0" err="1">
+                  <a:solidFill>
+                    <a:schemeClr val="accent5"/>
+                  </a:solidFill>
+                </a:rPr>
+                <a:t>keypoints__flex</a:t>
+              </a:r>
+              <a:r>
+                <a:rPr lang="en-US" sz="1600" dirty="0">
+                  <a:solidFill>
+                    <a:schemeClr val="accent5"/>
+                  </a:solidFill>
+                </a:rPr>
+                <a:t>-container</a:t>
+              </a:r>
+            </a:p>
+          </p:txBody>
+        </p:sp>
+      </p:grpSp>
+      <p:sp>
+        <p:nvSpPr>
+          <p:cNvPr id="23" name="Rectangle 22">
+            <a:extLst>
+              <a:ext uri="{FF2B5EF4-FFF2-40B4-BE49-F238E27FC236}">
+                <a16:creationId xmlns:a16="http://schemas.microsoft.com/office/drawing/2014/main" id="{C697B5D6-684E-F341-84B3-480269E5B8A5}"/>
+              </a:ext>
+            </a:extLst>
+          </p:cNvPr>
+          <p:cNvSpPr/>
+          <p:nvPr/>
+        </p:nvSpPr>
+        <p:spPr>
+          <a:xfrm>
+            <a:off x="1096191" y="1700349"/>
+            <a:ext cx="1811042" cy="796272"/>
+          </a:xfrm>
+          <a:prstGeom prst="rect">
+            <a:avLst/>
+          </a:prstGeom>
+          <a:noFill/>
+          <a:ln>
+            <a:noFill/>
+          </a:ln>
+        </p:spPr>
+        <p:style>
+          <a:lnRef idx="2">
+            <a:schemeClr val="accent1">
+              <a:shade val="50000"/>
+            </a:schemeClr>
+          </a:lnRef>
+          <a:fillRef idx="1">
+            <a:schemeClr val="accent1"/>
+          </a:fillRef>
+          <a:effectRef idx="0">
+            <a:schemeClr val="accent1"/>
+          </a:effectRef>
+          <a:fontRef idx="minor">
+            <a:schemeClr val="lt1"/>
+          </a:fontRef>
+        </p:style>
+        <p:txBody>
+          <a:bodyPr rtlCol="0" anchor="ctr"/>
+          <a:lstStyle/>
+          <a:p>
+            <a:r>
+              <a:rPr lang="en-US" sz="1600" dirty="0">
+                <a:solidFill>
+                  <a:schemeClr val="tx1"/>
+                </a:solidFill>
+              </a:rPr>
+              <a:t>&lt;div&gt; </a:t>
+            </a:r>
+            <a:br>
+              <a:rPr lang="en-US" sz="1600" dirty="0">
+                <a:solidFill>
+                  <a:schemeClr val="tx1"/>
+                </a:solidFill>
+              </a:rPr>
+            </a:br>
+            <a:r>
+              <a:rPr lang="en-US" sz="1600" dirty="0">
+                <a:solidFill>
+                  <a:schemeClr val="tx1"/>
+                </a:solidFill>
+              </a:rPr>
+              <a:t>.latest-works</a:t>
+            </a:r>
+          </a:p>
+          <a:p>
+            <a:r>
+              <a:rPr lang="en-US" sz="1600" dirty="0">
+                <a:solidFill>
+                  <a:schemeClr val="tx1"/>
+                </a:solidFill>
+              </a:rPr>
+              <a:t>.section</a:t>
+            </a:r>
+          </a:p>
+        </p:txBody>
+      </p:sp>
+      <p:grpSp>
+        <p:nvGrpSpPr>
+          <p:cNvPr id="24" name="Group 23">
+            <a:extLst>
+              <a:ext uri="{FF2B5EF4-FFF2-40B4-BE49-F238E27FC236}">
+                <a16:creationId xmlns:a16="http://schemas.microsoft.com/office/drawing/2014/main" id="{538C9DEF-B4A9-2340-A774-A0EE6CDDB056}"/>
+              </a:ext>
+            </a:extLst>
+          </p:cNvPr>
+          <p:cNvGrpSpPr/>
+          <p:nvPr/>
+        </p:nvGrpSpPr>
+        <p:grpSpPr>
+          <a:xfrm>
+            <a:off x="2602649" y="2059323"/>
+            <a:ext cx="9338188" cy="1241063"/>
+            <a:chOff x="1686470" y="650239"/>
+            <a:chExt cx="8956877" cy="710172"/>
+          </a:xfrm>
+        </p:grpSpPr>
+        <p:sp>
+          <p:nvSpPr>
+            <p:cNvPr id="25" name="Rectangle 24">
+              <a:extLst>
+                <a:ext uri="{FF2B5EF4-FFF2-40B4-BE49-F238E27FC236}">
+                  <a16:creationId xmlns:a16="http://schemas.microsoft.com/office/drawing/2014/main" id="{2FCB1430-0AAB-214B-A592-0F1B4C30544A}"/>
+                </a:ext>
+              </a:extLst>
+            </p:cNvPr>
+            <p:cNvSpPr/>
+            <p:nvPr/>
+          </p:nvSpPr>
+          <p:spPr>
+            <a:xfrm>
+              <a:off x="1686470" y="650239"/>
+              <a:ext cx="8956877" cy="710172"/>
+            </a:xfrm>
+            <a:prstGeom prst="rect">
+              <a:avLst/>
+            </a:prstGeom>
+            <a:solidFill>
+              <a:schemeClr val="accent4">
+                <a:alpha val="10196"/>
+              </a:schemeClr>
+            </a:solidFill>
+            <a:ln>
+              <a:solidFill>
+                <a:schemeClr val="accent4"/>
+              </a:solidFill>
+            </a:ln>
+          </p:spPr>
+          <p:style>
+            <a:lnRef idx="2">
+              <a:schemeClr val="accent1">
+                <a:shade val="50000"/>
+              </a:schemeClr>
+            </a:lnRef>
+            <a:fillRef idx="1">
+              <a:schemeClr val="accent1"/>
+            </a:fillRef>
+            <a:effectRef idx="0">
+              <a:schemeClr val="accent1"/>
+            </a:effectRef>
+            <a:fontRef idx="minor">
+              <a:schemeClr val="lt1"/>
+            </a:fontRef>
+          </p:style>
+          <p:txBody>
+            <a:bodyPr rtlCol="0" anchor="ctr"/>
+            <a:lstStyle/>
+            <a:p>
+              <a:pPr algn="ctr"/>
+              <a:endParaRPr lang="en-US" dirty="0"/>
+            </a:p>
+          </p:txBody>
+        </p:sp>
+        <p:sp>
+          <p:nvSpPr>
+            <p:cNvPr id="26" name="Rectangle 25">
+              <a:extLst>
+                <a:ext uri="{FF2B5EF4-FFF2-40B4-BE49-F238E27FC236}">
+                  <a16:creationId xmlns:a16="http://schemas.microsoft.com/office/drawing/2014/main" id="{96B646B2-80B9-8D43-8CD6-868C7793E705}"/>
+                </a:ext>
+              </a:extLst>
+            </p:cNvPr>
+            <p:cNvSpPr/>
+            <p:nvPr/>
+          </p:nvSpPr>
+          <p:spPr>
+            <a:xfrm>
+              <a:off x="1830909" y="696764"/>
+              <a:ext cx="3330802" cy="153799"/>
+            </a:xfrm>
+            <a:prstGeom prst="rect">
+              <a:avLst/>
+            </a:prstGeom>
+            <a:noFill/>
+            <a:ln>
+              <a:noFill/>
+            </a:ln>
+          </p:spPr>
+          <p:style>
+            <a:lnRef idx="2">
+              <a:schemeClr val="accent1">
+                <a:shade val="50000"/>
+              </a:schemeClr>
+            </a:lnRef>
+            <a:fillRef idx="1">
+              <a:schemeClr val="accent1"/>
+            </a:fillRef>
+            <a:effectRef idx="0">
+              <a:schemeClr val="accent1"/>
+            </a:effectRef>
+            <a:fontRef idx="minor">
+              <a:schemeClr val="lt1"/>
+            </a:fontRef>
+          </p:style>
+          <p:txBody>
+            <a:bodyPr rtlCol="0" anchor="ctr"/>
+            <a:lstStyle/>
+            <a:p>
+              <a:r>
+                <a:rPr lang="en-US" sz="1600" dirty="0">
+                  <a:solidFill>
+                    <a:schemeClr val="accent2">
+                      <a:lumMod val="50000"/>
+                    </a:schemeClr>
+                  </a:solidFill>
+                </a:rPr>
+                <a:t>&lt;div&gt; .latest-</a:t>
+              </a:r>
+              <a:r>
+                <a:rPr lang="en-US" sz="1600" dirty="0" err="1">
+                  <a:solidFill>
+                    <a:schemeClr val="accent2">
+                      <a:lumMod val="50000"/>
+                    </a:schemeClr>
+                  </a:solidFill>
+                </a:rPr>
+                <a:t>works__head</a:t>
+              </a:r>
+              <a:endParaRPr lang="en-US" sz="1600" dirty="0">
+                <a:solidFill>
+                  <a:schemeClr val="accent2">
+                    <a:lumMod val="50000"/>
+                  </a:schemeClr>
+                </a:solidFill>
+              </a:endParaRPr>
+            </a:p>
+          </p:txBody>
+        </p:sp>
+      </p:grpSp>
+      <p:sp>
+        <p:nvSpPr>
+          <p:cNvPr id="43" name="Rectangle 42">
+            <a:extLst>
+              <a:ext uri="{FF2B5EF4-FFF2-40B4-BE49-F238E27FC236}">
+                <a16:creationId xmlns:a16="http://schemas.microsoft.com/office/drawing/2014/main" id="{ED7FA569-BAE8-C547-AE68-577FC8D12E4C}"/>
+              </a:ext>
+            </a:extLst>
+          </p:cNvPr>
+          <p:cNvSpPr/>
+          <p:nvPr/>
+        </p:nvSpPr>
+        <p:spPr>
+          <a:xfrm>
+            <a:off x="4208920" y="2444971"/>
+            <a:ext cx="3079324" cy="569844"/>
+          </a:xfrm>
+          <a:prstGeom prst="rect">
+            <a:avLst/>
+          </a:prstGeom>
+          <a:solidFill>
+            <a:schemeClr val="tx1">
+              <a:lumMod val="50000"/>
+              <a:lumOff val="50000"/>
+              <a:alpha val="10196"/>
+            </a:schemeClr>
+          </a:solidFill>
+          <a:ln>
+            <a:solidFill>
+              <a:schemeClr val="tx1">
+                <a:lumMod val="50000"/>
+                <a:lumOff val="50000"/>
+              </a:schemeClr>
+            </a:solidFill>
+          </a:ln>
+        </p:spPr>
+        <p:style>
+          <a:lnRef idx="2">
+            <a:schemeClr val="accent1">
+              <a:shade val="50000"/>
+            </a:schemeClr>
+          </a:lnRef>
+          <a:fillRef idx="1">
+            <a:schemeClr val="accent1"/>
+          </a:fillRef>
+          <a:effectRef idx="0">
+            <a:schemeClr val="accent1"/>
+          </a:effectRef>
+          <a:fontRef idx="minor">
+            <a:schemeClr val="lt1"/>
+          </a:fontRef>
+        </p:style>
+        <p:txBody>
+          <a:bodyPr rtlCol="0" anchor="ctr"/>
+          <a:lstStyle/>
+          <a:p>
+            <a:pPr algn="ctr"/>
+            <a:endParaRPr lang="en-US" dirty="0"/>
+          </a:p>
+        </p:txBody>
+      </p:sp>
+      <p:sp>
+        <p:nvSpPr>
+          <p:cNvPr id="44" name="Rectangle 43">
+            <a:extLst>
+              <a:ext uri="{FF2B5EF4-FFF2-40B4-BE49-F238E27FC236}">
+                <a16:creationId xmlns:a16="http://schemas.microsoft.com/office/drawing/2014/main" id="{A28910A9-6B4A-6449-91BC-D05BB6824E19}"/>
+              </a:ext>
+            </a:extLst>
+          </p:cNvPr>
+          <p:cNvSpPr/>
+          <p:nvPr/>
+        </p:nvSpPr>
+        <p:spPr>
+          <a:xfrm>
+            <a:off x="4305301" y="2661686"/>
+            <a:ext cx="2834952" cy="180173"/>
+          </a:xfrm>
+          <a:prstGeom prst="rect">
+            <a:avLst/>
+          </a:prstGeom>
+          <a:noFill/>
+          <a:ln>
+            <a:noFill/>
+          </a:ln>
+        </p:spPr>
+        <p:style>
+          <a:lnRef idx="2">
+            <a:schemeClr val="accent1">
+              <a:shade val="50000"/>
+            </a:schemeClr>
+          </a:lnRef>
+          <a:fillRef idx="1">
+            <a:schemeClr val="accent1"/>
+          </a:fillRef>
+          <a:effectRef idx="0">
+            <a:schemeClr val="accent1"/>
+          </a:effectRef>
+          <a:fontRef idx="minor">
+            <a:schemeClr val="lt1"/>
+          </a:fontRef>
+        </p:style>
+        <p:txBody>
+          <a:bodyPr rtlCol="0" anchor="ctr"/>
+          <a:lstStyle/>
+          <a:p>
+            <a:r>
+              <a:rPr lang="en-US" sz="1600" dirty="0">
+                <a:solidFill>
+                  <a:schemeClr val="tx1">
+                    <a:lumMod val="75000"/>
+                    <a:lumOff val="25000"/>
+                  </a:schemeClr>
+                </a:solidFill>
+              </a:rPr>
+              <a:t>&lt;span&gt; .latest-</a:t>
+            </a:r>
+            <a:r>
+              <a:rPr lang="en-US" sz="1600" dirty="0" err="1">
+                <a:solidFill>
+                  <a:schemeClr val="tx1">
+                    <a:lumMod val="75000"/>
+                    <a:lumOff val="25000"/>
+                  </a:schemeClr>
+                </a:solidFill>
+              </a:rPr>
+              <a:t>works__header</a:t>
+            </a:r>
+            <a:endParaRPr lang="en-US" sz="1600" dirty="0">
+              <a:solidFill>
+                <a:schemeClr val="tx1">
+                  <a:lumMod val="75000"/>
+                  <a:lumOff val="25000"/>
+                </a:schemeClr>
+              </a:solidFill>
+            </a:endParaRPr>
+          </a:p>
+        </p:txBody>
+      </p:sp>
+      <p:grpSp>
+        <p:nvGrpSpPr>
+          <p:cNvPr id="49" name="Group 48">
+            <a:extLst>
+              <a:ext uri="{FF2B5EF4-FFF2-40B4-BE49-F238E27FC236}">
+                <a16:creationId xmlns:a16="http://schemas.microsoft.com/office/drawing/2014/main" id="{A5C17E2F-0594-2C48-8BD8-AAE2B7B95998}"/>
+              </a:ext>
+            </a:extLst>
+          </p:cNvPr>
+          <p:cNvGrpSpPr/>
+          <p:nvPr/>
+        </p:nvGrpSpPr>
+        <p:grpSpPr>
+          <a:xfrm>
+            <a:off x="2613673" y="3443624"/>
+            <a:ext cx="3651039" cy="1908469"/>
+            <a:chOff x="842732" y="1939441"/>
+            <a:chExt cx="1966314" cy="774374"/>
+          </a:xfrm>
+        </p:grpSpPr>
+        <p:sp>
+          <p:nvSpPr>
+            <p:cNvPr id="50" name="Rectangle 49">
+              <a:extLst>
+                <a:ext uri="{FF2B5EF4-FFF2-40B4-BE49-F238E27FC236}">
+                  <a16:creationId xmlns:a16="http://schemas.microsoft.com/office/drawing/2014/main" id="{C3529E1C-8826-8C49-9837-47C63212DBFA}"/>
+                </a:ext>
+              </a:extLst>
+            </p:cNvPr>
+            <p:cNvSpPr/>
+            <p:nvPr/>
+          </p:nvSpPr>
+          <p:spPr>
+            <a:xfrm>
+              <a:off x="842732" y="1939441"/>
+              <a:ext cx="1966314" cy="774374"/>
+            </a:xfrm>
+            <a:prstGeom prst="rect">
+              <a:avLst/>
+            </a:prstGeom>
+            <a:solidFill>
+              <a:schemeClr val="accent6">
+                <a:alpha val="10196"/>
+              </a:schemeClr>
+            </a:solidFill>
+            <a:ln>
+              <a:solidFill>
+                <a:schemeClr val="accent6">
+                  <a:lumMod val="50000"/>
+                </a:schemeClr>
+              </a:solidFill>
+            </a:ln>
+          </p:spPr>
+          <p:style>
+            <a:lnRef idx="2">
+              <a:schemeClr val="accent1">
+                <a:shade val="50000"/>
+              </a:schemeClr>
+            </a:lnRef>
+            <a:fillRef idx="1">
+              <a:schemeClr val="accent1"/>
+            </a:fillRef>
+            <a:effectRef idx="0">
+              <a:schemeClr val="accent1"/>
+            </a:effectRef>
+            <a:fontRef idx="minor">
+              <a:schemeClr val="lt1"/>
+            </a:fontRef>
+          </p:style>
+          <p:txBody>
+            <a:bodyPr rtlCol="0" anchor="ctr"/>
+            <a:lstStyle/>
+            <a:p>
+              <a:pPr algn="ctr"/>
+              <a:endParaRPr lang="en-US" dirty="0"/>
+            </a:p>
+          </p:txBody>
+        </p:sp>
+        <p:sp>
+          <p:nvSpPr>
+            <p:cNvPr id="51" name="Rectangle 50">
+              <a:extLst>
+                <a:ext uri="{FF2B5EF4-FFF2-40B4-BE49-F238E27FC236}">
+                  <a16:creationId xmlns:a16="http://schemas.microsoft.com/office/drawing/2014/main" id="{9D8F22D4-8AA0-264C-AFA3-62CAF1E15E1C}"/>
+                </a:ext>
+              </a:extLst>
+            </p:cNvPr>
+            <p:cNvSpPr/>
+            <p:nvPr/>
+          </p:nvSpPr>
+          <p:spPr>
+            <a:xfrm>
+              <a:off x="1098665" y="2209679"/>
+              <a:ext cx="1379290" cy="198293"/>
+            </a:xfrm>
+            <a:prstGeom prst="rect">
+              <a:avLst/>
+            </a:prstGeom>
+            <a:noFill/>
+            <a:ln>
+              <a:noFill/>
+            </a:ln>
+          </p:spPr>
+          <p:style>
+            <a:lnRef idx="2">
+              <a:schemeClr val="accent1">
+                <a:shade val="50000"/>
+              </a:schemeClr>
+            </a:lnRef>
+            <a:fillRef idx="1">
+              <a:schemeClr val="accent1"/>
+            </a:fillRef>
+            <a:effectRef idx="0">
+              <a:schemeClr val="accent1"/>
+            </a:effectRef>
+            <a:fontRef idx="minor">
+              <a:schemeClr val="lt1"/>
+            </a:fontRef>
+          </p:style>
+          <p:txBody>
+            <a:bodyPr rtlCol="0" anchor="ctr"/>
+            <a:lstStyle/>
+            <a:p>
+              <a:r>
+                <a:rPr lang="en-US" sz="1600" dirty="0">
+                  <a:solidFill>
+                    <a:schemeClr val="accent6">
+                      <a:lumMod val="50000"/>
+                    </a:schemeClr>
+                  </a:solidFill>
+                </a:rPr>
+                <a:t>&lt;img&gt; .latest-</a:t>
+              </a:r>
+              <a:r>
+                <a:rPr lang="en-US" sz="1600" dirty="0" err="1">
+                  <a:solidFill>
+                    <a:schemeClr val="accent6">
+                      <a:lumMod val="50000"/>
+                    </a:schemeClr>
+                  </a:solidFill>
+                </a:rPr>
+                <a:t>works__image</a:t>
+              </a:r>
+              <a:endParaRPr lang="en-US" sz="1600" dirty="0">
+                <a:solidFill>
+                  <a:schemeClr val="accent6">
+                    <a:lumMod val="50000"/>
+                  </a:schemeClr>
+                </a:solidFill>
+              </a:endParaRPr>
+            </a:p>
+          </p:txBody>
+        </p:sp>
+      </p:grpSp>
+      <p:sp>
+        <p:nvSpPr>
+          <p:cNvPr id="52" name="Rectangle 51">
+            <a:extLst>
+              <a:ext uri="{FF2B5EF4-FFF2-40B4-BE49-F238E27FC236}">
+                <a16:creationId xmlns:a16="http://schemas.microsoft.com/office/drawing/2014/main" id="{07F6ECB5-4753-B940-B80F-4E4ACE586CAC}"/>
+              </a:ext>
+            </a:extLst>
+          </p:cNvPr>
+          <p:cNvSpPr/>
+          <p:nvPr/>
+        </p:nvSpPr>
+        <p:spPr>
+          <a:xfrm>
+            <a:off x="1111430" y="6280862"/>
+            <a:ext cx="2844555" cy="1278718"/>
+          </a:xfrm>
+          <a:prstGeom prst="rect">
+            <a:avLst/>
+          </a:prstGeom>
+          <a:solidFill>
+            <a:srgbClr val="C00000">
+              <a:alpha val="10196"/>
+            </a:srgbClr>
+          </a:solidFill>
+          <a:ln>
+            <a:solidFill>
+              <a:schemeClr val="tx1">
+                <a:lumMod val="50000"/>
+                <a:lumOff val="50000"/>
+              </a:schemeClr>
+            </a:solidFill>
+          </a:ln>
+        </p:spPr>
+        <p:style>
+          <a:lnRef idx="2">
+            <a:schemeClr val="accent1">
+              <a:shade val="50000"/>
+            </a:schemeClr>
+          </a:lnRef>
+          <a:fillRef idx="1">
+            <a:schemeClr val="accent1"/>
+          </a:fillRef>
+          <a:effectRef idx="0">
+            <a:schemeClr val="accent1"/>
+          </a:effectRef>
+          <a:fontRef idx="minor">
+            <a:schemeClr val="lt1"/>
+          </a:fontRef>
+        </p:style>
+        <p:txBody>
+          <a:bodyPr rtlCol="0" anchor="ctr"/>
+          <a:lstStyle/>
+          <a:p>
+            <a:pPr algn="ctr"/>
+            <a:endParaRPr lang="en-US" dirty="0"/>
+          </a:p>
+        </p:txBody>
+      </p:sp>
+      <p:sp>
+        <p:nvSpPr>
+          <p:cNvPr id="53" name="Rectangle 52">
+            <a:extLst>
+              <a:ext uri="{FF2B5EF4-FFF2-40B4-BE49-F238E27FC236}">
+                <a16:creationId xmlns:a16="http://schemas.microsoft.com/office/drawing/2014/main" id="{775F8967-93E3-8340-A161-C45CE0E52C0E}"/>
+              </a:ext>
+            </a:extLst>
+          </p:cNvPr>
+          <p:cNvSpPr/>
+          <p:nvPr/>
+        </p:nvSpPr>
+        <p:spPr>
+          <a:xfrm>
+            <a:off x="1127244" y="5949068"/>
+            <a:ext cx="2828741" cy="286601"/>
+          </a:xfrm>
+          <a:prstGeom prst="rect">
+            <a:avLst/>
+          </a:prstGeom>
+          <a:noFill/>
+          <a:ln>
+            <a:noFill/>
+          </a:ln>
+        </p:spPr>
+        <p:style>
+          <a:lnRef idx="2">
+            <a:schemeClr val="accent1">
+              <a:shade val="50000"/>
+            </a:schemeClr>
+          </a:lnRef>
+          <a:fillRef idx="1">
+            <a:schemeClr val="accent1"/>
+          </a:fillRef>
+          <a:effectRef idx="0">
+            <a:schemeClr val="accent1"/>
+          </a:effectRef>
+          <a:fontRef idx="minor">
+            <a:schemeClr val="lt1"/>
+          </a:fontRef>
+        </p:style>
+        <p:txBody>
+          <a:bodyPr rtlCol="0" anchor="ctr"/>
+          <a:lstStyle/>
+          <a:p>
+            <a:r>
+              <a:rPr lang="en-US" sz="2000" dirty="0">
+                <a:solidFill>
+                  <a:srgbClr val="C00000"/>
+                </a:solidFill>
+              </a:rPr>
+              <a:t>&lt;div&gt; . scroller-left-right</a:t>
+            </a:r>
+          </a:p>
+        </p:txBody>
+      </p:sp>
+      <p:sp>
+        <p:nvSpPr>
+          <p:cNvPr id="54" name="Rectangle 53">
+            <a:extLst>
+              <a:ext uri="{FF2B5EF4-FFF2-40B4-BE49-F238E27FC236}">
+                <a16:creationId xmlns:a16="http://schemas.microsoft.com/office/drawing/2014/main" id="{58DC78B5-7018-AB48-9B4D-1F48FEC55097}"/>
+              </a:ext>
+            </a:extLst>
+          </p:cNvPr>
+          <p:cNvSpPr/>
+          <p:nvPr/>
+        </p:nvSpPr>
+        <p:spPr>
+          <a:xfrm>
+            <a:off x="1216998" y="6393077"/>
+            <a:ext cx="1251561" cy="1041831"/>
+          </a:xfrm>
+          <a:prstGeom prst="rect">
+            <a:avLst/>
+          </a:prstGeom>
+          <a:solidFill>
+            <a:schemeClr val="accent5">
+              <a:alpha val="10196"/>
+            </a:schemeClr>
+          </a:solidFill>
+          <a:ln>
+            <a:solidFill>
+              <a:schemeClr val="accent5">
+                <a:lumMod val="50000"/>
+              </a:schemeClr>
+            </a:solidFill>
+          </a:ln>
+        </p:spPr>
+        <p:style>
+          <a:lnRef idx="2">
+            <a:schemeClr val="accent1">
+              <a:shade val="50000"/>
+            </a:schemeClr>
+          </a:lnRef>
+          <a:fillRef idx="1">
+            <a:schemeClr val="accent1"/>
+          </a:fillRef>
+          <a:effectRef idx="0">
+            <a:schemeClr val="accent1"/>
+          </a:effectRef>
+          <a:fontRef idx="minor">
+            <a:schemeClr val="lt1"/>
+          </a:fontRef>
+        </p:style>
+        <p:txBody>
+          <a:bodyPr rtlCol="0" anchor="ctr"/>
+          <a:lstStyle/>
+          <a:p>
+            <a:pPr algn="ctr"/>
+            <a:endParaRPr lang="en-US" dirty="0"/>
+          </a:p>
+        </p:txBody>
+      </p:sp>
+      <p:sp>
+        <p:nvSpPr>
+          <p:cNvPr id="55" name="Rectangle 54">
+            <a:extLst>
+              <a:ext uri="{FF2B5EF4-FFF2-40B4-BE49-F238E27FC236}">
+                <a16:creationId xmlns:a16="http://schemas.microsoft.com/office/drawing/2014/main" id="{B57057F1-5442-004D-B63B-E2D95231F24C}"/>
+              </a:ext>
+            </a:extLst>
+          </p:cNvPr>
+          <p:cNvSpPr/>
+          <p:nvPr/>
+        </p:nvSpPr>
+        <p:spPr>
+          <a:xfrm>
+            <a:off x="1216998" y="6639611"/>
+            <a:ext cx="1324617" cy="548762"/>
+          </a:xfrm>
+          <a:prstGeom prst="rect">
+            <a:avLst/>
+          </a:prstGeom>
+          <a:noFill/>
+          <a:ln>
+            <a:noFill/>
+          </a:ln>
+        </p:spPr>
+        <p:style>
+          <a:lnRef idx="2">
+            <a:schemeClr val="accent1">
+              <a:shade val="50000"/>
+            </a:schemeClr>
+          </a:lnRef>
+          <a:fillRef idx="1">
+            <a:schemeClr val="accent1"/>
+          </a:fillRef>
+          <a:effectRef idx="0">
+            <a:schemeClr val="accent1"/>
+          </a:effectRef>
+          <a:fontRef idx="minor">
+            <a:schemeClr val="lt1"/>
+          </a:fontRef>
+        </p:style>
+        <p:txBody>
+          <a:bodyPr rtlCol="0" anchor="ctr"/>
+          <a:lstStyle/>
+          <a:p>
+            <a:r>
+              <a:rPr lang="en-US" sz="1600" dirty="0">
+                <a:solidFill>
+                  <a:schemeClr val="accent5">
+                    <a:lumMod val="50000"/>
+                  </a:schemeClr>
+                </a:solidFill>
+              </a:rPr>
+              <a:t>&lt;svg&gt; .scroller</a:t>
+            </a:r>
+            <a:br>
+              <a:rPr lang="en-US" sz="1600" dirty="0">
+                <a:solidFill>
+                  <a:schemeClr val="accent5">
+                    <a:lumMod val="50000"/>
+                  </a:schemeClr>
+                </a:solidFill>
+              </a:rPr>
+            </a:br>
+            <a:r>
+              <a:rPr lang="en-US" sz="1600" dirty="0">
+                <a:solidFill>
+                  <a:schemeClr val="accent5">
+                    <a:lumMod val="50000"/>
+                  </a:schemeClr>
+                </a:solidFill>
+              </a:rPr>
+              <a:t>__arrow-left</a:t>
+            </a:r>
+          </a:p>
+        </p:txBody>
+      </p:sp>
+      <p:sp>
+        <p:nvSpPr>
+          <p:cNvPr id="36" name="Rectangle 35">
+            <a:extLst>
+              <a:ext uri="{FF2B5EF4-FFF2-40B4-BE49-F238E27FC236}">
+                <a16:creationId xmlns:a16="http://schemas.microsoft.com/office/drawing/2014/main" id="{69A2AE1B-0D43-C74A-9104-819149D3D9EE}"/>
+              </a:ext>
+            </a:extLst>
+          </p:cNvPr>
+          <p:cNvSpPr/>
+          <p:nvPr/>
+        </p:nvSpPr>
+        <p:spPr>
+          <a:xfrm>
+            <a:off x="2795804" y="2444971"/>
+            <a:ext cx="1340757" cy="569844"/>
+          </a:xfrm>
+          <a:prstGeom prst="rect">
+            <a:avLst/>
+          </a:prstGeom>
+          <a:solidFill>
+            <a:schemeClr val="accent5">
+              <a:alpha val="10196"/>
+            </a:schemeClr>
+          </a:solidFill>
+          <a:ln>
+            <a:solidFill>
+              <a:schemeClr val="accent5">
+                <a:lumMod val="50000"/>
+              </a:schemeClr>
+            </a:solidFill>
+          </a:ln>
+        </p:spPr>
+        <p:style>
+          <a:lnRef idx="2">
+            <a:schemeClr val="accent1">
+              <a:shade val="50000"/>
+            </a:schemeClr>
+          </a:lnRef>
+          <a:fillRef idx="1">
+            <a:schemeClr val="accent1"/>
+          </a:fillRef>
+          <a:effectRef idx="0">
+            <a:schemeClr val="accent1"/>
+          </a:effectRef>
+          <a:fontRef idx="minor">
+            <a:schemeClr val="lt1"/>
+          </a:fontRef>
+        </p:style>
+        <p:txBody>
+          <a:bodyPr rtlCol="0" anchor="ctr"/>
+          <a:lstStyle/>
+          <a:p>
+            <a:pPr algn="ctr"/>
+            <a:endParaRPr lang="en-US" dirty="0"/>
+          </a:p>
+        </p:txBody>
+      </p:sp>
+      <p:sp>
+        <p:nvSpPr>
+          <p:cNvPr id="37" name="Rectangle 36">
+            <a:extLst>
+              <a:ext uri="{FF2B5EF4-FFF2-40B4-BE49-F238E27FC236}">
+                <a16:creationId xmlns:a16="http://schemas.microsoft.com/office/drawing/2014/main" id="{6AB35BE6-BBEB-204D-BAA1-9F77F0106A3A}"/>
+              </a:ext>
+            </a:extLst>
+          </p:cNvPr>
+          <p:cNvSpPr/>
+          <p:nvPr/>
+        </p:nvSpPr>
+        <p:spPr>
+          <a:xfrm>
+            <a:off x="2788185" y="2515226"/>
+            <a:ext cx="1517116" cy="473095"/>
+          </a:xfrm>
+          <a:prstGeom prst="rect">
+            <a:avLst/>
+          </a:prstGeom>
+          <a:noFill/>
+          <a:ln>
+            <a:noFill/>
+          </a:ln>
+        </p:spPr>
+        <p:style>
+          <a:lnRef idx="2">
+            <a:schemeClr val="accent1">
+              <a:shade val="50000"/>
+            </a:schemeClr>
+          </a:lnRef>
+          <a:fillRef idx="1">
+            <a:schemeClr val="accent1"/>
+          </a:fillRef>
+          <a:effectRef idx="0">
+            <a:schemeClr val="accent1"/>
+          </a:effectRef>
+          <a:fontRef idx="minor">
+            <a:schemeClr val="lt1"/>
+          </a:fontRef>
+        </p:style>
+        <p:txBody>
+          <a:bodyPr rtlCol="0" anchor="ctr"/>
+          <a:lstStyle/>
+          <a:p>
+            <a:r>
+              <a:rPr lang="en-US" sz="1600" dirty="0">
+                <a:solidFill>
+                  <a:schemeClr val="accent5">
+                    <a:lumMod val="50000"/>
+                  </a:schemeClr>
+                </a:solidFill>
+              </a:rPr>
+              <a:t>&lt;svg&gt; latest-</a:t>
+            </a:r>
+            <a:r>
+              <a:rPr lang="en-US" sz="1600" dirty="0" err="1">
+                <a:solidFill>
+                  <a:schemeClr val="accent5">
+                    <a:lumMod val="50000"/>
+                  </a:schemeClr>
+                </a:solidFill>
+              </a:rPr>
+              <a:t>works__icon</a:t>
+            </a:r>
+            <a:endParaRPr lang="en-US" sz="1600" dirty="0">
+              <a:solidFill>
+                <a:schemeClr val="accent5">
+                  <a:lumMod val="50000"/>
+                </a:schemeClr>
+              </a:solidFill>
+            </a:endParaRPr>
+          </a:p>
+        </p:txBody>
+      </p:sp>
+      <p:grpSp>
+        <p:nvGrpSpPr>
+          <p:cNvPr id="38" name="Group 37">
+            <a:extLst>
+              <a:ext uri="{FF2B5EF4-FFF2-40B4-BE49-F238E27FC236}">
+                <a16:creationId xmlns:a16="http://schemas.microsoft.com/office/drawing/2014/main" id="{B8009980-1188-0B4C-9FDF-67F0F02F672F}"/>
+              </a:ext>
+            </a:extLst>
+          </p:cNvPr>
+          <p:cNvGrpSpPr/>
+          <p:nvPr/>
+        </p:nvGrpSpPr>
+        <p:grpSpPr>
+          <a:xfrm>
+            <a:off x="10272435" y="2444971"/>
+            <a:ext cx="2321289" cy="591032"/>
+            <a:chOff x="2232840" y="1834122"/>
+            <a:chExt cx="1250160" cy="239815"/>
+          </a:xfrm>
+        </p:grpSpPr>
+        <p:sp>
+          <p:nvSpPr>
+            <p:cNvPr id="39" name="Rectangle 38">
+              <a:extLst>
+                <a:ext uri="{FF2B5EF4-FFF2-40B4-BE49-F238E27FC236}">
+                  <a16:creationId xmlns:a16="http://schemas.microsoft.com/office/drawing/2014/main" id="{CAFCEBA4-3EBB-FA46-BA05-0EC876A35F4F}"/>
+                </a:ext>
+              </a:extLst>
+            </p:cNvPr>
+            <p:cNvSpPr/>
+            <p:nvPr/>
+          </p:nvSpPr>
+          <p:spPr>
+            <a:xfrm>
+              <a:off x="2232840" y="1834122"/>
+              <a:ext cx="869993" cy="239815"/>
+            </a:xfrm>
+            <a:prstGeom prst="rect">
+              <a:avLst/>
+            </a:prstGeom>
+            <a:solidFill>
+              <a:srgbClr val="FF0000">
+                <a:alpha val="10196"/>
+              </a:srgbClr>
+            </a:solidFill>
+            <a:ln>
+              <a:solidFill>
+                <a:srgbClr val="C00000"/>
+              </a:solidFill>
+            </a:ln>
+          </p:spPr>
+          <p:style>
+            <a:lnRef idx="2">
+              <a:schemeClr val="accent1">
+                <a:shade val="50000"/>
+              </a:schemeClr>
+            </a:lnRef>
+            <a:fillRef idx="1">
+              <a:schemeClr val="accent1"/>
+            </a:fillRef>
+            <a:effectRef idx="0">
+              <a:schemeClr val="accent1"/>
+            </a:effectRef>
+            <a:fontRef idx="minor">
+              <a:schemeClr val="lt1"/>
+            </a:fontRef>
+          </p:style>
+          <p:txBody>
+            <a:bodyPr rtlCol="0" anchor="ctr"/>
+            <a:lstStyle/>
+            <a:p>
+              <a:pPr algn="ctr"/>
+              <a:endParaRPr lang="en-US" dirty="0"/>
+            </a:p>
+          </p:txBody>
+        </p:sp>
+        <p:sp>
+          <p:nvSpPr>
+            <p:cNvPr id="45" name="Rectangle 44">
+              <a:extLst>
+                <a:ext uri="{FF2B5EF4-FFF2-40B4-BE49-F238E27FC236}">
+                  <a16:creationId xmlns:a16="http://schemas.microsoft.com/office/drawing/2014/main" id="{6C43979A-A7C7-5342-9B85-0934A2445C6F}"/>
+                </a:ext>
+              </a:extLst>
+            </p:cNvPr>
+            <p:cNvSpPr/>
+            <p:nvPr/>
+          </p:nvSpPr>
+          <p:spPr>
+            <a:xfrm>
+              <a:off x="2232840" y="1850584"/>
+              <a:ext cx="1250160" cy="198293"/>
+            </a:xfrm>
+            <a:prstGeom prst="rect">
+              <a:avLst/>
+            </a:prstGeom>
+            <a:noFill/>
+            <a:ln>
+              <a:noFill/>
+            </a:ln>
+          </p:spPr>
+          <p:style>
+            <a:lnRef idx="2">
+              <a:schemeClr val="accent1">
+                <a:shade val="50000"/>
+              </a:schemeClr>
+            </a:lnRef>
+            <a:fillRef idx="1">
+              <a:schemeClr val="accent1"/>
+            </a:fillRef>
+            <a:effectRef idx="0">
+              <a:schemeClr val="accent1"/>
+            </a:effectRef>
+            <a:fontRef idx="minor">
+              <a:schemeClr val="lt1"/>
+            </a:fontRef>
+          </p:style>
+          <p:txBody>
+            <a:bodyPr rtlCol="0" anchor="ctr"/>
+            <a:lstStyle/>
+            <a:p>
+              <a:r>
+                <a:rPr lang="en-US" sz="1600" dirty="0">
+                  <a:solidFill>
+                    <a:srgbClr val="C00000"/>
+                  </a:solidFill>
+                </a:rPr>
+                <a:t>&lt;div&gt; </a:t>
+              </a:r>
+              <a:br>
+                <a:rPr lang="en-US" sz="1600" dirty="0">
+                  <a:solidFill>
+                    <a:srgbClr val="C00000"/>
+                  </a:solidFill>
+                </a:rPr>
+              </a:br>
+              <a:r>
+                <a:rPr lang="en-US" sz="1600" dirty="0">
+                  <a:solidFill>
+                    <a:srgbClr val="C00000"/>
+                  </a:solidFill>
+                </a:rPr>
+                <a:t>.scroller</a:t>
+              </a:r>
+            </a:p>
+          </p:txBody>
+        </p:sp>
+      </p:grpSp>
+      <p:sp>
+        <p:nvSpPr>
+          <p:cNvPr id="66" name="Rectangle 65">
+            <a:extLst>
+              <a:ext uri="{FF2B5EF4-FFF2-40B4-BE49-F238E27FC236}">
+                <a16:creationId xmlns:a16="http://schemas.microsoft.com/office/drawing/2014/main" id="{E0B49035-2050-3F47-AF80-3CBBF0B731A7}"/>
+              </a:ext>
+            </a:extLst>
+          </p:cNvPr>
+          <p:cNvSpPr/>
+          <p:nvPr/>
+        </p:nvSpPr>
+        <p:spPr>
+          <a:xfrm>
+            <a:off x="2563523" y="6393077"/>
+            <a:ext cx="1251561" cy="1041831"/>
+          </a:xfrm>
+          <a:prstGeom prst="rect">
+            <a:avLst/>
+          </a:prstGeom>
+          <a:solidFill>
+            <a:schemeClr val="accent5">
+              <a:alpha val="10196"/>
+            </a:schemeClr>
+          </a:solidFill>
+          <a:ln>
+            <a:solidFill>
+              <a:schemeClr val="accent5">
+                <a:lumMod val="50000"/>
+              </a:schemeClr>
+            </a:solidFill>
+          </a:ln>
+        </p:spPr>
+        <p:style>
+          <a:lnRef idx="2">
+            <a:schemeClr val="accent1">
+              <a:shade val="50000"/>
+            </a:schemeClr>
+          </a:lnRef>
+          <a:fillRef idx="1">
+            <a:schemeClr val="accent1"/>
+          </a:fillRef>
+          <a:effectRef idx="0">
+            <a:schemeClr val="accent1"/>
+          </a:effectRef>
+          <a:fontRef idx="minor">
+            <a:schemeClr val="lt1"/>
+          </a:fontRef>
+        </p:style>
+        <p:txBody>
+          <a:bodyPr rtlCol="0" anchor="ctr"/>
+          <a:lstStyle/>
+          <a:p>
+            <a:pPr algn="ctr"/>
+            <a:endParaRPr lang="en-US" dirty="0"/>
+          </a:p>
+        </p:txBody>
+      </p:sp>
+      <p:sp>
+        <p:nvSpPr>
+          <p:cNvPr id="67" name="Rectangle 66">
+            <a:extLst>
+              <a:ext uri="{FF2B5EF4-FFF2-40B4-BE49-F238E27FC236}">
+                <a16:creationId xmlns:a16="http://schemas.microsoft.com/office/drawing/2014/main" id="{01C0B53A-273D-684D-BFE0-93AD82E56BEA}"/>
+              </a:ext>
+            </a:extLst>
+          </p:cNvPr>
+          <p:cNvSpPr/>
+          <p:nvPr/>
+        </p:nvSpPr>
+        <p:spPr>
+          <a:xfrm>
+            <a:off x="2563523" y="6639611"/>
+            <a:ext cx="1324617" cy="548762"/>
+          </a:xfrm>
+          <a:prstGeom prst="rect">
+            <a:avLst/>
+          </a:prstGeom>
+          <a:noFill/>
+          <a:ln>
+            <a:noFill/>
+          </a:ln>
+        </p:spPr>
+        <p:style>
+          <a:lnRef idx="2">
+            <a:schemeClr val="accent1">
+              <a:shade val="50000"/>
+            </a:schemeClr>
+          </a:lnRef>
+          <a:fillRef idx="1">
+            <a:schemeClr val="accent1"/>
+          </a:fillRef>
+          <a:effectRef idx="0">
+            <a:schemeClr val="accent1"/>
+          </a:effectRef>
+          <a:fontRef idx="minor">
+            <a:schemeClr val="lt1"/>
+          </a:fontRef>
+        </p:style>
+        <p:txBody>
+          <a:bodyPr rtlCol="0" anchor="ctr"/>
+          <a:lstStyle/>
+          <a:p>
+            <a:r>
+              <a:rPr lang="en-US" sz="1600" dirty="0">
+                <a:solidFill>
+                  <a:schemeClr val="accent5">
+                    <a:lumMod val="50000"/>
+                  </a:schemeClr>
+                </a:solidFill>
+              </a:rPr>
+              <a:t>&lt;svg&gt; .scroller</a:t>
+            </a:r>
+            <a:br>
+              <a:rPr lang="en-US" sz="1600" dirty="0">
+                <a:solidFill>
+                  <a:schemeClr val="accent5">
+                    <a:lumMod val="50000"/>
+                  </a:schemeClr>
+                </a:solidFill>
+              </a:rPr>
+            </a:br>
+            <a:r>
+              <a:rPr lang="en-US" sz="1600" dirty="0">
+                <a:solidFill>
+                  <a:schemeClr val="accent5">
+                    <a:lumMod val="50000"/>
+                  </a:schemeClr>
+                </a:solidFill>
+              </a:rPr>
+              <a:t>__arrow-right</a:t>
+            </a:r>
+          </a:p>
+        </p:txBody>
+      </p:sp>
+    </p:spTree>
+    <p:extLst>
+      <p:ext uri="{BB962C8B-B14F-4D97-AF65-F5344CB8AC3E}">
+        <p14:creationId xmlns:p14="http://schemas.microsoft.com/office/powerpoint/2010/main" val="2179371068"/>
+      </p:ext>
+    </p:extLst>
+  </p:cSld>
+  <p:clrMapOvr>
+    <a:masterClrMapping/>
+  </p:clrMapOvr>
+</p:sld>
+</file>
+
 <file path=ppt/theme/theme1.xml><?xml version="1.0" encoding="utf-8"?>
 <a:theme xmlns:a="http://schemas.openxmlformats.org/drawingml/2006/main" name="Office Theme">
   <a:themeElements>

</xml_diff>

<commit_message>
implemented the "latest works" with a gallery. Scrolling not implemented.
</commit_message>
<xml_diff>
--- a/layout.pptx
+++ b/layout.pptx
@@ -8104,23 +8104,7 @@
                     <a:schemeClr val="accent5"/>
                   </a:solidFill>
                 </a:rPr>
-                <a:t>&lt;div&gt; .content-horizontal-center .</a:t>
-              </a:r>
-              <a:r>
-                <a:rPr lang="en-US" sz="1600" dirty="0" err="1">
-                  <a:solidFill>
-                    <a:schemeClr val="accent5"/>
-                  </a:solidFill>
-                </a:rPr>
-                <a:t>keypoints__flex</a:t>
-              </a:r>
-              <a:r>
-                <a:rPr lang="en-US" sz="1600" dirty="0">
-                  <a:solidFill>
-                    <a:schemeClr val="accent5"/>
-                  </a:solidFill>
-                </a:rPr>
-                <a:t>-container</a:t>
+                <a:t>&lt;div&gt; .content-horizontal-center</a:t>
               </a:r>
             </a:p>
           </p:txBody>
@@ -8512,10 +8496,10 @@
         </p:nvGrpSpPr>
         <p:grpSpPr>
           <a:xfrm>
-            <a:off x="2613673" y="3443624"/>
-            <a:ext cx="3651039" cy="1908469"/>
-            <a:chOff x="842732" y="1939441"/>
-            <a:chExt cx="1966314" cy="774374"/>
+            <a:off x="2613671" y="3398432"/>
+            <a:ext cx="9338188" cy="1953661"/>
+            <a:chOff x="842731" y="1921104"/>
+            <a:chExt cx="5029201" cy="792711"/>
           </a:xfrm>
         </p:grpSpPr>
         <p:sp>
@@ -8532,20 +8516,20 @@
           </p:nvSpPr>
           <p:spPr>
             <a:xfrm>
-              <a:off x="842732" y="1939441"/>
-              <a:ext cx="1966314" cy="774374"/>
+              <a:off x="842731" y="1939441"/>
+              <a:ext cx="5029201" cy="774374"/>
             </a:xfrm>
             <a:prstGeom prst="rect">
               <a:avLst/>
             </a:prstGeom>
             <a:solidFill>
-              <a:schemeClr val="accent6">
+              <a:schemeClr val="accent2">
                 <a:alpha val="10196"/>
               </a:schemeClr>
             </a:solidFill>
             <a:ln>
               <a:solidFill>
-                <a:schemeClr val="accent6">
+                <a:schemeClr val="accent2">
                   <a:lumMod val="50000"/>
                 </a:schemeClr>
               </a:solidFill>
@@ -8590,8 +8574,8 @@
           </p:nvSpPr>
           <p:spPr>
             <a:xfrm>
-              <a:off x="1098665" y="2209679"/>
-              <a:ext cx="1379290" cy="198293"/>
+              <a:off x="862532" y="1921104"/>
+              <a:ext cx="2054527" cy="198293"/>
             </a:xfrm>
             <a:prstGeom prst="rect">
               <a:avLst/>
@@ -8624,30 +8608,33 @@
               <a:r>
                 <a:rPr lang="en-US" sz="1600" dirty="0">
                   <a:solidFill>
-                    <a:schemeClr val="accent6">
+                    <a:schemeClr val="accent2">
                       <a:lumMod val="50000"/>
                     </a:schemeClr>
                   </a:solidFill>
                 </a:rPr>
-                <a:t>&lt;img&gt; .latest-</a:t>
+                <a:t>&lt;div&gt; .latest-</a:t>
               </a:r>
               <a:r>
                 <a:rPr lang="en-US" sz="1600" dirty="0" err="1">
                   <a:solidFill>
-                    <a:schemeClr val="accent6">
+                    <a:schemeClr val="accent2">
                       <a:lumMod val="50000"/>
                     </a:schemeClr>
                   </a:solidFill>
                 </a:rPr>
                 <a:t>works__image</a:t>
               </a:r>
-              <a:endParaRPr lang="en-US" sz="1600" dirty="0">
-                <a:solidFill>
-                  <a:schemeClr val="accent6">
-                    <a:lumMod val="50000"/>
-                  </a:schemeClr>
-                </a:solidFill>
-              </a:endParaRPr>
+              <a:r>
+                <a:rPr lang="en-US" sz="1600" dirty="0">
+                  <a:solidFill>
+                    <a:schemeClr val="accent2">
+                      <a:lumMod val="50000"/>
+                    </a:schemeClr>
+                  </a:solidFill>
+                </a:rPr>
+                <a:t>-container</a:t>
+              </a:r>
             </a:p>
           </p:txBody>
         </p:sp>
@@ -8878,7 +8865,7 @@
                   </a:schemeClr>
                 </a:solidFill>
               </a:rPr>
-              <a:t>&lt;svg&gt; .scroller</a:t>
+              <a:t>&lt;div&gt; .scroller</a:t>
             </a:r>
             <a:br>
               <a:rPr lang="en-US" sz="1600" dirty="0">
@@ -9294,7 +9281,7 @@
                   </a:schemeClr>
                 </a:solidFill>
               </a:rPr>
-              <a:t>&lt;svg&gt; .scroller</a:t>
+              <a:t>&lt;div&gt; .scroller</a:t>
             </a:r>
             <a:br>
               <a:rPr lang="en-US" sz="1600" dirty="0">
@@ -9318,6 +9305,536 @@
           </a:p>
         </p:txBody>
       </p:sp>
+      <p:grpSp>
+        <p:nvGrpSpPr>
+          <p:cNvPr id="68" name="Group 67">
+            <a:extLst>
+              <a:ext uri="{FF2B5EF4-FFF2-40B4-BE49-F238E27FC236}">
+                <a16:creationId xmlns:a16="http://schemas.microsoft.com/office/drawing/2014/main" id="{1D5C3E2B-13F5-CA45-A97C-037D793BCB2E}"/>
+              </a:ext>
+            </a:extLst>
+          </p:cNvPr>
+          <p:cNvGrpSpPr/>
+          <p:nvPr/>
+        </p:nvGrpSpPr>
+        <p:grpSpPr>
+          <a:xfrm>
+            <a:off x="2809083" y="3834401"/>
+            <a:ext cx="2561057" cy="1331958"/>
+            <a:chOff x="842732" y="2019825"/>
+            <a:chExt cx="1379290" cy="540451"/>
+          </a:xfrm>
+        </p:grpSpPr>
+        <p:sp>
+          <p:nvSpPr>
+            <p:cNvPr id="69" name="Rectangle 68">
+              <a:extLst>
+                <a:ext uri="{FF2B5EF4-FFF2-40B4-BE49-F238E27FC236}">
+                  <a16:creationId xmlns:a16="http://schemas.microsoft.com/office/drawing/2014/main" id="{17D6BE07-E211-4D43-83EA-FDAA453C8904}"/>
+                </a:ext>
+              </a:extLst>
+            </p:cNvPr>
+            <p:cNvSpPr/>
+            <p:nvPr/>
+          </p:nvSpPr>
+          <p:spPr>
+            <a:xfrm>
+              <a:off x="842732" y="2019825"/>
+              <a:ext cx="1088639" cy="540451"/>
+            </a:xfrm>
+            <a:prstGeom prst="rect">
+              <a:avLst/>
+            </a:prstGeom>
+            <a:solidFill>
+              <a:schemeClr val="accent6">
+                <a:alpha val="10196"/>
+              </a:schemeClr>
+            </a:solidFill>
+            <a:ln>
+              <a:solidFill>
+                <a:schemeClr val="accent6">
+                  <a:lumMod val="50000"/>
+                </a:schemeClr>
+              </a:solidFill>
+            </a:ln>
+          </p:spPr>
+          <p:style>
+            <a:lnRef idx="2">
+              <a:schemeClr val="accent1">
+                <a:shade val="50000"/>
+              </a:schemeClr>
+            </a:lnRef>
+            <a:fillRef idx="1">
+              <a:schemeClr val="accent1"/>
+            </a:fillRef>
+            <a:effectRef idx="0">
+              <a:schemeClr val="accent1"/>
+            </a:effectRef>
+            <a:fontRef idx="minor">
+              <a:schemeClr val="lt1"/>
+            </a:fontRef>
+          </p:style>
+          <p:txBody>
+            <a:bodyPr rtlCol="0" anchor="ctr"/>
+            <a:lstStyle/>
+            <a:p>
+              <a:pPr algn="ctr"/>
+              <a:endParaRPr lang="en-US" dirty="0"/>
+            </a:p>
+          </p:txBody>
+        </p:sp>
+        <p:sp>
+          <p:nvSpPr>
+            <p:cNvPr id="70" name="Rectangle 69">
+              <a:extLst>
+                <a:ext uri="{FF2B5EF4-FFF2-40B4-BE49-F238E27FC236}">
+                  <a16:creationId xmlns:a16="http://schemas.microsoft.com/office/drawing/2014/main" id="{65787492-143B-2D44-96F3-B45B755C4486}"/>
+                </a:ext>
+              </a:extLst>
+            </p:cNvPr>
+            <p:cNvSpPr/>
+            <p:nvPr/>
+          </p:nvSpPr>
+          <p:spPr>
+            <a:xfrm>
+              <a:off x="842732" y="2046553"/>
+              <a:ext cx="1379290" cy="445702"/>
+            </a:xfrm>
+            <a:prstGeom prst="rect">
+              <a:avLst/>
+            </a:prstGeom>
+            <a:noFill/>
+            <a:ln>
+              <a:noFill/>
+            </a:ln>
+          </p:spPr>
+          <p:style>
+            <a:lnRef idx="2">
+              <a:schemeClr val="accent1">
+                <a:shade val="50000"/>
+              </a:schemeClr>
+            </a:lnRef>
+            <a:fillRef idx="1">
+              <a:schemeClr val="accent1"/>
+            </a:fillRef>
+            <a:effectRef idx="0">
+              <a:schemeClr val="accent1"/>
+            </a:effectRef>
+            <a:fontRef idx="minor">
+              <a:schemeClr val="lt1"/>
+            </a:fontRef>
+          </p:style>
+          <p:txBody>
+            <a:bodyPr rtlCol="0" anchor="ctr"/>
+            <a:lstStyle/>
+            <a:p>
+              <a:r>
+                <a:rPr lang="en-US" sz="1600" dirty="0">
+                  <a:solidFill>
+                    <a:schemeClr val="accent6">
+                      <a:lumMod val="50000"/>
+                    </a:schemeClr>
+                  </a:solidFill>
+                </a:rPr>
+                <a:t>&lt;img&gt; </a:t>
+              </a:r>
+            </a:p>
+            <a:p>
+              <a:r>
+                <a:rPr lang="en-US" sz="1600" dirty="0">
+                  <a:solidFill>
+                    <a:schemeClr val="accent6">
+                      <a:lumMod val="50000"/>
+                    </a:schemeClr>
+                  </a:solidFill>
+                </a:rPr>
+                <a:t>.latest-</a:t>
+              </a:r>
+              <a:r>
+                <a:rPr lang="en-US" sz="1600" dirty="0" err="1">
+                  <a:solidFill>
+                    <a:schemeClr val="accent6">
+                      <a:lumMod val="50000"/>
+                    </a:schemeClr>
+                  </a:solidFill>
+                </a:rPr>
+                <a:t>works__image</a:t>
+              </a:r>
+              <a:endParaRPr lang="en-US" sz="1600" dirty="0">
+                <a:solidFill>
+                  <a:schemeClr val="accent6">
+                    <a:lumMod val="50000"/>
+                  </a:schemeClr>
+                </a:solidFill>
+              </a:endParaRPr>
+            </a:p>
+            <a:p>
+              <a:r>
+                <a:rPr lang="en-US" sz="1600" dirty="0">
+                  <a:solidFill>
+                    <a:schemeClr val="accent6">
+                      <a:lumMod val="50000"/>
+                    </a:schemeClr>
+                  </a:solidFill>
+                </a:rPr>
+                <a:t>[</a:t>
+              </a:r>
+              <a:r>
+                <a:rPr lang="en-US" sz="1600">
+                  <a:solidFill>
+                    <a:schemeClr val="accent6">
+                      <a:lumMod val="50000"/>
+                    </a:schemeClr>
+                  </a:solidFill>
+                </a:rPr>
+                <a:t>image 230x130</a:t>
+              </a:r>
+              <a:r>
+                <a:rPr lang="en-US" sz="1600" dirty="0">
+                  <a:solidFill>
+                    <a:schemeClr val="accent6">
+                      <a:lumMod val="50000"/>
+                    </a:schemeClr>
+                  </a:solidFill>
+                </a:rPr>
+                <a:t>]</a:t>
+              </a:r>
+            </a:p>
+          </p:txBody>
+        </p:sp>
+      </p:grpSp>
+      <p:grpSp>
+        <p:nvGrpSpPr>
+          <p:cNvPr id="71" name="Group 70">
+            <a:extLst>
+              <a:ext uri="{FF2B5EF4-FFF2-40B4-BE49-F238E27FC236}">
+                <a16:creationId xmlns:a16="http://schemas.microsoft.com/office/drawing/2014/main" id="{FDBDEBB9-0410-224A-9D05-85680C1AF0EA}"/>
+              </a:ext>
+            </a:extLst>
+          </p:cNvPr>
+          <p:cNvGrpSpPr/>
+          <p:nvPr/>
+        </p:nvGrpSpPr>
+        <p:grpSpPr>
+          <a:xfrm>
+            <a:off x="5085138" y="3834401"/>
+            <a:ext cx="2561057" cy="1331958"/>
+            <a:chOff x="842732" y="2019825"/>
+            <a:chExt cx="1379290" cy="540451"/>
+          </a:xfrm>
+        </p:grpSpPr>
+        <p:sp>
+          <p:nvSpPr>
+            <p:cNvPr id="72" name="Rectangle 71">
+              <a:extLst>
+                <a:ext uri="{FF2B5EF4-FFF2-40B4-BE49-F238E27FC236}">
+                  <a16:creationId xmlns:a16="http://schemas.microsoft.com/office/drawing/2014/main" id="{272419D1-7545-BA41-84FB-6A8BDFE570A4}"/>
+                </a:ext>
+              </a:extLst>
+            </p:cNvPr>
+            <p:cNvSpPr/>
+            <p:nvPr/>
+          </p:nvSpPr>
+          <p:spPr>
+            <a:xfrm>
+              <a:off x="842732" y="2019825"/>
+              <a:ext cx="1088639" cy="540451"/>
+            </a:xfrm>
+            <a:prstGeom prst="rect">
+              <a:avLst/>
+            </a:prstGeom>
+            <a:solidFill>
+              <a:schemeClr val="accent6">
+                <a:alpha val="10196"/>
+              </a:schemeClr>
+            </a:solidFill>
+            <a:ln>
+              <a:solidFill>
+                <a:schemeClr val="accent6">
+                  <a:lumMod val="50000"/>
+                </a:schemeClr>
+              </a:solidFill>
+            </a:ln>
+          </p:spPr>
+          <p:style>
+            <a:lnRef idx="2">
+              <a:schemeClr val="accent1">
+                <a:shade val="50000"/>
+              </a:schemeClr>
+            </a:lnRef>
+            <a:fillRef idx="1">
+              <a:schemeClr val="accent1"/>
+            </a:fillRef>
+            <a:effectRef idx="0">
+              <a:schemeClr val="accent1"/>
+            </a:effectRef>
+            <a:fontRef idx="minor">
+              <a:schemeClr val="lt1"/>
+            </a:fontRef>
+          </p:style>
+          <p:txBody>
+            <a:bodyPr rtlCol="0" anchor="ctr"/>
+            <a:lstStyle/>
+            <a:p>
+              <a:pPr algn="ctr"/>
+              <a:endParaRPr lang="en-US" dirty="0"/>
+            </a:p>
+          </p:txBody>
+        </p:sp>
+        <p:sp>
+          <p:nvSpPr>
+            <p:cNvPr id="73" name="Rectangle 72">
+              <a:extLst>
+                <a:ext uri="{FF2B5EF4-FFF2-40B4-BE49-F238E27FC236}">
+                  <a16:creationId xmlns:a16="http://schemas.microsoft.com/office/drawing/2014/main" id="{339D0DDF-76EF-DD4E-B405-9C6E5DE3CEEE}"/>
+                </a:ext>
+              </a:extLst>
+            </p:cNvPr>
+            <p:cNvSpPr/>
+            <p:nvPr/>
+          </p:nvSpPr>
+          <p:spPr>
+            <a:xfrm>
+              <a:off x="842732" y="2046553"/>
+              <a:ext cx="1379290" cy="198293"/>
+            </a:xfrm>
+            <a:prstGeom prst="rect">
+              <a:avLst/>
+            </a:prstGeom>
+            <a:noFill/>
+            <a:ln>
+              <a:noFill/>
+            </a:ln>
+          </p:spPr>
+          <p:style>
+            <a:lnRef idx="2">
+              <a:schemeClr val="accent1">
+                <a:shade val="50000"/>
+              </a:schemeClr>
+            </a:lnRef>
+            <a:fillRef idx="1">
+              <a:schemeClr val="accent1"/>
+            </a:fillRef>
+            <a:effectRef idx="0">
+              <a:schemeClr val="accent1"/>
+            </a:effectRef>
+            <a:fontRef idx="minor">
+              <a:schemeClr val="lt1"/>
+            </a:fontRef>
+          </p:style>
+          <p:txBody>
+            <a:bodyPr rtlCol="0" anchor="ctr"/>
+            <a:lstStyle/>
+            <a:p>
+              <a:r>
+                <a:rPr lang="en-US" sz="1600" dirty="0">
+                  <a:solidFill>
+                    <a:schemeClr val="accent6">
+                      <a:lumMod val="50000"/>
+                    </a:schemeClr>
+                  </a:solidFill>
+                </a:rPr>
+                <a:t>&lt;img&gt; </a:t>
+              </a:r>
+            </a:p>
+            <a:p>
+              <a:r>
+                <a:rPr lang="en-US" sz="1600" dirty="0">
+                  <a:solidFill>
+                    <a:schemeClr val="accent6">
+                      <a:lumMod val="50000"/>
+                    </a:schemeClr>
+                  </a:solidFill>
+                </a:rPr>
+                <a:t>.latest-</a:t>
+              </a:r>
+              <a:r>
+                <a:rPr lang="en-US" sz="1600" dirty="0" err="1">
+                  <a:solidFill>
+                    <a:schemeClr val="accent6">
+                      <a:lumMod val="50000"/>
+                    </a:schemeClr>
+                  </a:solidFill>
+                </a:rPr>
+                <a:t>works__image</a:t>
+              </a:r>
+              <a:endParaRPr lang="en-US" sz="1600" dirty="0">
+                <a:solidFill>
+                  <a:schemeClr val="accent6">
+                    <a:lumMod val="50000"/>
+                  </a:schemeClr>
+                </a:solidFill>
+              </a:endParaRPr>
+            </a:p>
+          </p:txBody>
+        </p:sp>
+      </p:grpSp>
+      <p:grpSp>
+        <p:nvGrpSpPr>
+          <p:cNvPr id="74" name="Group 73">
+            <a:extLst>
+              <a:ext uri="{FF2B5EF4-FFF2-40B4-BE49-F238E27FC236}">
+                <a16:creationId xmlns:a16="http://schemas.microsoft.com/office/drawing/2014/main" id="{D9D90B19-A5CA-C741-B241-228F4924DBF0}"/>
+              </a:ext>
+            </a:extLst>
+          </p:cNvPr>
+          <p:cNvGrpSpPr/>
+          <p:nvPr/>
+        </p:nvGrpSpPr>
+        <p:grpSpPr>
+          <a:xfrm>
+            <a:off x="7361193" y="3834401"/>
+            <a:ext cx="2561057" cy="1331958"/>
+            <a:chOff x="842732" y="2019825"/>
+            <a:chExt cx="1379290" cy="540451"/>
+          </a:xfrm>
+        </p:grpSpPr>
+        <p:sp>
+          <p:nvSpPr>
+            <p:cNvPr id="75" name="Rectangle 74">
+              <a:extLst>
+                <a:ext uri="{FF2B5EF4-FFF2-40B4-BE49-F238E27FC236}">
+                  <a16:creationId xmlns:a16="http://schemas.microsoft.com/office/drawing/2014/main" id="{A061DA4C-D894-AE42-BA4D-D0AA3165C679}"/>
+                </a:ext>
+              </a:extLst>
+            </p:cNvPr>
+            <p:cNvSpPr/>
+            <p:nvPr/>
+          </p:nvSpPr>
+          <p:spPr>
+            <a:xfrm>
+              <a:off x="842732" y="2019825"/>
+              <a:ext cx="1088639" cy="540451"/>
+            </a:xfrm>
+            <a:prstGeom prst="rect">
+              <a:avLst/>
+            </a:prstGeom>
+            <a:solidFill>
+              <a:schemeClr val="accent6">
+                <a:alpha val="10196"/>
+              </a:schemeClr>
+            </a:solidFill>
+            <a:ln>
+              <a:solidFill>
+                <a:schemeClr val="accent6">
+                  <a:lumMod val="50000"/>
+                </a:schemeClr>
+              </a:solidFill>
+            </a:ln>
+          </p:spPr>
+          <p:style>
+            <a:lnRef idx="2">
+              <a:schemeClr val="accent1">
+                <a:shade val="50000"/>
+              </a:schemeClr>
+            </a:lnRef>
+            <a:fillRef idx="1">
+              <a:schemeClr val="accent1"/>
+            </a:fillRef>
+            <a:effectRef idx="0">
+              <a:schemeClr val="accent1"/>
+            </a:effectRef>
+            <a:fontRef idx="minor">
+              <a:schemeClr val="lt1"/>
+            </a:fontRef>
+          </p:style>
+          <p:txBody>
+            <a:bodyPr rtlCol="0" anchor="ctr"/>
+            <a:lstStyle/>
+            <a:p>
+              <a:pPr algn="ctr"/>
+              <a:endParaRPr lang="en-US" dirty="0"/>
+            </a:p>
+          </p:txBody>
+        </p:sp>
+        <p:sp>
+          <p:nvSpPr>
+            <p:cNvPr id="76" name="Rectangle 75">
+              <a:extLst>
+                <a:ext uri="{FF2B5EF4-FFF2-40B4-BE49-F238E27FC236}">
+                  <a16:creationId xmlns:a16="http://schemas.microsoft.com/office/drawing/2014/main" id="{0A6FBB0C-9D9D-CE4E-9E7D-A509BF4F5649}"/>
+                </a:ext>
+              </a:extLst>
+            </p:cNvPr>
+            <p:cNvSpPr/>
+            <p:nvPr/>
+          </p:nvSpPr>
+          <p:spPr>
+            <a:xfrm>
+              <a:off x="842732" y="2046553"/>
+              <a:ext cx="1379290" cy="198293"/>
+            </a:xfrm>
+            <a:prstGeom prst="rect">
+              <a:avLst/>
+            </a:prstGeom>
+            <a:noFill/>
+            <a:ln>
+              <a:noFill/>
+            </a:ln>
+          </p:spPr>
+          <p:style>
+            <a:lnRef idx="2">
+              <a:schemeClr val="accent1">
+                <a:shade val="50000"/>
+              </a:schemeClr>
+            </a:lnRef>
+            <a:fillRef idx="1">
+              <a:schemeClr val="accent1"/>
+            </a:fillRef>
+            <a:effectRef idx="0">
+              <a:schemeClr val="accent1"/>
+            </a:effectRef>
+            <a:fontRef idx="minor">
+              <a:schemeClr val="lt1"/>
+            </a:fontRef>
+          </p:style>
+          <p:txBody>
+            <a:bodyPr rtlCol="0" anchor="ctr"/>
+            <a:lstStyle/>
+            <a:p>
+              <a:r>
+                <a:rPr lang="en-US" sz="1600" dirty="0">
+                  <a:solidFill>
+                    <a:schemeClr val="accent6">
+                      <a:lumMod val="50000"/>
+                    </a:schemeClr>
+                  </a:solidFill>
+                </a:rPr>
+                <a:t>&lt;img&gt; </a:t>
+              </a:r>
+            </a:p>
+            <a:p>
+              <a:r>
+                <a:rPr lang="en-US" sz="1600" dirty="0">
+                  <a:solidFill>
+                    <a:schemeClr val="accent6">
+                      <a:lumMod val="50000"/>
+                    </a:schemeClr>
+                  </a:solidFill>
+                </a:rPr>
+                <a:t>.latest-</a:t>
+              </a:r>
+              <a:r>
+                <a:rPr lang="en-US" sz="1600" dirty="0" err="1">
+                  <a:solidFill>
+                    <a:schemeClr val="accent6">
+                      <a:lumMod val="50000"/>
+                    </a:schemeClr>
+                  </a:solidFill>
+                </a:rPr>
+                <a:t>works__image</a:t>
+              </a:r>
+              <a:endParaRPr lang="en-US" sz="1600" dirty="0">
+                <a:solidFill>
+                  <a:schemeClr val="accent6">
+                    <a:lumMod val="50000"/>
+                  </a:schemeClr>
+                </a:solidFill>
+              </a:endParaRPr>
+            </a:p>
+          </p:txBody>
+        </p:sp>
+      </p:grpSp>
     </p:spTree>
     <p:extLst>
       <p:ext uri="{BB962C8B-B14F-4D97-AF65-F5344CB8AC3E}">

</xml_diff>

<commit_message>
prepared a preliminary version of the layout for the "testimonials" and "our clients" sections
</commit_message>
<xml_diff>
--- a/layout.pptx
+++ b/layout.pptx
@@ -10,6 +10,7 @@
     <p:sldId id="260" r:id="rId4"/>
     <p:sldId id="261" r:id="rId5"/>
     <p:sldId id="262" r:id="rId6"/>
+    <p:sldId id="263" r:id="rId7"/>
   </p:sldIdLst>
   <p:sldSz cx="16256000" cy="12192000"/>
   <p:notesSz cx="6858000" cy="9144000"/>
@@ -9477,38 +9478,263 @@
                     </a:schemeClr>
                   </a:solidFill>
                 </a:rPr>
-                <a:t>[</a:t>
-              </a:r>
-              <a:r>
-                <a:rPr lang="en-US" sz="1600">
-                  <a:solidFill>
-                    <a:schemeClr val="accent6">
-                      <a:lumMod val="50000"/>
-                    </a:schemeClr>
-                  </a:solidFill>
-                </a:rPr>
-                <a:t>image 230x130</a:t>
-              </a:r>
-              <a:r>
-                <a:rPr lang="en-US" sz="1600" dirty="0">
-                  <a:solidFill>
-                    <a:schemeClr val="accent6">
-                      <a:lumMod val="50000"/>
-                    </a:schemeClr>
-                  </a:solidFill>
-                </a:rPr>
-                <a:t>]</a:t>
+                <a:t>[image 230x130]</a:t>
               </a:r>
             </a:p>
           </p:txBody>
         </p:sp>
       </p:grpSp>
+      <p:sp>
+        <p:nvSpPr>
+          <p:cNvPr id="72" name="Rectangle 71">
+            <a:extLst>
+              <a:ext uri="{FF2B5EF4-FFF2-40B4-BE49-F238E27FC236}">
+                <a16:creationId xmlns:a16="http://schemas.microsoft.com/office/drawing/2014/main" id="{272419D1-7545-BA41-84FB-6A8BDFE570A4}"/>
+              </a:ext>
+            </a:extLst>
+          </p:cNvPr>
+          <p:cNvSpPr/>
+          <p:nvPr/>
+        </p:nvSpPr>
+        <p:spPr>
+          <a:xfrm>
+            <a:off x="5085138" y="3834401"/>
+            <a:ext cx="2021378" cy="1331958"/>
+          </a:xfrm>
+          <a:prstGeom prst="rect">
+            <a:avLst/>
+          </a:prstGeom>
+          <a:solidFill>
+            <a:schemeClr val="accent6">
+              <a:alpha val="10196"/>
+            </a:schemeClr>
+          </a:solidFill>
+          <a:ln>
+            <a:solidFill>
+              <a:schemeClr val="accent6">
+                <a:lumMod val="50000"/>
+              </a:schemeClr>
+            </a:solidFill>
+          </a:ln>
+        </p:spPr>
+        <p:style>
+          <a:lnRef idx="2">
+            <a:schemeClr val="accent1">
+              <a:shade val="50000"/>
+            </a:schemeClr>
+          </a:lnRef>
+          <a:fillRef idx="1">
+            <a:schemeClr val="accent1"/>
+          </a:fillRef>
+          <a:effectRef idx="0">
+            <a:schemeClr val="accent1"/>
+          </a:effectRef>
+          <a:fontRef idx="minor">
+            <a:schemeClr val="lt1"/>
+          </a:fontRef>
+        </p:style>
+        <p:txBody>
+          <a:bodyPr rtlCol="0" anchor="ctr"/>
+          <a:lstStyle/>
+          <a:p>
+            <a:pPr algn="ctr"/>
+            <a:endParaRPr lang="en-US" dirty="0"/>
+          </a:p>
+        </p:txBody>
+      </p:sp>
+      <p:sp>
+        <p:nvSpPr>
+          <p:cNvPr id="75" name="Rectangle 74">
+            <a:extLst>
+              <a:ext uri="{FF2B5EF4-FFF2-40B4-BE49-F238E27FC236}">
+                <a16:creationId xmlns:a16="http://schemas.microsoft.com/office/drawing/2014/main" id="{A061DA4C-D894-AE42-BA4D-D0AA3165C679}"/>
+              </a:ext>
+            </a:extLst>
+          </p:cNvPr>
+          <p:cNvSpPr/>
+          <p:nvPr/>
+        </p:nvSpPr>
+        <p:spPr>
+          <a:xfrm>
+            <a:off x="7361193" y="3834401"/>
+            <a:ext cx="2021378" cy="1331958"/>
+          </a:xfrm>
+          <a:prstGeom prst="rect">
+            <a:avLst/>
+          </a:prstGeom>
+          <a:solidFill>
+            <a:schemeClr val="accent6">
+              <a:alpha val="10196"/>
+            </a:schemeClr>
+          </a:solidFill>
+          <a:ln>
+            <a:solidFill>
+              <a:schemeClr val="accent6">
+                <a:lumMod val="50000"/>
+              </a:schemeClr>
+            </a:solidFill>
+          </a:ln>
+        </p:spPr>
+        <p:style>
+          <a:lnRef idx="2">
+            <a:schemeClr val="accent1">
+              <a:shade val="50000"/>
+            </a:schemeClr>
+          </a:lnRef>
+          <a:fillRef idx="1">
+            <a:schemeClr val="accent1"/>
+          </a:fillRef>
+          <a:effectRef idx="0">
+            <a:schemeClr val="accent1"/>
+          </a:effectRef>
+          <a:fontRef idx="minor">
+            <a:schemeClr val="lt1"/>
+          </a:fontRef>
+        </p:style>
+        <p:txBody>
+          <a:bodyPr rtlCol="0" anchor="ctr"/>
+          <a:lstStyle/>
+          <a:p>
+            <a:pPr algn="ctr"/>
+            <a:endParaRPr lang="en-US" dirty="0"/>
+          </a:p>
+        </p:txBody>
+      </p:sp>
+    </p:spTree>
+    <p:extLst>
+      <p:ext uri="{BB962C8B-B14F-4D97-AF65-F5344CB8AC3E}">
+        <p14:creationId xmlns:p14="http://schemas.microsoft.com/office/powerpoint/2010/main" val="2179371068"/>
+      </p:ext>
+    </p:extLst>
+  </p:cSld>
+  <p:clrMapOvr>
+    <a:masterClrMapping/>
+  </p:clrMapOvr>
+</p:sld>
+</file>
+
+<file path=ppt/slides/slide6.xml><?xml version="1.0" encoding="utf-8"?>
+<p:sld xmlns:a="http://schemas.openxmlformats.org/drawingml/2006/main" xmlns:r="http://schemas.openxmlformats.org/officeDocument/2006/relationships" xmlns:p="http://schemas.openxmlformats.org/presentationml/2006/main">
+  <p:cSld>
+    <p:spTree>
+      <p:nvGrpSpPr>
+        <p:cNvPr id="1" name=""/>
+        <p:cNvGrpSpPr/>
+        <p:nvPr/>
+      </p:nvGrpSpPr>
+      <p:grpSpPr>
+        <a:xfrm>
+          <a:off x="0" y="0"/>
+          <a:ext cx="0" cy="0"/>
+          <a:chOff x="0" y="0"/>
+          <a:chExt cx="0" cy="0"/>
+        </a:xfrm>
+      </p:grpSpPr>
+      <p:sp>
+        <p:nvSpPr>
+          <p:cNvPr id="4" name="TextBox 3">
+            <a:extLst>
+              <a:ext uri="{FF2B5EF4-FFF2-40B4-BE49-F238E27FC236}">
+                <a16:creationId xmlns:a16="http://schemas.microsoft.com/office/drawing/2014/main" id="{4E45CDFE-59FB-F74F-A73B-6933C90EBAEE}"/>
+              </a:ext>
+            </a:extLst>
+          </p:cNvPr>
+          <p:cNvSpPr txBox="1"/>
+          <p:nvPr/>
+        </p:nvSpPr>
+        <p:spPr>
+          <a:xfrm>
+            <a:off x="443346" y="360218"/>
+            <a:ext cx="4304448" cy="1938992"/>
+          </a:xfrm>
+          <a:prstGeom prst="rect">
+            <a:avLst/>
+          </a:prstGeom>
+          <a:noFill/>
+        </p:spPr>
+        <p:txBody>
+          <a:bodyPr wrap="none" rtlCol="0">
+            <a:spAutoFit/>
+          </a:bodyPr>
+          <a:lstStyle/>
+          <a:p>
+            <a:r>
+              <a:rPr lang="en-BY" sz="4000" dirty="0"/>
+              <a:t>Testimonials</a:t>
+            </a:r>
+          </a:p>
+          <a:p>
+            <a:r>
+              <a:rPr lang="en-BY" sz="4000" dirty="0"/>
+              <a:t>and </a:t>
+            </a:r>
+          </a:p>
+          <a:p>
+            <a:r>
+              <a:rPr lang="en-BY" sz="4000" dirty="0"/>
+              <a:t>Our Clients sections</a:t>
+            </a:r>
+            <a:endParaRPr lang="en-BY" dirty="0"/>
+          </a:p>
+        </p:txBody>
+      </p:sp>
+      <p:sp>
+        <p:nvSpPr>
+          <p:cNvPr id="16" name="Rectangle 15">
+            <a:extLst>
+              <a:ext uri="{FF2B5EF4-FFF2-40B4-BE49-F238E27FC236}">
+                <a16:creationId xmlns:a16="http://schemas.microsoft.com/office/drawing/2014/main" id="{3178C7DD-2D9B-D344-9FB1-89BF70EB1B23}"/>
+              </a:ext>
+            </a:extLst>
+          </p:cNvPr>
+          <p:cNvSpPr/>
+          <p:nvPr/>
+        </p:nvSpPr>
+        <p:spPr>
+          <a:xfrm>
+            <a:off x="856980" y="2456720"/>
+            <a:ext cx="12413183" cy="3856288"/>
+          </a:xfrm>
+          <a:prstGeom prst="rect">
+            <a:avLst/>
+          </a:prstGeom>
+          <a:solidFill>
+            <a:schemeClr val="bg1">
+              <a:lumMod val="95000"/>
+            </a:schemeClr>
+          </a:solidFill>
+        </p:spPr>
+        <p:style>
+          <a:lnRef idx="2">
+            <a:schemeClr val="accent1">
+              <a:shade val="50000"/>
+            </a:schemeClr>
+          </a:lnRef>
+          <a:fillRef idx="1">
+            <a:schemeClr val="accent1"/>
+          </a:fillRef>
+          <a:effectRef idx="0">
+            <a:schemeClr val="accent1"/>
+          </a:effectRef>
+          <a:fontRef idx="minor">
+            <a:schemeClr val="lt1"/>
+          </a:fontRef>
+        </p:style>
+        <p:txBody>
+          <a:bodyPr rtlCol="0" anchor="ctr"/>
+          <a:lstStyle/>
+          <a:p>
+            <a:pPr algn="ctr"/>
+            <a:endParaRPr lang="en-US"/>
+          </a:p>
+        </p:txBody>
+      </p:sp>
       <p:grpSp>
         <p:nvGrpSpPr>
-          <p:cNvPr id="71" name="Group 70">
+          <p:cNvPr id="17" name="Group 16">
             <a:extLst>
               <a:ext uri="{FF2B5EF4-FFF2-40B4-BE49-F238E27FC236}">
-                <a16:creationId xmlns:a16="http://schemas.microsoft.com/office/drawing/2014/main" id="{FDBDEBB9-0410-224A-9D05-85680C1AF0EA}"/>
+                <a16:creationId xmlns:a16="http://schemas.microsoft.com/office/drawing/2014/main" id="{C9880EC7-75D0-2E45-B27E-9CEE6201A1FF}"/>
               </a:ext>
             </a:extLst>
           </p:cNvPr>
@@ -9517,18 +9743,18 @@
         </p:nvGrpSpPr>
         <p:grpSpPr>
           <a:xfrm>
-            <a:off x="5085138" y="3834401"/>
-            <a:ext cx="2561057" cy="1331958"/>
-            <a:chOff x="842732" y="2019825"/>
-            <a:chExt cx="1379290" cy="540451"/>
+            <a:off x="2158666" y="2477494"/>
+            <a:ext cx="9809810" cy="3835514"/>
+            <a:chOff x="787400" y="646563"/>
+            <a:chExt cx="5283200" cy="1431468"/>
           </a:xfrm>
         </p:grpSpPr>
         <p:sp>
           <p:nvSpPr>
-            <p:cNvPr id="72" name="Rectangle 71">
+            <p:cNvPr id="18" name="Rectangle 17">
               <a:extLst>
                 <a:ext uri="{FF2B5EF4-FFF2-40B4-BE49-F238E27FC236}">
-                  <a16:creationId xmlns:a16="http://schemas.microsoft.com/office/drawing/2014/main" id="{272419D1-7545-BA41-84FB-6A8BDFE570A4}"/>
+                  <a16:creationId xmlns:a16="http://schemas.microsoft.com/office/drawing/2014/main" id="{8AFBF417-F05E-8E4F-8390-52398C96C588}"/>
                 </a:ext>
               </a:extLst>
             </p:cNvPr>
@@ -9537,8 +9763,994 @@
           </p:nvSpPr>
           <p:spPr>
             <a:xfrm>
-              <a:off x="842732" y="2019825"/>
-              <a:ext cx="1088639" cy="540451"/>
+              <a:off x="787400" y="650240"/>
+              <a:ext cx="5283200" cy="1427791"/>
+            </a:xfrm>
+            <a:prstGeom prst="rect">
+              <a:avLst/>
+            </a:prstGeom>
+            <a:solidFill>
+              <a:srgbClr val="5B9BD5">
+                <a:alpha val="10196"/>
+              </a:srgbClr>
+            </a:solidFill>
+            <a:ln>
+              <a:solidFill>
+                <a:schemeClr val="accent5"/>
+              </a:solidFill>
+            </a:ln>
+          </p:spPr>
+          <p:style>
+            <a:lnRef idx="2">
+              <a:schemeClr val="accent1">
+                <a:shade val="50000"/>
+              </a:schemeClr>
+            </a:lnRef>
+            <a:fillRef idx="1">
+              <a:schemeClr val="accent1"/>
+            </a:fillRef>
+            <a:effectRef idx="0">
+              <a:schemeClr val="accent1"/>
+            </a:effectRef>
+            <a:fontRef idx="minor">
+              <a:schemeClr val="lt1"/>
+            </a:fontRef>
+          </p:style>
+          <p:txBody>
+            <a:bodyPr rtlCol="0" anchor="ctr"/>
+            <a:lstStyle/>
+            <a:p>
+              <a:pPr algn="ctr"/>
+              <a:endParaRPr lang="en-US" dirty="0"/>
+            </a:p>
+          </p:txBody>
+        </p:sp>
+        <p:sp>
+          <p:nvSpPr>
+            <p:cNvPr id="19" name="Rectangle 18">
+              <a:extLst>
+                <a:ext uri="{FF2B5EF4-FFF2-40B4-BE49-F238E27FC236}">
+                  <a16:creationId xmlns:a16="http://schemas.microsoft.com/office/drawing/2014/main" id="{91869B45-4A01-164E-98E2-ADB9CC3952C9}"/>
+                </a:ext>
+              </a:extLst>
+            </p:cNvPr>
+            <p:cNvSpPr/>
+            <p:nvPr/>
+          </p:nvSpPr>
+          <p:spPr>
+            <a:xfrm>
+              <a:off x="787400" y="646563"/>
+              <a:ext cx="2878104" cy="130653"/>
+            </a:xfrm>
+            <a:prstGeom prst="rect">
+              <a:avLst/>
+            </a:prstGeom>
+            <a:noFill/>
+            <a:ln>
+              <a:noFill/>
+            </a:ln>
+          </p:spPr>
+          <p:style>
+            <a:lnRef idx="2">
+              <a:schemeClr val="accent1">
+                <a:shade val="50000"/>
+              </a:schemeClr>
+            </a:lnRef>
+            <a:fillRef idx="1">
+              <a:schemeClr val="accent1"/>
+            </a:fillRef>
+            <a:effectRef idx="0">
+              <a:schemeClr val="accent1"/>
+            </a:effectRef>
+            <a:fontRef idx="minor">
+              <a:schemeClr val="lt1"/>
+            </a:fontRef>
+          </p:style>
+          <p:txBody>
+            <a:bodyPr rtlCol="0" anchor="ctr"/>
+            <a:lstStyle/>
+            <a:p>
+              <a:r>
+                <a:rPr lang="en-US" sz="1600" dirty="0">
+                  <a:solidFill>
+                    <a:schemeClr val="accent5"/>
+                  </a:solidFill>
+                </a:rPr>
+                <a:t>&lt;div&gt; .content-container .content-horizontal-center</a:t>
+              </a:r>
+            </a:p>
+          </p:txBody>
+        </p:sp>
+      </p:grpSp>
+      <p:sp>
+        <p:nvSpPr>
+          <p:cNvPr id="23" name="Rectangle 22">
+            <a:extLst>
+              <a:ext uri="{FF2B5EF4-FFF2-40B4-BE49-F238E27FC236}">
+                <a16:creationId xmlns:a16="http://schemas.microsoft.com/office/drawing/2014/main" id="{C697B5D6-684E-F341-84B3-480269E5B8A5}"/>
+              </a:ext>
+            </a:extLst>
+          </p:cNvPr>
+          <p:cNvSpPr/>
+          <p:nvPr/>
+        </p:nvSpPr>
+        <p:spPr>
+          <a:xfrm>
+            <a:off x="841741" y="2487200"/>
+            <a:ext cx="1811042" cy="796272"/>
+          </a:xfrm>
+          <a:prstGeom prst="rect">
+            <a:avLst/>
+          </a:prstGeom>
+          <a:noFill/>
+          <a:ln>
+            <a:noFill/>
+          </a:ln>
+        </p:spPr>
+        <p:style>
+          <a:lnRef idx="2">
+            <a:schemeClr val="accent1">
+              <a:shade val="50000"/>
+            </a:schemeClr>
+          </a:lnRef>
+          <a:fillRef idx="1">
+            <a:schemeClr val="accent1"/>
+          </a:fillRef>
+          <a:effectRef idx="0">
+            <a:schemeClr val="accent1"/>
+          </a:effectRef>
+          <a:fontRef idx="minor">
+            <a:schemeClr val="lt1"/>
+          </a:fontRef>
+        </p:style>
+        <p:txBody>
+          <a:bodyPr rtlCol="0" anchor="ctr"/>
+          <a:lstStyle/>
+          <a:p>
+            <a:r>
+              <a:rPr lang="en-US" sz="1600" dirty="0">
+                <a:solidFill>
+                  <a:schemeClr val="tx1"/>
+                </a:solidFill>
+              </a:rPr>
+              <a:t>&lt;div&gt; </a:t>
+            </a:r>
+            <a:br>
+              <a:rPr lang="en-US" sz="1600" dirty="0">
+                <a:solidFill>
+                  <a:schemeClr val="tx1"/>
+                </a:solidFill>
+              </a:rPr>
+            </a:br>
+            <a:r>
+              <a:rPr lang="en-US" sz="1600" dirty="0">
+                <a:solidFill>
+                  <a:schemeClr val="tx1"/>
+                </a:solidFill>
+              </a:rPr>
+              <a:t>.content</a:t>
+            </a:r>
+          </a:p>
+          <a:p>
+            <a:r>
+              <a:rPr lang="en-US" sz="1600" dirty="0">
+                <a:solidFill>
+                  <a:schemeClr val="tx1"/>
+                </a:solidFill>
+              </a:rPr>
+              <a:t>.section</a:t>
+            </a:r>
+          </a:p>
+        </p:txBody>
+      </p:sp>
+      <p:grpSp>
+        <p:nvGrpSpPr>
+          <p:cNvPr id="24" name="Group 23">
+            <a:extLst>
+              <a:ext uri="{FF2B5EF4-FFF2-40B4-BE49-F238E27FC236}">
+                <a16:creationId xmlns:a16="http://schemas.microsoft.com/office/drawing/2014/main" id="{538C9DEF-B4A9-2340-A774-A0EE6CDDB056}"/>
+              </a:ext>
+            </a:extLst>
+          </p:cNvPr>
+          <p:cNvGrpSpPr/>
+          <p:nvPr/>
+        </p:nvGrpSpPr>
+        <p:grpSpPr>
+          <a:xfrm>
+            <a:off x="2488810" y="2843606"/>
+            <a:ext cx="4273782" cy="3239368"/>
+            <a:chOff x="1648943" y="639255"/>
+            <a:chExt cx="4099269" cy="1853658"/>
+          </a:xfrm>
+        </p:grpSpPr>
+        <p:sp>
+          <p:nvSpPr>
+            <p:cNvPr id="25" name="Rectangle 24">
+              <a:extLst>
+                <a:ext uri="{FF2B5EF4-FFF2-40B4-BE49-F238E27FC236}">
+                  <a16:creationId xmlns:a16="http://schemas.microsoft.com/office/drawing/2014/main" id="{2FCB1430-0AAB-214B-A592-0F1B4C30544A}"/>
+                </a:ext>
+              </a:extLst>
+            </p:cNvPr>
+            <p:cNvSpPr/>
+            <p:nvPr/>
+          </p:nvSpPr>
+          <p:spPr>
+            <a:xfrm>
+              <a:off x="1648943" y="672863"/>
+              <a:ext cx="4099269" cy="1820050"/>
+            </a:xfrm>
+            <a:prstGeom prst="rect">
+              <a:avLst/>
+            </a:prstGeom>
+            <a:solidFill>
+              <a:schemeClr val="accent4">
+                <a:alpha val="10196"/>
+              </a:schemeClr>
+            </a:solidFill>
+            <a:ln>
+              <a:solidFill>
+                <a:schemeClr val="accent4"/>
+              </a:solidFill>
+            </a:ln>
+          </p:spPr>
+          <p:style>
+            <a:lnRef idx="2">
+              <a:schemeClr val="accent1">
+                <a:shade val="50000"/>
+              </a:schemeClr>
+            </a:lnRef>
+            <a:fillRef idx="1">
+              <a:schemeClr val="accent1"/>
+            </a:fillRef>
+            <a:effectRef idx="0">
+              <a:schemeClr val="accent1"/>
+            </a:effectRef>
+            <a:fontRef idx="minor">
+              <a:schemeClr val="lt1"/>
+            </a:fontRef>
+          </p:style>
+          <p:txBody>
+            <a:bodyPr rtlCol="0" anchor="ctr"/>
+            <a:lstStyle/>
+            <a:p>
+              <a:pPr algn="ctr"/>
+              <a:endParaRPr lang="en-US" dirty="0"/>
+            </a:p>
+          </p:txBody>
+        </p:sp>
+        <p:sp>
+          <p:nvSpPr>
+            <p:cNvPr id="26" name="Rectangle 25">
+              <a:extLst>
+                <a:ext uri="{FF2B5EF4-FFF2-40B4-BE49-F238E27FC236}">
+                  <a16:creationId xmlns:a16="http://schemas.microsoft.com/office/drawing/2014/main" id="{96B646B2-80B9-8D43-8CD6-868C7793E705}"/>
+                </a:ext>
+              </a:extLst>
+            </p:cNvPr>
+            <p:cNvSpPr/>
+            <p:nvPr/>
+          </p:nvSpPr>
+          <p:spPr>
+            <a:xfrm>
+              <a:off x="1677425" y="639255"/>
+              <a:ext cx="3330802" cy="612786"/>
+            </a:xfrm>
+            <a:prstGeom prst="rect">
+              <a:avLst/>
+            </a:prstGeom>
+            <a:noFill/>
+            <a:ln>
+              <a:noFill/>
+            </a:ln>
+          </p:spPr>
+          <p:style>
+            <a:lnRef idx="2">
+              <a:schemeClr val="accent1">
+                <a:shade val="50000"/>
+              </a:schemeClr>
+            </a:lnRef>
+            <a:fillRef idx="1">
+              <a:schemeClr val="accent1"/>
+            </a:fillRef>
+            <a:effectRef idx="0">
+              <a:schemeClr val="accent1"/>
+            </a:effectRef>
+            <a:fontRef idx="minor">
+              <a:schemeClr val="lt1"/>
+            </a:fontRef>
+          </p:style>
+          <p:txBody>
+            <a:bodyPr rtlCol="0" anchor="ctr"/>
+            <a:lstStyle/>
+            <a:p>
+              <a:r>
+                <a:rPr lang="en-US" sz="1600" dirty="0">
+                  <a:solidFill>
+                    <a:schemeClr val="accent2">
+                      <a:lumMod val="50000"/>
+                    </a:schemeClr>
+                  </a:solidFill>
+                </a:rPr>
+                <a:t>&lt;div&gt; </a:t>
+              </a:r>
+            </a:p>
+            <a:p>
+              <a:r>
+                <a:rPr lang="en-US" sz="1600" dirty="0">
+                  <a:solidFill>
+                    <a:schemeClr val="accent2">
+                      <a:lumMod val="50000"/>
+                    </a:schemeClr>
+                  </a:solidFill>
+                </a:rPr>
+                <a:t>.card</a:t>
+              </a:r>
+            </a:p>
+            <a:p>
+              <a:r>
+                <a:rPr lang="en-US" sz="1600" dirty="0">
+                  <a:solidFill>
+                    <a:schemeClr val="accent2">
+                      <a:lumMod val="50000"/>
+                    </a:schemeClr>
+                  </a:solidFill>
+                </a:rPr>
+                <a:t>.</a:t>
+              </a:r>
+              <a:r>
+                <a:rPr lang="en-US" sz="1600" dirty="0" err="1">
+                  <a:solidFill>
+                    <a:schemeClr val="accent2">
+                      <a:lumMod val="50000"/>
+                    </a:schemeClr>
+                  </a:solidFill>
+                </a:rPr>
+                <a:t>card_testimonials</a:t>
+              </a:r>
+              <a:endParaRPr lang="en-US" sz="1600" dirty="0">
+                <a:solidFill>
+                  <a:schemeClr val="accent2">
+                    <a:lumMod val="50000"/>
+                  </a:schemeClr>
+                </a:solidFill>
+              </a:endParaRPr>
+            </a:p>
+          </p:txBody>
+        </p:sp>
+      </p:grpSp>
+      <p:grpSp>
+        <p:nvGrpSpPr>
+          <p:cNvPr id="40" name="Group 39">
+            <a:extLst>
+              <a:ext uri="{FF2B5EF4-FFF2-40B4-BE49-F238E27FC236}">
+                <a16:creationId xmlns:a16="http://schemas.microsoft.com/office/drawing/2014/main" id="{A54F1205-2E48-BD48-AAAC-704CEA5CE5A3}"/>
+              </a:ext>
+            </a:extLst>
+          </p:cNvPr>
+          <p:cNvGrpSpPr/>
+          <p:nvPr/>
+        </p:nvGrpSpPr>
+        <p:grpSpPr>
+          <a:xfrm>
+            <a:off x="7334153" y="2902338"/>
+            <a:ext cx="4273782" cy="3180636"/>
+            <a:chOff x="1648943" y="672863"/>
+            <a:chExt cx="4099269" cy="1820050"/>
+          </a:xfrm>
+        </p:grpSpPr>
+        <p:sp>
+          <p:nvSpPr>
+            <p:cNvPr id="41" name="Rectangle 40">
+              <a:extLst>
+                <a:ext uri="{FF2B5EF4-FFF2-40B4-BE49-F238E27FC236}">
+                  <a16:creationId xmlns:a16="http://schemas.microsoft.com/office/drawing/2014/main" id="{C20EE285-76F5-3A48-9DF1-A818A421807F}"/>
+                </a:ext>
+              </a:extLst>
+            </p:cNvPr>
+            <p:cNvSpPr/>
+            <p:nvPr/>
+          </p:nvSpPr>
+          <p:spPr>
+            <a:xfrm>
+              <a:off x="1648943" y="672863"/>
+              <a:ext cx="4099269" cy="1820050"/>
+            </a:xfrm>
+            <a:prstGeom prst="rect">
+              <a:avLst/>
+            </a:prstGeom>
+            <a:solidFill>
+              <a:schemeClr val="accent4">
+                <a:alpha val="10196"/>
+              </a:schemeClr>
+            </a:solidFill>
+            <a:ln>
+              <a:solidFill>
+                <a:schemeClr val="accent4"/>
+              </a:solidFill>
+            </a:ln>
+          </p:spPr>
+          <p:style>
+            <a:lnRef idx="2">
+              <a:schemeClr val="accent1">
+                <a:shade val="50000"/>
+              </a:schemeClr>
+            </a:lnRef>
+            <a:fillRef idx="1">
+              <a:schemeClr val="accent1"/>
+            </a:fillRef>
+            <a:effectRef idx="0">
+              <a:schemeClr val="accent1"/>
+            </a:effectRef>
+            <a:fontRef idx="minor">
+              <a:schemeClr val="lt1"/>
+            </a:fontRef>
+          </p:style>
+          <p:txBody>
+            <a:bodyPr rtlCol="0" anchor="ctr"/>
+            <a:lstStyle/>
+            <a:p>
+              <a:pPr algn="ctr"/>
+              <a:endParaRPr lang="en-US" dirty="0"/>
+            </a:p>
+          </p:txBody>
+        </p:sp>
+        <p:sp>
+          <p:nvSpPr>
+            <p:cNvPr id="42" name="Rectangle 41">
+              <a:extLst>
+                <a:ext uri="{FF2B5EF4-FFF2-40B4-BE49-F238E27FC236}">
+                  <a16:creationId xmlns:a16="http://schemas.microsoft.com/office/drawing/2014/main" id="{C93F498A-A6AD-9E41-9024-9FF678323180}"/>
+                </a:ext>
+              </a:extLst>
+            </p:cNvPr>
+            <p:cNvSpPr/>
+            <p:nvPr/>
+          </p:nvSpPr>
+          <p:spPr>
+            <a:xfrm>
+              <a:off x="1810906" y="719462"/>
+              <a:ext cx="3330802" cy="452373"/>
+            </a:xfrm>
+            <a:prstGeom prst="rect">
+              <a:avLst/>
+            </a:prstGeom>
+            <a:noFill/>
+            <a:ln>
+              <a:noFill/>
+            </a:ln>
+          </p:spPr>
+          <p:style>
+            <a:lnRef idx="2">
+              <a:schemeClr val="accent1">
+                <a:shade val="50000"/>
+              </a:schemeClr>
+            </a:lnRef>
+            <a:fillRef idx="1">
+              <a:schemeClr val="accent1"/>
+            </a:fillRef>
+            <a:effectRef idx="0">
+              <a:schemeClr val="accent1"/>
+            </a:effectRef>
+            <a:fontRef idx="minor">
+              <a:schemeClr val="lt1"/>
+            </a:fontRef>
+          </p:style>
+          <p:txBody>
+            <a:bodyPr rtlCol="0" anchor="ctr"/>
+            <a:lstStyle/>
+            <a:p>
+              <a:r>
+                <a:rPr lang="en-US" sz="1600" dirty="0">
+                  <a:solidFill>
+                    <a:schemeClr val="accent2">
+                      <a:lumMod val="50000"/>
+                    </a:schemeClr>
+                  </a:solidFill>
+                </a:rPr>
+                <a:t>&lt;div&gt;</a:t>
+              </a:r>
+            </a:p>
+            <a:p>
+              <a:r>
+                <a:rPr lang="en-US" sz="1600" dirty="0">
+                  <a:solidFill>
+                    <a:schemeClr val="accent2">
+                      <a:lumMod val="50000"/>
+                    </a:schemeClr>
+                  </a:solidFill>
+                </a:rPr>
+                <a:t>.card</a:t>
+              </a:r>
+            </a:p>
+            <a:p>
+              <a:r>
+                <a:rPr lang="en-US" sz="1600" dirty="0">
+                  <a:solidFill>
+                    <a:schemeClr val="accent2">
+                      <a:lumMod val="50000"/>
+                    </a:schemeClr>
+                  </a:solidFill>
+                </a:rPr>
+                <a:t>.</a:t>
+              </a:r>
+              <a:r>
+                <a:rPr lang="en-US" sz="1600" dirty="0" err="1">
+                  <a:solidFill>
+                    <a:schemeClr val="accent2">
+                      <a:lumMod val="50000"/>
+                    </a:schemeClr>
+                  </a:solidFill>
+                </a:rPr>
+                <a:t>card_clients</a:t>
+              </a:r>
+              <a:endParaRPr lang="en-US" sz="1600" dirty="0">
+                <a:solidFill>
+                  <a:schemeClr val="accent2">
+                    <a:lumMod val="50000"/>
+                  </a:schemeClr>
+                </a:solidFill>
+              </a:endParaRPr>
+            </a:p>
+          </p:txBody>
+        </p:sp>
+      </p:grpSp>
+      <p:grpSp>
+        <p:nvGrpSpPr>
+          <p:cNvPr id="58" name="Group 57">
+            <a:extLst>
+              <a:ext uri="{FF2B5EF4-FFF2-40B4-BE49-F238E27FC236}">
+                <a16:creationId xmlns:a16="http://schemas.microsoft.com/office/drawing/2014/main" id="{F055D5C8-00E6-A741-A4A3-3BBE4EF3EB8A}"/>
+              </a:ext>
+            </a:extLst>
+          </p:cNvPr>
+          <p:cNvGrpSpPr/>
+          <p:nvPr/>
+        </p:nvGrpSpPr>
+        <p:grpSpPr>
+          <a:xfrm>
+            <a:off x="766541" y="6695181"/>
+            <a:ext cx="3843454" cy="3329347"/>
+            <a:chOff x="1598378" y="451661"/>
+            <a:chExt cx="3686512" cy="1905146"/>
+          </a:xfrm>
+        </p:grpSpPr>
+        <p:sp>
+          <p:nvSpPr>
+            <p:cNvPr id="59" name="Rectangle 58">
+              <a:extLst>
+                <a:ext uri="{FF2B5EF4-FFF2-40B4-BE49-F238E27FC236}">
+                  <a16:creationId xmlns:a16="http://schemas.microsoft.com/office/drawing/2014/main" id="{045E065B-D5E5-6F43-BD6D-1AA0F64DBD1D}"/>
+                </a:ext>
+              </a:extLst>
+            </p:cNvPr>
+            <p:cNvSpPr/>
+            <p:nvPr/>
+          </p:nvSpPr>
+          <p:spPr>
+            <a:xfrm>
+              <a:off x="1598378" y="615662"/>
+              <a:ext cx="3686512" cy="1741145"/>
+            </a:xfrm>
+            <a:prstGeom prst="rect">
+              <a:avLst/>
+            </a:prstGeom>
+            <a:solidFill>
+              <a:schemeClr val="accent4">
+                <a:alpha val="10196"/>
+              </a:schemeClr>
+            </a:solidFill>
+            <a:ln>
+              <a:solidFill>
+                <a:schemeClr val="accent4"/>
+              </a:solidFill>
+            </a:ln>
+          </p:spPr>
+          <p:style>
+            <a:lnRef idx="2">
+              <a:schemeClr val="accent1">
+                <a:shade val="50000"/>
+              </a:schemeClr>
+            </a:lnRef>
+            <a:fillRef idx="1">
+              <a:schemeClr val="accent1"/>
+            </a:fillRef>
+            <a:effectRef idx="0">
+              <a:schemeClr val="accent1"/>
+            </a:effectRef>
+            <a:fontRef idx="minor">
+              <a:schemeClr val="lt1"/>
+            </a:fontRef>
+          </p:style>
+          <p:txBody>
+            <a:bodyPr rtlCol="0" anchor="ctr"/>
+            <a:lstStyle/>
+            <a:p>
+              <a:pPr algn="ctr"/>
+              <a:endParaRPr lang="en-US" dirty="0"/>
+            </a:p>
+          </p:txBody>
+        </p:sp>
+        <p:sp>
+          <p:nvSpPr>
+            <p:cNvPr id="60" name="Rectangle 59">
+              <a:extLst>
+                <a:ext uri="{FF2B5EF4-FFF2-40B4-BE49-F238E27FC236}">
+                  <a16:creationId xmlns:a16="http://schemas.microsoft.com/office/drawing/2014/main" id="{62823C49-56E8-D044-9D93-B6135DE604EF}"/>
+                </a:ext>
+              </a:extLst>
+            </p:cNvPr>
+            <p:cNvSpPr/>
+            <p:nvPr/>
+          </p:nvSpPr>
+          <p:spPr>
+            <a:xfrm>
+              <a:off x="1598378" y="451661"/>
+              <a:ext cx="2321560" cy="121920"/>
+            </a:xfrm>
+            <a:prstGeom prst="rect">
+              <a:avLst/>
+            </a:prstGeom>
+            <a:noFill/>
+            <a:ln>
+              <a:noFill/>
+            </a:ln>
+          </p:spPr>
+          <p:style>
+            <a:lnRef idx="2">
+              <a:schemeClr val="accent1">
+                <a:shade val="50000"/>
+              </a:schemeClr>
+            </a:lnRef>
+            <a:fillRef idx="1">
+              <a:schemeClr val="accent1"/>
+            </a:fillRef>
+            <a:effectRef idx="0">
+              <a:schemeClr val="accent1"/>
+            </a:effectRef>
+            <a:fontRef idx="minor">
+              <a:schemeClr val="lt1"/>
+            </a:fontRef>
+          </p:style>
+          <p:txBody>
+            <a:bodyPr rtlCol="0" anchor="ctr"/>
+            <a:lstStyle/>
+            <a:p>
+              <a:r>
+                <a:rPr lang="en-US" sz="2000" dirty="0">
+                  <a:solidFill>
+                    <a:schemeClr val="accent2">
+                      <a:lumMod val="50000"/>
+                    </a:schemeClr>
+                  </a:solidFill>
+                </a:rPr>
+                <a:t>&lt;div&gt; .card</a:t>
+              </a:r>
+            </a:p>
+          </p:txBody>
+        </p:sp>
+      </p:grpSp>
+      <p:sp>
+        <p:nvSpPr>
+          <p:cNvPr id="61" name="Rectangle 60">
+            <a:extLst>
+              <a:ext uri="{FF2B5EF4-FFF2-40B4-BE49-F238E27FC236}">
+                <a16:creationId xmlns:a16="http://schemas.microsoft.com/office/drawing/2014/main" id="{27090F9F-78CE-3E40-B92C-BB9E7C3BA1EA}"/>
+              </a:ext>
+            </a:extLst>
+          </p:cNvPr>
+          <p:cNvSpPr/>
+          <p:nvPr/>
+        </p:nvSpPr>
+        <p:spPr>
+          <a:xfrm>
+            <a:off x="853389" y="7063517"/>
+            <a:ext cx="3651039" cy="569844"/>
+          </a:xfrm>
+          <a:prstGeom prst="rect">
+            <a:avLst/>
+          </a:prstGeom>
+          <a:solidFill>
+            <a:schemeClr val="tx1">
+              <a:lumMod val="50000"/>
+              <a:lumOff val="50000"/>
+              <a:alpha val="10196"/>
+            </a:schemeClr>
+          </a:solidFill>
+          <a:ln>
+            <a:solidFill>
+              <a:schemeClr val="tx1">
+                <a:lumMod val="50000"/>
+                <a:lumOff val="50000"/>
+              </a:schemeClr>
+            </a:solidFill>
+          </a:ln>
+        </p:spPr>
+        <p:style>
+          <a:lnRef idx="2">
+            <a:schemeClr val="accent1">
+              <a:shade val="50000"/>
+            </a:schemeClr>
+          </a:lnRef>
+          <a:fillRef idx="1">
+            <a:schemeClr val="accent1"/>
+          </a:fillRef>
+          <a:effectRef idx="0">
+            <a:schemeClr val="accent1"/>
+          </a:effectRef>
+          <a:fontRef idx="minor">
+            <a:schemeClr val="lt1"/>
+          </a:fontRef>
+        </p:style>
+        <p:txBody>
+          <a:bodyPr rtlCol="0" anchor="ctr"/>
+          <a:lstStyle/>
+          <a:p>
+            <a:pPr algn="ctr"/>
+            <a:endParaRPr lang="en-US" dirty="0"/>
+          </a:p>
+        </p:txBody>
+      </p:sp>
+      <p:sp>
+        <p:nvSpPr>
+          <p:cNvPr id="62" name="Rectangle 61">
+            <a:extLst>
+              <a:ext uri="{FF2B5EF4-FFF2-40B4-BE49-F238E27FC236}">
+                <a16:creationId xmlns:a16="http://schemas.microsoft.com/office/drawing/2014/main" id="{20A83BA2-2977-DE48-ADBE-47C5A8F69A32}"/>
+              </a:ext>
+            </a:extLst>
+          </p:cNvPr>
+          <p:cNvSpPr/>
+          <p:nvPr/>
+        </p:nvSpPr>
+        <p:spPr>
+          <a:xfrm>
+            <a:off x="1806401" y="7243753"/>
+            <a:ext cx="2420393" cy="213062"/>
+          </a:xfrm>
+          <a:prstGeom prst="rect">
+            <a:avLst/>
+          </a:prstGeom>
+          <a:noFill/>
+          <a:ln>
+            <a:noFill/>
+          </a:ln>
+        </p:spPr>
+        <p:style>
+          <a:lnRef idx="2">
+            <a:schemeClr val="accent1">
+              <a:shade val="50000"/>
+            </a:schemeClr>
+          </a:lnRef>
+          <a:fillRef idx="1">
+            <a:schemeClr val="accent1"/>
+          </a:fillRef>
+          <a:effectRef idx="0">
+            <a:schemeClr val="accent1"/>
+          </a:effectRef>
+          <a:fontRef idx="minor">
+            <a:schemeClr val="lt1"/>
+          </a:fontRef>
+        </p:style>
+        <p:txBody>
+          <a:bodyPr rtlCol="0" anchor="ctr"/>
+          <a:lstStyle/>
+          <a:p>
+            <a:r>
+              <a:rPr lang="en-US" sz="1600" dirty="0">
+                <a:solidFill>
+                  <a:schemeClr val="tx1">
+                    <a:lumMod val="75000"/>
+                    <a:lumOff val="25000"/>
+                  </a:schemeClr>
+                </a:solidFill>
+              </a:rPr>
+              <a:t>&lt;div&gt; .</a:t>
+            </a:r>
+            <a:r>
+              <a:rPr lang="en-US" sz="1600" dirty="0" err="1">
+                <a:solidFill>
+                  <a:schemeClr val="tx1">
+                    <a:lumMod val="75000"/>
+                    <a:lumOff val="25000"/>
+                  </a:schemeClr>
+                </a:solidFill>
+              </a:rPr>
+              <a:t>card__head</a:t>
+            </a:r>
+            <a:endParaRPr lang="en-US" sz="1600" dirty="0">
+              <a:solidFill>
+                <a:schemeClr val="tx1">
+                  <a:lumMod val="75000"/>
+                  <a:lumOff val="25000"/>
+                </a:schemeClr>
+              </a:solidFill>
+            </a:endParaRPr>
+          </a:p>
+        </p:txBody>
+      </p:sp>
+      <p:grpSp>
+        <p:nvGrpSpPr>
+          <p:cNvPr id="63" name="Group 62">
+            <a:extLst>
+              <a:ext uri="{FF2B5EF4-FFF2-40B4-BE49-F238E27FC236}">
+                <a16:creationId xmlns:a16="http://schemas.microsoft.com/office/drawing/2014/main" id="{DC57EEED-326F-4343-B5F5-3B102877AE92}"/>
+              </a:ext>
+            </a:extLst>
+          </p:cNvPr>
+          <p:cNvGrpSpPr/>
+          <p:nvPr/>
+        </p:nvGrpSpPr>
+        <p:grpSpPr>
+          <a:xfrm>
+            <a:off x="858383" y="7744599"/>
+            <a:ext cx="3646044" cy="1473617"/>
+            <a:chOff x="838728" y="1834120"/>
+            <a:chExt cx="1963624" cy="597929"/>
+          </a:xfrm>
+        </p:grpSpPr>
+        <p:sp>
+          <p:nvSpPr>
+            <p:cNvPr id="64" name="Rectangle 63">
+              <a:extLst>
+                <a:ext uri="{FF2B5EF4-FFF2-40B4-BE49-F238E27FC236}">
+                  <a16:creationId xmlns:a16="http://schemas.microsoft.com/office/drawing/2014/main" id="{15EC1288-74DF-8046-A9F2-B5A529559588}"/>
+                </a:ext>
+              </a:extLst>
+            </p:cNvPr>
+            <p:cNvSpPr/>
+            <p:nvPr/>
+          </p:nvSpPr>
+          <p:spPr>
+            <a:xfrm>
+              <a:off x="838728" y="1834120"/>
+              <a:ext cx="1963624" cy="597929"/>
+            </a:xfrm>
+            <a:prstGeom prst="rect">
+              <a:avLst/>
+            </a:prstGeom>
+            <a:solidFill>
+              <a:srgbClr val="FF0000">
+                <a:alpha val="10196"/>
+              </a:srgbClr>
+            </a:solidFill>
+            <a:ln>
+              <a:solidFill>
+                <a:srgbClr val="C00000"/>
+              </a:solidFill>
+            </a:ln>
+          </p:spPr>
+          <p:style>
+            <a:lnRef idx="2">
+              <a:schemeClr val="accent1">
+                <a:shade val="50000"/>
+              </a:schemeClr>
+            </a:lnRef>
+            <a:fillRef idx="1">
+              <a:schemeClr val="accent1"/>
+            </a:fillRef>
+            <a:effectRef idx="0">
+              <a:schemeClr val="accent1"/>
+            </a:effectRef>
+            <a:fontRef idx="minor">
+              <a:schemeClr val="lt1"/>
+            </a:fontRef>
+          </p:style>
+          <p:txBody>
+            <a:bodyPr rtlCol="0" anchor="ctr"/>
+            <a:lstStyle/>
+            <a:p>
+              <a:pPr algn="ctr"/>
+              <a:endParaRPr lang="en-US" dirty="0"/>
+            </a:p>
+          </p:txBody>
+        </p:sp>
+        <p:sp>
+          <p:nvSpPr>
+            <p:cNvPr id="65" name="Rectangle 64">
+              <a:extLst>
+                <a:ext uri="{FF2B5EF4-FFF2-40B4-BE49-F238E27FC236}">
+                  <a16:creationId xmlns:a16="http://schemas.microsoft.com/office/drawing/2014/main" id="{2AB7230E-FD56-144A-ADDB-9C978B3FADEE}"/>
+                </a:ext>
+              </a:extLst>
+            </p:cNvPr>
+            <p:cNvSpPr/>
+            <p:nvPr/>
+          </p:nvSpPr>
+          <p:spPr>
+            <a:xfrm>
+              <a:off x="1310792" y="1992863"/>
+              <a:ext cx="1077682" cy="198293"/>
+            </a:xfrm>
+            <a:prstGeom prst="rect">
+              <a:avLst/>
+            </a:prstGeom>
+            <a:noFill/>
+            <a:ln>
+              <a:noFill/>
+            </a:ln>
+          </p:spPr>
+          <p:style>
+            <a:lnRef idx="2">
+              <a:schemeClr val="accent1">
+                <a:shade val="50000"/>
+              </a:schemeClr>
+            </a:lnRef>
+            <a:fillRef idx="1">
+              <a:schemeClr val="accent1"/>
+            </a:fillRef>
+            <a:effectRef idx="0">
+              <a:schemeClr val="accent1"/>
+            </a:effectRef>
+            <a:fontRef idx="minor">
+              <a:schemeClr val="lt1"/>
+            </a:fontRef>
+          </p:style>
+          <p:txBody>
+            <a:bodyPr rtlCol="0" anchor="ctr"/>
+            <a:lstStyle/>
+            <a:p>
+              <a:r>
+                <a:rPr lang="en-US" sz="1600" dirty="0">
+                  <a:solidFill>
+                    <a:srgbClr val="C00000"/>
+                  </a:solidFill>
+                </a:rPr>
+                <a:t>&lt;div&gt; .</a:t>
+              </a:r>
+              <a:r>
+                <a:rPr lang="en-US" sz="1600" dirty="0" err="1">
+                  <a:solidFill>
+                    <a:srgbClr val="C00000"/>
+                  </a:solidFill>
+                </a:rPr>
+                <a:t>card__content</a:t>
+              </a:r>
+              <a:endParaRPr lang="en-US" sz="1600" dirty="0">
+                <a:solidFill>
+                  <a:srgbClr val="C00000"/>
+                </a:solidFill>
+              </a:endParaRPr>
+            </a:p>
+          </p:txBody>
+        </p:sp>
+      </p:grpSp>
+      <p:grpSp>
+        <p:nvGrpSpPr>
+          <p:cNvPr id="77" name="Group 76">
+            <a:extLst>
+              <a:ext uri="{FF2B5EF4-FFF2-40B4-BE49-F238E27FC236}">
+                <a16:creationId xmlns:a16="http://schemas.microsoft.com/office/drawing/2014/main" id="{F6032840-3E9D-A849-897A-7C0EAD2D2A5C}"/>
+              </a:ext>
+            </a:extLst>
+          </p:cNvPr>
+          <p:cNvGrpSpPr/>
+          <p:nvPr/>
+        </p:nvGrpSpPr>
+        <p:grpSpPr>
+          <a:xfrm>
+            <a:off x="853390" y="9319741"/>
+            <a:ext cx="3651039" cy="640603"/>
+            <a:chOff x="842732" y="1868905"/>
+            <a:chExt cx="1966314" cy="259929"/>
+          </a:xfrm>
+        </p:grpSpPr>
+        <p:sp>
+          <p:nvSpPr>
+            <p:cNvPr id="78" name="Rectangle 77">
+              <a:extLst>
+                <a:ext uri="{FF2B5EF4-FFF2-40B4-BE49-F238E27FC236}">
+                  <a16:creationId xmlns:a16="http://schemas.microsoft.com/office/drawing/2014/main" id="{33685B8E-7FAE-C840-B3E0-646309A76940}"/>
+                </a:ext>
+              </a:extLst>
+            </p:cNvPr>
+            <p:cNvSpPr/>
+            <p:nvPr/>
+          </p:nvSpPr>
+          <p:spPr>
+            <a:xfrm>
+              <a:off x="842732" y="1868905"/>
+              <a:ext cx="1966314" cy="259929"/>
             </a:xfrm>
             <a:prstGeom prst="rect">
               <a:avLst/>
@@ -9583,10 +10795,10 @@
         </p:sp>
         <p:sp>
           <p:nvSpPr>
-            <p:cNvPr id="73" name="Rectangle 72">
+            <p:cNvPr id="79" name="Rectangle 78">
               <a:extLst>
                 <a:ext uri="{FF2B5EF4-FFF2-40B4-BE49-F238E27FC236}">
-                  <a16:creationId xmlns:a16="http://schemas.microsoft.com/office/drawing/2014/main" id="{339D0DDF-76EF-DD4E-B405-9C6E5DE3CEEE}"/>
+                  <a16:creationId xmlns:a16="http://schemas.microsoft.com/office/drawing/2014/main" id="{5918C641-BD2A-864A-A97B-538A504D03CF}"/>
                 </a:ext>
               </a:extLst>
             </p:cNvPr>
@@ -9595,8 +10807,8 @@
           </p:nvSpPr>
           <p:spPr>
             <a:xfrm>
-              <a:off x="842732" y="2046553"/>
-              <a:ext cx="1379290" cy="198293"/>
+              <a:off x="1347102" y="1898881"/>
+              <a:ext cx="1077682" cy="198293"/>
             </a:xfrm>
             <a:prstGeom prst="rect">
               <a:avLst/>
@@ -9634,19 +10846,7 @@
                     </a:schemeClr>
                   </a:solidFill>
                 </a:rPr>
-                <a:t>&lt;img&gt; </a:t>
-              </a:r>
-            </a:p>
-            <a:p>
-              <a:r>
-                <a:rPr lang="en-US" sz="1600" dirty="0">
-                  <a:solidFill>
-                    <a:schemeClr val="accent6">
-                      <a:lumMod val="50000"/>
-                    </a:schemeClr>
-                  </a:solidFill>
-                </a:rPr>
-                <a:t>.latest-</a:t>
+                <a:t>&lt;div&gt; .</a:t>
               </a:r>
               <a:r>
                 <a:rPr lang="en-US" sz="1600" dirty="0" err="1">
@@ -9656,7 +10856,7 @@
                     </a:schemeClr>
                   </a:solidFill>
                 </a:rPr>
-                <a:t>works__image</a:t>
+                <a:t>card__footer</a:t>
               </a:r>
               <a:endParaRPr lang="en-US" sz="1600" dirty="0">
                 <a:solidFill>
@@ -9669,12 +10869,284 @@
           </p:txBody>
         </p:sp>
       </p:grpSp>
+      <p:sp>
+        <p:nvSpPr>
+          <p:cNvPr id="81" name="Rectangle 80">
+            <a:extLst>
+              <a:ext uri="{FF2B5EF4-FFF2-40B4-BE49-F238E27FC236}">
+                <a16:creationId xmlns:a16="http://schemas.microsoft.com/office/drawing/2014/main" id="{BC15E8FB-E96C-E340-BF90-5397389B881B}"/>
+              </a:ext>
+            </a:extLst>
+          </p:cNvPr>
+          <p:cNvSpPr/>
+          <p:nvPr/>
+        </p:nvSpPr>
+        <p:spPr>
+          <a:xfrm>
+            <a:off x="744901" y="10702233"/>
+            <a:ext cx="5057189" cy="789312"/>
+          </a:xfrm>
+          <a:prstGeom prst="rect">
+            <a:avLst/>
+          </a:prstGeom>
+          <a:solidFill>
+            <a:schemeClr val="tx1">
+              <a:lumMod val="50000"/>
+              <a:lumOff val="50000"/>
+              <a:alpha val="10196"/>
+            </a:schemeClr>
+          </a:solidFill>
+          <a:ln>
+            <a:solidFill>
+              <a:schemeClr val="tx1">
+                <a:lumMod val="50000"/>
+                <a:lumOff val="50000"/>
+              </a:schemeClr>
+            </a:solidFill>
+          </a:ln>
+        </p:spPr>
+        <p:style>
+          <a:lnRef idx="2">
+            <a:schemeClr val="accent1">
+              <a:shade val="50000"/>
+            </a:schemeClr>
+          </a:lnRef>
+          <a:fillRef idx="1">
+            <a:schemeClr val="accent1"/>
+          </a:fillRef>
+          <a:effectRef idx="0">
+            <a:schemeClr val="accent1"/>
+          </a:effectRef>
+          <a:fontRef idx="minor">
+            <a:schemeClr val="lt1"/>
+          </a:fontRef>
+        </p:style>
+        <p:txBody>
+          <a:bodyPr rtlCol="0" anchor="ctr"/>
+          <a:lstStyle/>
+          <a:p>
+            <a:pPr algn="ctr"/>
+            <a:endParaRPr lang="en-US" dirty="0"/>
+          </a:p>
+        </p:txBody>
+      </p:sp>
+      <p:sp>
+        <p:nvSpPr>
+          <p:cNvPr id="82" name="Rectangle 81">
+            <a:extLst>
+              <a:ext uri="{FF2B5EF4-FFF2-40B4-BE49-F238E27FC236}">
+                <a16:creationId xmlns:a16="http://schemas.microsoft.com/office/drawing/2014/main" id="{B4C177C1-ED70-4543-A972-568E855D363F}"/>
+              </a:ext>
+            </a:extLst>
+          </p:cNvPr>
+          <p:cNvSpPr/>
+          <p:nvPr/>
+        </p:nvSpPr>
+        <p:spPr>
+          <a:xfrm>
+            <a:off x="744901" y="10415632"/>
+            <a:ext cx="2420393" cy="213062"/>
+          </a:xfrm>
+          <a:prstGeom prst="rect">
+            <a:avLst/>
+          </a:prstGeom>
+          <a:noFill/>
+          <a:ln>
+            <a:noFill/>
+          </a:ln>
+        </p:spPr>
+        <p:style>
+          <a:lnRef idx="2">
+            <a:schemeClr val="accent1">
+              <a:shade val="50000"/>
+            </a:schemeClr>
+          </a:lnRef>
+          <a:fillRef idx="1">
+            <a:schemeClr val="accent1"/>
+          </a:fillRef>
+          <a:effectRef idx="0">
+            <a:schemeClr val="accent1"/>
+          </a:effectRef>
+          <a:fontRef idx="minor">
+            <a:schemeClr val="lt1"/>
+          </a:fontRef>
+        </p:style>
+        <p:txBody>
+          <a:bodyPr rtlCol="0" anchor="ctr"/>
+          <a:lstStyle/>
+          <a:p>
+            <a:r>
+              <a:rPr lang="en-US" sz="2000" dirty="0">
+                <a:solidFill>
+                  <a:schemeClr val="tx1">
+                    <a:lumMod val="75000"/>
+                    <a:lumOff val="25000"/>
+                  </a:schemeClr>
+                </a:solidFill>
+              </a:rPr>
+              <a:t>&lt;div&gt; .</a:t>
+            </a:r>
+            <a:r>
+              <a:rPr lang="en-US" sz="2000" dirty="0" err="1">
+                <a:solidFill>
+                  <a:schemeClr val="tx1">
+                    <a:lumMod val="75000"/>
+                    <a:lumOff val="25000"/>
+                  </a:schemeClr>
+                </a:solidFill>
+              </a:rPr>
+              <a:t>card__head</a:t>
+            </a:r>
+            <a:endParaRPr lang="en-US" sz="2000" dirty="0">
+              <a:solidFill>
+                <a:schemeClr val="tx1">
+                  <a:lumMod val="75000"/>
+                  <a:lumOff val="25000"/>
+                </a:schemeClr>
+              </a:solidFill>
+            </a:endParaRPr>
+          </a:p>
+        </p:txBody>
+      </p:sp>
+      <p:sp>
+        <p:nvSpPr>
+          <p:cNvPr id="83" name="Rectangle 82">
+            <a:extLst>
+              <a:ext uri="{FF2B5EF4-FFF2-40B4-BE49-F238E27FC236}">
+                <a16:creationId xmlns:a16="http://schemas.microsoft.com/office/drawing/2014/main" id="{8D518BED-941E-0F49-9411-D6B75D47AA55}"/>
+              </a:ext>
+            </a:extLst>
+          </p:cNvPr>
+          <p:cNvSpPr/>
+          <p:nvPr/>
+        </p:nvSpPr>
+        <p:spPr>
+          <a:xfrm>
+            <a:off x="850469" y="10783968"/>
+            <a:ext cx="1251561" cy="569844"/>
+          </a:xfrm>
+          <a:prstGeom prst="rect">
+            <a:avLst/>
+          </a:prstGeom>
+          <a:solidFill>
+            <a:schemeClr val="accent5">
+              <a:alpha val="10196"/>
+            </a:schemeClr>
+          </a:solidFill>
+          <a:ln>
+            <a:solidFill>
+              <a:schemeClr val="accent5">
+                <a:lumMod val="50000"/>
+              </a:schemeClr>
+            </a:solidFill>
+          </a:ln>
+        </p:spPr>
+        <p:style>
+          <a:lnRef idx="2">
+            <a:schemeClr val="accent1">
+              <a:shade val="50000"/>
+            </a:schemeClr>
+          </a:lnRef>
+          <a:fillRef idx="1">
+            <a:schemeClr val="accent1"/>
+          </a:fillRef>
+          <a:effectRef idx="0">
+            <a:schemeClr val="accent1"/>
+          </a:effectRef>
+          <a:fontRef idx="minor">
+            <a:schemeClr val="lt1"/>
+          </a:fontRef>
+        </p:style>
+        <p:txBody>
+          <a:bodyPr rtlCol="0" anchor="ctr"/>
+          <a:lstStyle/>
+          <a:p>
+            <a:pPr algn="ctr"/>
+            <a:endParaRPr lang="en-US" dirty="0"/>
+          </a:p>
+        </p:txBody>
+      </p:sp>
+      <p:sp>
+        <p:nvSpPr>
+          <p:cNvPr id="84" name="Rectangle 83">
+            <a:extLst>
+              <a:ext uri="{FF2B5EF4-FFF2-40B4-BE49-F238E27FC236}">
+                <a16:creationId xmlns:a16="http://schemas.microsoft.com/office/drawing/2014/main" id="{A2CEEFE0-8249-474B-8326-0CFA52AEA9DA}"/>
+              </a:ext>
+            </a:extLst>
+          </p:cNvPr>
+          <p:cNvSpPr/>
+          <p:nvPr/>
+        </p:nvSpPr>
+        <p:spPr>
+          <a:xfrm>
+            <a:off x="850469" y="10916288"/>
+            <a:ext cx="1184245" cy="260978"/>
+          </a:xfrm>
+          <a:prstGeom prst="rect">
+            <a:avLst/>
+          </a:prstGeom>
+          <a:noFill/>
+          <a:ln>
+            <a:noFill/>
+          </a:ln>
+        </p:spPr>
+        <p:style>
+          <a:lnRef idx="2">
+            <a:schemeClr val="accent1">
+              <a:shade val="50000"/>
+            </a:schemeClr>
+          </a:lnRef>
+          <a:fillRef idx="1">
+            <a:schemeClr val="accent1"/>
+          </a:fillRef>
+          <a:effectRef idx="0">
+            <a:schemeClr val="accent1"/>
+          </a:effectRef>
+          <a:fontRef idx="minor">
+            <a:schemeClr val="lt1"/>
+          </a:fontRef>
+        </p:style>
+        <p:txBody>
+          <a:bodyPr rtlCol="0" anchor="ctr"/>
+          <a:lstStyle/>
+          <a:p>
+            <a:r>
+              <a:rPr lang="en-US" sz="1600" dirty="0">
+                <a:solidFill>
+                  <a:schemeClr val="accent5">
+                    <a:lumMod val="50000"/>
+                  </a:schemeClr>
+                </a:solidFill>
+              </a:rPr>
+              <a:t>&lt;svg&gt; .</a:t>
+            </a:r>
+            <a:r>
+              <a:rPr lang="en-US" sz="1600" dirty="0" err="1">
+                <a:solidFill>
+                  <a:schemeClr val="accent5">
+                    <a:lumMod val="50000"/>
+                  </a:schemeClr>
+                </a:solidFill>
+              </a:rPr>
+              <a:t>card__icon</a:t>
+            </a:r>
+            <a:endParaRPr lang="en-US" sz="1600" dirty="0">
+              <a:solidFill>
+                <a:schemeClr val="accent5">
+                  <a:lumMod val="50000"/>
+                </a:schemeClr>
+              </a:solidFill>
+            </a:endParaRPr>
+          </a:p>
+        </p:txBody>
+      </p:sp>
       <p:grpSp>
         <p:nvGrpSpPr>
-          <p:cNvPr id="74" name="Group 73">
+          <p:cNvPr id="85" name="Group 84">
             <a:extLst>
               <a:ext uri="{FF2B5EF4-FFF2-40B4-BE49-F238E27FC236}">
-                <a16:creationId xmlns:a16="http://schemas.microsoft.com/office/drawing/2014/main" id="{D9D90B19-A5CA-C741-B241-228F4924DBF0}"/>
+                <a16:creationId xmlns:a16="http://schemas.microsoft.com/office/drawing/2014/main" id="{ADB5C88F-710F-0F4A-A2C9-A9099A172397}"/>
               </a:ext>
             </a:extLst>
           </p:cNvPr>
@@ -9683,18 +11155,426 @@
         </p:nvGrpSpPr>
         <p:grpSpPr>
           <a:xfrm>
-            <a:off x="7361193" y="3834401"/>
-            <a:ext cx="2561057" cy="1331958"/>
-            <a:chOff x="842732" y="2019825"/>
-            <a:chExt cx="1379290" cy="540451"/>
+            <a:off x="2175086" y="10783969"/>
+            <a:ext cx="3505138" cy="591032"/>
+            <a:chOff x="1215096" y="1834122"/>
+            <a:chExt cx="1887737" cy="239815"/>
           </a:xfrm>
         </p:grpSpPr>
         <p:sp>
           <p:nvSpPr>
-            <p:cNvPr id="75" name="Rectangle 74">
+            <p:cNvPr id="86" name="Rectangle 85">
               <a:extLst>
                 <a:ext uri="{FF2B5EF4-FFF2-40B4-BE49-F238E27FC236}">
-                  <a16:creationId xmlns:a16="http://schemas.microsoft.com/office/drawing/2014/main" id="{A061DA4C-D894-AE42-BA4D-D0AA3165C679}"/>
+                  <a16:creationId xmlns:a16="http://schemas.microsoft.com/office/drawing/2014/main" id="{A16B4387-34DA-6347-BDE0-07CDAF55BEDB}"/>
+                </a:ext>
+              </a:extLst>
+            </p:cNvPr>
+            <p:cNvSpPr/>
+            <p:nvPr/>
+          </p:nvSpPr>
+          <p:spPr>
+            <a:xfrm>
+              <a:off x="1215096" y="1834122"/>
+              <a:ext cx="1887737" cy="239815"/>
+            </a:xfrm>
+            <a:prstGeom prst="rect">
+              <a:avLst/>
+            </a:prstGeom>
+            <a:solidFill>
+              <a:srgbClr val="FF0000">
+                <a:alpha val="10196"/>
+              </a:srgbClr>
+            </a:solidFill>
+            <a:ln>
+              <a:solidFill>
+                <a:srgbClr val="C00000"/>
+              </a:solidFill>
+            </a:ln>
+          </p:spPr>
+          <p:style>
+            <a:lnRef idx="2">
+              <a:schemeClr val="accent1">
+                <a:shade val="50000"/>
+              </a:schemeClr>
+            </a:lnRef>
+            <a:fillRef idx="1">
+              <a:schemeClr val="accent1"/>
+            </a:fillRef>
+            <a:effectRef idx="0">
+              <a:schemeClr val="accent1"/>
+            </a:effectRef>
+            <a:fontRef idx="minor">
+              <a:schemeClr val="lt1"/>
+            </a:fontRef>
+          </p:style>
+          <p:txBody>
+            <a:bodyPr rtlCol="0" anchor="ctr"/>
+            <a:lstStyle/>
+            <a:p>
+              <a:pPr algn="ctr"/>
+              <a:endParaRPr lang="en-US" dirty="0"/>
+            </a:p>
+          </p:txBody>
+        </p:sp>
+        <p:sp>
+          <p:nvSpPr>
+            <p:cNvPr id="87" name="Rectangle 86">
+              <a:extLst>
+                <a:ext uri="{FF2B5EF4-FFF2-40B4-BE49-F238E27FC236}">
+                  <a16:creationId xmlns:a16="http://schemas.microsoft.com/office/drawing/2014/main" id="{3A4A16C9-9479-974F-8B08-8A51C7B2551B}"/>
+                </a:ext>
+              </a:extLst>
+            </p:cNvPr>
+            <p:cNvSpPr/>
+            <p:nvPr/>
+          </p:nvSpPr>
+          <p:spPr>
+            <a:xfrm>
+              <a:off x="1500347" y="1854883"/>
+              <a:ext cx="1394679" cy="198293"/>
+            </a:xfrm>
+            <a:prstGeom prst="rect">
+              <a:avLst/>
+            </a:prstGeom>
+            <a:noFill/>
+            <a:ln>
+              <a:noFill/>
+            </a:ln>
+          </p:spPr>
+          <p:style>
+            <a:lnRef idx="2">
+              <a:schemeClr val="accent1">
+                <a:shade val="50000"/>
+              </a:schemeClr>
+            </a:lnRef>
+            <a:fillRef idx="1">
+              <a:schemeClr val="accent1"/>
+            </a:fillRef>
+            <a:effectRef idx="0">
+              <a:schemeClr val="accent1"/>
+            </a:effectRef>
+            <a:fontRef idx="minor">
+              <a:schemeClr val="lt1"/>
+            </a:fontRef>
+          </p:style>
+          <p:txBody>
+            <a:bodyPr rtlCol="0" anchor="ctr"/>
+            <a:lstStyle/>
+            <a:p>
+              <a:r>
+                <a:rPr lang="en-US" sz="1600" dirty="0">
+                  <a:solidFill>
+                    <a:srgbClr val="C00000"/>
+                  </a:solidFill>
+                </a:rPr>
+                <a:t>&lt;span&gt; .card__</a:t>
+              </a:r>
+              <a:r>
+                <a:rPr lang="en-US" sz="1600" dirty="0" err="1">
+                  <a:solidFill>
+                    <a:srgbClr val="C00000"/>
+                  </a:solidFill>
+                </a:rPr>
+                <a:t>header_span</a:t>
+              </a:r>
+              <a:endParaRPr lang="en-US" sz="1600" dirty="0">
+                <a:solidFill>
+                  <a:srgbClr val="C00000"/>
+                </a:solidFill>
+              </a:endParaRPr>
+            </a:p>
+          </p:txBody>
+        </p:sp>
+      </p:grpSp>
+      <p:grpSp>
+        <p:nvGrpSpPr>
+          <p:cNvPr id="88" name="Group 87">
+            <a:extLst>
+              <a:ext uri="{FF2B5EF4-FFF2-40B4-BE49-F238E27FC236}">
+                <a16:creationId xmlns:a16="http://schemas.microsoft.com/office/drawing/2014/main" id="{B51DFBF6-5DEB-DE45-AE13-39F406BE74CE}"/>
+              </a:ext>
+            </a:extLst>
+          </p:cNvPr>
+          <p:cNvGrpSpPr/>
+          <p:nvPr/>
+        </p:nvGrpSpPr>
+        <p:grpSpPr>
+          <a:xfrm>
+            <a:off x="5040203" y="6500660"/>
+            <a:ext cx="7075610" cy="3660990"/>
+            <a:chOff x="838727" y="1649579"/>
+            <a:chExt cx="2382239" cy="1406467"/>
+          </a:xfrm>
+        </p:grpSpPr>
+        <p:sp>
+          <p:nvSpPr>
+            <p:cNvPr id="89" name="Rectangle 88">
+              <a:extLst>
+                <a:ext uri="{FF2B5EF4-FFF2-40B4-BE49-F238E27FC236}">
+                  <a16:creationId xmlns:a16="http://schemas.microsoft.com/office/drawing/2014/main" id="{85647FCF-CAFB-0945-871D-7E4A875F8217}"/>
+                </a:ext>
+              </a:extLst>
+            </p:cNvPr>
+            <p:cNvSpPr/>
+            <p:nvPr/>
+          </p:nvSpPr>
+          <p:spPr>
+            <a:xfrm>
+              <a:off x="838727" y="1834120"/>
+              <a:ext cx="2382239" cy="1221926"/>
+            </a:xfrm>
+            <a:prstGeom prst="rect">
+              <a:avLst/>
+            </a:prstGeom>
+            <a:solidFill>
+              <a:srgbClr val="FF0000">
+                <a:alpha val="10196"/>
+              </a:srgbClr>
+            </a:solidFill>
+            <a:ln>
+              <a:solidFill>
+                <a:srgbClr val="C00000"/>
+              </a:solidFill>
+            </a:ln>
+          </p:spPr>
+          <p:style>
+            <a:lnRef idx="2">
+              <a:schemeClr val="accent1">
+                <a:shade val="50000"/>
+              </a:schemeClr>
+            </a:lnRef>
+            <a:fillRef idx="1">
+              <a:schemeClr val="accent1"/>
+            </a:fillRef>
+            <a:effectRef idx="0">
+              <a:schemeClr val="accent1"/>
+            </a:effectRef>
+            <a:fontRef idx="minor">
+              <a:schemeClr val="lt1"/>
+            </a:fontRef>
+          </p:style>
+          <p:txBody>
+            <a:bodyPr rtlCol="0" anchor="ctr"/>
+            <a:lstStyle/>
+            <a:p>
+              <a:pPr algn="ctr"/>
+              <a:endParaRPr lang="en-US" dirty="0"/>
+            </a:p>
+          </p:txBody>
+        </p:sp>
+        <p:sp>
+          <p:nvSpPr>
+            <p:cNvPr id="90" name="Rectangle 89">
+              <a:extLst>
+                <a:ext uri="{FF2B5EF4-FFF2-40B4-BE49-F238E27FC236}">
+                  <a16:creationId xmlns:a16="http://schemas.microsoft.com/office/drawing/2014/main" id="{CF3315C2-C3EF-2F42-B472-125724B70B3A}"/>
+                </a:ext>
+              </a:extLst>
+            </p:cNvPr>
+            <p:cNvSpPr/>
+            <p:nvPr/>
+          </p:nvSpPr>
+          <p:spPr>
+            <a:xfrm>
+              <a:off x="859484" y="1649579"/>
+              <a:ext cx="1938420" cy="198293"/>
+            </a:xfrm>
+            <a:prstGeom prst="rect">
+              <a:avLst/>
+            </a:prstGeom>
+            <a:noFill/>
+            <a:ln>
+              <a:noFill/>
+            </a:ln>
+          </p:spPr>
+          <p:style>
+            <a:lnRef idx="2">
+              <a:schemeClr val="accent1">
+                <a:shade val="50000"/>
+              </a:schemeClr>
+            </a:lnRef>
+            <a:fillRef idx="1">
+              <a:schemeClr val="accent1"/>
+            </a:fillRef>
+            <a:effectRef idx="0">
+              <a:schemeClr val="accent1"/>
+            </a:effectRef>
+            <a:fontRef idx="minor">
+              <a:schemeClr val="lt1"/>
+            </a:fontRef>
+          </p:style>
+          <p:txBody>
+            <a:bodyPr rtlCol="0" anchor="ctr"/>
+            <a:lstStyle/>
+            <a:p>
+              <a:r>
+                <a:rPr lang="en-US" sz="2000" dirty="0">
+                  <a:solidFill>
+                    <a:srgbClr val="C00000"/>
+                  </a:solidFill>
+                </a:rPr>
+                <a:t>&lt;div&gt; .</a:t>
+              </a:r>
+              <a:r>
+                <a:rPr lang="en-US" sz="2000" dirty="0" err="1">
+                  <a:solidFill>
+                    <a:srgbClr val="C00000"/>
+                  </a:solidFill>
+                </a:rPr>
+                <a:t>card__content_clients</a:t>
+              </a:r>
+              <a:endParaRPr lang="en-US" sz="2000" dirty="0">
+                <a:solidFill>
+                  <a:srgbClr val="C00000"/>
+                </a:solidFill>
+              </a:endParaRPr>
+            </a:p>
+          </p:txBody>
+        </p:sp>
+      </p:grpSp>
+      <p:sp>
+        <p:nvSpPr>
+          <p:cNvPr id="91" name="Rectangle 90">
+            <a:extLst>
+              <a:ext uri="{FF2B5EF4-FFF2-40B4-BE49-F238E27FC236}">
+                <a16:creationId xmlns:a16="http://schemas.microsoft.com/office/drawing/2014/main" id="{6E8C58CF-FF6D-E940-B438-D073C8BCAAD1}"/>
+              </a:ext>
+            </a:extLst>
+          </p:cNvPr>
+          <p:cNvSpPr/>
+          <p:nvPr/>
+        </p:nvSpPr>
+        <p:spPr>
+          <a:xfrm>
+            <a:off x="5148096" y="7084456"/>
+            <a:ext cx="6812195" cy="2915101"/>
+          </a:xfrm>
+          <a:prstGeom prst="rect">
+            <a:avLst/>
+          </a:prstGeom>
+          <a:solidFill>
+            <a:schemeClr val="accent5">
+              <a:alpha val="10196"/>
+            </a:schemeClr>
+          </a:solidFill>
+          <a:ln>
+            <a:solidFill>
+              <a:schemeClr val="accent5">
+                <a:lumMod val="50000"/>
+              </a:schemeClr>
+            </a:solidFill>
+          </a:ln>
+        </p:spPr>
+        <p:style>
+          <a:lnRef idx="2">
+            <a:schemeClr val="accent1">
+              <a:shade val="50000"/>
+            </a:schemeClr>
+          </a:lnRef>
+          <a:fillRef idx="1">
+            <a:schemeClr val="accent1"/>
+          </a:fillRef>
+          <a:effectRef idx="0">
+            <a:schemeClr val="accent1"/>
+          </a:effectRef>
+          <a:fontRef idx="minor">
+            <a:schemeClr val="lt1"/>
+          </a:fontRef>
+        </p:style>
+        <p:txBody>
+          <a:bodyPr rtlCol="0" anchor="ctr"/>
+          <a:lstStyle/>
+          <a:p>
+            <a:pPr algn="ctr"/>
+            <a:endParaRPr lang="en-US" dirty="0"/>
+          </a:p>
+        </p:txBody>
+      </p:sp>
+      <p:sp>
+        <p:nvSpPr>
+          <p:cNvPr id="92" name="Rectangle 91">
+            <a:extLst>
+              <a:ext uri="{FF2B5EF4-FFF2-40B4-BE49-F238E27FC236}">
+                <a16:creationId xmlns:a16="http://schemas.microsoft.com/office/drawing/2014/main" id="{46EB3607-129A-4348-801C-078C11283779}"/>
+              </a:ext>
+            </a:extLst>
+          </p:cNvPr>
+          <p:cNvSpPr/>
+          <p:nvPr/>
+        </p:nvSpPr>
+        <p:spPr>
+          <a:xfrm>
+            <a:off x="5179806" y="6992204"/>
+            <a:ext cx="3870675" cy="548762"/>
+          </a:xfrm>
+          <a:prstGeom prst="rect">
+            <a:avLst/>
+          </a:prstGeom>
+          <a:noFill/>
+          <a:ln>
+            <a:noFill/>
+          </a:ln>
+        </p:spPr>
+        <p:style>
+          <a:lnRef idx="2">
+            <a:schemeClr val="accent1">
+              <a:shade val="50000"/>
+            </a:schemeClr>
+          </a:lnRef>
+          <a:fillRef idx="1">
+            <a:schemeClr val="accent1"/>
+          </a:fillRef>
+          <a:effectRef idx="0">
+            <a:schemeClr val="accent1"/>
+          </a:effectRef>
+          <a:fontRef idx="minor">
+            <a:schemeClr val="lt1"/>
+          </a:fontRef>
+        </p:style>
+        <p:txBody>
+          <a:bodyPr rtlCol="0" anchor="ctr"/>
+          <a:lstStyle/>
+          <a:p>
+            <a:r>
+              <a:rPr lang="en-US" sz="1600" dirty="0">
+                <a:solidFill>
+                  <a:schemeClr val="accent5">
+                    <a:lumMod val="50000"/>
+                  </a:schemeClr>
+                </a:solidFill>
+              </a:rPr>
+              <a:t>&lt;div&gt; .icons-container</a:t>
+            </a:r>
+          </a:p>
+        </p:txBody>
+      </p:sp>
+      <p:grpSp>
+        <p:nvGrpSpPr>
+          <p:cNvPr id="93" name="Group 92">
+            <a:extLst>
+              <a:ext uri="{FF2B5EF4-FFF2-40B4-BE49-F238E27FC236}">
+                <a16:creationId xmlns:a16="http://schemas.microsoft.com/office/drawing/2014/main" id="{9A9EF228-99C6-EA4D-8BD9-FF42DE677694}"/>
+              </a:ext>
+            </a:extLst>
+          </p:cNvPr>
+          <p:cNvGrpSpPr/>
+          <p:nvPr/>
+        </p:nvGrpSpPr>
+        <p:grpSpPr>
+          <a:xfrm>
+            <a:off x="5330432" y="7502037"/>
+            <a:ext cx="2002851" cy="1110404"/>
+            <a:chOff x="842732" y="2019825"/>
+            <a:chExt cx="1078661" cy="450554"/>
+          </a:xfrm>
+        </p:grpSpPr>
+        <p:sp>
+          <p:nvSpPr>
+            <p:cNvPr id="94" name="Rectangle 93">
+              <a:extLst>
+                <a:ext uri="{FF2B5EF4-FFF2-40B4-BE49-F238E27FC236}">
+                  <a16:creationId xmlns:a16="http://schemas.microsoft.com/office/drawing/2014/main" id="{F3C221EF-12DD-264C-A143-8245A68115FD}"/>
                 </a:ext>
               </a:extLst>
             </p:cNvPr>
@@ -9704,7 +11584,7 @@
           <p:spPr>
             <a:xfrm>
               <a:off x="842732" y="2019825"/>
-              <a:ext cx="1088639" cy="540451"/>
+              <a:ext cx="1078661" cy="450554"/>
             </a:xfrm>
             <a:prstGeom prst="rect">
               <a:avLst/>
@@ -9749,10 +11629,10 @@
         </p:sp>
         <p:sp>
           <p:nvSpPr>
-            <p:cNvPr id="76" name="Rectangle 75">
+            <p:cNvPr id="95" name="Rectangle 94">
               <a:extLst>
                 <a:ext uri="{FF2B5EF4-FFF2-40B4-BE49-F238E27FC236}">
-                  <a16:creationId xmlns:a16="http://schemas.microsoft.com/office/drawing/2014/main" id="{0A6FBB0C-9D9D-CE4E-9E7D-A509BF4F5649}"/>
+                  <a16:creationId xmlns:a16="http://schemas.microsoft.com/office/drawing/2014/main" id="{71C1D662-1618-8546-8871-00256D0B6E7F}"/>
                 </a:ext>
               </a:extLst>
             </p:cNvPr>
@@ -9761,8 +11641,8 @@
           </p:nvSpPr>
           <p:spPr>
             <a:xfrm>
-              <a:off x="842732" y="2046553"/>
-              <a:ext cx="1379290" cy="198293"/>
+              <a:off x="929420" y="2046553"/>
+              <a:ext cx="890745" cy="418341"/>
             </a:xfrm>
             <a:prstGeom prst="rect">
               <a:avLst/>
@@ -9800,7 +11680,7 @@
                     </a:schemeClr>
                   </a:solidFill>
                 </a:rPr>
-                <a:t>&lt;img&gt; </a:t>
+                <a:t>&lt;div&gt; </a:t>
               </a:r>
             </a:p>
             <a:p>
@@ -9812,33 +11692,685 @@
                     </a:schemeClr>
                   </a:solidFill>
                 </a:rPr>
-                <a:t>.latest-</a:t>
+                <a:t>.icons-container</a:t>
               </a:r>
+            </a:p>
+            <a:p>
               <a:r>
-                <a:rPr lang="en-US" sz="1600" dirty="0" err="1">
+                <a:rPr lang="en-US" sz="1600" dirty="0">
                   <a:solidFill>
                     <a:schemeClr val="accent6">
                       <a:lumMod val="50000"/>
                     </a:schemeClr>
                   </a:solidFill>
                 </a:rPr>
-                <a:t>works__image</a:t>
+                <a:t>__icon-container</a:t>
               </a:r>
-              <a:endParaRPr lang="en-US" sz="1600" dirty="0">
-                <a:solidFill>
-                  <a:schemeClr val="accent6">
-                    <a:lumMod val="50000"/>
-                  </a:schemeClr>
-                </a:solidFill>
-              </a:endParaRPr>
             </a:p>
           </p:txBody>
         </p:sp>
       </p:grpSp>
+      <p:sp>
+        <p:nvSpPr>
+          <p:cNvPr id="98" name="Rectangle 97">
+            <a:extLst>
+              <a:ext uri="{FF2B5EF4-FFF2-40B4-BE49-F238E27FC236}">
+                <a16:creationId xmlns:a16="http://schemas.microsoft.com/office/drawing/2014/main" id="{C4E5BAB3-B6EB-5745-9D98-4069FF66AF01}"/>
+              </a:ext>
+            </a:extLst>
+          </p:cNvPr>
+          <p:cNvSpPr/>
+          <p:nvPr/>
+        </p:nvSpPr>
+        <p:spPr>
+          <a:xfrm>
+            <a:off x="7560785" y="7502037"/>
+            <a:ext cx="2002851" cy="1110404"/>
+          </a:xfrm>
+          <a:prstGeom prst="rect">
+            <a:avLst/>
+          </a:prstGeom>
+          <a:solidFill>
+            <a:schemeClr val="accent6">
+              <a:alpha val="10196"/>
+            </a:schemeClr>
+          </a:solidFill>
+          <a:ln>
+            <a:solidFill>
+              <a:schemeClr val="accent6">
+                <a:lumMod val="50000"/>
+              </a:schemeClr>
+            </a:solidFill>
+          </a:ln>
+        </p:spPr>
+        <p:style>
+          <a:lnRef idx="2">
+            <a:schemeClr val="accent1">
+              <a:shade val="50000"/>
+            </a:schemeClr>
+          </a:lnRef>
+          <a:fillRef idx="1">
+            <a:schemeClr val="accent1"/>
+          </a:fillRef>
+          <a:effectRef idx="0">
+            <a:schemeClr val="accent1"/>
+          </a:effectRef>
+          <a:fontRef idx="minor">
+            <a:schemeClr val="lt1"/>
+          </a:fontRef>
+        </p:style>
+        <p:txBody>
+          <a:bodyPr rtlCol="0" anchor="ctr"/>
+          <a:lstStyle/>
+          <a:p>
+            <a:pPr algn="ctr"/>
+            <a:endParaRPr lang="en-US" dirty="0"/>
+          </a:p>
+        </p:txBody>
+      </p:sp>
+      <p:sp>
+        <p:nvSpPr>
+          <p:cNvPr id="100" name="Rectangle 99">
+            <a:extLst>
+              <a:ext uri="{FF2B5EF4-FFF2-40B4-BE49-F238E27FC236}">
+                <a16:creationId xmlns:a16="http://schemas.microsoft.com/office/drawing/2014/main" id="{023D4C8E-9417-5645-BE4F-3250B6ABC30A}"/>
+              </a:ext>
+            </a:extLst>
+          </p:cNvPr>
+          <p:cNvSpPr/>
+          <p:nvPr/>
+        </p:nvSpPr>
+        <p:spPr>
+          <a:xfrm>
+            <a:off x="9776795" y="7502037"/>
+            <a:ext cx="2002851" cy="1110404"/>
+          </a:xfrm>
+          <a:prstGeom prst="rect">
+            <a:avLst/>
+          </a:prstGeom>
+          <a:solidFill>
+            <a:schemeClr val="accent6">
+              <a:alpha val="10196"/>
+            </a:schemeClr>
+          </a:solidFill>
+          <a:ln>
+            <a:solidFill>
+              <a:schemeClr val="accent6">
+                <a:lumMod val="50000"/>
+              </a:schemeClr>
+            </a:solidFill>
+          </a:ln>
+        </p:spPr>
+        <p:style>
+          <a:lnRef idx="2">
+            <a:schemeClr val="accent1">
+              <a:shade val="50000"/>
+            </a:schemeClr>
+          </a:lnRef>
+          <a:fillRef idx="1">
+            <a:schemeClr val="accent1"/>
+          </a:fillRef>
+          <a:effectRef idx="0">
+            <a:schemeClr val="accent1"/>
+          </a:effectRef>
+          <a:fontRef idx="minor">
+            <a:schemeClr val="lt1"/>
+          </a:fontRef>
+        </p:style>
+        <p:txBody>
+          <a:bodyPr rtlCol="0" anchor="ctr"/>
+          <a:lstStyle/>
+          <a:p>
+            <a:pPr algn="ctr"/>
+            <a:endParaRPr lang="en-US" dirty="0"/>
+          </a:p>
+        </p:txBody>
+      </p:sp>
+      <p:sp>
+        <p:nvSpPr>
+          <p:cNvPr id="102" name="Rectangle 101">
+            <a:extLst>
+              <a:ext uri="{FF2B5EF4-FFF2-40B4-BE49-F238E27FC236}">
+                <a16:creationId xmlns:a16="http://schemas.microsoft.com/office/drawing/2014/main" id="{57CB0A27-CFF9-4A46-9A96-8BA7BED4BCC6}"/>
+              </a:ext>
+            </a:extLst>
+          </p:cNvPr>
+          <p:cNvSpPr/>
+          <p:nvPr/>
+        </p:nvSpPr>
+        <p:spPr>
+          <a:xfrm>
+            <a:off x="5337798" y="8707172"/>
+            <a:ext cx="2002851" cy="1110404"/>
+          </a:xfrm>
+          <a:prstGeom prst="rect">
+            <a:avLst/>
+          </a:prstGeom>
+          <a:solidFill>
+            <a:schemeClr val="accent6">
+              <a:alpha val="10196"/>
+            </a:schemeClr>
+          </a:solidFill>
+          <a:ln>
+            <a:solidFill>
+              <a:schemeClr val="accent6">
+                <a:lumMod val="50000"/>
+              </a:schemeClr>
+            </a:solidFill>
+          </a:ln>
+        </p:spPr>
+        <p:style>
+          <a:lnRef idx="2">
+            <a:schemeClr val="accent1">
+              <a:shade val="50000"/>
+            </a:schemeClr>
+          </a:lnRef>
+          <a:fillRef idx="1">
+            <a:schemeClr val="accent1"/>
+          </a:fillRef>
+          <a:effectRef idx="0">
+            <a:schemeClr val="accent1"/>
+          </a:effectRef>
+          <a:fontRef idx="minor">
+            <a:schemeClr val="lt1"/>
+          </a:fontRef>
+        </p:style>
+        <p:txBody>
+          <a:bodyPr rtlCol="0" anchor="ctr"/>
+          <a:lstStyle/>
+          <a:p>
+            <a:pPr algn="ctr"/>
+            <a:endParaRPr lang="en-US" dirty="0"/>
+          </a:p>
+        </p:txBody>
+      </p:sp>
+      <p:sp>
+        <p:nvSpPr>
+          <p:cNvPr id="104" name="Rectangle 103">
+            <a:extLst>
+              <a:ext uri="{FF2B5EF4-FFF2-40B4-BE49-F238E27FC236}">
+                <a16:creationId xmlns:a16="http://schemas.microsoft.com/office/drawing/2014/main" id="{140B8A68-0D40-344D-BE7D-D18896B0B2AE}"/>
+              </a:ext>
+            </a:extLst>
+          </p:cNvPr>
+          <p:cNvSpPr/>
+          <p:nvPr/>
+        </p:nvSpPr>
+        <p:spPr>
+          <a:xfrm>
+            <a:off x="7569538" y="8707172"/>
+            <a:ext cx="2002851" cy="1110404"/>
+          </a:xfrm>
+          <a:prstGeom prst="rect">
+            <a:avLst/>
+          </a:prstGeom>
+          <a:solidFill>
+            <a:schemeClr val="accent6">
+              <a:alpha val="10196"/>
+            </a:schemeClr>
+          </a:solidFill>
+          <a:ln>
+            <a:solidFill>
+              <a:schemeClr val="accent6">
+                <a:lumMod val="50000"/>
+              </a:schemeClr>
+            </a:solidFill>
+          </a:ln>
+        </p:spPr>
+        <p:style>
+          <a:lnRef idx="2">
+            <a:schemeClr val="accent1">
+              <a:shade val="50000"/>
+            </a:schemeClr>
+          </a:lnRef>
+          <a:fillRef idx="1">
+            <a:schemeClr val="accent1"/>
+          </a:fillRef>
+          <a:effectRef idx="0">
+            <a:schemeClr val="accent1"/>
+          </a:effectRef>
+          <a:fontRef idx="minor">
+            <a:schemeClr val="lt1"/>
+          </a:fontRef>
+        </p:style>
+        <p:txBody>
+          <a:bodyPr rtlCol="0" anchor="ctr"/>
+          <a:lstStyle/>
+          <a:p>
+            <a:pPr algn="ctr"/>
+            <a:endParaRPr lang="en-US" dirty="0"/>
+          </a:p>
+        </p:txBody>
+      </p:sp>
+      <p:sp>
+        <p:nvSpPr>
+          <p:cNvPr id="105" name="Rectangle 104">
+            <a:extLst>
+              <a:ext uri="{FF2B5EF4-FFF2-40B4-BE49-F238E27FC236}">
+                <a16:creationId xmlns:a16="http://schemas.microsoft.com/office/drawing/2014/main" id="{608EBD62-140B-2944-B329-75E589693C50}"/>
+              </a:ext>
+            </a:extLst>
+          </p:cNvPr>
+          <p:cNvSpPr/>
+          <p:nvPr/>
+        </p:nvSpPr>
+        <p:spPr>
+          <a:xfrm>
+            <a:off x="9785548" y="8707172"/>
+            <a:ext cx="2002851" cy="1110404"/>
+          </a:xfrm>
+          <a:prstGeom prst="rect">
+            <a:avLst/>
+          </a:prstGeom>
+          <a:solidFill>
+            <a:schemeClr val="accent6">
+              <a:alpha val="10196"/>
+            </a:schemeClr>
+          </a:solidFill>
+          <a:ln>
+            <a:solidFill>
+              <a:schemeClr val="accent6">
+                <a:lumMod val="50000"/>
+              </a:schemeClr>
+            </a:solidFill>
+          </a:ln>
+        </p:spPr>
+        <p:style>
+          <a:lnRef idx="2">
+            <a:schemeClr val="accent1">
+              <a:shade val="50000"/>
+            </a:schemeClr>
+          </a:lnRef>
+          <a:fillRef idx="1">
+            <a:schemeClr val="accent1"/>
+          </a:fillRef>
+          <a:effectRef idx="0">
+            <a:schemeClr val="accent1"/>
+          </a:effectRef>
+          <a:fontRef idx="minor">
+            <a:schemeClr val="lt1"/>
+          </a:fontRef>
+        </p:style>
+        <p:txBody>
+          <a:bodyPr rtlCol="0" anchor="ctr"/>
+          <a:lstStyle/>
+          <a:p>
+            <a:pPr algn="ctr"/>
+            <a:endParaRPr lang="en-US" dirty="0"/>
+          </a:p>
+        </p:txBody>
+      </p:sp>
+      <p:sp>
+        <p:nvSpPr>
+          <p:cNvPr id="109" name="Rectangle 108">
+            <a:extLst>
+              <a:ext uri="{FF2B5EF4-FFF2-40B4-BE49-F238E27FC236}">
+                <a16:creationId xmlns:a16="http://schemas.microsoft.com/office/drawing/2014/main" id="{3D294D9B-9D9A-8840-8578-F8A58245435B}"/>
+              </a:ext>
+            </a:extLst>
+          </p:cNvPr>
+          <p:cNvSpPr/>
+          <p:nvPr/>
+        </p:nvSpPr>
+        <p:spPr>
+          <a:xfrm>
+            <a:off x="7696062" y="7638602"/>
+            <a:ext cx="1737870" cy="814021"/>
+          </a:xfrm>
+          <a:prstGeom prst="rect">
+            <a:avLst/>
+          </a:prstGeom>
+          <a:solidFill>
+            <a:schemeClr val="accent4">
+              <a:alpha val="10196"/>
+            </a:schemeClr>
+          </a:solidFill>
+          <a:ln>
+            <a:solidFill>
+              <a:schemeClr val="accent4"/>
+            </a:solidFill>
+          </a:ln>
+        </p:spPr>
+        <p:style>
+          <a:lnRef idx="2">
+            <a:schemeClr val="accent1">
+              <a:shade val="50000"/>
+            </a:schemeClr>
+          </a:lnRef>
+          <a:fillRef idx="1">
+            <a:schemeClr val="accent1"/>
+          </a:fillRef>
+          <a:effectRef idx="0">
+            <a:schemeClr val="accent1"/>
+          </a:effectRef>
+          <a:fontRef idx="minor">
+            <a:schemeClr val="lt1"/>
+          </a:fontRef>
+        </p:style>
+        <p:txBody>
+          <a:bodyPr rtlCol="0" anchor="ctr"/>
+          <a:lstStyle/>
+          <a:p>
+            <a:pPr algn="ctr"/>
+            <a:endParaRPr lang="en-US" dirty="0"/>
+          </a:p>
+        </p:txBody>
+      </p:sp>
+      <p:sp>
+        <p:nvSpPr>
+          <p:cNvPr id="110" name="Rectangle 109">
+            <a:extLst>
+              <a:ext uri="{FF2B5EF4-FFF2-40B4-BE49-F238E27FC236}">
+                <a16:creationId xmlns:a16="http://schemas.microsoft.com/office/drawing/2014/main" id="{D7C664E9-5382-174C-85D2-71652565D69B}"/>
+              </a:ext>
+            </a:extLst>
+          </p:cNvPr>
+          <p:cNvSpPr/>
+          <p:nvPr/>
+        </p:nvSpPr>
+        <p:spPr>
+          <a:xfrm>
+            <a:off x="7774642" y="7686651"/>
+            <a:ext cx="1583096" cy="725730"/>
+          </a:xfrm>
+          <a:prstGeom prst="rect">
+            <a:avLst/>
+          </a:prstGeom>
+          <a:noFill/>
+          <a:ln>
+            <a:noFill/>
+          </a:ln>
+        </p:spPr>
+        <p:style>
+          <a:lnRef idx="2">
+            <a:schemeClr val="accent1">
+              <a:shade val="50000"/>
+            </a:schemeClr>
+          </a:lnRef>
+          <a:fillRef idx="1">
+            <a:schemeClr val="accent1"/>
+          </a:fillRef>
+          <a:effectRef idx="0">
+            <a:schemeClr val="accent1"/>
+          </a:effectRef>
+          <a:fontRef idx="minor">
+            <a:schemeClr val="lt1"/>
+          </a:fontRef>
+        </p:style>
+        <p:txBody>
+          <a:bodyPr rtlCol="0" anchor="ctr"/>
+          <a:lstStyle/>
+          <a:p>
+            <a:r>
+              <a:rPr lang="en-US" sz="1600" dirty="0">
+                <a:solidFill>
+                  <a:schemeClr val="accent2">
+                    <a:lumMod val="50000"/>
+                  </a:schemeClr>
+                </a:solidFill>
+              </a:rPr>
+              <a:t>&lt;svg&gt; .card</a:t>
+            </a:r>
+          </a:p>
+          <a:p>
+            <a:r>
+              <a:rPr lang="en-US" sz="1600" dirty="0">
+                <a:solidFill>
+                  <a:schemeClr val="accent2">
+                    <a:lumMod val="50000"/>
+                  </a:schemeClr>
+                </a:solidFill>
+              </a:rPr>
+              <a:t>__</a:t>
+            </a:r>
+            <a:r>
+              <a:rPr lang="en-US" sz="1600" dirty="0" err="1">
+                <a:solidFill>
+                  <a:schemeClr val="accent2">
+                    <a:lumMod val="50000"/>
+                  </a:schemeClr>
+                </a:solidFill>
+              </a:rPr>
+              <a:t>icon_content</a:t>
+            </a:r>
+            <a:endParaRPr lang="en-US" sz="1600" dirty="0">
+              <a:solidFill>
+                <a:schemeClr val="accent2">
+                  <a:lumMod val="50000"/>
+                </a:schemeClr>
+              </a:solidFill>
+            </a:endParaRPr>
+          </a:p>
+        </p:txBody>
+      </p:sp>
+      <p:sp>
+        <p:nvSpPr>
+          <p:cNvPr id="111" name="Rectangle 110">
+            <a:extLst>
+              <a:ext uri="{FF2B5EF4-FFF2-40B4-BE49-F238E27FC236}">
+                <a16:creationId xmlns:a16="http://schemas.microsoft.com/office/drawing/2014/main" id="{8DA50251-EA40-E143-A9E1-1CDD34CD7B42}"/>
+              </a:ext>
+            </a:extLst>
+          </p:cNvPr>
+          <p:cNvSpPr/>
+          <p:nvPr/>
+        </p:nvSpPr>
+        <p:spPr>
+          <a:xfrm>
+            <a:off x="9909285" y="7654626"/>
+            <a:ext cx="1737870" cy="814021"/>
+          </a:xfrm>
+          <a:prstGeom prst="rect">
+            <a:avLst/>
+          </a:prstGeom>
+          <a:solidFill>
+            <a:schemeClr val="accent4">
+              <a:alpha val="10196"/>
+            </a:schemeClr>
+          </a:solidFill>
+          <a:ln>
+            <a:solidFill>
+              <a:schemeClr val="accent4"/>
+            </a:solidFill>
+          </a:ln>
+        </p:spPr>
+        <p:style>
+          <a:lnRef idx="2">
+            <a:schemeClr val="accent1">
+              <a:shade val="50000"/>
+            </a:schemeClr>
+          </a:lnRef>
+          <a:fillRef idx="1">
+            <a:schemeClr val="accent1"/>
+          </a:fillRef>
+          <a:effectRef idx="0">
+            <a:schemeClr val="accent1"/>
+          </a:effectRef>
+          <a:fontRef idx="minor">
+            <a:schemeClr val="lt1"/>
+          </a:fontRef>
+        </p:style>
+        <p:txBody>
+          <a:bodyPr rtlCol="0" anchor="ctr"/>
+          <a:lstStyle/>
+          <a:p>
+            <a:pPr algn="ctr"/>
+            <a:endParaRPr lang="en-US" dirty="0"/>
+          </a:p>
+        </p:txBody>
+      </p:sp>
+      <p:sp>
+        <p:nvSpPr>
+          <p:cNvPr id="112" name="Rectangle 111">
+            <a:extLst>
+              <a:ext uri="{FF2B5EF4-FFF2-40B4-BE49-F238E27FC236}">
+                <a16:creationId xmlns:a16="http://schemas.microsoft.com/office/drawing/2014/main" id="{E367F132-18DC-0F47-97C6-E11EA67FDC09}"/>
+              </a:ext>
+            </a:extLst>
+          </p:cNvPr>
+          <p:cNvSpPr/>
+          <p:nvPr/>
+        </p:nvSpPr>
+        <p:spPr>
+          <a:xfrm>
+            <a:off x="7693275" y="8849282"/>
+            <a:ext cx="1737870" cy="814021"/>
+          </a:xfrm>
+          <a:prstGeom prst="rect">
+            <a:avLst/>
+          </a:prstGeom>
+          <a:solidFill>
+            <a:schemeClr val="accent4">
+              <a:alpha val="10196"/>
+            </a:schemeClr>
+          </a:solidFill>
+          <a:ln>
+            <a:solidFill>
+              <a:schemeClr val="accent4"/>
+            </a:solidFill>
+          </a:ln>
+        </p:spPr>
+        <p:style>
+          <a:lnRef idx="2">
+            <a:schemeClr val="accent1">
+              <a:shade val="50000"/>
+            </a:schemeClr>
+          </a:lnRef>
+          <a:fillRef idx="1">
+            <a:schemeClr val="accent1"/>
+          </a:fillRef>
+          <a:effectRef idx="0">
+            <a:schemeClr val="accent1"/>
+          </a:effectRef>
+          <a:fontRef idx="minor">
+            <a:schemeClr val="lt1"/>
+          </a:fontRef>
+        </p:style>
+        <p:txBody>
+          <a:bodyPr rtlCol="0" anchor="ctr"/>
+          <a:lstStyle/>
+          <a:p>
+            <a:pPr algn="ctr"/>
+            <a:endParaRPr lang="en-US" dirty="0"/>
+          </a:p>
+        </p:txBody>
+      </p:sp>
+      <p:sp>
+        <p:nvSpPr>
+          <p:cNvPr id="113" name="Rectangle 112">
+            <a:extLst>
+              <a:ext uri="{FF2B5EF4-FFF2-40B4-BE49-F238E27FC236}">
+                <a16:creationId xmlns:a16="http://schemas.microsoft.com/office/drawing/2014/main" id="{594BFD40-071B-2244-A14C-CEDAD2D2217E}"/>
+              </a:ext>
+            </a:extLst>
+          </p:cNvPr>
+          <p:cNvSpPr/>
+          <p:nvPr/>
+        </p:nvSpPr>
+        <p:spPr>
+          <a:xfrm>
+            <a:off x="9909285" y="8848102"/>
+            <a:ext cx="1737870" cy="814021"/>
+          </a:xfrm>
+          <a:prstGeom prst="rect">
+            <a:avLst/>
+          </a:prstGeom>
+          <a:solidFill>
+            <a:schemeClr val="accent4">
+              <a:alpha val="10196"/>
+            </a:schemeClr>
+          </a:solidFill>
+          <a:ln>
+            <a:solidFill>
+              <a:schemeClr val="accent4"/>
+            </a:solidFill>
+          </a:ln>
+        </p:spPr>
+        <p:style>
+          <a:lnRef idx="2">
+            <a:schemeClr val="accent1">
+              <a:shade val="50000"/>
+            </a:schemeClr>
+          </a:lnRef>
+          <a:fillRef idx="1">
+            <a:schemeClr val="accent1"/>
+          </a:fillRef>
+          <a:effectRef idx="0">
+            <a:schemeClr val="accent1"/>
+          </a:effectRef>
+          <a:fontRef idx="minor">
+            <a:schemeClr val="lt1"/>
+          </a:fontRef>
+        </p:style>
+        <p:txBody>
+          <a:bodyPr rtlCol="0" anchor="ctr"/>
+          <a:lstStyle/>
+          <a:p>
+            <a:pPr algn="ctr"/>
+            <a:endParaRPr lang="en-US" dirty="0"/>
+          </a:p>
+        </p:txBody>
+      </p:sp>
+      <p:sp>
+        <p:nvSpPr>
+          <p:cNvPr id="114" name="Rectangle 113">
+            <a:extLst>
+              <a:ext uri="{FF2B5EF4-FFF2-40B4-BE49-F238E27FC236}">
+                <a16:creationId xmlns:a16="http://schemas.microsoft.com/office/drawing/2014/main" id="{0356F71A-FCB2-0B41-B89F-EED48A2BBB3F}"/>
+              </a:ext>
+            </a:extLst>
+          </p:cNvPr>
+          <p:cNvSpPr/>
+          <p:nvPr/>
+        </p:nvSpPr>
+        <p:spPr>
+          <a:xfrm>
+            <a:off x="5483468" y="8848102"/>
+            <a:ext cx="1737870" cy="814021"/>
+          </a:xfrm>
+          <a:prstGeom prst="rect">
+            <a:avLst/>
+          </a:prstGeom>
+          <a:solidFill>
+            <a:schemeClr val="accent4">
+              <a:alpha val="10196"/>
+            </a:schemeClr>
+          </a:solidFill>
+          <a:ln>
+            <a:solidFill>
+              <a:schemeClr val="accent4"/>
+            </a:solidFill>
+          </a:ln>
+        </p:spPr>
+        <p:style>
+          <a:lnRef idx="2">
+            <a:schemeClr val="accent1">
+              <a:shade val="50000"/>
+            </a:schemeClr>
+          </a:lnRef>
+          <a:fillRef idx="1">
+            <a:schemeClr val="accent1"/>
+          </a:fillRef>
+          <a:effectRef idx="0">
+            <a:schemeClr val="accent1"/>
+          </a:effectRef>
+          <a:fontRef idx="minor">
+            <a:schemeClr val="lt1"/>
+          </a:fontRef>
+        </p:style>
+        <p:txBody>
+          <a:bodyPr rtlCol="0" anchor="ctr"/>
+          <a:lstStyle/>
+          <a:p>
+            <a:pPr algn="ctr"/>
+            <a:endParaRPr lang="en-US" dirty="0"/>
+          </a:p>
+        </p:txBody>
+      </p:sp>
     </p:spTree>
     <p:extLst>
       <p:ext uri="{BB962C8B-B14F-4D97-AF65-F5344CB8AC3E}">
-        <p14:creationId xmlns:p14="http://schemas.microsoft.com/office/powerpoint/2010/main" val="2179371068"/>
+        <p14:creationId xmlns:p14="http://schemas.microsoft.com/office/powerpoint/2010/main" val="274582813"/>
       </p:ext>
     </p:extLst>
   </p:cSld>

</xml_diff>

<commit_message>
implemented and styled "Testimonials" subsection
</commit_message>
<xml_diff>
--- a/layout.pptx
+++ b/layout.pptx
@@ -9856,7 +9856,23 @@
                     <a:schemeClr val="accent5"/>
                   </a:solidFill>
                 </a:rPr>
-                <a:t>&lt;div&gt; .content-container .content-horizontal-center</a:t>
+                <a:t>&lt;div&gt; .</a:t>
+              </a:r>
+              <a:r>
+                <a:rPr lang="en-US" sz="1600">
+                  <a:solidFill>
+                    <a:schemeClr val="accent5"/>
+                  </a:solidFill>
+                </a:rPr>
+                <a:t>content__container</a:t>
+              </a:r>
+              <a:r>
+                <a:rPr lang="en-US" sz="1600" dirty="0">
+                  <a:solidFill>
+                    <a:schemeClr val="accent5"/>
+                  </a:solidFill>
+                </a:rPr>
+                <a:t> .content-horizontal-center</a:t>
               </a:r>
             </a:p>
           </p:txBody>

</xml_diff>

<commit_message>
svg sprites: added logos for the "Our Clients" section
</commit_message>
<xml_diff>
--- a/layout.pptx
+++ b/layout.pptx
@@ -9859,7 +9859,7 @@
                 <a:t>&lt;div&gt; .</a:t>
               </a:r>
               <a:r>
-                <a:rPr lang="en-US" sz="1600">
+                <a:rPr lang="en-US" sz="1600" dirty="0" err="1">
                   <a:solidFill>
                     <a:schemeClr val="accent5"/>
                   </a:solidFill>
@@ -12380,6 +12380,309 @@
           <a:p>
             <a:pPr algn="ctr"/>
             <a:endParaRPr lang="en-US" dirty="0"/>
+          </a:p>
+        </p:txBody>
+      </p:sp>
+      <p:sp>
+        <p:nvSpPr>
+          <p:cNvPr id="3" name="Rectangle 2">
+            <a:extLst>
+              <a:ext uri="{FF2B5EF4-FFF2-40B4-BE49-F238E27FC236}">
+                <a16:creationId xmlns:a16="http://schemas.microsoft.com/office/drawing/2014/main" id="{7A911345-1AA6-CC4B-AB1A-A8F10C4F527F}"/>
+              </a:ext>
+            </a:extLst>
+          </p:cNvPr>
+          <p:cNvSpPr/>
+          <p:nvPr/>
+        </p:nvSpPr>
+        <p:spPr>
+          <a:xfrm>
+            <a:off x="12890430" y="7024827"/>
+            <a:ext cx="1977273" cy="400110"/>
+          </a:xfrm>
+          <a:prstGeom prst="rect">
+            <a:avLst/>
+          </a:prstGeom>
+        </p:spPr>
+        <p:txBody>
+          <a:bodyPr wrap="none">
+            <a:spAutoFit/>
+          </a:bodyPr>
+          <a:lstStyle/>
+          <a:p>
+            <a:r>
+              <a:rPr lang="en-US" sz="2000" b="1" dirty="0">
+                <a:solidFill>
+                  <a:schemeClr val="tx1">
+                    <a:lumMod val="85000"/>
+                    <a:lumOff val="15000"/>
+                  </a:schemeClr>
+                </a:solidFill>
+              </a:rPr>
+              <a:t>LOGO CHECKLIST</a:t>
+            </a:r>
+            <a:endParaRPr lang="en-BY" sz="2000" b="1" dirty="0">
+              <a:solidFill>
+                <a:schemeClr val="tx1">
+                  <a:lumMod val="85000"/>
+                  <a:lumOff val="15000"/>
+                </a:schemeClr>
+              </a:solidFill>
+            </a:endParaRPr>
+          </a:p>
+        </p:txBody>
+      </p:sp>
+      <p:sp>
+        <p:nvSpPr>
+          <p:cNvPr id="115" name="Rectangle 114">
+            <a:extLst>
+              <a:ext uri="{FF2B5EF4-FFF2-40B4-BE49-F238E27FC236}">
+                <a16:creationId xmlns:a16="http://schemas.microsoft.com/office/drawing/2014/main" id="{1EB3F094-8C5B-0F49-A294-4C1A1FBE1A78}"/>
+              </a:ext>
+            </a:extLst>
+          </p:cNvPr>
+          <p:cNvSpPr/>
+          <p:nvPr/>
+        </p:nvSpPr>
+        <p:spPr>
+          <a:xfrm>
+            <a:off x="13368095" y="7520047"/>
+            <a:ext cx="939681" cy="369332"/>
+          </a:xfrm>
+          <a:prstGeom prst="rect">
+            <a:avLst/>
+          </a:prstGeom>
+        </p:spPr>
+        <p:txBody>
+          <a:bodyPr wrap="none">
+            <a:spAutoFit/>
+          </a:bodyPr>
+          <a:lstStyle/>
+          <a:p>
+            <a:r>
+              <a:rPr lang="en-US" dirty="0">
+                <a:solidFill>
+                  <a:schemeClr val="accent6"/>
+                </a:solidFill>
+              </a:rPr>
+              <a:t>NETFLIX</a:t>
+            </a:r>
+            <a:endParaRPr lang="en-BY" dirty="0">
+              <a:solidFill>
+                <a:schemeClr val="accent6"/>
+              </a:solidFill>
+            </a:endParaRPr>
+          </a:p>
+        </p:txBody>
+      </p:sp>
+      <p:sp>
+        <p:nvSpPr>
+          <p:cNvPr id="116" name="Rectangle 115">
+            <a:extLst>
+              <a:ext uri="{FF2B5EF4-FFF2-40B4-BE49-F238E27FC236}">
+                <a16:creationId xmlns:a16="http://schemas.microsoft.com/office/drawing/2014/main" id="{E1A8D1B7-ECC5-3C45-B07A-6896A276F57A}"/>
+              </a:ext>
+            </a:extLst>
+          </p:cNvPr>
+          <p:cNvSpPr/>
+          <p:nvPr/>
+        </p:nvSpPr>
+        <p:spPr>
+          <a:xfrm>
+            <a:off x="13294869" y="7914842"/>
+            <a:ext cx="1086131" cy="369332"/>
+          </a:xfrm>
+          <a:prstGeom prst="rect">
+            <a:avLst/>
+          </a:prstGeom>
+        </p:spPr>
+        <p:txBody>
+          <a:bodyPr wrap="none">
+            <a:spAutoFit/>
+          </a:bodyPr>
+          <a:lstStyle/>
+          <a:p>
+            <a:pPr algn="ctr"/>
+            <a:r>
+              <a:rPr lang="en-US" dirty="0">
+                <a:solidFill>
+                  <a:schemeClr val="accent6"/>
+                </a:solidFill>
+              </a:rPr>
+              <a:t>NY-TIMES</a:t>
+            </a:r>
+            <a:endParaRPr lang="en-BY" dirty="0">
+              <a:solidFill>
+                <a:schemeClr val="accent6"/>
+              </a:solidFill>
+            </a:endParaRPr>
+          </a:p>
+        </p:txBody>
+      </p:sp>
+      <p:sp>
+        <p:nvSpPr>
+          <p:cNvPr id="117" name="Rectangle 116">
+            <a:extLst>
+              <a:ext uri="{FF2B5EF4-FFF2-40B4-BE49-F238E27FC236}">
+                <a16:creationId xmlns:a16="http://schemas.microsoft.com/office/drawing/2014/main" id="{EF871E6F-355F-1744-9F8D-02F997CA3C38}"/>
+              </a:ext>
+            </a:extLst>
+          </p:cNvPr>
+          <p:cNvSpPr/>
+          <p:nvPr/>
+        </p:nvSpPr>
+        <p:spPr>
+          <a:xfrm>
+            <a:off x="13498743" y="8309637"/>
+            <a:ext cx="678392" cy="369332"/>
+          </a:xfrm>
+          <a:prstGeom prst="rect">
+            <a:avLst/>
+          </a:prstGeom>
+        </p:spPr>
+        <p:txBody>
+          <a:bodyPr wrap="none">
+            <a:spAutoFit/>
+          </a:bodyPr>
+          <a:lstStyle/>
+          <a:p>
+            <a:pPr algn="ctr"/>
+            <a:r>
+              <a:rPr lang="en-US" dirty="0">
+                <a:solidFill>
+                  <a:srgbClr val="C00000"/>
+                </a:solidFill>
+              </a:rPr>
+              <a:t>Flickr</a:t>
+            </a:r>
+            <a:endParaRPr lang="en-BY" dirty="0"/>
+          </a:p>
+        </p:txBody>
+      </p:sp>
+      <p:sp>
+        <p:nvSpPr>
+          <p:cNvPr id="118" name="Rectangle 117">
+            <a:extLst>
+              <a:ext uri="{FF2B5EF4-FFF2-40B4-BE49-F238E27FC236}">
+                <a16:creationId xmlns:a16="http://schemas.microsoft.com/office/drawing/2014/main" id="{AA438D8B-27F6-DE46-9E4E-72CC8E8743D4}"/>
+              </a:ext>
+            </a:extLst>
+          </p:cNvPr>
+          <p:cNvSpPr/>
+          <p:nvPr/>
+        </p:nvSpPr>
+        <p:spPr>
+          <a:xfrm>
+            <a:off x="13168524" y="8678969"/>
+            <a:ext cx="1338829" cy="369332"/>
+          </a:xfrm>
+          <a:prstGeom prst="rect">
+            <a:avLst/>
+          </a:prstGeom>
+        </p:spPr>
+        <p:txBody>
+          <a:bodyPr wrap="none">
+            <a:spAutoFit/>
+          </a:bodyPr>
+          <a:lstStyle/>
+          <a:p>
+            <a:pPr algn="ctr"/>
+            <a:r>
+              <a:rPr lang="en-BY" dirty="0">
+                <a:solidFill>
+                  <a:schemeClr val="accent6"/>
+                </a:solidFill>
+              </a:rPr>
+              <a:t>Belarusbank</a:t>
+            </a:r>
+          </a:p>
+        </p:txBody>
+      </p:sp>
+      <p:sp>
+        <p:nvSpPr>
+          <p:cNvPr id="119" name="Rectangle 118">
+            <a:extLst>
+              <a:ext uri="{FF2B5EF4-FFF2-40B4-BE49-F238E27FC236}">
+                <a16:creationId xmlns:a16="http://schemas.microsoft.com/office/drawing/2014/main" id="{88A1883E-0841-6B4A-BC51-28DC7F79BBB1}"/>
+              </a:ext>
+            </a:extLst>
+          </p:cNvPr>
+          <p:cNvSpPr/>
+          <p:nvPr/>
+        </p:nvSpPr>
+        <p:spPr>
+          <a:xfrm>
+            <a:off x="13513677" y="9048301"/>
+            <a:ext cx="598690" cy="369332"/>
+          </a:xfrm>
+          <a:prstGeom prst="rect">
+            <a:avLst/>
+          </a:prstGeom>
+        </p:spPr>
+        <p:txBody>
+          <a:bodyPr wrap="none">
+            <a:spAutoFit/>
+          </a:bodyPr>
+          <a:lstStyle/>
+          <a:p>
+            <a:pPr algn="ctr"/>
+            <a:r>
+              <a:rPr lang="en-US" dirty="0">
+                <a:solidFill>
+                  <a:schemeClr val="accent6"/>
+                </a:solidFill>
+              </a:rPr>
+              <a:t>MTS</a:t>
+            </a:r>
+            <a:endParaRPr lang="en-BY" dirty="0">
+              <a:solidFill>
+                <a:schemeClr val="accent6"/>
+              </a:solidFill>
+            </a:endParaRPr>
+          </a:p>
+        </p:txBody>
+      </p:sp>
+      <p:sp>
+        <p:nvSpPr>
+          <p:cNvPr id="120" name="Rectangle 119">
+            <a:extLst>
+              <a:ext uri="{FF2B5EF4-FFF2-40B4-BE49-F238E27FC236}">
+                <a16:creationId xmlns:a16="http://schemas.microsoft.com/office/drawing/2014/main" id="{8D8E5713-2E02-9341-8F27-9E4D7F5C9F40}"/>
+              </a:ext>
+            </a:extLst>
+          </p:cNvPr>
+          <p:cNvSpPr/>
+          <p:nvPr/>
+        </p:nvSpPr>
+        <p:spPr>
+          <a:xfrm>
+            <a:off x="13473027" y="9445324"/>
+            <a:ext cx="679994" cy="369332"/>
+          </a:xfrm>
+          <a:prstGeom prst="rect">
+            <a:avLst/>
+          </a:prstGeom>
+        </p:spPr>
+        <p:txBody>
+          <a:bodyPr wrap="none">
+            <a:spAutoFit/>
+          </a:bodyPr>
+          <a:lstStyle/>
+          <a:p>
+            <a:pPr algn="ctr"/>
+            <a:r>
+              <a:rPr lang="en-US" dirty="0" err="1">
+                <a:solidFill>
+                  <a:schemeClr val="accent6"/>
+                </a:solidFill>
+              </a:rPr>
+              <a:t>Belaz</a:t>
+            </a:r>
+            <a:endParaRPr lang="en-BY" dirty="0">
+              <a:solidFill>
+                <a:schemeClr val="accent6"/>
+              </a:solidFill>
+            </a:endParaRPr>
           </a:p>
         </p:txBody>
       </p:sp>

</xml_diff>

<commit_message>
implemented and styled the "Our Clients" subsection
</commit_message>
<xml_diff>
--- a/layout.pptx
+++ b/layout.pptx
@@ -12533,8 +12533,8 @@
         </p:nvSpPr>
         <p:spPr>
           <a:xfrm>
-            <a:off x="13498743" y="8309637"/>
-            <a:ext cx="678392" cy="369332"/>
+            <a:off x="13469538" y="8309637"/>
+            <a:ext cx="736805" cy="369332"/>
           </a:xfrm>
           <a:prstGeom prst="rect">
             <a:avLst/>
@@ -12553,7 +12553,7 @@
                   <a:srgbClr val="C00000"/>
                 </a:solidFill>
               </a:rPr>
-              <a:t>Flickr</a:t>
+              <a:t>Zillow</a:t>
             </a:r>
             <a:endParaRPr lang="en-BY" dirty="0"/>
           </a:p>
@@ -12573,8 +12573,8 @@
         </p:nvSpPr>
         <p:spPr>
           <a:xfrm>
-            <a:off x="13168524" y="8678969"/>
-            <a:ext cx="1338829" cy="369332"/>
+            <a:off x="13304781" y="8678969"/>
+            <a:ext cx="1066318" cy="369332"/>
           </a:xfrm>
           <a:prstGeom prst="rect">
             <a:avLst/>
@@ -12588,13 +12588,18 @@
           <a:p>
             <a:pPr algn="ctr"/>
             <a:r>
-              <a:rPr lang="en-BY" dirty="0">
+              <a:rPr lang="en-BY">
                 <a:solidFill>
                   <a:schemeClr val="accent6"/>
                 </a:solidFill>
               </a:rPr>
-              <a:t>Belarusbank</a:t>
-            </a:r>
+              <a:t>Sberbank</a:t>
+            </a:r>
+            <a:endParaRPr lang="en-BY" dirty="0">
+              <a:solidFill>
+                <a:schemeClr val="accent6"/>
+              </a:solidFill>
+            </a:endParaRPr>
           </a:p>
         </p:txBody>
       </p:sp>

</xml_diff>

<commit_message>
added general layout of the footer section
</commit_message>
<xml_diff>
--- a/layout.pptx
+++ b/layout.pptx
@@ -11,6 +11,7 @@
     <p:sldId id="261" r:id="rId5"/>
     <p:sldId id="262" r:id="rId6"/>
     <p:sldId id="263" r:id="rId7"/>
+    <p:sldId id="264" r:id="rId8"/>
   </p:sldIdLst>
   <p:sldSz cx="16256000" cy="12192000"/>
   <p:notesSz cx="6858000" cy="9144000"/>
@@ -11449,12 +11450,161 @@
           </p:txBody>
         </p:sp>
       </p:grpSp>
-      <p:sp>
-        <p:nvSpPr>
-          <p:cNvPr id="91" name="Rectangle 90">
+      <p:grpSp>
+        <p:nvGrpSpPr>
+          <p:cNvPr id="93" name="Group 92">
             <a:extLst>
               <a:ext uri="{FF2B5EF4-FFF2-40B4-BE49-F238E27FC236}">
-                <a16:creationId xmlns:a16="http://schemas.microsoft.com/office/drawing/2014/main" id="{6E8C58CF-FF6D-E940-B438-D073C8BCAAD1}"/>
+                <a16:creationId xmlns:a16="http://schemas.microsoft.com/office/drawing/2014/main" id="{9A9EF228-99C6-EA4D-8BD9-FF42DE677694}"/>
+              </a:ext>
+            </a:extLst>
+          </p:cNvPr>
+          <p:cNvGrpSpPr/>
+          <p:nvPr/>
+        </p:nvGrpSpPr>
+        <p:grpSpPr>
+          <a:xfrm>
+            <a:off x="5330432" y="7349633"/>
+            <a:ext cx="2002851" cy="1110404"/>
+            <a:chOff x="842732" y="2019825"/>
+            <a:chExt cx="1078661" cy="450554"/>
+          </a:xfrm>
+        </p:grpSpPr>
+        <p:sp>
+          <p:nvSpPr>
+            <p:cNvPr id="94" name="Rectangle 93">
+              <a:extLst>
+                <a:ext uri="{FF2B5EF4-FFF2-40B4-BE49-F238E27FC236}">
+                  <a16:creationId xmlns:a16="http://schemas.microsoft.com/office/drawing/2014/main" id="{F3C221EF-12DD-264C-A143-8245A68115FD}"/>
+                </a:ext>
+              </a:extLst>
+            </p:cNvPr>
+            <p:cNvSpPr/>
+            <p:nvPr/>
+          </p:nvSpPr>
+          <p:spPr>
+            <a:xfrm>
+              <a:off x="842732" y="2019825"/>
+              <a:ext cx="1078661" cy="450554"/>
+            </a:xfrm>
+            <a:prstGeom prst="rect">
+              <a:avLst/>
+            </a:prstGeom>
+            <a:solidFill>
+              <a:schemeClr val="accent6">
+                <a:alpha val="10196"/>
+              </a:schemeClr>
+            </a:solidFill>
+            <a:ln>
+              <a:solidFill>
+                <a:schemeClr val="accent6">
+                  <a:lumMod val="50000"/>
+                </a:schemeClr>
+              </a:solidFill>
+            </a:ln>
+          </p:spPr>
+          <p:style>
+            <a:lnRef idx="2">
+              <a:schemeClr val="accent1">
+                <a:shade val="50000"/>
+              </a:schemeClr>
+            </a:lnRef>
+            <a:fillRef idx="1">
+              <a:schemeClr val="accent1"/>
+            </a:fillRef>
+            <a:effectRef idx="0">
+              <a:schemeClr val="accent1"/>
+            </a:effectRef>
+            <a:fontRef idx="minor">
+              <a:schemeClr val="lt1"/>
+            </a:fontRef>
+          </p:style>
+          <p:txBody>
+            <a:bodyPr rtlCol="0" anchor="ctr"/>
+            <a:lstStyle/>
+            <a:p>
+              <a:pPr algn="ctr"/>
+              <a:endParaRPr lang="en-US" dirty="0"/>
+            </a:p>
+          </p:txBody>
+        </p:sp>
+        <p:sp>
+          <p:nvSpPr>
+            <p:cNvPr id="95" name="Rectangle 94">
+              <a:extLst>
+                <a:ext uri="{FF2B5EF4-FFF2-40B4-BE49-F238E27FC236}">
+                  <a16:creationId xmlns:a16="http://schemas.microsoft.com/office/drawing/2014/main" id="{71C1D662-1618-8546-8871-00256D0B6E7F}"/>
+                </a:ext>
+              </a:extLst>
+            </p:cNvPr>
+            <p:cNvSpPr/>
+            <p:nvPr/>
+          </p:nvSpPr>
+          <p:spPr>
+            <a:xfrm>
+              <a:off x="929420" y="2046553"/>
+              <a:ext cx="890745" cy="418341"/>
+            </a:xfrm>
+            <a:prstGeom prst="rect">
+              <a:avLst/>
+            </a:prstGeom>
+            <a:noFill/>
+            <a:ln>
+              <a:noFill/>
+            </a:ln>
+          </p:spPr>
+          <p:style>
+            <a:lnRef idx="2">
+              <a:schemeClr val="accent1">
+                <a:shade val="50000"/>
+              </a:schemeClr>
+            </a:lnRef>
+            <a:fillRef idx="1">
+              <a:schemeClr val="accent1"/>
+            </a:fillRef>
+            <a:effectRef idx="0">
+              <a:schemeClr val="accent1"/>
+            </a:effectRef>
+            <a:fontRef idx="minor">
+              <a:schemeClr val="lt1"/>
+            </a:fontRef>
+          </p:style>
+          <p:txBody>
+            <a:bodyPr rtlCol="0" anchor="ctr"/>
+            <a:lstStyle/>
+            <a:p>
+              <a:r>
+                <a:rPr lang="en-US" sz="1600" dirty="0">
+                  <a:solidFill>
+                    <a:schemeClr val="accent6">
+                      <a:lumMod val="50000"/>
+                    </a:schemeClr>
+                  </a:solidFill>
+                </a:rPr>
+                <a:t>&lt;div&gt; </a:t>
+              </a:r>
+            </a:p>
+            <a:p>
+              <a:r>
+                <a:rPr lang="en-US" sz="1600" dirty="0">
+                  <a:solidFill>
+                    <a:schemeClr val="accent6">
+                      <a:lumMod val="50000"/>
+                    </a:schemeClr>
+                  </a:solidFill>
+                </a:rPr>
+                <a:t>.logo-container</a:t>
+              </a:r>
+            </a:p>
+          </p:txBody>
+        </p:sp>
+      </p:grpSp>
+      <p:sp>
+        <p:nvSpPr>
+          <p:cNvPr id="98" name="Rectangle 97">
+            <a:extLst>
+              <a:ext uri="{FF2B5EF4-FFF2-40B4-BE49-F238E27FC236}">
+                <a16:creationId xmlns:a16="http://schemas.microsoft.com/office/drawing/2014/main" id="{C4E5BAB3-B6EB-5745-9D98-4069FF66AF01}"/>
               </a:ext>
             </a:extLst>
           </p:cNvPr>
@@ -11463,8 +11613,2180 @@
         </p:nvSpPr>
         <p:spPr>
           <a:xfrm>
-            <a:off x="5148096" y="7084456"/>
-            <a:ext cx="6812195" cy="2915101"/>
+            <a:off x="7560785" y="7349633"/>
+            <a:ext cx="2002851" cy="1110404"/>
+          </a:xfrm>
+          <a:prstGeom prst="rect">
+            <a:avLst/>
+          </a:prstGeom>
+          <a:solidFill>
+            <a:schemeClr val="accent6">
+              <a:alpha val="10196"/>
+            </a:schemeClr>
+          </a:solidFill>
+          <a:ln>
+            <a:solidFill>
+              <a:schemeClr val="accent6">
+                <a:lumMod val="50000"/>
+              </a:schemeClr>
+            </a:solidFill>
+          </a:ln>
+        </p:spPr>
+        <p:style>
+          <a:lnRef idx="2">
+            <a:schemeClr val="accent1">
+              <a:shade val="50000"/>
+            </a:schemeClr>
+          </a:lnRef>
+          <a:fillRef idx="1">
+            <a:schemeClr val="accent1"/>
+          </a:fillRef>
+          <a:effectRef idx="0">
+            <a:schemeClr val="accent1"/>
+          </a:effectRef>
+          <a:fontRef idx="minor">
+            <a:schemeClr val="lt1"/>
+          </a:fontRef>
+        </p:style>
+        <p:txBody>
+          <a:bodyPr rtlCol="0" anchor="ctr"/>
+          <a:lstStyle/>
+          <a:p>
+            <a:pPr algn="ctr"/>
+            <a:endParaRPr lang="en-US" dirty="0"/>
+          </a:p>
+        </p:txBody>
+      </p:sp>
+      <p:sp>
+        <p:nvSpPr>
+          <p:cNvPr id="100" name="Rectangle 99">
+            <a:extLst>
+              <a:ext uri="{FF2B5EF4-FFF2-40B4-BE49-F238E27FC236}">
+                <a16:creationId xmlns:a16="http://schemas.microsoft.com/office/drawing/2014/main" id="{023D4C8E-9417-5645-BE4F-3250B6ABC30A}"/>
+              </a:ext>
+            </a:extLst>
+          </p:cNvPr>
+          <p:cNvSpPr/>
+          <p:nvPr/>
+        </p:nvSpPr>
+        <p:spPr>
+          <a:xfrm>
+            <a:off x="9776795" y="7349633"/>
+            <a:ext cx="2002851" cy="1110404"/>
+          </a:xfrm>
+          <a:prstGeom prst="rect">
+            <a:avLst/>
+          </a:prstGeom>
+          <a:solidFill>
+            <a:schemeClr val="accent6">
+              <a:alpha val="10196"/>
+            </a:schemeClr>
+          </a:solidFill>
+          <a:ln>
+            <a:solidFill>
+              <a:schemeClr val="accent6">
+                <a:lumMod val="50000"/>
+              </a:schemeClr>
+            </a:solidFill>
+          </a:ln>
+        </p:spPr>
+        <p:style>
+          <a:lnRef idx="2">
+            <a:schemeClr val="accent1">
+              <a:shade val="50000"/>
+            </a:schemeClr>
+          </a:lnRef>
+          <a:fillRef idx="1">
+            <a:schemeClr val="accent1"/>
+          </a:fillRef>
+          <a:effectRef idx="0">
+            <a:schemeClr val="accent1"/>
+          </a:effectRef>
+          <a:fontRef idx="minor">
+            <a:schemeClr val="lt1"/>
+          </a:fontRef>
+        </p:style>
+        <p:txBody>
+          <a:bodyPr rtlCol="0" anchor="ctr"/>
+          <a:lstStyle/>
+          <a:p>
+            <a:pPr algn="ctr"/>
+            <a:endParaRPr lang="en-US" dirty="0"/>
+          </a:p>
+        </p:txBody>
+      </p:sp>
+      <p:sp>
+        <p:nvSpPr>
+          <p:cNvPr id="102" name="Rectangle 101">
+            <a:extLst>
+              <a:ext uri="{FF2B5EF4-FFF2-40B4-BE49-F238E27FC236}">
+                <a16:creationId xmlns:a16="http://schemas.microsoft.com/office/drawing/2014/main" id="{57CB0A27-CFF9-4A46-9A96-8BA7BED4BCC6}"/>
+              </a:ext>
+            </a:extLst>
+          </p:cNvPr>
+          <p:cNvSpPr/>
+          <p:nvPr/>
+        </p:nvSpPr>
+        <p:spPr>
+          <a:xfrm>
+            <a:off x="5337798" y="8748737"/>
+            <a:ext cx="2002851" cy="1110404"/>
+          </a:xfrm>
+          <a:prstGeom prst="rect">
+            <a:avLst/>
+          </a:prstGeom>
+          <a:solidFill>
+            <a:schemeClr val="accent6">
+              <a:alpha val="10196"/>
+            </a:schemeClr>
+          </a:solidFill>
+          <a:ln>
+            <a:solidFill>
+              <a:schemeClr val="accent6">
+                <a:lumMod val="50000"/>
+              </a:schemeClr>
+            </a:solidFill>
+          </a:ln>
+        </p:spPr>
+        <p:style>
+          <a:lnRef idx="2">
+            <a:schemeClr val="accent1">
+              <a:shade val="50000"/>
+            </a:schemeClr>
+          </a:lnRef>
+          <a:fillRef idx="1">
+            <a:schemeClr val="accent1"/>
+          </a:fillRef>
+          <a:effectRef idx="0">
+            <a:schemeClr val="accent1"/>
+          </a:effectRef>
+          <a:fontRef idx="minor">
+            <a:schemeClr val="lt1"/>
+          </a:fontRef>
+        </p:style>
+        <p:txBody>
+          <a:bodyPr rtlCol="0" anchor="ctr"/>
+          <a:lstStyle/>
+          <a:p>
+            <a:pPr algn="ctr"/>
+            <a:endParaRPr lang="en-US" dirty="0"/>
+          </a:p>
+        </p:txBody>
+      </p:sp>
+      <p:sp>
+        <p:nvSpPr>
+          <p:cNvPr id="104" name="Rectangle 103">
+            <a:extLst>
+              <a:ext uri="{FF2B5EF4-FFF2-40B4-BE49-F238E27FC236}">
+                <a16:creationId xmlns:a16="http://schemas.microsoft.com/office/drawing/2014/main" id="{140B8A68-0D40-344D-BE7D-D18896B0B2AE}"/>
+              </a:ext>
+            </a:extLst>
+          </p:cNvPr>
+          <p:cNvSpPr/>
+          <p:nvPr/>
+        </p:nvSpPr>
+        <p:spPr>
+          <a:xfrm>
+            <a:off x="7569538" y="8748737"/>
+            <a:ext cx="2002851" cy="1110404"/>
+          </a:xfrm>
+          <a:prstGeom prst="rect">
+            <a:avLst/>
+          </a:prstGeom>
+          <a:solidFill>
+            <a:schemeClr val="accent6">
+              <a:alpha val="10196"/>
+            </a:schemeClr>
+          </a:solidFill>
+          <a:ln>
+            <a:solidFill>
+              <a:schemeClr val="accent6">
+                <a:lumMod val="50000"/>
+              </a:schemeClr>
+            </a:solidFill>
+          </a:ln>
+        </p:spPr>
+        <p:style>
+          <a:lnRef idx="2">
+            <a:schemeClr val="accent1">
+              <a:shade val="50000"/>
+            </a:schemeClr>
+          </a:lnRef>
+          <a:fillRef idx="1">
+            <a:schemeClr val="accent1"/>
+          </a:fillRef>
+          <a:effectRef idx="0">
+            <a:schemeClr val="accent1"/>
+          </a:effectRef>
+          <a:fontRef idx="minor">
+            <a:schemeClr val="lt1"/>
+          </a:fontRef>
+        </p:style>
+        <p:txBody>
+          <a:bodyPr rtlCol="0" anchor="ctr"/>
+          <a:lstStyle/>
+          <a:p>
+            <a:pPr algn="ctr"/>
+            <a:endParaRPr lang="en-US" dirty="0"/>
+          </a:p>
+        </p:txBody>
+      </p:sp>
+      <p:sp>
+        <p:nvSpPr>
+          <p:cNvPr id="105" name="Rectangle 104">
+            <a:extLst>
+              <a:ext uri="{FF2B5EF4-FFF2-40B4-BE49-F238E27FC236}">
+                <a16:creationId xmlns:a16="http://schemas.microsoft.com/office/drawing/2014/main" id="{608EBD62-140B-2944-B329-75E589693C50}"/>
+              </a:ext>
+            </a:extLst>
+          </p:cNvPr>
+          <p:cNvSpPr/>
+          <p:nvPr/>
+        </p:nvSpPr>
+        <p:spPr>
+          <a:xfrm>
+            <a:off x="9785548" y="8748737"/>
+            <a:ext cx="2002851" cy="1110404"/>
+          </a:xfrm>
+          <a:prstGeom prst="rect">
+            <a:avLst/>
+          </a:prstGeom>
+          <a:solidFill>
+            <a:schemeClr val="accent6">
+              <a:alpha val="10196"/>
+            </a:schemeClr>
+          </a:solidFill>
+          <a:ln>
+            <a:solidFill>
+              <a:schemeClr val="accent6">
+                <a:lumMod val="50000"/>
+              </a:schemeClr>
+            </a:solidFill>
+          </a:ln>
+        </p:spPr>
+        <p:style>
+          <a:lnRef idx="2">
+            <a:schemeClr val="accent1">
+              <a:shade val="50000"/>
+            </a:schemeClr>
+          </a:lnRef>
+          <a:fillRef idx="1">
+            <a:schemeClr val="accent1"/>
+          </a:fillRef>
+          <a:effectRef idx="0">
+            <a:schemeClr val="accent1"/>
+          </a:effectRef>
+          <a:fontRef idx="minor">
+            <a:schemeClr val="lt1"/>
+          </a:fontRef>
+        </p:style>
+        <p:txBody>
+          <a:bodyPr rtlCol="0" anchor="ctr"/>
+          <a:lstStyle/>
+          <a:p>
+            <a:pPr algn="ctr"/>
+            <a:endParaRPr lang="en-US" dirty="0"/>
+          </a:p>
+        </p:txBody>
+      </p:sp>
+      <p:sp>
+        <p:nvSpPr>
+          <p:cNvPr id="109" name="Rectangle 108">
+            <a:extLst>
+              <a:ext uri="{FF2B5EF4-FFF2-40B4-BE49-F238E27FC236}">
+                <a16:creationId xmlns:a16="http://schemas.microsoft.com/office/drawing/2014/main" id="{3D294D9B-9D9A-8840-8578-F8A58245435B}"/>
+              </a:ext>
+            </a:extLst>
+          </p:cNvPr>
+          <p:cNvSpPr/>
+          <p:nvPr/>
+        </p:nvSpPr>
+        <p:spPr>
+          <a:xfrm>
+            <a:off x="7696062" y="7486198"/>
+            <a:ext cx="1737870" cy="814021"/>
+          </a:xfrm>
+          <a:prstGeom prst="rect">
+            <a:avLst/>
+          </a:prstGeom>
+          <a:solidFill>
+            <a:schemeClr val="accent4">
+              <a:alpha val="10196"/>
+            </a:schemeClr>
+          </a:solidFill>
+          <a:ln>
+            <a:solidFill>
+              <a:schemeClr val="accent4"/>
+            </a:solidFill>
+          </a:ln>
+        </p:spPr>
+        <p:style>
+          <a:lnRef idx="2">
+            <a:schemeClr val="accent1">
+              <a:shade val="50000"/>
+            </a:schemeClr>
+          </a:lnRef>
+          <a:fillRef idx="1">
+            <a:schemeClr val="accent1"/>
+          </a:fillRef>
+          <a:effectRef idx="0">
+            <a:schemeClr val="accent1"/>
+          </a:effectRef>
+          <a:fontRef idx="minor">
+            <a:schemeClr val="lt1"/>
+          </a:fontRef>
+        </p:style>
+        <p:txBody>
+          <a:bodyPr rtlCol="0" anchor="ctr"/>
+          <a:lstStyle/>
+          <a:p>
+            <a:pPr algn="ctr"/>
+            <a:endParaRPr lang="en-US" dirty="0"/>
+          </a:p>
+        </p:txBody>
+      </p:sp>
+      <p:sp>
+        <p:nvSpPr>
+          <p:cNvPr id="110" name="Rectangle 109">
+            <a:extLst>
+              <a:ext uri="{FF2B5EF4-FFF2-40B4-BE49-F238E27FC236}">
+                <a16:creationId xmlns:a16="http://schemas.microsoft.com/office/drawing/2014/main" id="{D7C664E9-5382-174C-85D2-71652565D69B}"/>
+              </a:ext>
+            </a:extLst>
+          </p:cNvPr>
+          <p:cNvSpPr/>
+          <p:nvPr/>
+        </p:nvSpPr>
+        <p:spPr>
+          <a:xfrm>
+            <a:off x="7774642" y="7534247"/>
+            <a:ext cx="1583096" cy="725730"/>
+          </a:xfrm>
+          <a:prstGeom prst="rect">
+            <a:avLst/>
+          </a:prstGeom>
+          <a:noFill/>
+          <a:ln>
+            <a:noFill/>
+          </a:ln>
+        </p:spPr>
+        <p:style>
+          <a:lnRef idx="2">
+            <a:schemeClr val="accent1">
+              <a:shade val="50000"/>
+            </a:schemeClr>
+          </a:lnRef>
+          <a:fillRef idx="1">
+            <a:schemeClr val="accent1"/>
+          </a:fillRef>
+          <a:effectRef idx="0">
+            <a:schemeClr val="accent1"/>
+          </a:effectRef>
+          <a:fontRef idx="minor">
+            <a:schemeClr val="lt1"/>
+          </a:fontRef>
+        </p:style>
+        <p:txBody>
+          <a:bodyPr rtlCol="0" anchor="ctr"/>
+          <a:lstStyle/>
+          <a:p>
+            <a:r>
+              <a:rPr lang="en-US" sz="1600" dirty="0">
+                <a:solidFill>
+                  <a:schemeClr val="accent2">
+                    <a:lumMod val="50000"/>
+                  </a:schemeClr>
+                </a:solidFill>
+              </a:rPr>
+              <a:t>&lt;svg&gt; .</a:t>
+            </a:r>
+            <a:r>
+              <a:rPr lang="en-US" sz="1600" dirty="0" err="1">
+                <a:solidFill>
+                  <a:schemeClr val="accent2">
+                    <a:lumMod val="50000"/>
+                  </a:schemeClr>
+                </a:solidFill>
+              </a:rPr>
+              <a:t>logo_clients</a:t>
+            </a:r>
+            <a:endParaRPr lang="en-US" sz="1600" dirty="0">
+              <a:solidFill>
+                <a:schemeClr val="accent2">
+                  <a:lumMod val="50000"/>
+                </a:schemeClr>
+              </a:solidFill>
+            </a:endParaRPr>
+          </a:p>
+        </p:txBody>
+      </p:sp>
+      <p:sp>
+        <p:nvSpPr>
+          <p:cNvPr id="111" name="Rectangle 110">
+            <a:extLst>
+              <a:ext uri="{FF2B5EF4-FFF2-40B4-BE49-F238E27FC236}">
+                <a16:creationId xmlns:a16="http://schemas.microsoft.com/office/drawing/2014/main" id="{8DA50251-EA40-E143-A9E1-1CDD34CD7B42}"/>
+              </a:ext>
+            </a:extLst>
+          </p:cNvPr>
+          <p:cNvSpPr/>
+          <p:nvPr/>
+        </p:nvSpPr>
+        <p:spPr>
+          <a:xfrm>
+            <a:off x="9909285" y="7502222"/>
+            <a:ext cx="1737870" cy="814021"/>
+          </a:xfrm>
+          <a:prstGeom prst="rect">
+            <a:avLst/>
+          </a:prstGeom>
+          <a:solidFill>
+            <a:schemeClr val="accent4">
+              <a:alpha val="10196"/>
+            </a:schemeClr>
+          </a:solidFill>
+          <a:ln>
+            <a:solidFill>
+              <a:schemeClr val="accent4"/>
+            </a:solidFill>
+          </a:ln>
+        </p:spPr>
+        <p:style>
+          <a:lnRef idx="2">
+            <a:schemeClr val="accent1">
+              <a:shade val="50000"/>
+            </a:schemeClr>
+          </a:lnRef>
+          <a:fillRef idx="1">
+            <a:schemeClr val="accent1"/>
+          </a:fillRef>
+          <a:effectRef idx="0">
+            <a:schemeClr val="accent1"/>
+          </a:effectRef>
+          <a:fontRef idx="minor">
+            <a:schemeClr val="lt1"/>
+          </a:fontRef>
+        </p:style>
+        <p:txBody>
+          <a:bodyPr rtlCol="0" anchor="ctr"/>
+          <a:lstStyle/>
+          <a:p>
+            <a:pPr algn="ctr"/>
+            <a:endParaRPr lang="en-US" dirty="0"/>
+          </a:p>
+        </p:txBody>
+      </p:sp>
+      <p:sp>
+        <p:nvSpPr>
+          <p:cNvPr id="112" name="Rectangle 111">
+            <a:extLst>
+              <a:ext uri="{FF2B5EF4-FFF2-40B4-BE49-F238E27FC236}">
+                <a16:creationId xmlns:a16="http://schemas.microsoft.com/office/drawing/2014/main" id="{E367F132-18DC-0F47-97C6-E11EA67FDC09}"/>
+              </a:ext>
+            </a:extLst>
+          </p:cNvPr>
+          <p:cNvSpPr/>
+          <p:nvPr/>
+        </p:nvSpPr>
+        <p:spPr>
+          <a:xfrm>
+            <a:off x="7693275" y="8890847"/>
+            <a:ext cx="1737870" cy="814021"/>
+          </a:xfrm>
+          <a:prstGeom prst="rect">
+            <a:avLst/>
+          </a:prstGeom>
+          <a:solidFill>
+            <a:schemeClr val="accent4">
+              <a:alpha val="10196"/>
+            </a:schemeClr>
+          </a:solidFill>
+          <a:ln>
+            <a:solidFill>
+              <a:schemeClr val="accent4"/>
+            </a:solidFill>
+          </a:ln>
+        </p:spPr>
+        <p:style>
+          <a:lnRef idx="2">
+            <a:schemeClr val="accent1">
+              <a:shade val="50000"/>
+            </a:schemeClr>
+          </a:lnRef>
+          <a:fillRef idx="1">
+            <a:schemeClr val="accent1"/>
+          </a:fillRef>
+          <a:effectRef idx="0">
+            <a:schemeClr val="accent1"/>
+          </a:effectRef>
+          <a:fontRef idx="minor">
+            <a:schemeClr val="lt1"/>
+          </a:fontRef>
+        </p:style>
+        <p:txBody>
+          <a:bodyPr rtlCol="0" anchor="ctr"/>
+          <a:lstStyle/>
+          <a:p>
+            <a:pPr algn="ctr"/>
+            <a:endParaRPr lang="en-US" dirty="0"/>
+          </a:p>
+        </p:txBody>
+      </p:sp>
+      <p:sp>
+        <p:nvSpPr>
+          <p:cNvPr id="113" name="Rectangle 112">
+            <a:extLst>
+              <a:ext uri="{FF2B5EF4-FFF2-40B4-BE49-F238E27FC236}">
+                <a16:creationId xmlns:a16="http://schemas.microsoft.com/office/drawing/2014/main" id="{594BFD40-071B-2244-A14C-CEDAD2D2217E}"/>
+              </a:ext>
+            </a:extLst>
+          </p:cNvPr>
+          <p:cNvSpPr/>
+          <p:nvPr/>
+        </p:nvSpPr>
+        <p:spPr>
+          <a:xfrm>
+            <a:off x="9909285" y="8889667"/>
+            <a:ext cx="1737870" cy="814021"/>
+          </a:xfrm>
+          <a:prstGeom prst="rect">
+            <a:avLst/>
+          </a:prstGeom>
+          <a:solidFill>
+            <a:schemeClr val="accent4">
+              <a:alpha val="10196"/>
+            </a:schemeClr>
+          </a:solidFill>
+          <a:ln>
+            <a:solidFill>
+              <a:schemeClr val="accent4"/>
+            </a:solidFill>
+          </a:ln>
+        </p:spPr>
+        <p:style>
+          <a:lnRef idx="2">
+            <a:schemeClr val="accent1">
+              <a:shade val="50000"/>
+            </a:schemeClr>
+          </a:lnRef>
+          <a:fillRef idx="1">
+            <a:schemeClr val="accent1"/>
+          </a:fillRef>
+          <a:effectRef idx="0">
+            <a:schemeClr val="accent1"/>
+          </a:effectRef>
+          <a:fontRef idx="minor">
+            <a:schemeClr val="lt1"/>
+          </a:fontRef>
+        </p:style>
+        <p:txBody>
+          <a:bodyPr rtlCol="0" anchor="ctr"/>
+          <a:lstStyle/>
+          <a:p>
+            <a:pPr algn="ctr"/>
+            <a:endParaRPr lang="en-US" dirty="0"/>
+          </a:p>
+        </p:txBody>
+      </p:sp>
+      <p:sp>
+        <p:nvSpPr>
+          <p:cNvPr id="114" name="Rectangle 113">
+            <a:extLst>
+              <a:ext uri="{FF2B5EF4-FFF2-40B4-BE49-F238E27FC236}">
+                <a16:creationId xmlns:a16="http://schemas.microsoft.com/office/drawing/2014/main" id="{0356F71A-FCB2-0B41-B89F-EED48A2BBB3F}"/>
+              </a:ext>
+            </a:extLst>
+          </p:cNvPr>
+          <p:cNvSpPr/>
+          <p:nvPr/>
+        </p:nvSpPr>
+        <p:spPr>
+          <a:xfrm>
+            <a:off x="5483468" y="8889667"/>
+            <a:ext cx="1737870" cy="814021"/>
+          </a:xfrm>
+          <a:prstGeom prst="rect">
+            <a:avLst/>
+          </a:prstGeom>
+          <a:solidFill>
+            <a:schemeClr val="accent4">
+              <a:alpha val="10196"/>
+            </a:schemeClr>
+          </a:solidFill>
+          <a:ln>
+            <a:solidFill>
+              <a:schemeClr val="accent4"/>
+            </a:solidFill>
+          </a:ln>
+        </p:spPr>
+        <p:style>
+          <a:lnRef idx="2">
+            <a:schemeClr val="accent1">
+              <a:shade val="50000"/>
+            </a:schemeClr>
+          </a:lnRef>
+          <a:fillRef idx="1">
+            <a:schemeClr val="accent1"/>
+          </a:fillRef>
+          <a:effectRef idx="0">
+            <a:schemeClr val="accent1"/>
+          </a:effectRef>
+          <a:fontRef idx="minor">
+            <a:schemeClr val="lt1"/>
+          </a:fontRef>
+        </p:style>
+        <p:txBody>
+          <a:bodyPr rtlCol="0" anchor="ctr"/>
+          <a:lstStyle/>
+          <a:p>
+            <a:pPr algn="ctr"/>
+            <a:endParaRPr lang="en-US" dirty="0"/>
+          </a:p>
+        </p:txBody>
+      </p:sp>
+      <p:sp>
+        <p:nvSpPr>
+          <p:cNvPr id="3" name="Rectangle 2">
+            <a:extLst>
+              <a:ext uri="{FF2B5EF4-FFF2-40B4-BE49-F238E27FC236}">
+                <a16:creationId xmlns:a16="http://schemas.microsoft.com/office/drawing/2014/main" id="{7A911345-1AA6-CC4B-AB1A-A8F10C4F527F}"/>
+              </a:ext>
+            </a:extLst>
+          </p:cNvPr>
+          <p:cNvSpPr/>
+          <p:nvPr/>
+        </p:nvSpPr>
+        <p:spPr>
+          <a:xfrm>
+            <a:off x="12890430" y="7024827"/>
+            <a:ext cx="1977273" cy="400110"/>
+          </a:xfrm>
+          <a:prstGeom prst="rect">
+            <a:avLst/>
+          </a:prstGeom>
+        </p:spPr>
+        <p:txBody>
+          <a:bodyPr wrap="none">
+            <a:spAutoFit/>
+          </a:bodyPr>
+          <a:lstStyle/>
+          <a:p>
+            <a:r>
+              <a:rPr lang="en-US" sz="2000" b="1" dirty="0">
+                <a:solidFill>
+                  <a:schemeClr val="tx1">
+                    <a:lumMod val="85000"/>
+                    <a:lumOff val="15000"/>
+                  </a:schemeClr>
+                </a:solidFill>
+              </a:rPr>
+              <a:t>LOGO CHECKLIST</a:t>
+            </a:r>
+            <a:endParaRPr lang="en-BY" sz="2000" b="1" dirty="0">
+              <a:solidFill>
+                <a:schemeClr val="tx1">
+                  <a:lumMod val="85000"/>
+                  <a:lumOff val="15000"/>
+                </a:schemeClr>
+              </a:solidFill>
+            </a:endParaRPr>
+          </a:p>
+        </p:txBody>
+      </p:sp>
+      <p:sp>
+        <p:nvSpPr>
+          <p:cNvPr id="115" name="Rectangle 114">
+            <a:extLst>
+              <a:ext uri="{FF2B5EF4-FFF2-40B4-BE49-F238E27FC236}">
+                <a16:creationId xmlns:a16="http://schemas.microsoft.com/office/drawing/2014/main" id="{1EB3F094-8C5B-0F49-A294-4C1A1FBE1A78}"/>
+              </a:ext>
+            </a:extLst>
+          </p:cNvPr>
+          <p:cNvSpPr/>
+          <p:nvPr/>
+        </p:nvSpPr>
+        <p:spPr>
+          <a:xfrm>
+            <a:off x="13368095" y="7520047"/>
+            <a:ext cx="939681" cy="369332"/>
+          </a:xfrm>
+          <a:prstGeom prst="rect">
+            <a:avLst/>
+          </a:prstGeom>
+        </p:spPr>
+        <p:txBody>
+          <a:bodyPr wrap="none">
+            <a:spAutoFit/>
+          </a:bodyPr>
+          <a:lstStyle/>
+          <a:p>
+            <a:r>
+              <a:rPr lang="en-US" dirty="0">
+                <a:solidFill>
+                  <a:schemeClr val="accent6"/>
+                </a:solidFill>
+              </a:rPr>
+              <a:t>NETFLIX</a:t>
+            </a:r>
+            <a:endParaRPr lang="en-BY" dirty="0">
+              <a:solidFill>
+                <a:schemeClr val="accent6"/>
+              </a:solidFill>
+            </a:endParaRPr>
+          </a:p>
+        </p:txBody>
+      </p:sp>
+      <p:sp>
+        <p:nvSpPr>
+          <p:cNvPr id="116" name="Rectangle 115">
+            <a:extLst>
+              <a:ext uri="{FF2B5EF4-FFF2-40B4-BE49-F238E27FC236}">
+                <a16:creationId xmlns:a16="http://schemas.microsoft.com/office/drawing/2014/main" id="{E1A8D1B7-ECC5-3C45-B07A-6896A276F57A}"/>
+              </a:ext>
+            </a:extLst>
+          </p:cNvPr>
+          <p:cNvSpPr/>
+          <p:nvPr/>
+        </p:nvSpPr>
+        <p:spPr>
+          <a:xfrm>
+            <a:off x="13294869" y="7914842"/>
+            <a:ext cx="1086131" cy="369332"/>
+          </a:xfrm>
+          <a:prstGeom prst="rect">
+            <a:avLst/>
+          </a:prstGeom>
+        </p:spPr>
+        <p:txBody>
+          <a:bodyPr wrap="none">
+            <a:spAutoFit/>
+          </a:bodyPr>
+          <a:lstStyle/>
+          <a:p>
+            <a:pPr algn="ctr"/>
+            <a:r>
+              <a:rPr lang="en-US" dirty="0">
+                <a:solidFill>
+                  <a:schemeClr val="accent6"/>
+                </a:solidFill>
+              </a:rPr>
+              <a:t>NY-TIMES</a:t>
+            </a:r>
+            <a:endParaRPr lang="en-BY" dirty="0">
+              <a:solidFill>
+                <a:schemeClr val="accent6"/>
+              </a:solidFill>
+            </a:endParaRPr>
+          </a:p>
+        </p:txBody>
+      </p:sp>
+      <p:sp>
+        <p:nvSpPr>
+          <p:cNvPr id="117" name="Rectangle 116">
+            <a:extLst>
+              <a:ext uri="{FF2B5EF4-FFF2-40B4-BE49-F238E27FC236}">
+                <a16:creationId xmlns:a16="http://schemas.microsoft.com/office/drawing/2014/main" id="{EF871E6F-355F-1744-9F8D-02F997CA3C38}"/>
+              </a:ext>
+            </a:extLst>
+          </p:cNvPr>
+          <p:cNvSpPr/>
+          <p:nvPr/>
+        </p:nvSpPr>
+        <p:spPr>
+          <a:xfrm>
+            <a:off x="13469538" y="8309637"/>
+            <a:ext cx="736805" cy="369332"/>
+          </a:xfrm>
+          <a:prstGeom prst="rect">
+            <a:avLst/>
+          </a:prstGeom>
+        </p:spPr>
+        <p:txBody>
+          <a:bodyPr wrap="none">
+            <a:spAutoFit/>
+          </a:bodyPr>
+          <a:lstStyle/>
+          <a:p>
+            <a:pPr algn="ctr"/>
+            <a:r>
+              <a:rPr lang="en-US" dirty="0">
+                <a:solidFill>
+                  <a:schemeClr val="accent6"/>
+                </a:solidFill>
+              </a:rPr>
+              <a:t>Zillow</a:t>
+            </a:r>
+            <a:endParaRPr lang="en-BY" dirty="0">
+              <a:solidFill>
+                <a:schemeClr val="accent6"/>
+              </a:solidFill>
+            </a:endParaRPr>
+          </a:p>
+        </p:txBody>
+      </p:sp>
+      <p:sp>
+        <p:nvSpPr>
+          <p:cNvPr id="118" name="Rectangle 117">
+            <a:extLst>
+              <a:ext uri="{FF2B5EF4-FFF2-40B4-BE49-F238E27FC236}">
+                <a16:creationId xmlns:a16="http://schemas.microsoft.com/office/drawing/2014/main" id="{AA438D8B-27F6-DE46-9E4E-72CC8E8743D4}"/>
+              </a:ext>
+            </a:extLst>
+          </p:cNvPr>
+          <p:cNvSpPr/>
+          <p:nvPr/>
+        </p:nvSpPr>
+        <p:spPr>
+          <a:xfrm>
+            <a:off x="13304781" y="8678969"/>
+            <a:ext cx="1066318" cy="369332"/>
+          </a:xfrm>
+          <a:prstGeom prst="rect">
+            <a:avLst/>
+          </a:prstGeom>
+        </p:spPr>
+        <p:txBody>
+          <a:bodyPr wrap="none">
+            <a:spAutoFit/>
+          </a:bodyPr>
+          <a:lstStyle/>
+          <a:p>
+            <a:pPr algn="ctr"/>
+            <a:r>
+              <a:rPr lang="en-BY" dirty="0">
+                <a:solidFill>
+                  <a:schemeClr val="accent6"/>
+                </a:solidFill>
+              </a:rPr>
+              <a:t>Sberbank</a:t>
+            </a:r>
+          </a:p>
+        </p:txBody>
+      </p:sp>
+      <p:sp>
+        <p:nvSpPr>
+          <p:cNvPr id="119" name="Rectangle 118">
+            <a:extLst>
+              <a:ext uri="{FF2B5EF4-FFF2-40B4-BE49-F238E27FC236}">
+                <a16:creationId xmlns:a16="http://schemas.microsoft.com/office/drawing/2014/main" id="{88A1883E-0841-6B4A-BC51-28DC7F79BBB1}"/>
+              </a:ext>
+            </a:extLst>
+          </p:cNvPr>
+          <p:cNvSpPr/>
+          <p:nvPr/>
+        </p:nvSpPr>
+        <p:spPr>
+          <a:xfrm>
+            <a:off x="13513677" y="9048301"/>
+            <a:ext cx="598690" cy="369332"/>
+          </a:xfrm>
+          <a:prstGeom prst="rect">
+            <a:avLst/>
+          </a:prstGeom>
+        </p:spPr>
+        <p:txBody>
+          <a:bodyPr wrap="none">
+            <a:spAutoFit/>
+          </a:bodyPr>
+          <a:lstStyle/>
+          <a:p>
+            <a:pPr algn="ctr"/>
+            <a:r>
+              <a:rPr lang="en-US" dirty="0">
+                <a:solidFill>
+                  <a:schemeClr val="accent6"/>
+                </a:solidFill>
+              </a:rPr>
+              <a:t>MTS</a:t>
+            </a:r>
+            <a:endParaRPr lang="en-BY" dirty="0">
+              <a:solidFill>
+                <a:schemeClr val="accent6"/>
+              </a:solidFill>
+            </a:endParaRPr>
+          </a:p>
+        </p:txBody>
+      </p:sp>
+      <p:sp>
+        <p:nvSpPr>
+          <p:cNvPr id="120" name="Rectangle 119">
+            <a:extLst>
+              <a:ext uri="{FF2B5EF4-FFF2-40B4-BE49-F238E27FC236}">
+                <a16:creationId xmlns:a16="http://schemas.microsoft.com/office/drawing/2014/main" id="{8D8E5713-2E02-9341-8F27-9E4D7F5C9F40}"/>
+              </a:ext>
+            </a:extLst>
+          </p:cNvPr>
+          <p:cNvSpPr/>
+          <p:nvPr/>
+        </p:nvSpPr>
+        <p:spPr>
+          <a:xfrm>
+            <a:off x="13473027" y="9445324"/>
+            <a:ext cx="679994" cy="369332"/>
+          </a:xfrm>
+          <a:prstGeom prst="rect">
+            <a:avLst/>
+          </a:prstGeom>
+        </p:spPr>
+        <p:txBody>
+          <a:bodyPr wrap="none">
+            <a:spAutoFit/>
+          </a:bodyPr>
+          <a:lstStyle/>
+          <a:p>
+            <a:pPr algn="ctr"/>
+            <a:r>
+              <a:rPr lang="en-US" dirty="0" err="1">
+                <a:solidFill>
+                  <a:schemeClr val="accent6"/>
+                </a:solidFill>
+              </a:rPr>
+              <a:t>Belaz</a:t>
+            </a:r>
+            <a:endParaRPr lang="en-BY" dirty="0">
+              <a:solidFill>
+                <a:schemeClr val="accent6"/>
+              </a:solidFill>
+            </a:endParaRPr>
+          </a:p>
+        </p:txBody>
+      </p:sp>
+    </p:spTree>
+    <p:extLst>
+      <p:ext uri="{BB962C8B-B14F-4D97-AF65-F5344CB8AC3E}">
+        <p14:creationId xmlns:p14="http://schemas.microsoft.com/office/powerpoint/2010/main" val="274582813"/>
+      </p:ext>
+    </p:extLst>
+  </p:cSld>
+  <p:clrMapOvr>
+    <a:masterClrMapping/>
+  </p:clrMapOvr>
+</p:sld>
+</file>
+
+<file path=ppt/slides/slide7.xml><?xml version="1.0" encoding="utf-8"?>
+<p:sld xmlns:a="http://schemas.openxmlformats.org/drawingml/2006/main" xmlns:r="http://schemas.openxmlformats.org/officeDocument/2006/relationships" xmlns:p="http://schemas.openxmlformats.org/presentationml/2006/main">
+  <p:cSld>
+    <p:spTree>
+      <p:nvGrpSpPr>
+        <p:cNvPr id="1" name=""/>
+        <p:cNvGrpSpPr/>
+        <p:nvPr/>
+      </p:nvGrpSpPr>
+      <p:grpSpPr>
+        <a:xfrm>
+          <a:off x="0" y="0"/>
+          <a:ext cx="0" cy="0"/>
+          <a:chOff x="0" y="0"/>
+          <a:chExt cx="0" cy="0"/>
+        </a:xfrm>
+      </p:grpSpPr>
+      <p:sp>
+        <p:nvSpPr>
+          <p:cNvPr id="4" name="TextBox 3">
+            <a:extLst>
+              <a:ext uri="{FF2B5EF4-FFF2-40B4-BE49-F238E27FC236}">
+                <a16:creationId xmlns:a16="http://schemas.microsoft.com/office/drawing/2014/main" id="{4E45CDFE-59FB-F74F-A73B-6933C90EBAEE}"/>
+              </a:ext>
+            </a:extLst>
+          </p:cNvPr>
+          <p:cNvSpPr txBox="1"/>
+          <p:nvPr/>
+        </p:nvSpPr>
+        <p:spPr>
+          <a:xfrm>
+            <a:off x="443346" y="360218"/>
+            <a:ext cx="3206647" cy="707886"/>
+          </a:xfrm>
+          <a:prstGeom prst="rect">
+            <a:avLst/>
+          </a:prstGeom>
+          <a:noFill/>
+        </p:spPr>
+        <p:txBody>
+          <a:bodyPr wrap="none" rtlCol="0">
+            <a:spAutoFit/>
+          </a:bodyPr>
+          <a:lstStyle/>
+          <a:p>
+            <a:r>
+              <a:rPr lang="en-BY" sz="4000" dirty="0"/>
+              <a:t>Footer Section</a:t>
+            </a:r>
+            <a:endParaRPr lang="en-BY" dirty="0"/>
+          </a:p>
+        </p:txBody>
+      </p:sp>
+      <p:sp>
+        <p:nvSpPr>
+          <p:cNvPr id="16" name="Rectangle 15">
+            <a:extLst>
+              <a:ext uri="{FF2B5EF4-FFF2-40B4-BE49-F238E27FC236}">
+                <a16:creationId xmlns:a16="http://schemas.microsoft.com/office/drawing/2014/main" id="{3178C7DD-2D9B-D344-9FB1-89BF70EB1B23}"/>
+              </a:ext>
+            </a:extLst>
+          </p:cNvPr>
+          <p:cNvSpPr/>
+          <p:nvPr/>
+        </p:nvSpPr>
+        <p:spPr>
+          <a:xfrm>
+            <a:off x="1288918" y="1308403"/>
+            <a:ext cx="12413183" cy="3856288"/>
+          </a:xfrm>
+          <a:prstGeom prst="rect">
+            <a:avLst/>
+          </a:prstGeom>
+          <a:solidFill>
+            <a:schemeClr val="bg1">
+              <a:lumMod val="95000"/>
+            </a:schemeClr>
+          </a:solidFill>
+        </p:spPr>
+        <p:style>
+          <a:lnRef idx="2">
+            <a:schemeClr val="accent1">
+              <a:shade val="50000"/>
+            </a:schemeClr>
+          </a:lnRef>
+          <a:fillRef idx="1">
+            <a:schemeClr val="accent1"/>
+          </a:fillRef>
+          <a:effectRef idx="0">
+            <a:schemeClr val="accent1"/>
+          </a:effectRef>
+          <a:fontRef idx="minor">
+            <a:schemeClr val="lt1"/>
+          </a:fontRef>
+        </p:style>
+        <p:txBody>
+          <a:bodyPr rtlCol="0" anchor="ctr"/>
+          <a:lstStyle/>
+          <a:p>
+            <a:pPr algn="ctr"/>
+            <a:endParaRPr lang="en-US"/>
+          </a:p>
+        </p:txBody>
+      </p:sp>
+      <p:grpSp>
+        <p:nvGrpSpPr>
+          <p:cNvPr id="17" name="Group 16">
+            <a:extLst>
+              <a:ext uri="{FF2B5EF4-FFF2-40B4-BE49-F238E27FC236}">
+                <a16:creationId xmlns:a16="http://schemas.microsoft.com/office/drawing/2014/main" id="{C9880EC7-75D0-2E45-B27E-9CEE6201A1FF}"/>
+              </a:ext>
+            </a:extLst>
+          </p:cNvPr>
+          <p:cNvGrpSpPr/>
+          <p:nvPr/>
+        </p:nvGrpSpPr>
+        <p:grpSpPr>
+          <a:xfrm>
+            <a:off x="2590604" y="1329177"/>
+            <a:ext cx="9809810" cy="3835514"/>
+            <a:chOff x="787400" y="646563"/>
+            <a:chExt cx="5283200" cy="1431468"/>
+          </a:xfrm>
+        </p:grpSpPr>
+        <p:sp>
+          <p:nvSpPr>
+            <p:cNvPr id="18" name="Rectangle 17">
+              <a:extLst>
+                <a:ext uri="{FF2B5EF4-FFF2-40B4-BE49-F238E27FC236}">
+                  <a16:creationId xmlns:a16="http://schemas.microsoft.com/office/drawing/2014/main" id="{8AFBF417-F05E-8E4F-8390-52398C96C588}"/>
+                </a:ext>
+              </a:extLst>
+            </p:cNvPr>
+            <p:cNvSpPr/>
+            <p:nvPr/>
+          </p:nvSpPr>
+          <p:spPr>
+            <a:xfrm>
+              <a:off x="787400" y="650240"/>
+              <a:ext cx="5283200" cy="1427791"/>
+            </a:xfrm>
+            <a:prstGeom prst="rect">
+              <a:avLst/>
+            </a:prstGeom>
+            <a:solidFill>
+              <a:srgbClr val="5B9BD5">
+                <a:alpha val="10196"/>
+              </a:srgbClr>
+            </a:solidFill>
+            <a:ln>
+              <a:solidFill>
+                <a:schemeClr val="accent5"/>
+              </a:solidFill>
+            </a:ln>
+          </p:spPr>
+          <p:style>
+            <a:lnRef idx="2">
+              <a:schemeClr val="accent1">
+                <a:shade val="50000"/>
+              </a:schemeClr>
+            </a:lnRef>
+            <a:fillRef idx="1">
+              <a:schemeClr val="accent1"/>
+            </a:fillRef>
+            <a:effectRef idx="0">
+              <a:schemeClr val="accent1"/>
+            </a:effectRef>
+            <a:fontRef idx="minor">
+              <a:schemeClr val="lt1"/>
+            </a:fontRef>
+          </p:style>
+          <p:txBody>
+            <a:bodyPr rtlCol="0" anchor="ctr"/>
+            <a:lstStyle/>
+            <a:p>
+              <a:pPr algn="ctr"/>
+              <a:endParaRPr lang="en-US" dirty="0"/>
+            </a:p>
+          </p:txBody>
+        </p:sp>
+        <p:sp>
+          <p:nvSpPr>
+            <p:cNvPr id="19" name="Rectangle 18">
+              <a:extLst>
+                <a:ext uri="{FF2B5EF4-FFF2-40B4-BE49-F238E27FC236}">
+                  <a16:creationId xmlns:a16="http://schemas.microsoft.com/office/drawing/2014/main" id="{91869B45-4A01-164E-98E2-ADB9CC3952C9}"/>
+                </a:ext>
+              </a:extLst>
+            </p:cNvPr>
+            <p:cNvSpPr/>
+            <p:nvPr/>
+          </p:nvSpPr>
+          <p:spPr>
+            <a:xfrm>
+              <a:off x="787400" y="646563"/>
+              <a:ext cx="2878104" cy="130653"/>
+            </a:xfrm>
+            <a:prstGeom prst="rect">
+              <a:avLst/>
+            </a:prstGeom>
+            <a:noFill/>
+            <a:ln>
+              <a:noFill/>
+            </a:ln>
+          </p:spPr>
+          <p:style>
+            <a:lnRef idx="2">
+              <a:schemeClr val="accent1">
+                <a:shade val="50000"/>
+              </a:schemeClr>
+            </a:lnRef>
+            <a:fillRef idx="1">
+              <a:schemeClr val="accent1"/>
+            </a:fillRef>
+            <a:effectRef idx="0">
+              <a:schemeClr val="accent1"/>
+            </a:effectRef>
+            <a:fontRef idx="minor">
+              <a:schemeClr val="lt1"/>
+            </a:fontRef>
+          </p:style>
+          <p:txBody>
+            <a:bodyPr rtlCol="0" anchor="ctr"/>
+            <a:lstStyle/>
+            <a:p>
+              <a:r>
+                <a:rPr lang="en-US" sz="1600" dirty="0">
+                  <a:solidFill>
+                    <a:schemeClr val="accent5"/>
+                  </a:solidFill>
+                </a:rPr>
+                <a:t>&lt;div&gt; .content-horizontal-center</a:t>
+              </a:r>
+            </a:p>
+          </p:txBody>
+        </p:sp>
+      </p:grpSp>
+      <p:sp>
+        <p:nvSpPr>
+          <p:cNvPr id="23" name="Rectangle 22">
+            <a:extLst>
+              <a:ext uri="{FF2B5EF4-FFF2-40B4-BE49-F238E27FC236}">
+                <a16:creationId xmlns:a16="http://schemas.microsoft.com/office/drawing/2014/main" id="{C697B5D6-684E-F341-84B3-480269E5B8A5}"/>
+              </a:ext>
+            </a:extLst>
+          </p:cNvPr>
+          <p:cNvSpPr/>
+          <p:nvPr/>
+        </p:nvSpPr>
+        <p:spPr>
+          <a:xfrm>
+            <a:off x="1273679" y="1338883"/>
+            <a:ext cx="1811042" cy="796272"/>
+          </a:xfrm>
+          <a:prstGeom prst="rect">
+            <a:avLst/>
+          </a:prstGeom>
+          <a:noFill/>
+          <a:ln>
+            <a:noFill/>
+          </a:ln>
+        </p:spPr>
+        <p:style>
+          <a:lnRef idx="2">
+            <a:schemeClr val="accent1">
+              <a:shade val="50000"/>
+            </a:schemeClr>
+          </a:lnRef>
+          <a:fillRef idx="1">
+            <a:schemeClr val="accent1"/>
+          </a:fillRef>
+          <a:effectRef idx="0">
+            <a:schemeClr val="accent1"/>
+          </a:effectRef>
+          <a:fontRef idx="minor">
+            <a:schemeClr val="lt1"/>
+          </a:fontRef>
+        </p:style>
+        <p:txBody>
+          <a:bodyPr rtlCol="0" anchor="ctr"/>
+          <a:lstStyle/>
+          <a:p>
+            <a:r>
+              <a:rPr lang="en-US" sz="1600" dirty="0">
+                <a:solidFill>
+                  <a:schemeClr val="tx1"/>
+                </a:solidFill>
+              </a:rPr>
+              <a:t>&lt;div&gt; </a:t>
+            </a:r>
+            <a:br>
+              <a:rPr lang="en-US" sz="1600" dirty="0">
+                <a:solidFill>
+                  <a:schemeClr val="tx1"/>
+                </a:solidFill>
+              </a:rPr>
+            </a:br>
+            <a:r>
+              <a:rPr lang="en-US" sz="1600" dirty="0">
+                <a:solidFill>
+                  <a:schemeClr val="tx1"/>
+                </a:solidFill>
+              </a:rPr>
+              <a:t>.footer</a:t>
+            </a:r>
+          </a:p>
+          <a:p>
+            <a:r>
+              <a:rPr lang="en-US" sz="1600" dirty="0">
+                <a:solidFill>
+                  <a:schemeClr val="tx1"/>
+                </a:solidFill>
+              </a:rPr>
+              <a:t>.section</a:t>
+            </a:r>
+          </a:p>
+        </p:txBody>
+      </p:sp>
+      <p:grpSp>
+        <p:nvGrpSpPr>
+          <p:cNvPr id="24" name="Group 23">
+            <a:extLst>
+              <a:ext uri="{FF2B5EF4-FFF2-40B4-BE49-F238E27FC236}">
+                <a16:creationId xmlns:a16="http://schemas.microsoft.com/office/drawing/2014/main" id="{538C9DEF-B4A9-2340-A774-A0EE6CDDB056}"/>
+              </a:ext>
+            </a:extLst>
+          </p:cNvPr>
+          <p:cNvGrpSpPr/>
+          <p:nvPr/>
+        </p:nvGrpSpPr>
+        <p:grpSpPr>
+          <a:xfrm>
+            <a:off x="2719104" y="1745299"/>
+            <a:ext cx="2051708" cy="1926156"/>
+            <a:chOff x="1648943" y="672863"/>
+            <a:chExt cx="2234226" cy="1820050"/>
+          </a:xfrm>
+        </p:grpSpPr>
+        <p:sp>
+          <p:nvSpPr>
+            <p:cNvPr id="25" name="Rectangle 24">
+              <a:extLst>
+                <a:ext uri="{FF2B5EF4-FFF2-40B4-BE49-F238E27FC236}">
+                  <a16:creationId xmlns:a16="http://schemas.microsoft.com/office/drawing/2014/main" id="{2FCB1430-0AAB-214B-A592-0F1B4C30544A}"/>
+                </a:ext>
+              </a:extLst>
+            </p:cNvPr>
+            <p:cNvSpPr/>
+            <p:nvPr/>
+          </p:nvSpPr>
+          <p:spPr>
+            <a:xfrm>
+              <a:off x="1648943" y="672863"/>
+              <a:ext cx="2234226" cy="1820050"/>
+            </a:xfrm>
+            <a:prstGeom prst="rect">
+              <a:avLst/>
+            </a:prstGeom>
+            <a:solidFill>
+              <a:schemeClr val="accent4">
+                <a:alpha val="10196"/>
+              </a:schemeClr>
+            </a:solidFill>
+            <a:ln>
+              <a:solidFill>
+                <a:schemeClr val="accent4"/>
+              </a:solidFill>
+            </a:ln>
+          </p:spPr>
+          <p:style>
+            <a:lnRef idx="2">
+              <a:schemeClr val="accent1">
+                <a:shade val="50000"/>
+              </a:schemeClr>
+            </a:lnRef>
+            <a:fillRef idx="1">
+              <a:schemeClr val="accent1"/>
+            </a:fillRef>
+            <a:effectRef idx="0">
+              <a:schemeClr val="accent1"/>
+            </a:effectRef>
+            <a:fontRef idx="minor">
+              <a:schemeClr val="lt1"/>
+            </a:fontRef>
+          </p:style>
+          <p:txBody>
+            <a:bodyPr rtlCol="0" anchor="ctr"/>
+            <a:lstStyle/>
+            <a:p>
+              <a:pPr algn="ctr"/>
+              <a:endParaRPr lang="en-US" dirty="0"/>
+            </a:p>
+          </p:txBody>
+        </p:sp>
+        <p:sp>
+          <p:nvSpPr>
+            <p:cNvPr id="26" name="Rectangle 25">
+              <a:extLst>
+                <a:ext uri="{FF2B5EF4-FFF2-40B4-BE49-F238E27FC236}">
+                  <a16:creationId xmlns:a16="http://schemas.microsoft.com/office/drawing/2014/main" id="{96B646B2-80B9-8D43-8CD6-868C7793E705}"/>
+                </a:ext>
+              </a:extLst>
+            </p:cNvPr>
+            <p:cNvSpPr/>
+            <p:nvPr/>
+          </p:nvSpPr>
+          <p:spPr>
+            <a:xfrm>
+              <a:off x="1677426" y="757955"/>
+              <a:ext cx="2205743" cy="612786"/>
+            </a:xfrm>
+            <a:prstGeom prst="rect">
+              <a:avLst/>
+            </a:prstGeom>
+            <a:noFill/>
+            <a:ln>
+              <a:noFill/>
+            </a:ln>
+          </p:spPr>
+          <p:style>
+            <a:lnRef idx="2">
+              <a:schemeClr val="accent1">
+                <a:shade val="50000"/>
+              </a:schemeClr>
+            </a:lnRef>
+            <a:fillRef idx="1">
+              <a:schemeClr val="accent1"/>
+            </a:fillRef>
+            <a:effectRef idx="0">
+              <a:schemeClr val="accent1"/>
+            </a:effectRef>
+            <a:fontRef idx="minor">
+              <a:schemeClr val="lt1"/>
+            </a:fontRef>
+          </p:style>
+          <p:txBody>
+            <a:bodyPr rtlCol="0" anchor="ctr"/>
+            <a:lstStyle/>
+            <a:p>
+              <a:r>
+                <a:rPr lang="en-US" sz="1600" dirty="0">
+                  <a:solidFill>
+                    <a:schemeClr val="accent2">
+                      <a:lumMod val="50000"/>
+                    </a:schemeClr>
+                  </a:solidFill>
+                </a:rPr>
+                <a:t>&lt;div&gt; </a:t>
+              </a:r>
+            </a:p>
+            <a:p>
+              <a:r>
+                <a:rPr lang="en-US" sz="1600" dirty="0">
+                  <a:solidFill>
+                    <a:schemeClr val="accent2">
+                      <a:lumMod val="50000"/>
+                    </a:schemeClr>
+                  </a:solidFill>
+                </a:rPr>
+                <a:t>.card</a:t>
+              </a:r>
+            </a:p>
+            <a:p>
+              <a:r>
+                <a:rPr lang="en-US" sz="1600" dirty="0">
+                  <a:solidFill>
+                    <a:schemeClr val="accent2">
+                      <a:lumMod val="50000"/>
+                    </a:schemeClr>
+                  </a:solidFill>
+                </a:rPr>
+                <a:t>.</a:t>
+              </a:r>
+              <a:r>
+                <a:rPr lang="en-US" sz="1600" dirty="0" err="1">
+                  <a:solidFill>
+                    <a:schemeClr val="accent2">
+                      <a:lumMod val="50000"/>
+                    </a:schemeClr>
+                  </a:solidFill>
+                </a:rPr>
+                <a:t>card_about</a:t>
+              </a:r>
+              <a:endParaRPr lang="en-US" sz="1600" dirty="0">
+                <a:solidFill>
+                  <a:schemeClr val="accent2">
+                    <a:lumMod val="50000"/>
+                  </a:schemeClr>
+                </a:solidFill>
+              </a:endParaRPr>
+            </a:p>
+          </p:txBody>
+        </p:sp>
+      </p:grpSp>
+      <p:grpSp>
+        <p:nvGrpSpPr>
+          <p:cNvPr id="58" name="Group 57">
+            <a:extLst>
+              <a:ext uri="{FF2B5EF4-FFF2-40B4-BE49-F238E27FC236}">
+                <a16:creationId xmlns:a16="http://schemas.microsoft.com/office/drawing/2014/main" id="{F055D5C8-00E6-A741-A4A3-3BBE4EF3EB8A}"/>
+              </a:ext>
+            </a:extLst>
+          </p:cNvPr>
+          <p:cNvGrpSpPr/>
+          <p:nvPr/>
+        </p:nvGrpSpPr>
+        <p:grpSpPr>
+          <a:xfrm>
+            <a:off x="1310558" y="7567051"/>
+            <a:ext cx="3843454" cy="3329347"/>
+            <a:chOff x="1598378" y="451661"/>
+            <a:chExt cx="3686512" cy="1905146"/>
+          </a:xfrm>
+        </p:grpSpPr>
+        <p:sp>
+          <p:nvSpPr>
+            <p:cNvPr id="59" name="Rectangle 58">
+              <a:extLst>
+                <a:ext uri="{FF2B5EF4-FFF2-40B4-BE49-F238E27FC236}">
+                  <a16:creationId xmlns:a16="http://schemas.microsoft.com/office/drawing/2014/main" id="{045E065B-D5E5-6F43-BD6D-1AA0F64DBD1D}"/>
+                </a:ext>
+              </a:extLst>
+            </p:cNvPr>
+            <p:cNvSpPr/>
+            <p:nvPr/>
+          </p:nvSpPr>
+          <p:spPr>
+            <a:xfrm>
+              <a:off x="1598378" y="615662"/>
+              <a:ext cx="3686512" cy="1741145"/>
+            </a:xfrm>
+            <a:prstGeom prst="rect">
+              <a:avLst/>
+            </a:prstGeom>
+            <a:solidFill>
+              <a:schemeClr val="accent4">
+                <a:alpha val="10196"/>
+              </a:schemeClr>
+            </a:solidFill>
+            <a:ln>
+              <a:solidFill>
+                <a:schemeClr val="accent4"/>
+              </a:solidFill>
+            </a:ln>
+          </p:spPr>
+          <p:style>
+            <a:lnRef idx="2">
+              <a:schemeClr val="accent1">
+                <a:shade val="50000"/>
+              </a:schemeClr>
+            </a:lnRef>
+            <a:fillRef idx="1">
+              <a:schemeClr val="accent1"/>
+            </a:fillRef>
+            <a:effectRef idx="0">
+              <a:schemeClr val="accent1"/>
+            </a:effectRef>
+            <a:fontRef idx="minor">
+              <a:schemeClr val="lt1"/>
+            </a:fontRef>
+          </p:style>
+          <p:txBody>
+            <a:bodyPr rtlCol="0" anchor="ctr"/>
+            <a:lstStyle/>
+            <a:p>
+              <a:pPr algn="ctr"/>
+              <a:endParaRPr lang="en-US" dirty="0"/>
+            </a:p>
+          </p:txBody>
+        </p:sp>
+        <p:sp>
+          <p:nvSpPr>
+            <p:cNvPr id="60" name="Rectangle 59">
+              <a:extLst>
+                <a:ext uri="{FF2B5EF4-FFF2-40B4-BE49-F238E27FC236}">
+                  <a16:creationId xmlns:a16="http://schemas.microsoft.com/office/drawing/2014/main" id="{62823C49-56E8-D044-9D93-B6135DE604EF}"/>
+                </a:ext>
+              </a:extLst>
+            </p:cNvPr>
+            <p:cNvSpPr/>
+            <p:nvPr/>
+          </p:nvSpPr>
+          <p:spPr>
+            <a:xfrm>
+              <a:off x="1598378" y="451661"/>
+              <a:ext cx="2321560" cy="121920"/>
+            </a:xfrm>
+            <a:prstGeom prst="rect">
+              <a:avLst/>
+            </a:prstGeom>
+            <a:noFill/>
+            <a:ln>
+              <a:noFill/>
+            </a:ln>
+          </p:spPr>
+          <p:style>
+            <a:lnRef idx="2">
+              <a:schemeClr val="accent1">
+                <a:shade val="50000"/>
+              </a:schemeClr>
+            </a:lnRef>
+            <a:fillRef idx="1">
+              <a:schemeClr val="accent1"/>
+            </a:fillRef>
+            <a:effectRef idx="0">
+              <a:schemeClr val="accent1"/>
+            </a:effectRef>
+            <a:fontRef idx="minor">
+              <a:schemeClr val="lt1"/>
+            </a:fontRef>
+          </p:style>
+          <p:txBody>
+            <a:bodyPr rtlCol="0" anchor="ctr"/>
+            <a:lstStyle/>
+            <a:p>
+              <a:r>
+                <a:rPr lang="en-US" sz="2000" dirty="0">
+                  <a:solidFill>
+                    <a:schemeClr val="accent2">
+                      <a:lumMod val="50000"/>
+                    </a:schemeClr>
+                  </a:solidFill>
+                </a:rPr>
+                <a:t>&lt;div&gt; .card</a:t>
+              </a:r>
+            </a:p>
+          </p:txBody>
+        </p:sp>
+      </p:grpSp>
+      <p:sp>
+        <p:nvSpPr>
+          <p:cNvPr id="61" name="Rectangle 60">
+            <a:extLst>
+              <a:ext uri="{FF2B5EF4-FFF2-40B4-BE49-F238E27FC236}">
+                <a16:creationId xmlns:a16="http://schemas.microsoft.com/office/drawing/2014/main" id="{27090F9F-78CE-3E40-B92C-BB9E7C3BA1EA}"/>
+              </a:ext>
+            </a:extLst>
+          </p:cNvPr>
+          <p:cNvSpPr/>
+          <p:nvPr/>
+        </p:nvSpPr>
+        <p:spPr>
+          <a:xfrm>
+            <a:off x="1397406" y="7935387"/>
+            <a:ext cx="3651039" cy="569844"/>
+          </a:xfrm>
+          <a:prstGeom prst="rect">
+            <a:avLst/>
+          </a:prstGeom>
+          <a:solidFill>
+            <a:schemeClr val="tx1">
+              <a:lumMod val="50000"/>
+              <a:lumOff val="50000"/>
+              <a:alpha val="10196"/>
+            </a:schemeClr>
+          </a:solidFill>
+          <a:ln>
+            <a:solidFill>
+              <a:schemeClr val="tx1">
+                <a:lumMod val="50000"/>
+                <a:lumOff val="50000"/>
+              </a:schemeClr>
+            </a:solidFill>
+          </a:ln>
+        </p:spPr>
+        <p:style>
+          <a:lnRef idx="2">
+            <a:schemeClr val="accent1">
+              <a:shade val="50000"/>
+            </a:schemeClr>
+          </a:lnRef>
+          <a:fillRef idx="1">
+            <a:schemeClr val="accent1"/>
+          </a:fillRef>
+          <a:effectRef idx="0">
+            <a:schemeClr val="accent1"/>
+          </a:effectRef>
+          <a:fontRef idx="minor">
+            <a:schemeClr val="lt1"/>
+          </a:fontRef>
+        </p:style>
+        <p:txBody>
+          <a:bodyPr rtlCol="0" anchor="ctr"/>
+          <a:lstStyle/>
+          <a:p>
+            <a:pPr algn="ctr"/>
+            <a:endParaRPr lang="en-US" dirty="0"/>
+          </a:p>
+        </p:txBody>
+      </p:sp>
+      <p:sp>
+        <p:nvSpPr>
+          <p:cNvPr id="62" name="Rectangle 61">
+            <a:extLst>
+              <a:ext uri="{FF2B5EF4-FFF2-40B4-BE49-F238E27FC236}">
+                <a16:creationId xmlns:a16="http://schemas.microsoft.com/office/drawing/2014/main" id="{20A83BA2-2977-DE48-ADBE-47C5A8F69A32}"/>
+              </a:ext>
+            </a:extLst>
+          </p:cNvPr>
+          <p:cNvSpPr/>
+          <p:nvPr/>
+        </p:nvSpPr>
+        <p:spPr>
+          <a:xfrm>
+            <a:off x="2350418" y="8115623"/>
+            <a:ext cx="2420393" cy="213062"/>
+          </a:xfrm>
+          <a:prstGeom prst="rect">
+            <a:avLst/>
+          </a:prstGeom>
+          <a:noFill/>
+          <a:ln>
+            <a:noFill/>
+          </a:ln>
+        </p:spPr>
+        <p:style>
+          <a:lnRef idx="2">
+            <a:schemeClr val="accent1">
+              <a:shade val="50000"/>
+            </a:schemeClr>
+          </a:lnRef>
+          <a:fillRef idx="1">
+            <a:schemeClr val="accent1"/>
+          </a:fillRef>
+          <a:effectRef idx="0">
+            <a:schemeClr val="accent1"/>
+          </a:effectRef>
+          <a:fontRef idx="minor">
+            <a:schemeClr val="lt1"/>
+          </a:fontRef>
+        </p:style>
+        <p:txBody>
+          <a:bodyPr rtlCol="0" anchor="ctr"/>
+          <a:lstStyle/>
+          <a:p>
+            <a:r>
+              <a:rPr lang="en-US" sz="1600" dirty="0">
+                <a:solidFill>
+                  <a:schemeClr val="tx1">
+                    <a:lumMod val="75000"/>
+                    <a:lumOff val="25000"/>
+                  </a:schemeClr>
+                </a:solidFill>
+              </a:rPr>
+              <a:t>&lt;div&gt; .</a:t>
+            </a:r>
+            <a:r>
+              <a:rPr lang="en-US" sz="1600" dirty="0" err="1">
+                <a:solidFill>
+                  <a:schemeClr val="tx1">
+                    <a:lumMod val="75000"/>
+                    <a:lumOff val="25000"/>
+                  </a:schemeClr>
+                </a:solidFill>
+              </a:rPr>
+              <a:t>card__head</a:t>
+            </a:r>
+            <a:endParaRPr lang="en-US" sz="1600" dirty="0">
+              <a:solidFill>
+                <a:schemeClr val="tx1">
+                  <a:lumMod val="75000"/>
+                  <a:lumOff val="25000"/>
+                </a:schemeClr>
+              </a:solidFill>
+            </a:endParaRPr>
+          </a:p>
+        </p:txBody>
+      </p:sp>
+      <p:grpSp>
+        <p:nvGrpSpPr>
+          <p:cNvPr id="63" name="Group 62">
+            <a:extLst>
+              <a:ext uri="{FF2B5EF4-FFF2-40B4-BE49-F238E27FC236}">
+                <a16:creationId xmlns:a16="http://schemas.microsoft.com/office/drawing/2014/main" id="{DC57EEED-326F-4343-B5F5-3B102877AE92}"/>
+              </a:ext>
+            </a:extLst>
+          </p:cNvPr>
+          <p:cNvGrpSpPr/>
+          <p:nvPr/>
+        </p:nvGrpSpPr>
+        <p:grpSpPr>
+          <a:xfrm>
+            <a:off x="1402400" y="8616469"/>
+            <a:ext cx="3646044" cy="1473617"/>
+            <a:chOff x="838728" y="1834120"/>
+            <a:chExt cx="1963624" cy="597929"/>
+          </a:xfrm>
+        </p:grpSpPr>
+        <p:sp>
+          <p:nvSpPr>
+            <p:cNvPr id="64" name="Rectangle 63">
+              <a:extLst>
+                <a:ext uri="{FF2B5EF4-FFF2-40B4-BE49-F238E27FC236}">
+                  <a16:creationId xmlns:a16="http://schemas.microsoft.com/office/drawing/2014/main" id="{15EC1288-74DF-8046-A9F2-B5A529559588}"/>
+                </a:ext>
+              </a:extLst>
+            </p:cNvPr>
+            <p:cNvSpPr/>
+            <p:nvPr/>
+          </p:nvSpPr>
+          <p:spPr>
+            <a:xfrm>
+              <a:off x="838728" y="1834120"/>
+              <a:ext cx="1963624" cy="597929"/>
+            </a:xfrm>
+            <a:prstGeom prst="rect">
+              <a:avLst/>
+            </a:prstGeom>
+            <a:solidFill>
+              <a:srgbClr val="FF0000">
+                <a:alpha val="10196"/>
+              </a:srgbClr>
+            </a:solidFill>
+            <a:ln>
+              <a:solidFill>
+                <a:srgbClr val="C00000"/>
+              </a:solidFill>
+            </a:ln>
+          </p:spPr>
+          <p:style>
+            <a:lnRef idx="2">
+              <a:schemeClr val="accent1">
+                <a:shade val="50000"/>
+              </a:schemeClr>
+            </a:lnRef>
+            <a:fillRef idx="1">
+              <a:schemeClr val="accent1"/>
+            </a:fillRef>
+            <a:effectRef idx="0">
+              <a:schemeClr val="accent1"/>
+            </a:effectRef>
+            <a:fontRef idx="minor">
+              <a:schemeClr val="lt1"/>
+            </a:fontRef>
+          </p:style>
+          <p:txBody>
+            <a:bodyPr rtlCol="0" anchor="ctr"/>
+            <a:lstStyle/>
+            <a:p>
+              <a:pPr algn="ctr"/>
+              <a:endParaRPr lang="en-US" dirty="0"/>
+            </a:p>
+          </p:txBody>
+        </p:sp>
+        <p:sp>
+          <p:nvSpPr>
+            <p:cNvPr id="65" name="Rectangle 64">
+              <a:extLst>
+                <a:ext uri="{FF2B5EF4-FFF2-40B4-BE49-F238E27FC236}">
+                  <a16:creationId xmlns:a16="http://schemas.microsoft.com/office/drawing/2014/main" id="{2AB7230E-FD56-144A-ADDB-9C978B3FADEE}"/>
+                </a:ext>
+              </a:extLst>
+            </p:cNvPr>
+            <p:cNvSpPr/>
+            <p:nvPr/>
+          </p:nvSpPr>
+          <p:spPr>
+            <a:xfrm>
+              <a:off x="1310792" y="1992863"/>
+              <a:ext cx="1077682" cy="198293"/>
+            </a:xfrm>
+            <a:prstGeom prst="rect">
+              <a:avLst/>
+            </a:prstGeom>
+            <a:noFill/>
+            <a:ln>
+              <a:noFill/>
+            </a:ln>
+          </p:spPr>
+          <p:style>
+            <a:lnRef idx="2">
+              <a:schemeClr val="accent1">
+                <a:shade val="50000"/>
+              </a:schemeClr>
+            </a:lnRef>
+            <a:fillRef idx="1">
+              <a:schemeClr val="accent1"/>
+            </a:fillRef>
+            <a:effectRef idx="0">
+              <a:schemeClr val="accent1"/>
+            </a:effectRef>
+            <a:fontRef idx="minor">
+              <a:schemeClr val="lt1"/>
+            </a:fontRef>
+          </p:style>
+          <p:txBody>
+            <a:bodyPr rtlCol="0" anchor="ctr"/>
+            <a:lstStyle/>
+            <a:p>
+              <a:r>
+                <a:rPr lang="en-US" sz="1600" dirty="0">
+                  <a:solidFill>
+                    <a:srgbClr val="C00000"/>
+                  </a:solidFill>
+                </a:rPr>
+                <a:t>&lt;div&gt; .</a:t>
+              </a:r>
+              <a:r>
+                <a:rPr lang="en-US" sz="1600" dirty="0" err="1">
+                  <a:solidFill>
+                    <a:srgbClr val="C00000"/>
+                  </a:solidFill>
+                </a:rPr>
+                <a:t>card__content</a:t>
+              </a:r>
+              <a:endParaRPr lang="en-US" sz="1600" dirty="0">
+                <a:solidFill>
+                  <a:srgbClr val="C00000"/>
+                </a:solidFill>
+              </a:endParaRPr>
+            </a:p>
+          </p:txBody>
+        </p:sp>
+      </p:grpSp>
+      <p:grpSp>
+        <p:nvGrpSpPr>
+          <p:cNvPr id="77" name="Group 76">
+            <a:extLst>
+              <a:ext uri="{FF2B5EF4-FFF2-40B4-BE49-F238E27FC236}">
+                <a16:creationId xmlns:a16="http://schemas.microsoft.com/office/drawing/2014/main" id="{F6032840-3E9D-A849-897A-7C0EAD2D2A5C}"/>
+              </a:ext>
+            </a:extLst>
+          </p:cNvPr>
+          <p:cNvGrpSpPr/>
+          <p:nvPr/>
+        </p:nvGrpSpPr>
+        <p:grpSpPr>
+          <a:xfrm>
+            <a:off x="1397407" y="10191611"/>
+            <a:ext cx="3651039" cy="640603"/>
+            <a:chOff x="842732" y="1868905"/>
+            <a:chExt cx="1966314" cy="259929"/>
+          </a:xfrm>
+        </p:grpSpPr>
+        <p:sp>
+          <p:nvSpPr>
+            <p:cNvPr id="78" name="Rectangle 77">
+              <a:extLst>
+                <a:ext uri="{FF2B5EF4-FFF2-40B4-BE49-F238E27FC236}">
+                  <a16:creationId xmlns:a16="http://schemas.microsoft.com/office/drawing/2014/main" id="{33685B8E-7FAE-C840-B3E0-646309A76940}"/>
+                </a:ext>
+              </a:extLst>
+            </p:cNvPr>
+            <p:cNvSpPr/>
+            <p:nvPr/>
+          </p:nvSpPr>
+          <p:spPr>
+            <a:xfrm>
+              <a:off x="842732" y="1868905"/>
+              <a:ext cx="1966314" cy="259929"/>
+            </a:xfrm>
+            <a:prstGeom prst="rect">
+              <a:avLst/>
+            </a:prstGeom>
+            <a:solidFill>
+              <a:schemeClr val="accent6">
+                <a:alpha val="10196"/>
+              </a:schemeClr>
+            </a:solidFill>
+            <a:ln>
+              <a:solidFill>
+                <a:schemeClr val="accent6">
+                  <a:lumMod val="50000"/>
+                </a:schemeClr>
+              </a:solidFill>
+            </a:ln>
+          </p:spPr>
+          <p:style>
+            <a:lnRef idx="2">
+              <a:schemeClr val="accent1">
+                <a:shade val="50000"/>
+              </a:schemeClr>
+            </a:lnRef>
+            <a:fillRef idx="1">
+              <a:schemeClr val="accent1"/>
+            </a:fillRef>
+            <a:effectRef idx="0">
+              <a:schemeClr val="accent1"/>
+            </a:effectRef>
+            <a:fontRef idx="minor">
+              <a:schemeClr val="lt1"/>
+            </a:fontRef>
+          </p:style>
+          <p:txBody>
+            <a:bodyPr rtlCol="0" anchor="ctr"/>
+            <a:lstStyle/>
+            <a:p>
+              <a:pPr algn="ctr"/>
+              <a:endParaRPr lang="en-US" dirty="0"/>
+            </a:p>
+          </p:txBody>
+        </p:sp>
+        <p:sp>
+          <p:nvSpPr>
+            <p:cNvPr id="79" name="Rectangle 78">
+              <a:extLst>
+                <a:ext uri="{FF2B5EF4-FFF2-40B4-BE49-F238E27FC236}">
+                  <a16:creationId xmlns:a16="http://schemas.microsoft.com/office/drawing/2014/main" id="{5918C641-BD2A-864A-A97B-538A504D03CF}"/>
+                </a:ext>
+              </a:extLst>
+            </p:cNvPr>
+            <p:cNvSpPr/>
+            <p:nvPr/>
+          </p:nvSpPr>
+          <p:spPr>
+            <a:xfrm>
+              <a:off x="1347102" y="1898881"/>
+              <a:ext cx="1077682" cy="198293"/>
+            </a:xfrm>
+            <a:prstGeom prst="rect">
+              <a:avLst/>
+            </a:prstGeom>
+            <a:noFill/>
+            <a:ln>
+              <a:noFill/>
+            </a:ln>
+          </p:spPr>
+          <p:style>
+            <a:lnRef idx="2">
+              <a:schemeClr val="accent1">
+                <a:shade val="50000"/>
+              </a:schemeClr>
+            </a:lnRef>
+            <a:fillRef idx="1">
+              <a:schemeClr val="accent1"/>
+            </a:fillRef>
+            <a:effectRef idx="0">
+              <a:schemeClr val="accent1"/>
+            </a:effectRef>
+            <a:fontRef idx="minor">
+              <a:schemeClr val="lt1"/>
+            </a:fontRef>
+          </p:style>
+          <p:txBody>
+            <a:bodyPr rtlCol="0" anchor="ctr"/>
+            <a:lstStyle/>
+            <a:p>
+              <a:r>
+                <a:rPr lang="en-US" sz="1600" dirty="0">
+                  <a:solidFill>
+                    <a:schemeClr val="accent6">
+                      <a:lumMod val="50000"/>
+                    </a:schemeClr>
+                  </a:solidFill>
+                </a:rPr>
+                <a:t>&lt;div&gt; .</a:t>
+              </a:r>
+              <a:r>
+                <a:rPr lang="en-US" sz="1600" dirty="0" err="1">
+                  <a:solidFill>
+                    <a:schemeClr val="accent6">
+                      <a:lumMod val="50000"/>
+                    </a:schemeClr>
+                  </a:solidFill>
+                </a:rPr>
+                <a:t>card__footer</a:t>
+              </a:r>
+              <a:endParaRPr lang="en-US" sz="1600" dirty="0">
+                <a:solidFill>
+                  <a:schemeClr val="accent6">
+                    <a:lumMod val="50000"/>
+                  </a:schemeClr>
+                </a:solidFill>
+              </a:endParaRPr>
+            </a:p>
+          </p:txBody>
+        </p:sp>
+      </p:grpSp>
+      <p:sp>
+        <p:nvSpPr>
+          <p:cNvPr id="81" name="Rectangle 80">
+            <a:extLst>
+              <a:ext uri="{FF2B5EF4-FFF2-40B4-BE49-F238E27FC236}">
+                <a16:creationId xmlns:a16="http://schemas.microsoft.com/office/drawing/2014/main" id="{BC15E8FB-E96C-E340-BF90-5397389B881B}"/>
+              </a:ext>
+            </a:extLst>
+          </p:cNvPr>
+          <p:cNvSpPr/>
+          <p:nvPr/>
+        </p:nvSpPr>
+        <p:spPr>
+          <a:xfrm>
+            <a:off x="1288918" y="11574103"/>
+            <a:ext cx="5057189" cy="789312"/>
+          </a:xfrm>
+          <a:prstGeom prst="rect">
+            <a:avLst/>
+          </a:prstGeom>
+          <a:solidFill>
+            <a:schemeClr val="tx1">
+              <a:lumMod val="50000"/>
+              <a:lumOff val="50000"/>
+              <a:alpha val="10196"/>
+            </a:schemeClr>
+          </a:solidFill>
+          <a:ln>
+            <a:solidFill>
+              <a:schemeClr val="tx1">
+                <a:lumMod val="50000"/>
+                <a:lumOff val="50000"/>
+              </a:schemeClr>
+            </a:solidFill>
+          </a:ln>
+        </p:spPr>
+        <p:style>
+          <a:lnRef idx="2">
+            <a:schemeClr val="accent1">
+              <a:shade val="50000"/>
+            </a:schemeClr>
+          </a:lnRef>
+          <a:fillRef idx="1">
+            <a:schemeClr val="accent1"/>
+          </a:fillRef>
+          <a:effectRef idx="0">
+            <a:schemeClr val="accent1"/>
+          </a:effectRef>
+          <a:fontRef idx="minor">
+            <a:schemeClr val="lt1"/>
+          </a:fontRef>
+        </p:style>
+        <p:txBody>
+          <a:bodyPr rtlCol="0" anchor="ctr"/>
+          <a:lstStyle/>
+          <a:p>
+            <a:pPr algn="ctr"/>
+            <a:endParaRPr lang="en-US" dirty="0"/>
+          </a:p>
+        </p:txBody>
+      </p:sp>
+      <p:sp>
+        <p:nvSpPr>
+          <p:cNvPr id="82" name="Rectangle 81">
+            <a:extLst>
+              <a:ext uri="{FF2B5EF4-FFF2-40B4-BE49-F238E27FC236}">
+                <a16:creationId xmlns:a16="http://schemas.microsoft.com/office/drawing/2014/main" id="{B4C177C1-ED70-4543-A972-568E855D363F}"/>
+              </a:ext>
+            </a:extLst>
+          </p:cNvPr>
+          <p:cNvSpPr/>
+          <p:nvPr/>
+        </p:nvSpPr>
+        <p:spPr>
+          <a:xfrm>
+            <a:off x="1288918" y="11287502"/>
+            <a:ext cx="2420393" cy="213062"/>
+          </a:xfrm>
+          <a:prstGeom prst="rect">
+            <a:avLst/>
+          </a:prstGeom>
+          <a:noFill/>
+          <a:ln>
+            <a:noFill/>
+          </a:ln>
+        </p:spPr>
+        <p:style>
+          <a:lnRef idx="2">
+            <a:schemeClr val="accent1">
+              <a:shade val="50000"/>
+            </a:schemeClr>
+          </a:lnRef>
+          <a:fillRef idx="1">
+            <a:schemeClr val="accent1"/>
+          </a:fillRef>
+          <a:effectRef idx="0">
+            <a:schemeClr val="accent1"/>
+          </a:effectRef>
+          <a:fontRef idx="minor">
+            <a:schemeClr val="lt1"/>
+          </a:fontRef>
+        </p:style>
+        <p:txBody>
+          <a:bodyPr rtlCol="0" anchor="ctr"/>
+          <a:lstStyle/>
+          <a:p>
+            <a:r>
+              <a:rPr lang="en-US" sz="2000" dirty="0">
+                <a:solidFill>
+                  <a:schemeClr val="tx1">
+                    <a:lumMod val="75000"/>
+                    <a:lumOff val="25000"/>
+                  </a:schemeClr>
+                </a:solidFill>
+              </a:rPr>
+              <a:t>&lt;div&gt; .</a:t>
+            </a:r>
+            <a:r>
+              <a:rPr lang="en-US" sz="2000" dirty="0" err="1">
+                <a:solidFill>
+                  <a:schemeClr val="tx1">
+                    <a:lumMod val="75000"/>
+                    <a:lumOff val="25000"/>
+                  </a:schemeClr>
+                </a:solidFill>
+              </a:rPr>
+              <a:t>card__head</a:t>
+            </a:r>
+            <a:endParaRPr lang="en-US" sz="2000" dirty="0">
+              <a:solidFill>
+                <a:schemeClr val="tx1">
+                  <a:lumMod val="75000"/>
+                  <a:lumOff val="25000"/>
+                </a:schemeClr>
+              </a:solidFill>
+            </a:endParaRPr>
+          </a:p>
+        </p:txBody>
+      </p:sp>
+      <p:sp>
+        <p:nvSpPr>
+          <p:cNvPr id="83" name="Rectangle 82">
+            <a:extLst>
+              <a:ext uri="{FF2B5EF4-FFF2-40B4-BE49-F238E27FC236}">
+                <a16:creationId xmlns:a16="http://schemas.microsoft.com/office/drawing/2014/main" id="{8D518BED-941E-0F49-9411-D6B75D47AA55}"/>
+              </a:ext>
+            </a:extLst>
+          </p:cNvPr>
+          <p:cNvSpPr/>
+          <p:nvPr/>
+        </p:nvSpPr>
+        <p:spPr>
+          <a:xfrm>
+            <a:off x="1394486" y="11655838"/>
+            <a:ext cx="1251561" cy="569844"/>
           </a:xfrm>
           <a:prstGeom prst="rect">
             <a:avLst/>
@@ -11509,10 +13831,10 @@
       </p:sp>
       <p:sp>
         <p:nvSpPr>
-          <p:cNvPr id="92" name="Rectangle 91">
+          <p:cNvPr id="84" name="Rectangle 83">
             <a:extLst>
               <a:ext uri="{FF2B5EF4-FFF2-40B4-BE49-F238E27FC236}">
-                <a16:creationId xmlns:a16="http://schemas.microsoft.com/office/drawing/2014/main" id="{46EB3607-129A-4348-801C-078C11283779}"/>
+                <a16:creationId xmlns:a16="http://schemas.microsoft.com/office/drawing/2014/main" id="{A2CEEFE0-8249-474B-8326-0CFA52AEA9DA}"/>
               </a:ext>
             </a:extLst>
           </p:cNvPr>
@@ -11521,8 +13843,8 @@
         </p:nvSpPr>
         <p:spPr>
           <a:xfrm>
-            <a:off x="5179806" y="6992204"/>
-            <a:ext cx="3870675" cy="548762"/>
+            <a:off x="1394486" y="11788158"/>
+            <a:ext cx="1184245" cy="260978"/>
           </a:xfrm>
           <a:prstGeom prst="rect">
             <a:avLst/>
@@ -11560,6 +13882,431 @@
                   </a:schemeClr>
                 </a:solidFill>
               </a:rPr>
+              <a:t>&lt;svg&gt; .</a:t>
+            </a:r>
+            <a:r>
+              <a:rPr lang="en-US" sz="1600" dirty="0" err="1">
+                <a:solidFill>
+                  <a:schemeClr val="accent5">
+                    <a:lumMod val="50000"/>
+                  </a:schemeClr>
+                </a:solidFill>
+              </a:rPr>
+              <a:t>card__icon</a:t>
+            </a:r>
+            <a:endParaRPr lang="en-US" sz="1600" dirty="0">
+              <a:solidFill>
+                <a:schemeClr val="accent5">
+                  <a:lumMod val="50000"/>
+                </a:schemeClr>
+              </a:solidFill>
+            </a:endParaRPr>
+          </a:p>
+        </p:txBody>
+      </p:sp>
+      <p:grpSp>
+        <p:nvGrpSpPr>
+          <p:cNvPr id="85" name="Group 84">
+            <a:extLst>
+              <a:ext uri="{FF2B5EF4-FFF2-40B4-BE49-F238E27FC236}">
+                <a16:creationId xmlns:a16="http://schemas.microsoft.com/office/drawing/2014/main" id="{ADB5C88F-710F-0F4A-A2C9-A9099A172397}"/>
+              </a:ext>
+            </a:extLst>
+          </p:cNvPr>
+          <p:cNvGrpSpPr/>
+          <p:nvPr/>
+        </p:nvGrpSpPr>
+        <p:grpSpPr>
+          <a:xfrm>
+            <a:off x="2719103" y="11655839"/>
+            <a:ext cx="3505138" cy="591032"/>
+            <a:chOff x="1215096" y="1834122"/>
+            <a:chExt cx="1887737" cy="239815"/>
+          </a:xfrm>
+        </p:grpSpPr>
+        <p:sp>
+          <p:nvSpPr>
+            <p:cNvPr id="86" name="Rectangle 85">
+              <a:extLst>
+                <a:ext uri="{FF2B5EF4-FFF2-40B4-BE49-F238E27FC236}">
+                  <a16:creationId xmlns:a16="http://schemas.microsoft.com/office/drawing/2014/main" id="{A16B4387-34DA-6347-BDE0-07CDAF55BEDB}"/>
+                </a:ext>
+              </a:extLst>
+            </p:cNvPr>
+            <p:cNvSpPr/>
+            <p:nvPr/>
+          </p:nvSpPr>
+          <p:spPr>
+            <a:xfrm>
+              <a:off x="1215096" y="1834122"/>
+              <a:ext cx="1887737" cy="239815"/>
+            </a:xfrm>
+            <a:prstGeom prst="rect">
+              <a:avLst/>
+            </a:prstGeom>
+            <a:solidFill>
+              <a:srgbClr val="FF0000">
+                <a:alpha val="10196"/>
+              </a:srgbClr>
+            </a:solidFill>
+            <a:ln>
+              <a:solidFill>
+                <a:srgbClr val="C00000"/>
+              </a:solidFill>
+            </a:ln>
+          </p:spPr>
+          <p:style>
+            <a:lnRef idx="2">
+              <a:schemeClr val="accent1">
+                <a:shade val="50000"/>
+              </a:schemeClr>
+            </a:lnRef>
+            <a:fillRef idx="1">
+              <a:schemeClr val="accent1"/>
+            </a:fillRef>
+            <a:effectRef idx="0">
+              <a:schemeClr val="accent1"/>
+            </a:effectRef>
+            <a:fontRef idx="minor">
+              <a:schemeClr val="lt1"/>
+            </a:fontRef>
+          </p:style>
+          <p:txBody>
+            <a:bodyPr rtlCol="0" anchor="ctr"/>
+            <a:lstStyle/>
+            <a:p>
+              <a:pPr algn="ctr"/>
+              <a:endParaRPr lang="en-US" dirty="0"/>
+            </a:p>
+          </p:txBody>
+        </p:sp>
+        <p:sp>
+          <p:nvSpPr>
+            <p:cNvPr id="87" name="Rectangle 86">
+              <a:extLst>
+                <a:ext uri="{FF2B5EF4-FFF2-40B4-BE49-F238E27FC236}">
+                  <a16:creationId xmlns:a16="http://schemas.microsoft.com/office/drawing/2014/main" id="{3A4A16C9-9479-974F-8B08-8A51C7B2551B}"/>
+                </a:ext>
+              </a:extLst>
+            </p:cNvPr>
+            <p:cNvSpPr/>
+            <p:nvPr/>
+          </p:nvSpPr>
+          <p:spPr>
+            <a:xfrm>
+              <a:off x="1500347" y="1854883"/>
+              <a:ext cx="1394679" cy="198293"/>
+            </a:xfrm>
+            <a:prstGeom prst="rect">
+              <a:avLst/>
+            </a:prstGeom>
+            <a:noFill/>
+            <a:ln>
+              <a:noFill/>
+            </a:ln>
+          </p:spPr>
+          <p:style>
+            <a:lnRef idx="2">
+              <a:schemeClr val="accent1">
+                <a:shade val="50000"/>
+              </a:schemeClr>
+            </a:lnRef>
+            <a:fillRef idx="1">
+              <a:schemeClr val="accent1"/>
+            </a:fillRef>
+            <a:effectRef idx="0">
+              <a:schemeClr val="accent1"/>
+            </a:effectRef>
+            <a:fontRef idx="minor">
+              <a:schemeClr val="lt1"/>
+            </a:fontRef>
+          </p:style>
+          <p:txBody>
+            <a:bodyPr rtlCol="0" anchor="ctr"/>
+            <a:lstStyle/>
+            <a:p>
+              <a:r>
+                <a:rPr lang="en-US" sz="1600" dirty="0">
+                  <a:solidFill>
+                    <a:srgbClr val="C00000"/>
+                  </a:solidFill>
+                </a:rPr>
+                <a:t>&lt;span&gt; .card__</a:t>
+              </a:r>
+              <a:r>
+                <a:rPr lang="en-US" sz="1600" dirty="0" err="1">
+                  <a:solidFill>
+                    <a:srgbClr val="C00000"/>
+                  </a:solidFill>
+                </a:rPr>
+                <a:t>header_span</a:t>
+              </a:r>
+              <a:endParaRPr lang="en-US" sz="1600" dirty="0">
+                <a:solidFill>
+                  <a:srgbClr val="C00000"/>
+                </a:solidFill>
+              </a:endParaRPr>
+            </a:p>
+          </p:txBody>
+        </p:sp>
+      </p:grpSp>
+      <p:grpSp>
+        <p:nvGrpSpPr>
+          <p:cNvPr id="88" name="Group 87">
+            <a:extLst>
+              <a:ext uri="{FF2B5EF4-FFF2-40B4-BE49-F238E27FC236}">
+                <a16:creationId xmlns:a16="http://schemas.microsoft.com/office/drawing/2014/main" id="{B51DFBF6-5DEB-DE45-AE13-39F406BE74CE}"/>
+              </a:ext>
+            </a:extLst>
+          </p:cNvPr>
+          <p:cNvGrpSpPr/>
+          <p:nvPr/>
+        </p:nvGrpSpPr>
+        <p:grpSpPr>
+          <a:xfrm>
+            <a:off x="5584220" y="7372530"/>
+            <a:ext cx="7075610" cy="3660990"/>
+            <a:chOff x="838727" y="1649579"/>
+            <a:chExt cx="2382239" cy="1406467"/>
+          </a:xfrm>
+        </p:grpSpPr>
+        <p:sp>
+          <p:nvSpPr>
+            <p:cNvPr id="89" name="Rectangle 88">
+              <a:extLst>
+                <a:ext uri="{FF2B5EF4-FFF2-40B4-BE49-F238E27FC236}">
+                  <a16:creationId xmlns:a16="http://schemas.microsoft.com/office/drawing/2014/main" id="{85647FCF-CAFB-0945-871D-7E4A875F8217}"/>
+                </a:ext>
+              </a:extLst>
+            </p:cNvPr>
+            <p:cNvSpPr/>
+            <p:nvPr/>
+          </p:nvSpPr>
+          <p:spPr>
+            <a:xfrm>
+              <a:off x="838727" y="1834120"/>
+              <a:ext cx="2382239" cy="1221926"/>
+            </a:xfrm>
+            <a:prstGeom prst="rect">
+              <a:avLst/>
+            </a:prstGeom>
+            <a:solidFill>
+              <a:srgbClr val="FF0000">
+                <a:alpha val="10196"/>
+              </a:srgbClr>
+            </a:solidFill>
+            <a:ln>
+              <a:solidFill>
+                <a:srgbClr val="C00000"/>
+              </a:solidFill>
+            </a:ln>
+          </p:spPr>
+          <p:style>
+            <a:lnRef idx="2">
+              <a:schemeClr val="accent1">
+                <a:shade val="50000"/>
+              </a:schemeClr>
+            </a:lnRef>
+            <a:fillRef idx="1">
+              <a:schemeClr val="accent1"/>
+            </a:fillRef>
+            <a:effectRef idx="0">
+              <a:schemeClr val="accent1"/>
+            </a:effectRef>
+            <a:fontRef idx="minor">
+              <a:schemeClr val="lt1"/>
+            </a:fontRef>
+          </p:style>
+          <p:txBody>
+            <a:bodyPr rtlCol="0" anchor="ctr"/>
+            <a:lstStyle/>
+            <a:p>
+              <a:pPr algn="ctr"/>
+              <a:endParaRPr lang="en-US" dirty="0"/>
+            </a:p>
+          </p:txBody>
+        </p:sp>
+        <p:sp>
+          <p:nvSpPr>
+            <p:cNvPr id="90" name="Rectangle 89">
+              <a:extLst>
+                <a:ext uri="{FF2B5EF4-FFF2-40B4-BE49-F238E27FC236}">
+                  <a16:creationId xmlns:a16="http://schemas.microsoft.com/office/drawing/2014/main" id="{CF3315C2-C3EF-2F42-B472-125724B70B3A}"/>
+                </a:ext>
+              </a:extLst>
+            </p:cNvPr>
+            <p:cNvSpPr/>
+            <p:nvPr/>
+          </p:nvSpPr>
+          <p:spPr>
+            <a:xfrm>
+              <a:off x="859484" y="1649579"/>
+              <a:ext cx="1938420" cy="198293"/>
+            </a:xfrm>
+            <a:prstGeom prst="rect">
+              <a:avLst/>
+            </a:prstGeom>
+            <a:noFill/>
+            <a:ln>
+              <a:noFill/>
+            </a:ln>
+          </p:spPr>
+          <p:style>
+            <a:lnRef idx="2">
+              <a:schemeClr val="accent1">
+                <a:shade val="50000"/>
+              </a:schemeClr>
+            </a:lnRef>
+            <a:fillRef idx="1">
+              <a:schemeClr val="accent1"/>
+            </a:fillRef>
+            <a:effectRef idx="0">
+              <a:schemeClr val="accent1"/>
+            </a:effectRef>
+            <a:fontRef idx="minor">
+              <a:schemeClr val="lt1"/>
+            </a:fontRef>
+          </p:style>
+          <p:txBody>
+            <a:bodyPr rtlCol="0" anchor="ctr"/>
+            <a:lstStyle/>
+            <a:p>
+              <a:r>
+                <a:rPr lang="en-US" sz="2000" dirty="0">
+                  <a:solidFill>
+                    <a:srgbClr val="C00000"/>
+                  </a:solidFill>
+                </a:rPr>
+                <a:t>&lt;div&gt; .</a:t>
+              </a:r>
+              <a:r>
+                <a:rPr lang="en-US" sz="2000" dirty="0" err="1">
+                  <a:solidFill>
+                    <a:srgbClr val="C00000"/>
+                  </a:solidFill>
+                </a:rPr>
+                <a:t>card__content_clients</a:t>
+              </a:r>
+              <a:endParaRPr lang="en-US" sz="2000" dirty="0">
+                <a:solidFill>
+                  <a:srgbClr val="C00000"/>
+                </a:solidFill>
+              </a:endParaRPr>
+            </a:p>
+          </p:txBody>
+        </p:sp>
+      </p:grpSp>
+      <p:sp>
+        <p:nvSpPr>
+          <p:cNvPr id="91" name="Rectangle 90">
+            <a:extLst>
+              <a:ext uri="{FF2B5EF4-FFF2-40B4-BE49-F238E27FC236}">
+                <a16:creationId xmlns:a16="http://schemas.microsoft.com/office/drawing/2014/main" id="{6E8C58CF-FF6D-E940-B438-D073C8BCAAD1}"/>
+              </a:ext>
+            </a:extLst>
+          </p:cNvPr>
+          <p:cNvSpPr/>
+          <p:nvPr/>
+        </p:nvSpPr>
+        <p:spPr>
+          <a:xfrm>
+            <a:off x="5692113" y="7956326"/>
+            <a:ext cx="6812195" cy="2915101"/>
+          </a:xfrm>
+          <a:prstGeom prst="rect">
+            <a:avLst/>
+          </a:prstGeom>
+          <a:solidFill>
+            <a:schemeClr val="accent5">
+              <a:alpha val="10196"/>
+            </a:schemeClr>
+          </a:solidFill>
+          <a:ln>
+            <a:solidFill>
+              <a:schemeClr val="accent5">
+                <a:lumMod val="50000"/>
+              </a:schemeClr>
+            </a:solidFill>
+          </a:ln>
+        </p:spPr>
+        <p:style>
+          <a:lnRef idx="2">
+            <a:schemeClr val="accent1">
+              <a:shade val="50000"/>
+            </a:schemeClr>
+          </a:lnRef>
+          <a:fillRef idx="1">
+            <a:schemeClr val="accent1"/>
+          </a:fillRef>
+          <a:effectRef idx="0">
+            <a:schemeClr val="accent1"/>
+          </a:effectRef>
+          <a:fontRef idx="minor">
+            <a:schemeClr val="lt1"/>
+          </a:fontRef>
+        </p:style>
+        <p:txBody>
+          <a:bodyPr rtlCol="0" anchor="ctr"/>
+          <a:lstStyle/>
+          <a:p>
+            <a:pPr algn="ctr"/>
+            <a:endParaRPr lang="en-US" dirty="0"/>
+          </a:p>
+        </p:txBody>
+      </p:sp>
+      <p:sp>
+        <p:nvSpPr>
+          <p:cNvPr id="92" name="Rectangle 91">
+            <a:extLst>
+              <a:ext uri="{FF2B5EF4-FFF2-40B4-BE49-F238E27FC236}">
+                <a16:creationId xmlns:a16="http://schemas.microsoft.com/office/drawing/2014/main" id="{46EB3607-129A-4348-801C-078C11283779}"/>
+              </a:ext>
+            </a:extLst>
+          </p:cNvPr>
+          <p:cNvSpPr/>
+          <p:nvPr/>
+        </p:nvSpPr>
+        <p:spPr>
+          <a:xfrm>
+            <a:off x="5723823" y="7864074"/>
+            <a:ext cx="3870675" cy="548762"/>
+          </a:xfrm>
+          <a:prstGeom prst="rect">
+            <a:avLst/>
+          </a:prstGeom>
+          <a:noFill/>
+          <a:ln>
+            <a:noFill/>
+          </a:ln>
+        </p:spPr>
+        <p:style>
+          <a:lnRef idx="2">
+            <a:schemeClr val="accent1">
+              <a:shade val="50000"/>
+            </a:schemeClr>
+          </a:lnRef>
+          <a:fillRef idx="1">
+            <a:schemeClr val="accent1"/>
+          </a:fillRef>
+          <a:effectRef idx="0">
+            <a:schemeClr val="accent1"/>
+          </a:effectRef>
+          <a:fontRef idx="minor">
+            <a:schemeClr val="lt1"/>
+          </a:fontRef>
+        </p:style>
+        <p:txBody>
+          <a:bodyPr rtlCol="0" anchor="ctr"/>
+          <a:lstStyle/>
+          <a:p>
+            <a:r>
+              <a:rPr lang="en-US" sz="1600" dirty="0">
+                <a:solidFill>
+                  <a:schemeClr val="accent5">
+                    <a:lumMod val="50000"/>
+                  </a:schemeClr>
+                </a:solidFill>
+              </a:rPr>
               <a:t>&lt;div&gt; .icons-container</a:t>
             </a:r>
           </a:p>
@@ -11579,7 +14326,7 @@
         </p:nvGrpSpPr>
         <p:grpSpPr>
           <a:xfrm>
-            <a:off x="5330432" y="7502037"/>
+            <a:off x="5874449" y="8373907"/>
             <a:ext cx="2002851" cy="1110404"/>
             <a:chOff x="842732" y="2019825"/>
             <a:chExt cx="1078661" cy="450554"/>
@@ -11740,7 +14487,7 @@
         </p:nvSpPr>
         <p:spPr>
           <a:xfrm>
-            <a:off x="7560785" y="7502037"/>
+            <a:off x="8104802" y="8373907"/>
             <a:ext cx="2002851" cy="1110404"/>
           </a:xfrm>
           <a:prstGeom prst="rect">
@@ -11798,7 +14545,7 @@
         </p:nvSpPr>
         <p:spPr>
           <a:xfrm>
-            <a:off x="9776795" y="7502037"/>
+            <a:off x="10320812" y="8373907"/>
             <a:ext cx="2002851" cy="1110404"/>
           </a:xfrm>
           <a:prstGeom prst="rect">
@@ -11856,7 +14603,7 @@
         </p:nvSpPr>
         <p:spPr>
           <a:xfrm>
-            <a:off x="5337798" y="8707172"/>
+            <a:off x="5881815" y="9579042"/>
             <a:ext cx="2002851" cy="1110404"/>
           </a:xfrm>
           <a:prstGeom prst="rect">
@@ -11914,7 +14661,7 @@
         </p:nvSpPr>
         <p:spPr>
           <a:xfrm>
-            <a:off x="7569538" y="8707172"/>
+            <a:off x="8113555" y="9579042"/>
             <a:ext cx="2002851" cy="1110404"/>
           </a:xfrm>
           <a:prstGeom prst="rect">
@@ -11972,7 +14719,7 @@
         </p:nvSpPr>
         <p:spPr>
           <a:xfrm>
-            <a:off x="9785548" y="8707172"/>
+            <a:off x="10329565" y="9579042"/>
             <a:ext cx="2002851" cy="1110404"/>
           </a:xfrm>
           <a:prstGeom prst="rect">
@@ -12030,7 +14777,7 @@
         </p:nvSpPr>
         <p:spPr>
           <a:xfrm>
-            <a:off x="7696062" y="7638602"/>
+            <a:off x="8240079" y="8510472"/>
             <a:ext cx="1737870" cy="814021"/>
           </a:xfrm>
           <a:prstGeom prst="rect">
@@ -12086,7 +14833,7 @@
         </p:nvSpPr>
         <p:spPr>
           <a:xfrm>
-            <a:off x="7774642" y="7686651"/>
+            <a:off x="8318659" y="8558521"/>
             <a:ext cx="1583096" cy="725730"/>
           </a:xfrm>
           <a:prstGeom prst="rect">
@@ -12173,7 +14920,7 @@
         </p:nvSpPr>
         <p:spPr>
           <a:xfrm>
-            <a:off x="9909285" y="7654626"/>
+            <a:off x="10453302" y="8526496"/>
             <a:ext cx="1737870" cy="814021"/>
           </a:xfrm>
           <a:prstGeom prst="rect">
@@ -12229,7 +14976,7 @@
         </p:nvSpPr>
         <p:spPr>
           <a:xfrm>
-            <a:off x="7693275" y="8849282"/>
+            <a:off x="8237292" y="9721152"/>
             <a:ext cx="1737870" cy="814021"/>
           </a:xfrm>
           <a:prstGeom prst="rect">
@@ -12285,7 +15032,7 @@
         </p:nvSpPr>
         <p:spPr>
           <a:xfrm>
-            <a:off x="9909285" y="8848102"/>
+            <a:off x="10453302" y="9719972"/>
             <a:ext cx="1737870" cy="814021"/>
           </a:xfrm>
           <a:prstGeom prst="rect">
@@ -12341,7 +15088,7 @@
         </p:nvSpPr>
         <p:spPr>
           <a:xfrm>
-            <a:off x="5483468" y="8848102"/>
+            <a:off x="6027485" y="9719972"/>
             <a:ext cx="1737870" cy="814021"/>
           </a:xfrm>
           <a:prstGeom prst="rect">
@@ -12397,7 +15144,7 @@
         </p:nvSpPr>
         <p:spPr>
           <a:xfrm>
-            <a:off x="12890430" y="7024827"/>
+            <a:off x="13434447" y="7896697"/>
             <a:ext cx="1977273" cy="400110"/>
           </a:xfrm>
           <a:prstGeom prst="rect">
@@ -12446,7 +15193,7 @@
         </p:nvSpPr>
         <p:spPr>
           <a:xfrm>
-            <a:off x="13368095" y="7520047"/>
+            <a:off x="13912112" y="8391917"/>
             <a:ext cx="939681" cy="369332"/>
           </a:xfrm>
           <a:prstGeom prst="rect">
@@ -12489,7 +15236,7 @@
         </p:nvSpPr>
         <p:spPr>
           <a:xfrm>
-            <a:off x="13294869" y="7914842"/>
+            <a:off x="13838886" y="8786712"/>
             <a:ext cx="1086131" cy="369332"/>
           </a:xfrm>
           <a:prstGeom prst="rect">
@@ -12533,7 +15280,7 @@
         </p:nvSpPr>
         <p:spPr>
           <a:xfrm>
-            <a:off x="13469538" y="8309637"/>
+            <a:off x="14013555" y="9181507"/>
             <a:ext cx="736805" cy="369332"/>
           </a:xfrm>
           <a:prstGeom prst="rect">
@@ -12550,12 +15297,16 @@
             <a:r>
               <a:rPr lang="en-US" dirty="0">
                 <a:solidFill>
-                  <a:srgbClr val="C00000"/>
+                  <a:schemeClr val="accent6"/>
                 </a:solidFill>
               </a:rPr>
               <a:t>Zillow</a:t>
             </a:r>
-            <a:endParaRPr lang="en-BY" dirty="0"/>
+            <a:endParaRPr lang="en-BY" dirty="0">
+              <a:solidFill>
+                <a:schemeClr val="accent6"/>
+              </a:solidFill>
+            </a:endParaRPr>
           </a:p>
         </p:txBody>
       </p:sp>
@@ -12573,7 +15324,7 @@
         </p:nvSpPr>
         <p:spPr>
           <a:xfrm>
-            <a:off x="13304781" y="8678969"/>
+            <a:off x="13848798" y="9550839"/>
             <a:ext cx="1066318" cy="369332"/>
           </a:xfrm>
           <a:prstGeom prst="rect">
@@ -12588,18 +15339,13 @@
           <a:p>
             <a:pPr algn="ctr"/>
             <a:r>
-              <a:rPr lang="en-BY">
+              <a:rPr lang="en-BY" dirty="0">
                 <a:solidFill>
                   <a:schemeClr val="accent6"/>
                 </a:solidFill>
               </a:rPr>
               <a:t>Sberbank</a:t>
             </a:r>
-            <a:endParaRPr lang="en-BY" dirty="0">
-              <a:solidFill>
-                <a:schemeClr val="accent6"/>
-              </a:solidFill>
-            </a:endParaRPr>
           </a:p>
         </p:txBody>
       </p:sp>
@@ -12617,7 +15363,7 @@
         </p:nvSpPr>
         <p:spPr>
           <a:xfrm>
-            <a:off x="13513677" y="9048301"/>
+            <a:off x="14057694" y="9920171"/>
             <a:ext cx="598690" cy="369332"/>
           </a:xfrm>
           <a:prstGeom prst="rect">
@@ -12661,7 +15407,7 @@
         </p:nvSpPr>
         <p:spPr>
           <a:xfrm>
-            <a:off x="13473027" y="9445324"/>
+            <a:off x="14017044" y="10317194"/>
             <a:ext cx="679994" cy="369332"/>
           </a:xfrm>
           <a:prstGeom prst="rect">
@@ -12691,10 +15437,714 @@
           </a:p>
         </p:txBody>
       </p:sp>
+      <p:grpSp>
+        <p:nvGrpSpPr>
+          <p:cNvPr id="66" name="Group 65">
+            <a:extLst>
+              <a:ext uri="{FF2B5EF4-FFF2-40B4-BE49-F238E27FC236}">
+                <a16:creationId xmlns:a16="http://schemas.microsoft.com/office/drawing/2014/main" id="{02D9E28C-D76F-8043-A8F3-EB8C314976CD}"/>
+              </a:ext>
+            </a:extLst>
+          </p:cNvPr>
+          <p:cNvGrpSpPr/>
+          <p:nvPr/>
+        </p:nvGrpSpPr>
+        <p:grpSpPr>
+          <a:xfrm>
+            <a:off x="4877336" y="1745299"/>
+            <a:ext cx="1378200" cy="1926156"/>
+            <a:chOff x="1648943" y="672863"/>
+            <a:chExt cx="2234226" cy="1820050"/>
+          </a:xfrm>
+        </p:grpSpPr>
+        <p:sp>
+          <p:nvSpPr>
+            <p:cNvPr id="67" name="Rectangle 66">
+              <a:extLst>
+                <a:ext uri="{FF2B5EF4-FFF2-40B4-BE49-F238E27FC236}">
+                  <a16:creationId xmlns:a16="http://schemas.microsoft.com/office/drawing/2014/main" id="{C586338F-06FF-9B40-9D0D-D6CC90AEE5F3}"/>
+                </a:ext>
+              </a:extLst>
+            </p:cNvPr>
+            <p:cNvSpPr/>
+            <p:nvPr/>
+          </p:nvSpPr>
+          <p:spPr>
+            <a:xfrm>
+              <a:off x="1648943" y="672863"/>
+              <a:ext cx="2234226" cy="1820050"/>
+            </a:xfrm>
+            <a:prstGeom prst="rect">
+              <a:avLst/>
+            </a:prstGeom>
+            <a:solidFill>
+              <a:schemeClr val="accent4">
+                <a:alpha val="10196"/>
+              </a:schemeClr>
+            </a:solidFill>
+            <a:ln>
+              <a:solidFill>
+                <a:schemeClr val="accent4"/>
+              </a:solidFill>
+            </a:ln>
+          </p:spPr>
+          <p:style>
+            <a:lnRef idx="2">
+              <a:schemeClr val="accent1">
+                <a:shade val="50000"/>
+              </a:schemeClr>
+            </a:lnRef>
+            <a:fillRef idx="1">
+              <a:schemeClr val="accent1"/>
+            </a:fillRef>
+            <a:effectRef idx="0">
+              <a:schemeClr val="accent1"/>
+            </a:effectRef>
+            <a:fontRef idx="minor">
+              <a:schemeClr val="lt1"/>
+            </a:fontRef>
+          </p:style>
+          <p:txBody>
+            <a:bodyPr rtlCol="0" anchor="ctr"/>
+            <a:lstStyle/>
+            <a:p>
+              <a:pPr algn="ctr"/>
+              <a:endParaRPr lang="en-US" dirty="0"/>
+            </a:p>
+          </p:txBody>
+        </p:sp>
+        <p:sp>
+          <p:nvSpPr>
+            <p:cNvPr id="68" name="Rectangle 67">
+              <a:extLst>
+                <a:ext uri="{FF2B5EF4-FFF2-40B4-BE49-F238E27FC236}">
+                  <a16:creationId xmlns:a16="http://schemas.microsoft.com/office/drawing/2014/main" id="{AE457809-2D46-ED45-BA35-8E01DD18551D}"/>
+                </a:ext>
+              </a:extLst>
+            </p:cNvPr>
+            <p:cNvSpPr/>
+            <p:nvPr/>
+          </p:nvSpPr>
+          <p:spPr>
+            <a:xfrm>
+              <a:off x="1677426" y="757955"/>
+              <a:ext cx="2205743" cy="612786"/>
+            </a:xfrm>
+            <a:prstGeom prst="rect">
+              <a:avLst/>
+            </a:prstGeom>
+            <a:noFill/>
+            <a:ln>
+              <a:noFill/>
+            </a:ln>
+          </p:spPr>
+          <p:style>
+            <a:lnRef idx="2">
+              <a:schemeClr val="accent1">
+                <a:shade val="50000"/>
+              </a:schemeClr>
+            </a:lnRef>
+            <a:fillRef idx="1">
+              <a:schemeClr val="accent1"/>
+            </a:fillRef>
+            <a:effectRef idx="0">
+              <a:schemeClr val="accent1"/>
+            </a:effectRef>
+            <a:fontRef idx="minor">
+              <a:schemeClr val="lt1"/>
+            </a:fontRef>
+          </p:style>
+          <p:txBody>
+            <a:bodyPr rtlCol="0" anchor="ctr"/>
+            <a:lstStyle/>
+            <a:p>
+              <a:r>
+                <a:rPr lang="en-US" sz="1600" dirty="0">
+                  <a:solidFill>
+                    <a:schemeClr val="accent2">
+                      <a:lumMod val="50000"/>
+                    </a:schemeClr>
+                  </a:solidFill>
+                </a:rPr>
+                <a:t>&lt;div&gt; </a:t>
+              </a:r>
+            </a:p>
+            <a:p>
+              <a:r>
+                <a:rPr lang="en-US" sz="1600" dirty="0">
+                  <a:solidFill>
+                    <a:schemeClr val="accent2">
+                      <a:lumMod val="50000"/>
+                    </a:schemeClr>
+                  </a:solidFill>
+                </a:rPr>
+                <a:t>.card</a:t>
+              </a:r>
+            </a:p>
+            <a:p>
+              <a:r>
+                <a:rPr lang="en-US" sz="1600" dirty="0">
+                  <a:solidFill>
+                    <a:schemeClr val="accent2">
+                      <a:lumMod val="50000"/>
+                    </a:schemeClr>
+                  </a:solidFill>
+                </a:rPr>
+                <a:t>.</a:t>
+              </a:r>
+              <a:r>
+                <a:rPr lang="en-US" sz="1600" dirty="0" err="1">
+                  <a:solidFill>
+                    <a:schemeClr val="accent2">
+                      <a:lumMod val="50000"/>
+                    </a:schemeClr>
+                  </a:solidFill>
+                </a:rPr>
+                <a:t>card_explore</a:t>
+              </a:r>
+              <a:endParaRPr lang="en-US" sz="1600" dirty="0">
+                <a:solidFill>
+                  <a:schemeClr val="accent2">
+                    <a:lumMod val="50000"/>
+                  </a:schemeClr>
+                </a:solidFill>
+              </a:endParaRPr>
+            </a:p>
+          </p:txBody>
+        </p:sp>
+      </p:grpSp>
+      <p:grpSp>
+        <p:nvGrpSpPr>
+          <p:cNvPr id="69" name="Group 68">
+            <a:extLst>
+              <a:ext uri="{FF2B5EF4-FFF2-40B4-BE49-F238E27FC236}">
+                <a16:creationId xmlns:a16="http://schemas.microsoft.com/office/drawing/2014/main" id="{08A701FB-A0D1-644F-9FDC-3945580D74CE}"/>
+              </a:ext>
+            </a:extLst>
+          </p:cNvPr>
+          <p:cNvGrpSpPr/>
+          <p:nvPr/>
+        </p:nvGrpSpPr>
+        <p:grpSpPr>
+          <a:xfrm>
+            <a:off x="6362060" y="1744611"/>
+            <a:ext cx="1378200" cy="1926156"/>
+            <a:chOff x="1648943" y="672863"/>
+            <a:chExt cx="2234226" cy="1820050"/>
+          </a:xfrm>
+        </p:grpSpPr>
+        <p:sp>
+          <p:nvSpPr>
+            <p:cNvPr id="70" name="Rectangle 69">
+              <a:extLst>
+                <a:ext uri="{FF2B5EF4-FFF2-40B4-BE49-F238E27FC236}">
+                  <a16:creationId xmlns:a16="http://schemas.microsoft.com/office/drawing/2014/main" id="{7BB7E2CB-1675-5547-B3DF-20E2464D3776}"/>
+                </a:ext>
+              </a:extLst>
+            </p:cNvPr>
+            <p:cNvSpPr/>
+            <p:nvPr/>
+          </p:nvSpPr>
+          <p:spPr>
+            <a:xfrm>
+              <a:off x="1648943" y="672863"/>
+              <a:ext cx="2234226" cy="1820050"/>
+            </a:xfrm>
+            <a:prstGeom prst="rect">
+              <a:avLst/>
+            </a:prstGeom>
+            <a:solidFill>
+              <a:schemeClr val="accent4">
+                <a:alpha val="10196"/>
+              </a:schemeClr>
+            </a:solidFill>
+            <a:ln>
+              <a:solidFill>
+                <a:schemeClr val="accent4"/>
+              </a:solidFill>
+            </a:ln>
+          </p:spPr>
+          <p:style>
+            <a:lnRef idx="2">
+              <a:schemeClr val="accent1">
+                <a:shade val="50000"/>
+              </a:schemeClr>
+            </a:lnRef>
+            <a:fillRef idx="1">
+              <a:schemeClr val="accent1"/>
+            </a:fillRef>
+            <a:effectRef idx="0">
+              <a:schemeClr val="accent1"/>
+            </a:effectRef>
+            <a:fontRef idx="minor">
+              <a:schemeClr val="lt1"/>
+            </a:fontRef>
+          </p:style>
+          <p:txBody>
+            <a:bodyPr rtlCol="0" anchor="ctr"/>
+            <a:lstStyle/>
+            <a:p>
+              <a:pPr algn="ctr"/>
+              <a:endParaRPr lang="en-US" dirty="0"/>
+            </a:p>
+          </p:txBody>
+        </p:sp>
+        <p:sp>
+          <p:nvSpPr>
+            <p:cNvPr id="71" name="Rectangle 70">
+              <a:extLst>
+                <a:ext uri="{FF2B5EF4-FFF2-40B4-BE49-F238E27FC236}">
+                  <a16:creationId xmlns:a16="http://schemas.microsoft.com/office/drawing/2014/main" id="{083D686C-1ADA-0546-932D-65C8D17089DE}"/>
+                </a:ext>
+              </a:extLst>
+            </p:cNvPr>
+            <p:cNvSpPr/>
+            <p:nvPr/>
+          </p:nvSpPr>
+          <p:spPr>
+            <a:xfrm>
+              <a:off x="1677426" y="757955"/>
+              <a:ext cx="2205743" cy="612786"/>
+            </a:xfrm>
+            <a:prstGeom prst="rect">
+              <a:avLst/>
+            </a:prstGeom>
+            <a:noFill/>
+            <a:ln>
+              <a:noFill/>
+            </a:ln>
+          </p:spPr>
+          <p:style>
+            <a:lnRef idx="2">
+              <a:schemeClr val="accent1">
+                <a:shade val="50000"/>
+              </a:schemeClr>
+            </a:lnRef>
+            <a:fillRef idx="1">
+              <a:schemeClr val="accent1"/>
+            </a:fillRef>
+            <a:effectRef idx="0">
+              <a:schemeClr val="accent1"/>
+            </a:effectRef>
+            <a:fontRef idx="minor">
+              <a:schemeClr val="lt1"/>
+            </a:fontRef>
+          </p:style>
+          <p:txBody>
+            <a:bodyPr rtlCol="0" anchor="ctr"/>
+            <a:lstStyle/>
+            <a:p>
+              <a:r>
+                <a:rPr lang="en-US" sz="1600" dirty="0">
+                  <a:solidFill>
+                    <a:schemeClr val="accent2">
+                      <a:lumMod val="50000"/>
+                    </a:schemeClr>
+                  </a:solidFill>
+                </a:rPr>
+                <a:t>&lt;div&gt; </a:t>
+              </a:r>
+            </a:p>
+            <a:p>
+              <a:r>
+                <a:rPr lang="en-US" sz="1600" dirty="0">
+                  <a:solidFill>
+                    <a:schemeClr val="accent2">
+                      <a:lumMod val="50000"/>
+                    </a:schemeClr>
+                  </a:solidFill>
+                </a:rPr>
+                <a:t>.card</a:t>
+              </a:r>
+            </a:p>
+            <a:p>
+              <a:r>
+                <a:rPr lang="en-US" sz="1600" dirty="0">
+                  <a:solidFill>
+                    <a:schemeClr val="accent2">
+                      <a:lumMod val="50000"/>
+                    </a:schemeClr>
+                  </a:solidFill>
+                </a:rPr>
+                <a:t>.</a:t>
+              </a:r>
+              <a:r>
+                <a:rPr lang="en-US" sz="1600" dirty="0" err="1">
+                  <a:solidFill>
+                    <a:schemeClr val="accent2">
+                      <a:lumMod val="50000"/>
+                    </a:schemeClr>
+                  </a:solidFill>
+                </a:rPr>
+                <a:t>card_browse</a:t>
+              </a:r>
+              <a:endParaRPr lang="en-US" sz="1600" dirty="0">
+                <a:solidFill>
+                  <a:schemeClr val="accent2">
+                    <a:lumMod val="50000"/>
+                  </a:schemeClr>
+                </a:solidFill>
+              </a:endParaRPr>
+            </a:p>
+          </p:txBody>
+        </p:sp>
+      </p:grpSp>
+      <p:grpSp>
+        <p:nvGrpSpPr>
+          <p:cNvPr id="72" name="Group 71">
+            <a:extLst>
+              <a:ext uri="{FF2B5EF4-FFF2-40B4-BE49-F238E27FC236}">
+                <a16:creationId xmlns:a16="http://schemas.microsoft.com/office/drawing/2014/main" id="{8A2EA360-E6A9-4F49-A2CB-AFEE4EBDDF74}"/>
+              </a:ext>
+            </a:extLst>
+          </p:cNvPr>
+          <p:cNvGrpSpPr/>
+          <p:nvPr/>
+        </p:nvGrpSpPr>
+        <p:grpSpPr>
+          <a:xfrm>
+            <a:off x="9358774" y="1747450"/>
+            <a:ext cx="2871829" cy="1926156"/>
+            <a:chOff x="1648943" y="672863"/>
+            <a:chExt cx="2234226" cy="1820050"/>
+          </a:xfrm>
+        </p:grpSpPr>
+        <p:sp>
+          <p:nvSpPr>
+            <p:cNvPr id="73" name="Rectangle 72">
+              <a:extLst>
+                <a:ext uri="{FF2B5EF4-FFF2-40B4-BE49-F238E27FC236}">
+                  <a16:creationId xmlns:a16="http://schemas.microsoft.com/office/drawing/2014/main" id="{7F718AD8-0BBF-6C4C-B75A-0EAF8716CC2E}"/>
+                </a:ext>
+              </a:extLst>
+            </p:cNvPr>
+            <p:cNvSpPr/>
+            <p:nvPr/>
+          </p:nvSpPr>
+          <p:spPr>
+            <a:xfrm>
+              <a:off x="1648943" y="672863"/>
+              <a:ext cx="2234226" cy="1820050"/>
+            </a:xfrm>
+            <a:prstGeom prst="rect">
+              <a:avLst/>
+            </a:prstGeom>
+            <a:solidFill>
+              <a:schemeClr val="accent4">
+                <a:alpha val="10196"/>
+              </a:schemeClr>
+            </a:solidFill>
+            <a:ln>
+              <a:solidFill>
+                <a:schemeClr val="accent4"/>
+              </a:solidFill>
+            </a:ln>
+          </p:spPr>
+          <p:style>
+            <a:lnRef idx="2">
+              <a:schemeClr val="accent1">
+                <a:shade val="50000"/>
+              </a:schemeClr>
+            </a:lnRef>
+            <a:fillRef idx="1">
+              <a:schemeClr val="accent1"/>
+            </a:fillRef>
+            <a:effectRef idx="0">
+              <a:schemeClr val="accent1"/>
+            </a:effectRef>
+            <a:fontRef idx="minor">
+              <a:schemeClr val="lt1"/>
+            </a:fontRef>
+          </p:style>
+          <p:txBody>
+            <a:bodyPr rtlCol="0" anchor="ctr"/>
+            <a:lstStyle/>
+            <a:p>
+              <a:pPr algn="ctr"/>
+              <a:endParaRPr lang="en-US" dirty="0"/>
+            </a:p>
+          </p:txBody>
+        </p:sp>
+        <p:sp>
+          <p:nvSpPr>
+            <p:cNvPr id="74" name="Rectangle 73">
+              <a:extLst>
+                <a:ext uri="{FF2B5EF4-FFF2-40B4-BE49-F238E27FC236}">
+                  <a16:creationId xmlns:a16="http://schemas.microsoft.com/office/drawing/2014/main" id="{E2C8345E-0881-9A45-B2B9-8FB6718B4AEC}"/>
+                </a:ext>
+              </a:extLst>
+            </p:cNvPr>
+            <p:cNvSpPr/>
+            <p:nvPr/>
+          </p:nvSpPr>
+          <p:spPr>
+            <a:xfrm>
+              <a:off x="1677426" y="757955"/>
+              <a:ext cx="2205743" cy="612786"/>
+            </a:xfrm>
+            <a:prstGeom prst="rect">
+              <a:avLst/>
+            </a:prstGeom>
+            <a:noFill/>
+            <a:ln>
+              <a:noFill/>
+            </a:ln>
+          </p:spPr>
+          <p:style>
+            <a:lnRef idx="2">
+              <a:schemeClr val="accent1">
+                <a:shade val="50000"/>
+              </a:schemeClr>
+            </a:lnRef>
+            <a:fillRef idx="1">
+              <a:schemeClr val="accent1"/>
+            </a:fillRef>
+            <a:effectRef idx="0">
+              <a:schemeClr val="accent1"/>
+            </a:effectRef>
+            <a:fontRef idx="minor">
+              <a:schemeClr val="lt1"/>
+            </a:fontRef>
+          </p:style>
+          <p:txBody>
+            <a:bodyPr rtlCol="0" anchor="ctr"/>
+            <a:lstStyle/>
+            <a:p>
+              <a:r>
+                <a:rPr lang="en-US" sz="1600" dirty="0">
+                  <a:solidFill>
+                    <a:schemeClr val="accent2">
+                      <a:lumMod val="50000"/>
+                    </a:schemeClr>
+                  </a:solidFill>
+                </a:rPr>
+                <a:t>&lt;div&gt; </a:t>
+              </a:r>
+            </a:p>
+            <a:p>
+              <a:r>
+                <a:rPr lang="en-US" sz="1600" dirty="0">
+                  <a:solidFill>
+                    <a:schemeClr val="accent2">
+                      <a:lumMod val="50000"/>
+                    </a:schemeClr>
+                  </a:solidFill>
+                </a:rPr>
+                <a:t>.card</a:t>
+              </a:r>
+            </a:p>
+            <a:p>
+              <a:r>
+                <a:rPr lang="en-US" sz="1600" dirty="0">
+                  <a:solidFill>
+                    <a:schemeClr val="accent2">
+                      <a:lumMod val="50000"/>
+                    </a:schemeClr>
+                  </a:solidFill>
+                </a:rPr>
+                <a:t>.</a:t>
+              </a:r>
+              <a:r>
+                <a:rPr lang="en-US" sz="1600" dirty="0" err="1">
+                  <a:solidFill>
+                    <a:schemeClr val="accent2">
+                      <a:lumMod val="50000"/>
+                    </a:schemeClr>
+                  </a:solidFill>
+                </a:rPr>
+                <a:t>card_connect</a:t>
+              </a:r>
+              <a:endParaRPr lang="en-US" sz="1600" dirty="0">
+                <a:solidFill>
+                  <a:schemeClr val="accent2">
+                    <a:lumMod val="50000"/>
+                  </a:schemeClr>
+                </a:solidFill>
+              </a:endParaRPr>
+            </a:p>
+          </p:txBody>
+        </p:sp>
+      </p:grpSp>
+      <p:grpSp>
+        <p:nvGrpSpPr>
+          <p:cNvPr id="75" name="Group 74">
+            <a:extLst>
+              <a:ext uri="{FF2B5EF4-FFF2-40B4-BE49-F238E27FC236}">
+                <a16:creationId xmlns:a16="http://schemas.microsoft.com/office/drawing/2014/main" id="{17BFD831-955D-6A48-BDC5-0C8896197510}"/>
+              </a:ext>
+            </a:extLst>
+          </p:cNvPr>
+          <p:cNvGrpSpPr/>
+          <p:nvPr/>
+        </p:nvGrpSpPr>
+        <p:grpSpPr>
+          <a:xfrm>
+            <a:off x="7860417" y="1744611"/>
+            <a:ext cx="1378200" cy="1926156"/>
+            <a:chOff x="1648943" y="672863"/>
+            <a:chExt cx="2234226" cy="1820050"/>
+          </a:xfrm>
+        </p:grpSpPr>
+        <p:sp>
+          <p:nvSpPr>
+            <p:cNvPr id="76" name="Rectangle 75">
+              <a:extLst>
+                <a:ext uri="{FF2B5EF4-FFF2-40B4-BE49-F238E27FC236}">
+                  <a16:creationId xmlns:a16="http://schemas.microsoft.com/office/drawing/2014/main" id="{B4CED176-9E4F-5549-BF10-A6EBAF8626BA}"/>
+                </a:ext>
+              </a:extLst>
+            </p:cNvPr>
+            <p:cNvSpPr/>
+            <p:nvPr/>
+          </p:nvSpPr>
+          <p:spPr>
+            <a:xfrm>
+              <a:off x="1648943" y="672863"/>
+              <a:ext cx="2234226" cy="1820050"/>
+            </a:xfrm>
+            <a:prstGeom prst="rect">
+              <a:avLst/>
+            </a:prstGeom>
+            <a:solidFill>
+              <a:schemeClr val="accent4">
+                <a:alpha val="10196"/>
+              </a:schemeClr>
+            </a:solidFill>
+            <a:ln>
+              <a:solidFill>
+                <a:schemeClr val="accent4"/>
+              </a:solidFill>
+            </a:ln>
+          </p:spPr>
+          <p:style>
+            <a:lnRef idx="2">
+              <a:schemeClr val="accent1">
+                <a:shade val="50000"/>
+              </a:schemeClr>
+            </a:lnRef>
+            <a:fillRef idx="1">
+              <a:schemeClr val="accent1"/>
+            </a:fillRef>
+            <a:effectRef idx="0">
+              <a:schemeClr val="accent1"/>
+            </a:effectRef>
+            <a:fontRef idx="minor">
+              <a:schemeClr val="lt1"/>
+            </a:fontRef>
+          </p:style>
+          <p:txBody>
+            <a:bodyPr rtlCol="0" anchor="ctr"/>
+            <a:lstStyle/>
+            <a:p>
+              <a:pPr algn="ctr"/>
+              <a:endParaRPr lang="en-US" dirty="0"/>
+            </a:p>
+          </p:txBody>
+        </p:sp>
+        <p:sp>
+          <p:nvSpPr>
+            <p:cNvPr id="80" name="Rectangle 79">
+              <a:extLst>
+                <a:ext uri="{FF2B5EF4-FFF2-40B4-BE49-F238E27FC236}">
+                  <a16:creationId xmlns:a16="http://schemas.microsoft.com/office/drawing/2014/main" id="{7682112C-E86B-B047-B3ED-4456F2ABDD71}"/>
+                </a:ext>
+              </a:extLst>
+            </p:cNvPr>
+            <p:cNvSpPr/>
+            <p:nvPr/>
+          </p:nvSpPr>
+          <p:spPr>
+            <a:xfrm>
+              <a:off x="1677426" y="757955"/>
+              <a:ext cx="2205743" cy="612786"/>
+            </a:xfrm>
+            <a:prstGeom prst="rect">
+              <a:avLst/>
+            </a:prstGeom>
+            <a:noFill/>
+            <a:ln>
+              <a:noFill/>
+            </a:ln>
+          </p:spPr>
+          <p:style>
+            <a:lnRef idx="2">
+              <a:schemeClr val="accent1">
+                <a:shade val="50000"/>
+              </a:schemeClr>
+            </a:lnRef>
+            <a:fillRef idx="1">
+              <a:schemeClr val="accent1"/>
+            </a:fillRef>
+            <a:effectRef idx="0">
+              <a:schemeClr val="accent1"/>
+            </a:effectRef>
+            <a:fontRef idx="minor">
+              <a:schemeClr val="lt1"/>
+            </a:fontRef>
+          </p:style>
+          <p:txBody>
+            <a:bodyPr rtlCol="0" anchor="ctr"/>
+            <a:lstStyle/>
+            <a:p>
+              <a:r>
+                <a:rPr lang="en-US" sz="1600" dirty="0">
+                  <a:solidFill>
+                    <a:schemeClr val="accent2">
+                      <a:lumMod val="50000"/>
+                    </a:schemeClr>
+                  </a:solidFill>
+                </a:rPr>
+                <a:t>&lt;div&gt; </a:t>
+              </a:r>
+            </a:p>
+            <a:p>
+              <a:r>
+                <a:rPr lang="en-US" sz="1600" dirty="0">
+                  <a:solidFill>
+                    <a:schemeClr val="accent2">
+                      <a:lumMod val="50000"/>
+                    </a:schemeClr>
+                  </a:solidFill>
+                </a:rPr>
+                <a:t>.card</a:t>
+              </a:r>
+            </a:p>
+            <a:p>
+              <a:r>
+                <a:rPr lang="en-US" sz="1600" dirty="0">
+                  <a:solidFill>
+                    <a:schemeClr val="accent2">
+                      <a:lumMod val="50000"/>
+                    </a:schemeClr>
+                  </a:solidFill>
+                </a:rPr>
+                <a:t>.</a:t>
+              </a:r>
+              <a:r>
+                <a:rPr lang="en-US" sz="1600" dirty="0" err="1">
+                  <a:solidFill>
+                    <a:schemeClr val="accent2">
+                      <a:lumMod val="50000"/>
+                    </a:schemeClr>
+                  </a:solidFill>
+                </a:rPr>
+                <a:t>card_contact</a:t>
+              </a:r>
+              <a:endParaRPr lang="en-US" sz="1600" dirty="0">
+                <a:solidFill>
+                  <a:schemeClr val="accent2">
+                    <a:lumMod val="50000"/>
+                  </a:schemeClr>
+                </a:solidFill>
+              </a:endParaRPr>
+            </a:p>
+          </p:txBody>
+        </p:sp>
+      </p:grpSp>
     </p:spTree>
     <p:extLst>
       <p:ext uri="{BB962C8B-B14F-4D97-AF65-F5344CB8AC3E}">
-        <p14:creationId xmlns:p14="http://schemas.microsoft.com/office/powerpoint/2010/main" val="274582813"/>
+        <p14:creationId xmlns:p14="http://schemas.microsoft.com/office/powerpoint/2010/main" val="379254269"/>
       </p:ext>
     </p:extLst>
   </p:cSld>

</xml_diff>

<commit_message>
finalized preliminary layout of the footer section
</commit_message>
<xml_diff>
--- a/layout.pptx
+++ b/layout.pptx
@@ -3652,8 +3652,8 @@
         </p:nvSpPr>
         <p:spPr>
           <a:xfrm>
-            <a:off x="5786120" y="1507765"/>
-            <a:ext cx="1275080" cy="121920"/>
+            <a:off x="5786120" y="1373007"/>
+            <a:ext cx="1275080" cy="389615"/>
           </a:xfrm>
           <a:prstGeom prst="rect">
             <a:avLst/>
@@ -3693,27 +3693,8 @@
                   </a:schemeClr>
                 </a:solidFill>
               </a:rPr>
-              <a:t>&lt;img&gt; .</a:t>
+              <a:t>&lt;img&gt; .main-logo</a:t>
             </a:r>
-            <a:r>
-              <a:rPr lang="en-US" sz="1200" dirty="0" err="1">
-                <a:solidFill>
-                  <a:schemeClr val="tx1">
-                    <a:lumMod val="50000"/>
-                    <a:lumOff val="50000"/>
-                  </a:schemeClr>
-                </a:solidFill>
-              </a:rPr>
-              <a:t>head__logo</a:t>
-            </a:r>
-            <a:endParaRPr lang="en-US" sz="1200" dirty="0">
-              <a:solidFill>
-                <a:schemeClr val="tx1">
-                  <a:lumMod val="50000"/>
-                  <a:lumOff val="50000"/>
-                </a:schemeClr>
-              </a:solidFill>
-            </a:endParaRPr>
           </a:p>
         </p:txBody>
       </p:sp>
@@ -13646,7 +13627,7 @@
         </p:nvSpPr>
         <p:spPr>
           <a:xfrm>
-            <a:off x="1288918" y="11574103"/>
+            <a:off x="1273679" y="11381810"/>
             <a:ext cx="5057189" cy="789312"/>
           </a:xfrm>
           <a:prstGeom prst="rect">
@@ -13707,7 +13688,7 @@
         </p:nvSpPr>
         <p:spPr>
           <a:xfrm>
-            <a:off x="1288918" y="11287502"/>
+            <a:off x="1273679" y="11095209"/>
             <a:ext cx="2420393" cy="213062"/>
           </a:xfrm>
           <a:prstGeom prst="rect">
@@ -13771,139 +13752,6 @@
           </a:p>
         </p:txBody>
       </p:sp>
-      <p:sp>
-        <p:nvSpPr>
-          <p:cNvPr id="83" name="Rectangle 82">
-            <a:extLst>
-              <a:ext uri="{FF2B5EF4-FFF2-40B4-BE49-F238E27FC236}">
-                <a16:creationId xmlns:a16="http://schemas.microsoft.com/office/drawing/2014/main" id="{8D518BED-941E-0F49-9411-D6B75D47AA55}"/>
-              </a:ext>
-            </a:extLst>
-          </p:cNvPr>
-          <p:cNvSpPr/>
-          <p:nvPr/>
-        </p:nvSpPr>
-        <p:spPr>
-          <a:xfrm>
-            <a:off x="1394486" y="11655838"/>
-            <a:ext cx="1251561" cy="569844"/>
-          </a:xfrm>
-          <a:prstGeom prst="rect">
-            <a:avLst/>
-          </a:prstGeom>
-          <a:solidFill>
-            <a:schemeClr val="accent5">
-              <a:alpha val="10196"/>
-            </a:schemeClr>
-          </a:solidFill>
-          <a:ln>
-            <a:solidFill>
-              <a:schemeClr val="accent5">
-                <a:lumMod val="50000"/>
-              </a:schemeClr>
-            </a:solidFill>
-          </a:ln>
-        </p:spPr>
-        <p:style>
-          <a:lnRef idx="2">
-            <a:schemeClr val="accent1">
-              <a:shade val="50000"/>
-            </a:schemeClr>
-          </a:lnRef>
-          <a:fillRef idx="1">
-            <a:schemeClr val="accent1"/>
-          </a:fillRef>
-          <a:effectRef idx="0">
-            <a:schemeClr val="accent1"/>
-          </a:effectRef>
-          <a:fontRef idx="minor">
-            <a:schemeClr val="lt1"/>
-          </a:fontRef>
-        </p:style>
-        <p:txBody>
-          <a:bodyPr rtlCol="0" anchor="ctr"/>
-          <a:lstStyle/>
-          <a:p>
-            <a:pPr algn="ctr"/>
-            <a:endParaRPr lang="en-US" dirty="0"/>
-          </a:p>
-        </p:txBody>
-      </p:sp>
-      <p:sp>
-        <p:nvSpPr>
-          <p:cNvPr id="84" name="Rectangle 83">
-            <a:extLst>
-              <a:ext uri="{FF2B5EF4-FFF2-40B4-BE49-F238E27FC236}">
-                <a16:creationId xmlns:a16="http://schemas.microsoft.com/office/drawing/2014/main" id="{A2CEEFE0-8249-474B-8326-0CFA52AEA9DA}"/>
-              </a:ext>
-            </a:extLst>
-          </p:cNvPr>
-          <p:cNvSpPr/>
-          <p:nvPr/>
-        </p:nvSpPr>
-        <p:spPr>
-          <a:xfrm>
-            <a:off x="1394486" y="11788158"/>
-            <a:ext cx="1184245" cy="260978"/>
-          </a:xfrm>
-          <a:prstGeom prst="rect">
-            <a:avLst/>
-          </a:prstGeom>
-          <a:noFill/>
-          <a:ln>
-            <a:noFill/>
-          </a:ln>
-        </p:spPr>
-        <p:style>
-          <a:lnRef idx="2">
-            <a:schemeClr val="accent1">
-              <a:shade val="50000"/>
-            </a:schemeClr>
-          </a:lnRef>
-          <a:fillRef idx="1">
-            <a:schemeClr val="accent1"/>
-          </a:fillRef>
-          <a:effectRef idx="0">
-            <a:schemeClr val="accent1"/>
-          </a:effectRef>
-          <a:fontRef idx="minor">
-            <a:schemeClr val="lt1"/>
-          </a:fontRef>
-        </p:style>
-        <p:txBody>
-          <a:bodyPr rtlCol="0" anchor="ctr"/>
-          <a:lstStyle/>
-          <a:p>
-            <a:r>
-              <a:rPr lang="en-US" sz="1600" dirty="0">
-                <a:solidFill>
-                  <a:schemeClr val="accent5">
-                    <a:lumMod val="50000"/>
-                  </a:schemeClr>
-                </a:solidFill>
-              </a:rPr>
-              <a:t>&lt;svg&gt; .</a:t>
-            </a:r>
-            <a:r>
-              <a:rPr lang="en-US" sz="1600" dirty="0" err="1">
-                <a:solidFill>
-                  <a:schemeClr val="accent5">
-                    <a:lumMod val="50000"/>
-                  </a:schemeClr>
-                </a:solidFill>
-              </a:rPr>
-              <a:t>card__icon</a:t>
-            </a:r>
-            <a:endParaRPr lang="en-US" sz="1600" dirty="0">
-              <a:solidFill>
-                <a:schemeClr val="accent5">
-                  <a:lumMod val="50000"/>
-                </a:schemeClr>
-              </a:solidFill>
-            </a:endParaRPr>
-          </a:p>
-        </p:txBody>
-      </p:sp>
       <p:grpSp>
         <p:nvGrpSpPr>
           <p:cNvPr id="85" name="Group 84">
@@ -13918,7 +13766,7 @@
         </p:nvGrpSpPr>
         <p:grpSpPr>
           <a:xfrm>
-            <a:off x="2719103" y="11655839"/>
+            <a:off x="1389768" y="11507082"/>
             <a:ext cx="3505138" cy="591032"/>
             <a:chOff x="1215096" y="1834122"/>
             <a:chExt cx="1887737" cy="239815"/>
@@ -16137,6 +15985,276 @@
                   </a:schemeClr>
                 </a:solidFill>
               </a:endParaRPr>
+            </a:p>
+          </p:txBody>
+        </p:sp>
+      </p:grpSp>
+      <p:grpSp>
+        <p:nvGrpSpPr>
+          <p:cNvPr id="96" name="Group 95">
+            <a:extLst>
+              <a:ext uri="{FF2B5EF4-FFF2-40B4-BE49-F238E27FC236}">
+                <a16:creationId xmlns:a16="http://schemas.microsoft.com/office/drawing/2014/main" id="{793DFD8B-7AB3-444F-9232-60EDF63708E1}"/>
+              </a:ext>
+            </a:extLst>
+          </p:cNvPr>
+          <p:cNvGrpSpPr/>
+          <p:nvPr/>
+        </p:nvGrpSpPr>
+        <p:grpSpPr>
+          <a:xfrm>
+            <a:off x="2745259" y="3911069"/>
+            <a:ext cx="5573400" cy="1002872"/>
+            <a:chOff x="959638" y="1625377"/>
+            <a:chExt cx="3001626" cy="406921"/>
+          </a:xfrm>
+        </p:grpSpPr>
+        <p:sp>
+          <p:nvSpPr>
+            <p:cNvPr id="97" name="Rectangle 96">
+              <a:extLst>
+                <a:ext uri="{FF2B5EF4-FFF2-40B4-BE49-F238E27FC236}">
+                  <a16:creationId xmlns:a16="http://schemas.microsoft.com/office/drawing/2014/main" id="{3B28DB00-DA90-AA4F-8C3B-608F526F6586}"/>
+                </a:ext>
+              </a:extLst>
+            </p:cNvPr>
+            <p:cNvSpPr/>
+            <p:nvPr/>
+          </p:nvSpPr>
+          <p:spPr>
+            <a:xfrm>
+              <a:off x="959638" y="1625377"/>
+              <a:ext cx="3001626" cy="406921"/>
+            </a:xfrm>
+            <a:prstGeom prst="rect">
+              <a:avLst/>
+            </a:prstGeom>
+            <a:solidFill>
+              <a:srgbClr val="FF0000">
+                <a:alpha val="10196"/>
+              </a:srgbClr>
+            </a:solidFill>
+            <a:ln>
+              <a:solidFill>
+                <a:srgbClr val="C00000"/>
+              </a:solidFill>
+            </a:ln>
+          </p:spPr>
+          <p:style>
+            <a:lnRef idx="2">
+              <a:schemeClr val="accent1">
+                <a:shade val="50000"/>
+              </a:schemeClr>
+            </a:lnRef>
+            <a:fillRef idx="1">
+              <a:schemeClr val="accent1"/>
+            </a:fillRef>
+            <a:effectRef idx="0">
+              <a:schemeClr val="accent1"/>
+            </a:effectRef>
+            <a:fontRef idx="minor">
+              <a:schemeClr val="lt1"/>
+            </a:fontRef>
+          </p:style>
+          <p:txBody>
+            <a:bodyPr rtlCol="0" anchor="ctr"/>
+            <a:lstStyle/>
+            <a:p>
+              <a:pPr algn="ctr"/>
+              <a:endParaRPr lang="en-US" dirty="0"/>
+            </a:p>
+          </p:txBody>
+        </p:sp>
+        <p:sp>
+          <p:nvSpPr>
+            <p:cNvPr id="99" name="Rectangle 98">
+              <a:extLst>
+                <a:ext uri="{FF2B5EF4-FFF2-40B4-BE49-F238E27FC236}">
+                  <a16:creationId xmlns:a16="http://schemas.microsoft.com/office/drawing/2014/main" id="{9B9525AC-9801-3F47-8976-E88302445F44}"/>
+                </a:ext>
+              </a:extLst>
+            </p:cNvPr>
+            <p:cNvSpPr/>
+            <p:nvPr/>
+          </p:nvSpPr>
+          <p:spPr>
+            <a:xfrm>
+              <a:off x="1030213" y="1734789"/>
+              <a:ext cx="1077682" cy="198293"/>
+            </a:xfrm>
+            <a:prstGeom prst="rect">
+              <a:avLst/>
+            </a:prstGeom>
+            <a:noFill/>
+            <a:ln>
+              <a:noFill/>
+            </a:ln>
+          </p:spPr>
+          <p:style>
+            <a:lnRef idx="2">
+              <a:schemeClr val="accent1">
+                <a:shade val="50000"/>
+              </a:schemeClr>
+            </a:lnRef>
+            <a:fillRef idx="1">
+              <a:schemeClr val="accent1"/>
+            </a:fillRef>
+            <a:effectRef idx="0">
+              <a:schemeClr val="accent1"/>
+            </a:effectRef>
+            <a:fontRef idx="minor">
+              <a:schemeClr val="lt1"/>
+            </a:fontRef>
+          </p:style>
+          <p:txBody>
+            <a:bodyPr rtlCol="0" anchor="ctr"/>
+            <a:lstStyle/>
+            <a:p>
+              <a:r>
+                <a:rPr lang="en-US" sz="1600" dirty="0">
+                  <a:solidFill>
+                    <a:srgbClr val="C00000"/>
+                  </a:solidFill>
+                </a:rPr>
+                <a:t>&lt;div&gt; .copyright</a:t>
+              </a:r>
+            </a:p>
+          </p:txBody>
+        </p:sp>
+      </p:grpSp>
+      <p:grpSp>
+        <p:nvGrpSpPr>
+          <p:cNvPr id="101" name="Group 100">
+            <a:extLst>
+              <a:ext uri="{FF2B5EF4-FFF2-40B4-BE49-F238E27FC236}">
+                <a16:creationId xmlns:a16="http://schemas.microsoft.com/office/drawing/2014/main" id="{5F949FC5-7BC2-2B49-BC55-EB704AB3FA2D}"/>
+              </a:ext>
+            </a:extLst>
+          </p:cNvPr>
+          <p:cNvGrpSpPr/>
+          <p:nvPr/>
+        </p:nvGrpSpPr>
+        <p:grpSpPr>
+          <a:xfrm>
+            <a:off x="8786814" y="3916402"/>
+            <a:ext cx="3443790" cy="997536"/>
+            <a:chOff x="1164865" y="1868905"/>
+            <a:chExt cx="1854697" cy="404757"/>
+          </a:xfrm>
+        </p:grpSpPr>
+        <p:sp>
+          <p:nvSpPr>
+            <p:cNvPr id="103" name="Rectangle 102">
+              <a:extLst>
+                <a:ext uri="{FF2B5EF4-FFF2-40B4-BE49-F238E27FC236}">
+                  <a16:creationId xmlns:a16="http://schemas.microsoft.com/office/drawing/2014/main" id="{9641187D-4087-D142-978E-C1C5A0F9A669}"/>
+                </a:ext>
+              </a:extLst>
+            </p:cNvPr>
+            <p:cNvSpPr/>
+            <p:nvPr/>
+          </p:nvSpPr>
+          <p:spPr>
+            <a:xfrm>
+              <a:off x="1164865" y="1868905"/>
+              <a:ext cx="1854697" cy="404757"/>
+            </a:xfrm>
+            <a:prstGeom prst="rect">
+              <a:avLst/>
+            </a:prstGeom>
+            <a:solidFill>
+              <a:schemeClr val="accent6">
+                <a:alpha val="10196"/>
+              </a:schemeClr>
+            </a:solidFill>
+            <a:ln>
+              <a:solidFill>
+                <a:schemeClr val="accent6">
+                  <a:lumMod val="50000"/>
+                </a:schemeClr>
+              </a:solidFill>
+            </a:ln>
+          </p:spPr>
+          <p:style>
+            <a:lnRef idx="2">
+              <a:schemeClr val="accent1">
+                <a:shade val="50000"/>
+              </a:schemeClr>
+            </a:lnRef>
+            <a:fillRef idx="1">
+              <a:schemeClr val="accent1"/>
+            </a:fillRef>
+            <a:effectRef idx="0">
+              <a:schemeClr val="accent1"/>
+            </a:effectRef>
+            <a:fontRef idx="minor">
+              <a:schemeClr val="lt1"/>
+            </a:fontRef>
+          </p:style>
+          <p:txBody>
+            <a:bodyPr rtlCol="0" anchor="ctr"/>
+            <a:lstStyle/>
+            <a:p>
+              <a:pPr algn="ctr"/>
+              <a:endParaRPr lang="en-US" dirty="0"/>
+            </a:p>
+          </p:txBody>
+        </p:sp>
+        <p:sp>
+          <p:nvSpPr>
+            <p:cNvPr id="106" name="Rectangle 105">
+              <a:extLst>
+                <a:ext uri="{FF2B5EF4-FFF2-40B4-BE49-F238E27FC236}">
+                  <a16:creationId xmlns:a16="http://schemas.microsoft.com/office/drawing/2014/main" id="{804D9326-38A4-1042-9B4F-64BA5F05702B}"/>
+                </a:ext>
+              </a:extLst>
+            </p:cNvPr>
+            <p:cNvSpPr/>
+            <p:nvPr/>
+          </p:nvSpPr>
+          <p:spPr>
+            <a:xfrm>
+              <a:off x="1613774" y="1976153"/>
+              <a:ext cx="1077682" cy="198293"/>
+            </a:xfrm>
+            <a:prstGeom prst="rect">
+              <a:avLst/>
+            </a:prstGeom>
+            <a:noFill/>
+            <a:ln>
+              <a:noFill/>
+            </a:ln>
+          </p:spPr>
+          <p:style>
+            <a:lnRef idx="2">
+              <a:schemeClr val="accent1">
+                <a:shade val="50000"/>
+              </a:schemeClr>
+            </a:lnRef>
+            <a:fillRef idx="1">
+              <a:schemeClr val="accent1"/>
+            </a:fillRef>
+            <a:effectRef idx="0">
+              <a:schemeClr val="accent1"/>
+            </a:effectRef>
+            <a:fontRef idx="minor">
+              <a:schemeClr val="lt1"/>
+            </a:fontRef>
+          </p:style>
+          <p:txBody>
+            <a:bodyPr rtlCol="0" anchor="ctr"/>
+            <a:lstStyle/>
+            <a:p>
+              <a:r>
+                <a:rPr lang="en-US" sz="1600" dirty="0">
+                  <a:solidFill>
+                    <a:schemeClr val="accent6">
+                      <a:lumMod val="50000"/>
+                    </a:schemeClr>
+                  </a:solidFill>
+                </a:rPr>
+                <a:t>&lt;div&gt; .main-logo</a:t>
+              </a:r>
             </a:p>
           </p:txBody>
         </p:sp>

</xml_diff>